<commit_message>
Saliency Maps alex net model presentation modified
</commit_message>
<xml_diff>
--- a/Präsentation1 (3).pptx
+++ b/Präsentation1 (3).pptx
@@ -18,18 +18,21 @@
     <p:sldId id="268" r:id="rId12"/>
     <p:sldId id="269" r:id="rId13"/>
     <p:sldId id="282" r:id="rId14"/>
-    <p:sldId id="271" r:id="rId15"/>
-    <p:sldId id="270" r:id="rId16"/>
-    <p:sldId id="272" r:id="rId17"/>
-    <p:sldId id="273" r:id="rId18"/>
-    <p:sldId id="274" r:id="rId19"/>
-    <p:sldId id="276" r:id="rId20"/>
-    <p:sldId id="275" r:id="rId21"/>
-    <p:sldId id="279" r:id="rId22"/>
-    <p:sldId id="277" r:id="rId23"/>
-    <p:sldId id="278" r:id="rId24"/>
-    <p:sldId id="280" r:id="rId25"/>
-    <p:sldId id="281" r:id="rId26"/>
+    <p:sldId id="283" r:id="rId15"/>
+    <p:sldId id="284" r:id="rId16"/>
+    <p:sldId id="285" r:id="rId17"/>
+    <p:sldId id="271" r:id="rId18"/>
+    <p:sldId id="270" r:id="rId19"/>
+    <p:sldId id="272" r:id="rId20"/>
+    <p:sldId id="273" r:id="rId21"/>
+    <p:sldId id="274" r:id="rId22"/>
+    <p:sldId id="276" r:id="rId23"/>
+    <p:sldId id="275" r:id="rId24"/>
+    <p:sldId id="279" r:id="rId25"/>
+    <p:sldId id="277" r:id="rId26"/>
+    <p:sldId id="278" r:id="rId27"/>
+    <p:sldId id="280" r:id="rId28"/>
+    <p:sldId id="281" r:id="rId29"/>
   </p:sldIdLst>
   <p:sldSz cx="12192000" cy="6858000"/>
   <p:notesSz cx="6858000" cy="9144000"/>
@@ -4053,134 +4056,49 @@
             </a:r>
             <a:r>
               <a:rPr lang="de-DE" dirty="0"/>
-              <a:t>- Labels</a:t>
-            </a:r>
-          </a:p>
-        </p:txBody>
-      </p:sp>
-      <p:sp>
-        <p:nvSpPr>
-          <p:cNvPr id="5" name="Textfeld 4">
-            <a:extLst>
-              <a:ext uri="{FF2B5EF4-FFF2-40B4-BE49-F238E27FC236}">
-                <a16:creationId xmlns:a16="http://schemas.microsoft.com/office/drawing/2014/main" id="{D064DB0F-8769-48E6-A427-FE9967D8F4B4}"/>
-              </a:ext>
-            </a:extLst>
-          </p:cNvPr>
-          <p:cNvSpPr txBox="1"/>
+              <a:t> –</a:t>
+            </a:r>
+            <a:r>
+              <a:rPr lang="de-DE" dirty="0" err="1"/>
+              <a:t>Confusion</a:t>
+            </a:r>
+            <a:r>
+              <a:rPr lang="de-DE" dirty="0"/>
+              <a:t> Matrix</a:t>
+            </a:r>
+          </a:p>
+        </p:txBody>
+      </p:sp>
+      <p:pic>
+        <p:nvPicPr>
+          <p:cNvPr id="3" name="Grafik 2">
+            <a:extLst>
+              <a:ext uri="{FF2B5EF4-FFF2-40B4-BE49-F238E27FC236}">
+                <a16:creationId xmlns:a16="http://schemas.microsoft.com/office/drawing/2014/main" id="{F32513A5-1A7C-4658-B371-DA5869B1D017}"/>
+              </a:ext>
+            </a:extLst>
+          </p:cNvPr>
+          <p:cNvPicPr>
+            <a:picLocks noChangeAspect="1"/>
+          </p:cNvPicPr>
           <p:nvPr/>
-        </p:nvSpPr>
+        </p:nvPicPr>
+        <p:blipFill>
+          <a:blip r:embed="rId2"/>
+          <a:stretch>
+            <a:fillRect/>
+          </a:stretch>
+        </p:blipFill>
         <p:spPr>
           <a:xfrm>
-            <a:off x="308758" y="1389413"/>
-            <a:ext cx="11467606" cy="4708981"/>
+            <a:off x="1713015" y="1582533"/>
+            <a:ext cx="8765969" cy="4795132"/>
           </a:xfrm>
           <a:prstGeom prst="rect">
             <a:avLst/>
           </a:prstGeom>
-          <a:noFill/>
         </p:spPr>
-        <p:txBody>
-          <a:bodyPr wrap="square">
-            <a:spAutoFit/>
-          </a:bodyPr>
-          <a:lstStyle/>
-          <a:p>
-            <a:r>
-              <a:rPr lang="de-DE" sz="1200" dirty="0"/>
-              <a:t>Test </a:t>
-            </a:r>
-            <a:r>
-              <a:rPr lang="de-DE" sz="1200" dirty="0" err="1"/>
-              <a:t>Accuracy</a:t>
-            </a:r>
-            <a:r>
-              <a:rPr lang="de-DE" sz="1200" dirty="0"/>
-              <a:t>: 0.8705</a:t>
-            </a:r>
-          </a:p>
-          <a:p>
-            <a:r>
-              <a:rPr lang="de-DE" sz="1200" dirty="0"/>
-              <a:t>Test </a:t>
-            </a:r>
-            <a:r>
-              <a:rPr lang="de-DE" sz="1200" dirty="0" err="1"/>
-              <a:t>Accuracy</a:t>
-            </a:r>
-            <a:r>
-              <a:rPr lang="de-DE" sz="1200" dirty="0"/>
-              <a:t>: 0.8705</a:t>
-            </a:r>
-          </a:p>
-          <a:p>
-            <a:r>
-              <a:rPr lang="de-DE" sz="1200" dirty="0"/>
-              <a:t>Precision: 0.8769</a:t>
-            </a:r>
-          </a:p>
-          <a:p>
-            <a:r>
-              <a:rPr lang="de-DE" sz="1200" dirty="0"/>
-              <a:t>Recall: 0.8705</a:t>
-            </a:r>
-          </a:p>
-          <a:p>
-            <a:r>
-              <a:rPr lang="de-DE" sz="1200" dirty="0"/>
-              <a:t>F1-Score: 0.8700</a:t>
-            </a:r>
-          </a:p>
-          <a:p>
-            <a:r>
-              <a:rPr lang="de-DE" sz="1000" dirty="0"/>
-              <a:t>Labels Testdaten: [4, 24, 22, 5, 5, 8, 22, 3, 17, 13, 0, 18, 4, 25, 8, 6, 1, 11, 25, 2, 2, 8, 25, 8, 8, 3, 13, 22, 21, 22, 0, 14, 17, 17, 20, 7, 12, 6, 18, 20, 21, 23, 16, 25, 9, 3, 2, 11, 23, 18, 11, 21, 3, 21, 20, 0, 25, 16, 24, 16, 22, 13, 2, 24, 21, 18, 9, 15, 24, 17, 20, 5, 24, 5, 9, 18, 13, 8, 15, 13, 5, 23, 6, 6, 22, 12, 3, 8, 0, 5, 20, 19, 5, 25, 13, 19, 9, 12, 16, 2, 20, 20, 24, 10, 16, 19, 5, 11, 14, 10, 23, 13, 17, 11, 12, 23, 8, 13, 15, 24, 1, 2, 9, 20, 5, 7, 19, 2, 20, 4, 18, 23, 15, 14, 6, 22, 23, 22, 19, 4, 17, 23, 4, 15, 25, 14, 7, 19, 22, 1, 6, 21, 12, 3, 7, 3, 6, 6, 21, 20, 15, 21, 13, 1, 23, 0, 19, 17, 7, 3, 11, 19, 22, 20, 20, 7, 23, 17, 22, 22, 13, 20, 2, 5, 14, 20, 11, 25, 21, 20, 0, 24, 17, 0, </a:t>
-            </a:r>
-          </a:p>
-          <a:p>
-            <a:r>
-              <a:rPr lang="de-DE" sz="1000" dirty="0"/>
-              <a:t>12, 12, 14, 25, 2, 14, 4, 10, 2, 8, 6, 19, 16, 18, 2, 20, 2, 12, 3, 8, 7, 25, 20, 16, 22, 3, 12, 11, 25, 13, 8, 18, 8, 8, 10, 5, 20, 16, 19, 10, 20, 14, 17, 13, 19, 24, 15, 23, 4, 5, 10, 0, 18, 10, 14, 14, 23, 17, 3, 7, 0, 21, 3, 10, 15, 9, 9, 13, 12, 2, 10, 24, 2, 15, 18, 22, 1, 17, 3, 23, 7, 7, 22, 3, 15, 13, 5, 8, 24, 6, 5, 3, 1, 25, 21, 24, 14, 25, 11, 9, 0, 25, 24, 12, 17, 12, 21, 10, 24, 14, 8, 25, 8, 9, 16, 25, 3, 11, 11, 13, 2, 11, 7, 25, 9, 4, 15, 13, 2, 14, 5, 5, 4, 4, </a:t>
-            </a:r>
-          </a:p>
-          <a:p>
-            <a:r>
-              <a:rPr lang="de-DE" sz="1000" dirty="0"/>
-              <a:t>7, 10, 7, 10, 1, 14, 21, 7, 18, 23, 11, 1, 20, 2, 9, 20, 4, 14, 11, 7, 18, 7, 2, 16, 11, 18, 24, 9, 21, 0, 14, 13, 23, 3, 22, 7, 23, 6, 2, 0, 3, 19, 16, 19, 4, 8, 0, 21, 14, 10, 3, 9, 13, 19, 13, 22, 0, 6, 23, 16, 7, 4, 7, 23, 10, 4, 9, 5, 25, 0, 6, 8, 17, 13, 0, 19, 10, 6, 17, 5, 16, 22, 23, 7, 9, 14, 0, 1, 7, 8, 4, 21, 24, 24, 18, 17, 15, 8, 7, 13, 11, 9, 2, 13, 21, 2, 15, 17, 12, 4, 24, 9, 24, 14, 2, 12, 17, 16, 6, 10, 12, 4, 9, 17, 16, 4, 19, 18, 19, 7, 8, 4, 6, 14, 15, 5, 13, 20, 16, 22, 15, 6, 10, 6, 4, 1, 15, 16, 25, 3, 18, 15, 14, 22, 5, 2, 1, 9, 22, 5, 6, 1, 23, 23, 6, 21, 8, 21, 6, 11, 14, 1, 19, 19, 22, 4, 15, 20, 8, 15, 7, 8, 18, 23, 10, 9, 12, 4, 22, 17, 22, 15, 6, 10, 5, 18, 5, 17, 25, 11, 11, 19, 2, 22, 11, 12, 18, 1, 0, 10, 8, 1, 3, 6, 17, 22, 16, 2, 19, 14, 5, 25, 23, 1, 2, 6, 25, 25, 17, 21, 5, 21, 0, 1, 3, 11, 18, 12, 18, 17, 25, 12, 7, 15, 21, 6, 13, 13, 1, 18, 15, 7, 14, 20, 24, 21, 23, 0, 17, 18, 24, 0, 1, 9, 14, 20, 7, 1, 16, 2, 16, 11, 8, 17, 3, 10, 24, 1, 15, 18, 1, 15, 15, 25, 8, 23, 1, 1, 15, 12, 10, 16, 17, 13, 9, 9, 11, 7, 22, 12, 25, 10, 1, 21, 11, 20, 19, 20, 20, 18, 4, 0, 8, 14, 14, 5, 12, 17, 25, 13, 10, 6, 9, 19, 4, 24, 12, 1, 16, 10, 8, 24, 18, 25, 6, 0, 10, 3, 23, 16, 17, 12, 16, 0, 12, 16, 24, 5, 15, 18, 1, 9, 19, 19, 9, 3, 25, 4, 7, 24, 16, 11, 10, 21, 23, 10, 6, 13, 10, 6, 0, 21, 11, 4, 25, 23, 19, 20, 9, 11, 24, 18, 23, 22, 17, 15, 18, 21, 14, 11, 5, 24, 5, 18, 12, 3, 13, 13, 14, 20, 8, 0, 14, 21, 12, 0, 9, 0, 16, 0, 12, 11, 1, 4, 3, 9, 2, 3, 3, 0, 22, 10, 2, 15, 11, 9, 24, 24, 5, 12, 22, 4, 4, 3, 7, 16, 15, 4, 1, 1, 19, 23, 19, 19, 12, 21, 19, 16, 16, 2, 6, 21]</a:t>
-            </a:r>
-          </a:p>
-          <a:p>
-            <a:r>
-              <a:rPr lang="de-DE" sz="1000" dirty="0"/>
-              <a:t>vorhergesagte Testdaten: [4, 24, 22, 5, 5, 8, 21, 3, 17, 13, 0, 18, 4, 25, 8, 6, 5, 11, 3, 2, 2, 0, 25, 8, 11, 3, 13, 22, 21, 22, 0, 14, 17, 22, 20, 15, 0, 6, 18, 20, 20, 23, 16, 25, 9, 3, 2, 11, 23, 18, 11, 21, 3, 21, 20, 0, 25, 16, 11, 16, </a:t>
-            </a:r>
-          </a:p>
-          <a:p>
-            <a:r>
-              <a:rPr lang="de-DE" sz="1000" dirty="0"/>
-              <a:t>22, 13, 2, 24, 21, 4, 9, 16, 24, 17, 20, 5, 24, 5, 9, 18, 13, 8, 15, 13, 5, 5, 2, 6, 22, 0, 3, 8, 0, 5, 20, 19, 5, 25, 3, 19, 9, 12, 16, 2, 20, 20, 24, 22, 16, 19, 5, 11, 14, 10, 23, 13, 20, 11, 4, 23, 8, 13, 15, 3, 1, 2, 9, 20, 5, 7, 19, 2, </a:t>
-            </a:r>
-          </a:p>
-          <a:p>
-            <a:r>
-              <a:rPr lang="de-DE" sz="1000" dirty="0"/>
-              <a:t>20, 4, 18, 23, 15, 14, 6, 22, 23, 22, 0, 4, 17, 23, 4, 15, 25, 14, 7, 19, 22, 1, 6, 21, 12, 3, 7, 3, 6, 6, 21, 20, 15, 21, 13, 1, 19, 0, 19, 17, 7, 3, 11, 19, 22, 20, 20, 7, 23, 17, 22, 22, 13, 20, 2, 5, 14, 20, 11, 25, 10, 20, 0, 24, 17, 0, </a:t>
-            </a:r>
-          </a:p>
-          <a:p>
-            <a:r>
-              <a:rPr lang="de-DE" sz="1000" dirty="0"/>
-              <a:t>12, 12, 14, 25, 2, 14, 4, 10, 2, 8, 6, 19, 16, 18, 2, 20, 2, 12, 14, 8, 15, 10, 20, 16, 22, 3, 12, 11, 25, 13, 8, 18, 8, 23, 10, 5, 20, 16, 24, 10, 20, 14, 17, 18, 19, 24, 15, 23, 4, 5, 20, 0, 18, 17, 14, 14, 23, 17, 3, 7, 0, 21, 3, 10, 15, 9, 9, 13, 13, 2, 10, 24, 2, 15, 18, 22, 1, 17, 3, 23, 7, 7, 22, 3, 15, 13, 5, 4, 24, 7, 5, 17, 1, 25, 22, 24, 14, 25, 11, 9, 0, 3, 24, 12, 10, 0, 21, 10, 24, 14, 8, 25, 8, 9, 16, 25, 3, 11, 11, 13, 3, 11, 7, 25, 9, 5, 15, 13, 2, 14, 5, 5, 4, 4, 7, 22, 7, 10, 1, 18, 21, 7, 0, 23, 11, 1, 20, 2, 9, 20, 4, 14, 11, 7, 18, 7, 2, 16, 11, 18, 24, 9, 21, 0, 14, 13, 23, 3, 22, 7, 23, 6, 2, 0, 3, 0, 16, 19, 4, 8, 0, 21, 14, 10, 3, 9, 5, 19, 13, 22, 0, 6, 23, 16, 7, 4, 7, 23, 10, 4, 8, 5, 25, 0, 6, 8, 17, 13, 0, 19, 10, 6, 17, 5, 16, 22, 23, 7, 9, 12, 0, 1, 7, 0, 4, 21, 24, 24, 18, 17, 15, 8, 7, 12, 11, 9, 2, 13, 22, 2, 15, 17, 0, 4, 24, 9, 24, 14, 2, 12, 17, 16, 6, 22, 12, 4, 9, 17, 16, 4, 19, 4, 19, 7, 8, 4, 6, 14, 15, 5, 13, 20, 16, 22, 15, 6, 21, 6, 4, 1, 15, 16, 25, 3, 0, 15, 14, 22, 5, 2, 1, 9, 21, 5, 6, 1, 23, 23, 18, 21, 8, 21, 6, 11, 14, 1, 19, 11, 22, 4, 15, 20, 8, 15, 7, 10, 23, 19, 21, 9, 12, 4, 22, 17, 22, 15, 6, 10, 5, 8, 5, 17, 25, 11, 11, 19, 2, 22, 11, 12, 0, 1, 0, 10, 10, 1, 3, 8, 17, 22, 16, 2, 19, 14, 5, 25, 23, 1, 2, 6, 25, 25, 17, 22, 5, 21, 0, 1, 3, 11, 18, 12, 18, 23, 25, 4, 7, 15, 21, 6, 13, 13, 1, 0, 15, 7, 5, 20, 24, 22, 25, 0, 17, 18, 24, 0, 1, 9, 14, 20, 7, 1, 16, 2, 16, 11, </a:t>
-            </a:r>
-          </a:p>
-          <a:p>
-            <a:r>
-              <a:rPr lang="de-DE" sz="1000" dirty="0"/>
-              <a:t>8, 17, 3, 10, 24, 1, 6, 18, 1, 15, 15, 25, 8, 23, 1, 1, 15, 12, 10, 16, 20, 12, 9, 23, 11, 7, 22, 12, 25, 10, 1, 20, 11, 20, 19, 20, 20, 18, 4, 0, 18, 14, 14, 5, 12, 20, 25, 16, 10, 6, 9, 24, 4, 24, 12, 1, 16, 10, 8, 24, 0, 25, 6, 0, 10, 3, 20, 16, 17, 12, 16, 0, 12, 16, 24, 5, 15, 18, 1, 24, 19, 19, 9, 3, 25, 4, 7, 23, 16, 11, 8, 21, 5, 10, 6, 12, 10, 6, 0, 22, 11, 4, 25, 23, 19, 20, 9, 11, 24, 18, 23, 21, 17, 15, 18, 22, 14, 11, 5, 25, 5, 18, 12, 3, 13, 13, 14, 17, 8, 0, 14, 22, 12, 13, 9, 0, 16, 0, 12, 11, 1, 4, 3, 9, 2, 3, 3, 0, 22, 10, 2, 15, 24, 9, 24, 24, 5, 12, 22, 4, 0, 3, 7, 16, 15, 4, 1, 1, 19, 18, 19, 19, 12, 21, 19, 16, 2, 2, 6, 21]</a:t>
-            </a:r>
-          </a:p>
-        </p:txBody>
-      </p:sp>
+      </p:pic>
     </p:spTree>
     <p:extLst>
       <p:ext uri="{BB962C8B-B14F-4D97-AF65-F5344CB8AC3E}">
@@ -4213,10 +4131,10 @@
       </p:grpSpPr>
       <p:sp>
         <p:nvSpPr>
-          <p:cNvPr id="2" name="Titel 1">
-            <a:extLst>
-              <a:ext uri="{FF2B5EF4-FFF2-40B4-BE49-F238E27FC236}">
-                <a16:creationId xmlns:a16="http://schemas.microsoft.com/office/drawing/2014/main" id="{FA0E998A-8B92-4AB3-A9A8-1DE5D112DC24}"/>
+          <p:cNvPr id="16" name="Titel 1">
+            <a:extLst>
+              <a:ext uri="{FF2B5EF4-FFF2-40B4-BE49-F238E27FC236}">
+                <a16:creationId xmlns:a16="http://schemas.microsoft.com/office/drawing/2014/main" id="{CE3C357C-3A6D-4B2D-919B-468E62ADB4A7}"/>
               </a:ext>
             </a:extLst>
           </p:cNvPr>
@@ -4227,78 +4145,146 @@
             <p:ph type="title"/>
           </p:nvPr>
         </p:nvSpPr>
-        <p:spPr/>
+        <p:spPr>
+          <a:xfrm>
+            <a:off x="415636" y="317623"/>
+            <a:ext cx="10515600" cy="1325563"/>
+          </a:xfrm>
+        </p:spPr>
         <p:txBody>
           <a:bodyPr/>
           <a:lstStyle/>
           <a:p>
             <a:r>
-              <a:rPr lang="de-DE" dirty="0"/>
-              <a:t>ResNet50 on </a:t>
-            </a:r>
-            <a:r>
-              <a:rPr lang="de-DE" dirty="0" err="1"/>
-              <a:t>new</a:t>
-            </a:r>
-            <a:r>
-              <a:rPr lang="de-DE" dirty="0"/>
-              <a:t> Dataset</a:t>
-            </a:r>
-          </a:p>
-        </p:txBody>
-      </p:sp>
-      <p:sp>
-        <p:nvSpPr>
-          <p:cNvPr id="3" name="Inhaltsplatzhalter 2">
-            <a:extLst>
-              <a:ext uri="{FF2B5EF4-FFF2-40B4-BE49-F238E27FC236}">
-                <a16:creationId xmlns:a16="http://schemas.microsoft.com/office/drawing/2014/main" id="{03FCA3D9-EE93-495D-BB38-42608EA49BF0}"/>
-              </a:ext>
-            </a:extLst>
-          </p:cNvPr>
-          <p:cNvSpPr>
-            <a:spLocks noGrp="1"/>
-          </p:cNvSpPr>
-          <p:nvPr>
-            <p:ph idx="1"/>
-          </p:nvPr>
-        </p:nvSpPr>
-        <p:spPr/>
-        <p:txBody>
-          <a:bodyPr/>
+              <a:rPr lang="de-DE" dirty="0" err="1"/>
+              <a:t>AlexNet</a:t>
+            </a:r>
+            <a:r>
+              <a:rPr lang="de-DE" dirty="0"/>
+              <a:t>- Labels</a:t>
+            </a:r>
+          </a:p>
+        </p:txBody>
+      </p:sp>
+      <p:sp>
+        <p:nvSpPr>
+          <p:cNvPr id="5" name="Textfeld 4">
+            <a:extLst>
+              <a:ext uri="{FF2B5EF4-FFF2-40B4-BE49-F238E27FC236}">
+                <a16:creationId xmlns:a16="http://schemas.microsoft.com/office/drawing/2014/main" id="{D064DB0F-8769-48E6-A427-FE9967D8F4B4}"/>
+              </a:ext>
+            </a:extLst>
+          </p:cNvPr>
+          <p:cNvSpPr txBox="1"/>
+          <p:nvPr/>
+        </p:nvSpPr>
+        <p:spPr>
+          <a:xfrm>
+            <a:off x="308758" y="1389413"/>
+            <a:ext cx="11467606" cy="4708981"/>
+          </a:xfrm>
+          <a:prstGeom prst="rect">
+            <a:avLst/>
+          </a:prstGeom>
+          <a:noFill/>
+        </p:spPr>
+        <p:txBody>
+          <a:bodyPr wrap="square">
+            <a:spAutoFit/>
+          </a:bodyPr>
           <a:lstStyle/>
           <a:p>
             <a:r>
-              <a:rPr lang="de-DE" dirty="0" err="1"/>
-              <a:t>Augmentierung</a:t>
-            </a:r>
-            <a:r>
-              <a:rPr lang="de-DE" dirty="0"/>
-              <a:t>: Spiegeln, </a:t>
-            </a:r>
-            <a:r>
-              <a:rPr lang="de-DE" dirty="0" err="1"/>
-              <a:t>Crop</a:t>
-            </a:r>
-            <a:r>
-              <a:rPr lang="de-DE" dirty="0"/>
-              <a:t> </a:t>
-            </a:r>
-            <a:r>
-              <a:rPr lang="de-DE" dirty="0" err="1"/>
-              <a:t>with</a:t>
-            </a:r>
-            <a:r>
-              <a:rPr lang="de-DE" dirty="0"/>
-              <a:t> </a:t>
-            </a:r>
-            <a:r>
-              <a:rPr lang="de-DE" dirty="0" err="1"/>
-              <a:t>padding</a:t>
-            </a:r>
-            <a:r>
-              <a:rPr lang="de-DE" dirty="0"/>
-              <a:t> n = 4</a:t>
+              <a:rPr lang="de-DE" sz="1200" dirty="0"/>
+              <a:t>Test </a:t>
+            </a:r>
+            <a:r>
+              <a:rPr lang="de-DE" sz="1200" dirty="0" err="1"/>
+              <a:t>Accuracy</a:t>
+            </a:r>
+            <a:r>
+              <a:rPr lang="de-DE" sz="1200" dirty="0"/>
+              <a:t>: 0.8705</a:t>
+            </a:r>
+          </a:p>
+          <a:p>
+            <a:r>
+              <a:rPr lang="de-DE" sz="1200" dirty="0"/>
+              <a:t>Test </a:t>
+            </a:r>
+            <a:r>
+              <a:rPr lang="de-DE" sz="1200" dirty="0" err="1"/>
+              <a:t>Accuracy</a:t>
+            </a:r>
+            <a:r>
+              <a:rPr lang="de-DE" sz="1200" dirty="0"/>
+              <a:t>: 0.8705</a:t>
+            </a:r>
+          </a:p>
+          <a:p>
+            <a:r>
+              <a:rPr lang="de-DE" sz="1200" dirty="0"/>
+              <a:t>Precision: 0.8769</a:t>
+            </a:r>
+          </a:p>
+          <a:p>
+            <a:r>
+              <a:rPr lang="de-DE" sz="1200" dirty="0"/>
+              <a:t>Recall: 0.8705</a:t>
+            </a:r>
+          </a:p>
+          <a:p>
+            <a:r>
+              <a:rPr lang="de-DE" sz="1200" dirty="0"/>
+              <a:t>F1-Score: 0.8700</a:t>
+            </a:r>
+          </a:p>
+          <a:p>
+            <a:r>
+              <a:rPr lang="de-DE" sz="1000" dirty="0"/>
+              <a:t>Labels Testdaten: [4, 24, 22, 5, 5, 8, 22, 3, 17, 13, 0, 18, 4, 25, 8, 6, 1, 11, 25, 2, 2, 8, 25, 8, 8, 3, 13, 22, 21, 22, 0, 14, 17, 17, 20, 7, 12, 6, 18, 20, 21, 23, 16, 25, 9, 3, 2, 11, 23, 18, 11, 21, 3, 21, 20, 0, 25, 16, 24, 16, 22, 13, 2, 24, 21, 18, 9, 15, 24, 17, 20, 5, 24, 5, 9, 18, 13, 8, 15, 13, 5, 23, 6, 6, 22, 12, 3, 8, 0, 5, 20, 19, 5, 25, 13, 19, 9, 12, 16, 2, 20, 20, 24, 10, 16, 19, 5, 11, 14, 10, 23, 13, 17, 11, 12, 23, 8, 13, 15, 24, 1, 2, 9, 20, 5, 7, 19, 2, 20, 4, 18, 23, 15, 14, 6, 22, 23, 22, 19, 4, 17, 23, 4, 15, 25, 14, 7, 19, 22, 1, 6, 21, 12, 3, 7, 3, 6, 6, 21, 20, 15, 21, 13, 1, 23, 0, 19, 17, 7, 3, 11, 19, 22, 20, 20, 7, 23, 17, 22, 22, 13, 20, 2, 5, 14, 20, 11, 25, 21, 20, 0, 24, 17, 0, </a:t>
+            </a:r>
+          </a:p>
+          <a:p>
+            <a:r>
+              <a:rPr lang="de-DE" sz="1000" dirty="0"/>
+              <a:t>12, 12, 14, 25, 2, 14, 4, 10, 2, 8, 6, 19, 16, 18, 2, 20, 2, 12, 3, 8, 7, 25, 20, 16, 22, 3, 12, 11, 25, 13, 8, 18, 8, 8, 10, 5, 20, 16, 19, 10, 20, 14, 17, 13, 19, 24, 15, 23, 4, 5, 10, 0, 18, 10, 14, 14, 23, 17, 3, 7, 0, 21, 3, 10, 15, 9, 9, 13, 12, 2, 10, 24, 2, 15, 18, 22, 1, 17, 3, 23, 7, 7, 22, 3, 15, 13, 5, 8, 24, 6, 5, 3, 1, 25, 21, 24, 14, 25, 11, 9, 0, 25, 24, 12, 17, 12, 21, 10, 24, 14, 8, 25, 8, 9, 16, 25, 3, 11, 11, 13, 2, 11, 7, 25, 9, 4, 15, 13, 2, 14, 5, 5, 4, 4, </a:t>
+            </a:r>
+          </a:p>
+          <a:p>
+            <a:r>
+              <a:rPr lang="de-DE" sz="1000" dirty="0"/>
+              <a:t>7, 10, 7, 10, 1, 14, 21, 7, 18, 23, 11, 1, 20, 2, 9, 20, 4, 14, 11, 7, 18, 7, 2, 16, 11, 18, 24, 9, 21, 0, 14, 13, 23, 3, 22, 7, 23, 6, 2, 0, 3, 19, 16, 19, 4, 8, 0, 21, 14, 10, 3, 9, 13, 19, 13, 22, 0, 6, 23, 16, 7, 4, 7, 23, 10, 4, 9, 5, 25, 0, 6, 8, 17, 13, 0, 19, 10, 6, 17, 5, 16, 22, 23, 7, 9, 14, 0, 1, 7, 8, 4, 21, 24, 24, 18, 17, 15, 8, 7, 13, 11, 9, 2, 13, 21, 2, 15, 17, 12, 4, 24, 9, 24, 14, 2, 12, 17, 16, 6, 10, 12, 4, 9, 17, 16, 4, 19, 18, 19, 7, 8, 4, 6, 14, 15, 5, 13, 20, 16, 22, 15, 6, 10, 6, 4, 1, 15, 16, 25, 3, 18, 15, 14, 22, 5, 2, 1, 9, 22, 5, 6, 1, 23, 23, 6, 21, 8, 21, 6, 11, 14, 1, 19, 19, 22, 4, 15, 20, 8, 15, 7, 8, 18, 23, 10, 9, 12, 4, 22, 17, 22, 15, 6, 10, 5, 18, 5, 17, 25, 11, 11, 19, 2, 22, 11, 12, 18, 1, 0, 10, 8, 1, 3, 6, 17, 22, 16, 2, 19, 14, 5, 25, 23, 1, 2, 6, 25, 25, 17, 21, 5, 21, 0, 1, 3, 11, 18, 12, 18, 17, 25, 12, 7, 15, 21, 6, 13, 13, 1, 18, 15, 7, 14, 20, 24, 21, 23, 0, 17, 18, 24, 0, 1, 9, 14, 20, 7, 1, 16, 2, 16, 11, 8, 17, 3, 10, 24, 1, 15, 18, 1, 15, 15, 25, 8, 23, 1, 1, 15, 12, 10, 16, 17, 13, 9, 9, 11, 7, 22, 12, 25, 10, 1, 21, 11, 20, 19, 20, 20, 18, 4, 0, 8, 14, 14, 5, 12, 17, 25, 13, 10, 6, 9, 19, 4, 24, 12, 1, 16, 10, 8, 24, 18, 25, 6, 0, 10, 3, 23, 16, 17, 12, 16, 0, 12, 16, 24, 5, 15, 18, 1, 9, 19, 19, 9, 3, 25, 4, 7, 24, 16, 11, 10, 21, 23, 10, 6, 13, 10, 6, 0, 21, 11, 4, 25, 23, 19, 20, 9, 11, 24, 18, 23, 22, 17, 15, 18, 21, 14, 11, 5, 24, 5, 18, 12, 3, 13, 13, 14, 20, 8, 0, 14, 21, 12, 0, 9, 0, 16, 0, 12, 11, 1, 4, 3, 9, 2, 3, 3, 0, 22, 10, 2, 15, 11, 9, 24, 24, 5, 12, 22, 4, 4, 3, 7, 16, 15, 4, 1, 1, 19, 23, 19, 19, 12, 21, 19, 16, 16, 2, 6, 21]</a:t>
+            </a:r>
+          </a:p>
+          <a:p>
+            <a:r>
+              <a:rPr lang="de-DE" sz="1000" dirty="0"/>
+              <a:t>vorhergesagte Testdaten: [4, 24, 22, 5, 5, 8, 21, 3, 17, 13, 0, 18, 4, 25, 8, 6, 5, 11, 3, 2, 2, 0, 25, 8, 11, 3, 13, 22, 21, 22, 0, 14, 17, 22, 20, 15, 0, 6, 18, 20, 20, 23, 16, 25, 9, 3, 2, 11, 23, 18, 11, 21, 3, 21, 20, 0, 25, 16, 11, 16, </a:t>
+            </a:r>
+          </a:p>
+          <a:p>
+            <a:r>
+              <a:rPr lang="de-DE" sz="1000" dirty="0"/>
+              <a:t>22, 13, 2, 24, 21, 4, 9, 16, 24, 17, 20, 5, 24, 5, 9, 18, 13, 8, 15, 13, 5, 5, 2, 6, 22, 0, 3, 8, 0, 5, 20, 19, 5, 25, 3, 19, 9, 12, 16, 2, 20, 20, 24, 22, 16, 19, 5, 11, 14, 10, 23, 13, 20, 11, 4, 23, 8, 13, 15, 3, 1, 2, 9, 20, 5, 7, 19, 2, </a:t>
+            </a:r>
+          </a:p>
+          <a:p>
+            <a:r>
+              <a:rPr lang="de-DE" sz="1000" dirty="0"/>
+              <a:t>20, 4, 18, 23, 15, 14, 6, 22, 23, 22, 0, 4, 17, 23, 4, 15, 25, 14, 7, 19, 22, 1, 6, 21, 12, 3, 7, 3, 6, 6, 21, 20, 15, 21, 13, 1, 19, 0, 19, 17, 7, 3, 11, 19, 22, 20, 20, 7, 23, 17, 22, 22, 13, 20, 2, 5, 14, 20, 11, 25, 10, 20, 0, 24, 17, 0, </a:t>
+            </a:r>
+          </a:p>
+          <a:p>
+            <a:r>
+              <a:rPr lang="de-DE" sz="1000" dirty="0"/>
+              <a:t>12, 12, 14, 25, 2, 14, 4, 10, 2, 8, 6, 19, 16, 18, 2, 20, 2, 12, 14, 8, 15, 10, 20, 16, 22, 3, 12, 11, 25, 13, 8, 18, 8, 23, 10, 5, 20, 16, 24, 10, 20, 14, 17, 18, 19, 24, 15, 23, 4, 5, 20, 0, 18, 17, 14, 14, 23, 17, 3, 7, 0, 21, 3, 10, 15, 9, 9, 13, 13, 2, 10, 24, 2, 15, 18, 22, 1, 17, 3, 23, 7, 7, 22, 3, 15, 13, 5, 4, 24, 7, 5, 17, 1, 25, 22, 24, 14, 25, 11, 9, 0, 3, 24, 12, 10, 0, 21, 10, 24, 14, 8, 25, 8, 9, 16, 25, 3, 11, 11, 13, 3, 11, 7, 25, 9, 5, 15, 13, 2, 14, 5, 5, 4, 4, 7, 22, 7, 10, 1, 18, 21, 7, 0, 23, 11, 1, 20, 2, 9, 20, 4, 14, 11, 7, 18, 7, 2, 16, 11, 18, 24, 9, 21, 0, 14, 13, 23, 3, 22, 7, 23, 6, 2, 0, 3, 0, 16, 19, 4, 8, 0, 21, 14, 10, 3, 9, 5, 19, 13, 22, 0, 6, 23, 16, 7, 4, 7, 23, 10, 4, 8, 5, 25, 0, 6, 8, 17, 13, 0, 19, 10, 6, 17, 5, 16, 22, 23, 7, 9, 12, 0, 1, 7, 0, 4, 21, 24, 24, 18, 17, 15, 8, 7, 12, 11, 9, 2, 13, 22, 2, 15, 17, 0, 4, 24, 9, 24, 14, 2, 12, 17, 16, 6, 22, 12, 4, 9, 17, 16, 4, 19, 4, 19, 7, 8, 4, 6, 14, 15, 5, 13, 20, 16, 22, 15, 6, 21, 6, 4, 1, 15, 16, 25, 3, 0, 15, 14, 22, 5, 2, 1, 9, 21, 5, 6, 1, 23, 23, 18, 21, 8, 21, 6, 11, 14, 1, 19, 11, 22, 4, 15, 20, 8, 15, 7, 10, 23, 19, 21, 9, 12, 4, 22, 17, 22, 15, 6, 10, 5, 8, 5, 17, 25, 11, 11, 19, 2, 22, 11, 12, 0, 1, 0, 10, 10, 1, 3, 8, 17, 22, 16, 2, 19, 14, 5, 25, 23, 1, 2, 6, 25, 25, 17, 22, 5, 21, 0, 1, 3, 11, 18, 12, 18, 23, 25, 4, 7, 15, 21, 6, 13, 13, 1, 0, 15, 7, 5, 20, 24, 22, 25, 0, 17, 18, 24, 0, 1, 9, 14, 20, 7, 1, 16, 2, 16, 11, </a:t>
+            </a:r>
+          </a:p>
+          <a:p>
+            <a:r>
+              <a:rPr lang="de-DE" sz="1000" dirty="0"/>
+              <a:t>8, 17, 3, 10, 24, 1, 6, 18, 1, 15, 15, 25, 8, 23, 1, 1, 15, 12, 10, 16, 20, 12, 9, 23, 11, 7, 22, 12, 25, 10, 1, 20, 11, 20, 19, 20, 20, 18, 4, 0, 18, 14, 14, 5, 12, 20, 25, 16, 10, 6, 9, 24, 4, 24, 12, 1, 16, 10, 8, 24, 0, 25, 6, 0, 10, 3, 20, 16, 17, 12, 16, 0, 12, 16, 24, 5, 15, 18, 1, 24, 19, 19, 9, 3, 25, 4, 7, 23, 16, 11, 8, 21, 5, 10, 6, 12, 10, 6, 0, 22, 11, 4, 25, 23, 19, 20, 9, 11, 24, 18, 23, 21, 17, 15, 18, 22, 14, 11, 5, 25, 5, 18, 12, 3, 13, 13, 14, 17, 8, 0, 14, 22, 12, 13, 9, 0, 16, 0, 12, 11, 1, 4, 3, 9, 2, 3, 3, 0, 22, 10, 2, 15, 24, 9, 24, 24, 5, 12, 22, 4, 0, 3, 7, 16, 15, 4, 1, 1, 19, 18, 19, 19, 12, 21, 19, 16, 2, 2, 6, 21]</a:t>
             </a:r>
           </a:p>
         </p:txBody>
@@ -4306,7 +4292,7 @@
     </p:spTree>
     <p:extLst>
       <p:ext uri="{BB962C8B-B14F-4D97-AF65-F5344CB8AC3E}">
-        <p14:creationId xmlns:p14="http://schemas.microsoft.com/office/powerpoint/2010/main" val="3635575258"/>
+        <p14:creationId xmlns:p14="http://schemas.microsoft.com/office/powerpoint/2010/main" val="334209920"/>
       </p:ext>
     </p:extLst>
   </p:cSld>
@@ -4335,416 +4321,75 @@
       </p:grpSpPr>
       <p:sp>
         <p:nvSpPr>
-          <p:cNvPr id="10" name="Textfeld 9">
-            <a:extLst>
-              <a:ext uri="{FF2B5EF4-FFF2-40B4-BE49-F238E27FC236}">
-                <a16:creationId xmlns:a16="http://schemas.microsoft.com/office/drawing/2014/main" id="{8214A440-4372-42B2-95FA-FB333F1ACF7C}"/>
-              </a:ext>
-            </a:extLst>
-          </p:cNvPr>
-          <p:cNvSpPr txBox="1"/>
+          <p:cNvPr id="2" name="Titel 1">
+            <a:extLst>
+              <a:ext uri="{FF2B5EF4-FFF2-40B4-BE49-F238E27FC236}">
+                <a16:creationId xmlns:a16="http://schemas.microsoft.com/office/drawing/2014/main" id="{9672587A-9876-4331-AC51-AA638EA60F83}"/>
+              </a:ext>
+            </a:extLst>
+          </p:cNvPr>
+          <p:cNvSpPr>
+            <a:spLocks noGrp="1"/>
+          </p:cNvSpPr>
+          <p:nvPr>
+            <p:ph type="title"/>
+          </p:nvPr>
+        </p:nvSpPr>
+        <p:spPr/>
+        <p:txBody>
+          <a:bodyPr/>
+          <a:lstStyle/>
+          <a:p>
+            <a:r>
+              <a:rPr lang="de-DE" dirty="0" err="1"/>
+              <a:t>AlexNet</a:t>
+            </a:r>
+            <a:r>
+              <a:rPr lang="de-DE" dirty="0"/>
+              <a:t> –Loss and </a:t>
+            </a:r>
+            <a:r>
+              <a:rPr lang="de-DE" dirty="0" err="1"/>
+              <a:t>Accuracy</a:t>
+            </a:r>
+            <a:endParaRPr lang="de-DE" dirty="0"/>
+          </a:p>
+        </p:txBody>
+      </p:sp>
+      <p:pic>
+        <p:nvPicPr>
+          <p:cNvPr id="6" name="Grafik 5">
+            <a:extLst>
+              <a:ext uri="{FF2B5EF4-FFF2-40B4-BE49-F238E27FC236}">
+                <a16:creationId xmlns:a16="http://schemas.microsoft.com/office/drawing/2014/main" id="{BCA779CB-39BD-4D78-99DA-D05FB82932A6}"/>
+              </a:ext>
+            </a:extLst>
+          </p:cNvPr>
+          <p:cNvPicPr>
+            <a:picLocks noChangeAspect="1"/>
+          </p:cNvPicPr>
           <p:nvPr/>
-        </p:nvSpPr>
+        </p:nvPicPr>
+        <p:blipFill>
+          <a:blip r:embed="rId2"/>
+          <a:stretch>
+            <a:fillRect/>
+          </a:stretch>
+        </p:blipFill>
         <p:spPr>
           <a:xfrm>
-            <a:off x="700644" y="197346"/>
-            <a:ext cx="10747169" cy="6463308"/>
+            <a:off x="1269137" y="1490353"/>
+            <a:ext cx="9653726" cy="5099311"/>
           </a:xfrm>
           <a:prstGeom prst="rect">
             <a:avLst/>
           </a:prstGeom>
-          <a:noFill/>
         </p:spPr>
-        <p:txBody>
-          <a:bodyPr wrap="square">
-            <a:spAutoFit/>
-          </a:bodyPr>
-          <a:lstStyle/>
-          <a:p>
-            <a:r>
-              <a:rPr lang="de-DE" dirty="0"/>
-              <a:t>Trial 0 </a:t>
-            </a:r>
-            <a:r>
-              <a:rPr lang="de-DE" dirty="0" err="1"/>
-              <a:t>finished</a:t>
-            </a:r>
-            <a:r>
-              <a:rPr lang="de-DE" dirty="0"/>
-              <a:t> </a:t>
-            </a:r>
-            <a:r>
-              <a:rPr lang="de-DE" dirty="0" err="1"/>
-              <a:t>with</a:t>
-            </a:r>
-            <a:r>
-              <a:rPr lang="de-DE" dirty="0"/>
-              <a:t> </a:t>
-            </a:r>
-            <a:r>
-              <a:rPr lang="de-DE" dirty="0" err="1"/>
-              <a:t>value</a:t>
-            </a:r>
-            <a:r>
-              <a:rPr lang="de-DE" dirty="0"/>
-              <a:t>: 0.7784011220196353 and </a:t>
-            </a:r>
-            <a:r>
-              <a:rPr lang="de-DE" dirty="0" err="1"/>
-              <a:t>parameters</a:t>
-            </a:r>
-            <a:r>
-              <a:rPr lang="de-DE" dirty="0"/>
-              <a:t>: {'</a:t>
-            </a:r>
-            <a:r>
-              <a:rPr lang="de-DE" dirty="0" err="1"/>
-              <a:t>learning_rate</a:t>
-            </a:r>
-            <a:r>
-              <a:rPr lang="de-DE" dirty="0"/>
-              <a:t>': 0.0006965942314459044, '</a:t>
-            </a:r>
-            <a:r>
-              <a:rPr lang="de-DE" dirty="0" err="1"/>
-              <a:t>batch_size</a:t>
-            </a:r>
-            <a:r>
-              <a:rPr lang="de-DE" dirty="0"/>
-              <a:t>': 64, '</a:t>
-            </a:r>
-            <a:r>
-              <a:rPr lang="de-DE" dirty="0" err="1"/>
-              <a:t>num_epochs</a:t>
-            </a:r>
-            <a:r>
-              <a:rPr lang="de-DE" dirty="0"/>
-              <a:t>': 10}. Best </a:t>
-            </a:r>
-            <a:r>
-              <a:rPr lang="de-DE" dirty="0" err="1"/>
-              <a:t>is</a:t>
-            </a:r>
-            <a:r>
-              <a:rPr lang="de-DE" dirty="0"/>
-              <a:t> </a:t>
-            </a:r>
-            <a:r>
-              <a:rPr lang="de-DE" dirty="0" err="1"/>
-              <a:t>trial</a:t>
-            </a:r>
-            <a:r>
-              <a:rPr lang="de-DE" dirty="0"/>
-              <a:t> 0 </a:t>
-            </a:r>
-            <a:r>
-              <a:rPr lang="de-DE" dirty="0" err="1"/>
-              <a:t>with</a:t>
-            </a:r>
-            <a:r>
-              <a:rPr lang="de-DE" dirty="0"/>
-              <a:t> </a:t>
-            </a:r>
-            <a:r>
-              <a:rPr lang="de-DE" dirty="0" err="1"/>
-              <a:t>value</a:t>
-            </a:r>
-            <a:r>
-              <a:rPr lang="de-DE" dirty="0"/>
-              <a:t>: 0.7784011220196353.</a:t>
-            </a:r>
-          </a:p>
-          <a:p>
-            <a:endParaRPr lang="de-DE" dirty="0"/>
-          </a:p>
-          <a:p>
-            <a:r>
-              <a:rPr lang="de-DE" dirty="0"/>
-              <a:t>Beste Hyperparameter: {'</a:t>
-            </a:r>
-            <a:r>
-              <a:rPr lang="de-DE" dirty="0" err="1"/>
-              <a:t>learning_rate</a:t>
-            </a:r>
-            <a:r>
-              <a:rPr lang="de-DE" dirty="0"/>
-              <a:t>': 0.0006965942314459044, '</a:t>
-            </a:r>
-            <a:r>
-              <a:rPr lang="de-DE" dirty="0" err="1"/>
-              <a:t>batch_size</a:t>
-            </a:r>
-            <a:r>
-              <a:rPr lang="de-DE" dirty="0"/>
-              <a:t>': 64, '</a:t>
-            </a:r>
-            <a:r>
-              <a:rPr lang="de-DE" dirty="0" err="1"/>
-              <a:t>num_epochs</a:t>
-            </a:r>
-            <a:r>
-              <a:rPr lang="de-DE" dirty="0"/>
-              <a:t>': 10}</a:t>
-            </a:r>
-          </a:p>
-          <a:p>
-            <a:r>
-              <a:rPr lang="de-DE" dirty="0"/>
-              <a:t>Bester Validierungsverlust: 0.7784011220196353</a:t>
-            </a:r>
-          </a:p>
-          <a:p>
-            <a:endParaRPr lang="de-DE" dirty="0"/>
-          </a:p>
-          <a:p>
-            <a:r>
-              <a:rPr lang="de-DE" dirty="0" err="1"/>
-              <a:t>Epoch</a:t>
-            </a:r>
-            <a:r>
-              <a:rPr lang="de-DE" dirty="0"/>
-              <a:t> 1/10, Loss: 2.6664, </a:t>
-            </a:r>
-            <a:r>
-              <a:rPr lang="de-DE" dirty="0" err="1"/>
-              <a:t>Accuracy</a:t>
-            </a:r>
-            <a:r>
-              <a:rPr lang="de-DE" dirty="0"/>
-              <a:t>: 0.3958</a:t>
-            </a:r>
-          </a:p>
-          <a:p>
-            <a:r>
-              <a:rPr lang="de-DE" dirty="0" err="1"/>
-              <a:t>Epoch</a:t>
-            </a:r>
-            <a:r>
-              <a:rPr lang="de-DE" dirty="0"/>
-              <a:t> 2/10, Loss: 1.9060, </a:t>
-            </a:r>
-            <a:r>
-              <a:rPr lang="de-DE" dirty="0" err="1"/>
-              <a:t>Accuracy</a:t>
-            </a:r>
-            <a:r>
-              <a:rPr lang="de-DE" dirty="0"/>
-              <a:t>: 0.6386</a:t>
-            </a:r>
-          </a:p>
-          <a:p>
-            <a:r>
-              <a:rPr lang="de-DE" dirty="0" err="1"/>
-              <a:t>Epoch</a:t>
-            </a:r>
-            <a:r>
-              <a:rPr lang="de-DE" dirty="0"/>
-              <a:t> 3/10, Loss: 1.5304, </a:t>
-            </a:r>
-            <a:r>
-              <a:rPr lang="de-DE" dirty="0" err="1"/>
-              <a:t>Accuracy</a:t>
-            </a:r>
-            <a:r>
-              <a:rPr lang="de-DE" dirty="0"/>
-              <a:t>: 0.7085</a:t>
-            </a:r>
-          </a:p>
-          <a:p>
-            <a:r>
-              <a:rPr lang="de-DE" dirty="0" err="1"/>
-              <a:t>Epoch</a:t>
-            </a:r>
-            <a:r>
-              <a:rPr lang="de-DE" dirty="0"/>
-              <a:t> 4/10, Loss: 1.3135, </a:t>
-            </a:r>
-            <a:r>
-              <a:rPr lang="de-DE" dirty="0" err="1"/>
-              <a:t>Accuracy</a:t>
-            </a:r>
-            <a:r>
-              <a:rPr lang="de-DE" dirty="0"/>
-              <a:t>: 0.7431</a:t>
-            </a:r>
-          </a:p>
-          <a:p>
-            <a:r>
-              <a:rPr lang="de-DE" dirty="0" err="1"/>
-              <a:t>Epoch</a:t>
-            </a:r>
-            <a:r>
-              <a:rPr lang="de-DE" dirty="0"/>
-              <a:t> 5/10, Loss: 1.1643, </a:t>
-            </a:r>
-            <a:r>
-              <a:rPr lang="de-DE" dirty="0" err="1"/>
-              <a:t>Accuracy</a:t>
-            </a:r>
-            <a:r>
-              <a:rPr lang="de-DE" dirty="0"/>
-              <a:t>: 0.7680</a:t>
-            </a:r>
-          </a:p>
-          <a:p>
-            <a:r>
-              <a:rPr lang="de-DE" dirty="0" err="1"/>
-              <a:t>Epoch</a:t>
-            </a:r>
-            <a:r>
-              <a:rPr lang="de-DE" dirty="0"/>
-              <a:t> 6/10, Loss: 1.0487, </a:t>
-            </a:r>
-            <a:r>
-              <a:rPr lang="de-DE" dirty="0" err="1"/>
-              <a:t>Accuracy</a:t>
-            </a:r>
-            <a:r>
-              <a:rPr lang="de-DE" dirty="0"/>
-              <a:t>: 0.7863</a:t>
-            </a:r>
-          </a:p>
-          <a:p>
-            <a:r>
-              <a:rPr lang="de-DE" dirty="0" err="1"/>
-              <a:t>Epoch</a:t>
-            </a:r>
-            <a:r>
-              <a:rPr lang="de-DE" dirty="0"/>
-              <a:t> 7/10, Loss: 0.9651, </a:t>
-            </a:r>
-            <a:r>
-              <a:rPr lang="de-DE" dirty="0" err="1"/>
-              <a:t>Accuracy</a:t>
-            </a:r>
-            <a:r>
-              <a:rPr lang="de-DE" dirty="0"/>
-              <a:t>: 0.7986</a:t>
-            </a:r>
-          </a:p>
-          <a:p>
-            <a:r>
-              <a:rPr lang="de-DE" dirty="0" err="1"/>
-              <a:t>Epoch</a:t>
-            </a:r>
-            <a:r>
-              <a:rPr lang="de-DE" dirty="0"/>
-              <a:t> 8/10, Loss: 0.9009, </a:t>
-            </a:r>
-            <a:r>
-              <a:rPr lang="de-DE" dirty="0" err="1"/>
-              <a:t>Accuracy</a:t>
-            </a:r>
-            <a:r>
-              <a:rPr lang="de-DE" dirty="0"/>
-              <a:t>: 0.8123</a:t>
-            </a:r>
-          </a:p>
-          <a:p>
-            <a:r>
-              <a:rPr lang="de-DE" dirty="0" err="1"/>
-              <a:t>Epoch</a:t>
-            </a:r>
-            <a:r>
-              <a:rPr lang="de-DE" dirty="0"/>
-              <a:t> 9/10, Loss: 0.8358, </a:t>
-            </a:r>
-            <a:r>
-              <a:rPr lang="de-DE" dirty="0" err="1"/>
-              <a:t>Accuracy</a:t>
-            </a:r>
-            <a:r>
-              <a:rPr lang="de-DE" dirty="0"/>
-              <a:t>: 0.8261</a:t>
-            </a:r>
-          </a:p>
-          <a:p>
-            <a:r>
-              <a:rPr lang="de-DE" dirty="0" err="1"/>
-              <a:t>Epoch</a:t>
-            </a:r>
-            <a:r>
-              <a:rPr lang="de-DE" dirty="0"/>
-              <a:t> 10/10, Loss: 0.7837, </a:t>
-            </a:r>
-            <a:r>
-              <a:rPr lang="de-DE" dirty="0" err="1"/>
-              <a:t>Accuracy</a:t>
-            </a:r>
-            <a:r>
-              <a:rPr lang="de-DE" dirty="0"/>
-              <a:t>: 0.8329</a:t>
-            </a:r>
-          </a:p>
-          <a:p>
-            <a:endParaRPr lang="de-DE" dirty="0"/>
-          </a:p>
-          <a:p>
-            <a:r>
-              <a:rPr lang="de-DE" dirty="0"/>
-              <a:t>Final Validation Loss: 0.9445, Final Validation </a:t>
-            </a:r>
-            <a:r>
-              <a:rPr lang="de-DE" dirty="0" err="1"/>
-              <a:t>Accuracy</a:t>
-            </a:r>
-            <a:r>
-              <a:rPr lang="de-DE" dirty="0"/>
-              <a:t>: 0.7714</a:t>
-            </a:r>
-          </a:p>
-          <a:p>
-            <a:r>
-              <a:rPr lang="de-DE" dirty="0"/>
-              <a:t>Test </a:t>
-            </a:r>
-            <a:r>
-              <a:rPr lang="de-DE" dirty="0" err="1"/>
-              <a:t>Accuracy</a:t>
-            </a:r>
-            <a:r>
-              <a:rPr lang="de-DE" dirty="0"/>
-              <a:t>: 0.7811</a:t>
-            </a:r>
-          </a:p>
-          <a:p>
-            <a:r>
-              <a:rPr lang="de-DE" dirty="0"/>
-              <a:t>Test </a:t>
-            </a:r>
-            <a:r>
-              <a:rPr lang="de-DE" dirty="0" err="1"/>
-              <a:t>Accuracy</a:t>
-            </a:r>
-            <a:r>
-              <a:rPr lang="de-DE" dirty="0"/>
-              <a:t>: 0.7811</a:t>
-            </a:r>
-          </a:p>
-          <a:p>
-            <a:r>
-              <a:rPr lang="de-DE" dirty="0"/>
-              <a:t>Precision: 0.7849</a:t>
-            </a:r>
-          </a:p>
-          <a:p>
-            <a:r>
-              <a:rPr lang="de-DE" dirty="0"/>
-              <a:t>Recall: 0.7811</a:t>
-            </a:r>
-          </a:p>
-          <a:p>
-            <a:r>
-              <a:rPr lang="de-DE" dirty="0"/>
-              <a:t>F1-Score: 0.7808</a:t>
-            </a:r>
-          </a:p>
-        </p:txBody>
-      </p:sp>
+      </p:pic>
     </p:spTree>
     <p:extLst>
       <p:ext uri="{BB962C8B-B14F-4D97-AF65-F5344CB8AC3E}">
-        <p14:creationId xmlns:p14="http://schemas.microsoft.com/office/powerpoint/2010/main" val="946259710"/>
+        <p14:creationId xmlns:p14="http://schemas.microsoft.com/office/powerpoint/2010/main" val="3991479672"/>
       </p:ext>
     </p:extLst>
   </p:cSld>
@@ -4773,6 +4418,876 @@
       </p:grpSpPr>
       <p:sp>
         <p:nvSpPr>
+          <p:cNvPr id="2" name="Titel 1">
+            <a:extLst>
+              <a:ext uri="{FF2B5EF4-FFF2-40B4-BE49-F238E27FC236}">
+                <a16:creationId xmlns:a16="http://schemas.microsoft.com/office/drawing/2014/main" id="{9672587A-9876-4331-AC51-AA638EA60F83}"/>
+              </a:ext>
+            </a:extLst>
+          </p:cNvPr>
+          <p:cNvSpPr>
+            <a:spLocks noGrp="1"/>
+          </p:cNvSpPr>
+          <p:nvPr>
+            <p:ph type="title"/>
+          </p:nvPr>
+        </p:nvSpPr>
+        <p:spPr/>
+        <p:txBody>
+          <a:bodyPr/>
+          <a:lstStyle/>
+          <a:p>
+            <a:r>
+              <a:rPr lang="de-DE" dirty="0" err="1"/>
+              <a:t>AlexNet</a:t>
+            </a:r>
+            <a:r>
+              <a:rPr lang="de-DE" dirty="0"/>
+              <a:t> – </a:t>
+            </a:r>
+            <a:r>
+              <a:rPr lang="de-DE" dirty="0" err="1"/>
+              <a:t>Saliency</a:t>
+            </a:r>
+            <a:r>
+              <a:rPr lang="de-DE" dirty="0"/>
+              <a:t> Maps</a:t>
+            </a:r>
+          </a:p>
+        </p:txBody>
+      </p:sp>
+      <p:pic>
+        <p:nvPicPr>
+          <p:cNvPr id="4" name="Grafik 3">
+            <a:extLst>
+              <a:ext uri="{FF2B5EF4-FFF2-40B4-BE49-F238E27FC236}">
+                <a16:creationId xmlns:a16="http://schemas.microsoft.com/office/drawing/2014/main" id="{816B13E9-5249-4CA4-A35C-5986BA9BE4D0}"/>
+              </a:ext>
+            </a:extLst>
+          </p:cNvPr>
+          <p:cNvPicPr>
+            <a:picLocks noChangeAspect="1"/>
+          </p:cNvPicPr>
+          <p:nvPr/>
+        </p:nvPicPr>
+        <p:blipFill>
+          <a:blip r:embed="rId2"/>
+          <a:stretch>
+            <a:fillRect/>
+          </a:stretch>
+        </p:blipFill>
+        <p:spPr>
+          <a:xfrm>
+            <a:off x="838200" y="1687719"/>
+            <a:ext cx="2133600" cy="2133600"/>
+          </a:xfrm>
+          <a:prstGeom prst="rect">
+            <a:avLst/>
+          </a:prstGeom>
+        </p:spPr>
+      </p:pic>
+      <p:pic>
+        <p:nvPicPr>
+          <p:cNvPr id="7" name="Grafik 6">
+            <a:extLst>
+              <a:ext uri="{FF2B5EF4-FFF2-40B4-BE49-F238E27FC236}">
+                <a16:creationId xmlns:a16="http://schemas.microsoft.com/office/drawing/2014/main" id="{06299A92-39CC-407C-9E6D-FD10FB52FD53}"/>
+              </a:ext>
+            </a:extLst>
+          </p:cNvPr>
+          <p:cNvPicPr>
+            <a:picLocks noChangeAspect="1"/>
+          </p:cNvPicPr>
+          <p:nvPr/>
+        </p:nvPicPr>
+        <p:blipFill>
+          <a:blip r:embed="rId3"/>
+          <a:stretch>
+            <a:fillRect/>
+          </a:stretch>
+        </p:blipFill>
+        <p:spPr>
+          <a:xfrm>
+            <a:off x="3426031" y="1681225"/>
+            <a:ext cx="2133600" cy="2133600"/>
+          </a:xfrm>
+          <a:prstGeom prst="rect">
+            <a:avLst/>
+          </a:prstGeom>
+        </p:spPr>
+      </p:pic>
+      <p:pic>
+        <p:nvPicPr>
+          <p:cNvPr id="9" name="Grafik 8">
+            <a:extLst>
+              <a:ext uri="{FF2B5EF4-FFF2-40B4-BE49-F238E27FC236}">
+                <a16:creationId xmlns:a16="http://schemas.microsoft.com/office/drawing/2014/main" id="{B3D05ACD-4BA4-4ED1-8118-57BAE2BFDC77}"/>
+              </a:ext>
+            </a:extLst>
+          </p:cNvPr>
+          <p:cNvPicPr>
+            <a:picLocks noChangeAspect="1"/>
+          </p:cNvPicPr>
+          <p:nvPr/>
+        </p:nvPicPr>
+        <p:blipFill>
+          <a:blip r:embed="rId4"/>
+          <a:stretch>
+            <a:fillRect/>
+          </a:stretch>
+        </p:blipFill>
+        <p:spPr>
+          <a:xfrm>
+            <a:off x="6013862" y="1681225"/>
+            <a:ext cx="2133600" cy="2133600"/>
+          </a:xfrm>
+          <a:prstGeom prst="rect">
+            <a:avLst/>
+          </a:prstGeom>
+        </p:spPr>
+      </p:pic>
+      <p:pic>
+        <p:nvPicPr>
+          <p:cNvPr id="11" name="Grafik 10">
+            <a:extLst>
+              <a:ext uri="{FF2B5EF4-FFF2-40B4-BE49-F238E27FC236}">
+                <a16:creationId xmlns:a16="http://schemas.microsoft.com/office/drawing/2014/main" id="{8F3F2480-A696-41BE-BB9D-CE16ECF8109F}"/>
+              </a:ext>
+            </a:extLst>
+          </p:cNvPr>
+          <p:cNvPicPr>
+            <a:picLocks noChangeAspect="1"/>
+          </p:cNvPicPr>
+          <p:nvPr/>
+        </p:nvPicPr>
+        <p:blipFill>
+          <a:blip r:embed="rId5"/>
+          <a:stretch>
+            <a:fillRect/>
+          </a:stretch>
+        </p:blipFill>
+        <p:spPr>
+          <a:xfrm>
+            <a:off x="8601693" y="1677618"/>
+            <a:ext cx="2133600" cy="2133600"/>
+          </a:xfrm>
+          <a:prstGeom prst="rect">
+            <a:avLst/>
+          </a:prstGeom>
+        </p:spPr>
+      </p:pic>
+      <p:pic>
+        <p:nvPicPr>
+          <p:cNvPr id="13" name="Grafik 12">
+            <a:extLst>
+              <a:ext uri="{FF2B5EF4-FFF2-40B4-BE49-F238E27FC236}">
+                <a16:creationId xmlns:a16="http://schemas.microsoft.com/office/drawing/2014/main" id="{99F321E4-6331-4E11-83E0-2F96235275AD}"/>
+              </a:ext>
+            </a:extLst>
+          </p:cNvPr>
+          <p:cNvPicPr>
+            <a:picLocks noChangeAspect="1"/>
+          </p:cNvPicPr>
+          <p:nvPr/>
+        </p:nvPicPr>
+        <p:blipFill>
+          <a:blip r:embed="rId6"/>
+          <a:stretch>
+            <a:fillRect/>
+          </a:stretch>
+        </p:blipFill>
+        <p:spPr>
+          <a:xfrm>
+            <a:off x="838200" y="4297878"/>
+            <a:ext cx="2133600" cy="2133600"/>
+          </a:xfrm>
+          <a:prstGeom prst="rect">
+            <a:avLst/>
+          </a:prstGeom>
+        </p:spPr>
+      </p:pic>
+      <p:pic>
+        <p:nvPicPr>
+          <p:cNvPr id="15" name="Grafik 14">
+            <a:extLst>
+              <a:ext uri="{FF2B5EF4-FFF2-40B4-BE49-F238E27FC236}">
+                <a16:creationId xmlns:a16="http://schemas.microsoft.com/office/drawing/2014/main" id="{B1275EFF-ED71-49FA-94FE-2CE08AD215C1}"/>
+              </a:ext>
+            </a:extLst>
+          </p:cNvPr>
+          <p:cNvPicPr>
+            <a:picLocks noChangeAspect="1"/>
+          </p:cNvPicPr>
+          <p:nvPr/>
+        </p:nvPicPr>
+        <p:blipFill>
+          <a:blip r:embed="rId7"/>
+          <a:stretch>
+            <a:fillRect/>
+          </a:stretch>
+        </p:blipFill>
+        <p:spPr>
+          <a:xfrm>
+            <a:off x="3426031" y="4297878"/>
+            <a:ext cx="2133600" cy="2133600"/>
+          </a:xfrm>
+          <a:prstGeom prst="rect">
+            <a:avLst/>
+          </a:prstGeom>
+        </p:spPr>
+      </p:pic>
+      <p:pic>
+        <p:nvPicPr>
+          <p:cNvPr id="17" name="Grafik 16">
+            <a:extLst>
+              <a:ext uri="{FF2B5EF4-FFF2-40B4-BE49-F238E27FC236}">
+                <a16:creationId xmlns:a16="http://schemas.microsoft.com/office/drawing/2014/main" id="{5678B9CE-3CD7-467D-9B10-379F15D1A62F}"/>
+              </a:ext>
+            </a:extLst>
+          </p:cNvPr>
+          <p:cNvPicPr>
+            <a:picLocks noChangeAspect="1"/>
+          </p:cNvPicPr>
+          <p:nvPr/>
+        </p:nvPicPr>
+        <p:blipFill>
+          <a:blip r:embed="rId8"/>
+          <a:stretch>
+            <a:fillRect/>
+          </a:stretch>
+        </p:blipFill>
+        <p:spPr>
+          <a:xfrm>
+            <a:off x="6013862" y="4297878"/>
+            <a:ext cx="2133600" cy="2133600"/>
+          </a:xfrm>
+          <a:prstGeom prst="rect">
+            <a:avLst/>
+          </a:prstGeom>
+        </p:spPr>
+      </p:pic>
+      <p:pic>
+        <p:nvPicPr>
+          <p:cNvPr id="19" name="Grafik 18">
+            <a:extLst>
+              <a:ext uri="{FF2B5EF4-FFF2-40B4-BE49-F238E27FC236}">
+                <a16:creationId xmlns:a16="http://schemas.microsoft.com/office/drawing/2014/main" id="{DD39D264-4BC7-485D-862A-ECF9A3A6CEB1}"/>
+              </a:ext>
+            </a:extLst>
+          </p:cNvPr>
+          <p:cNvPicPr>
+            <a:picLocks noChangeAspect="1"/>
+          </p:cNvPicPr>
+          <p:nvPr/>
+        </p:nvPicPr>
+        <p:blipFill>
+          <a:blip r:embed="rId9"/>
+          <a:stretch>
+            <a:fillRect/>
+          </a:stretch>
+        </p:blipFill>
+        <p:spPr>
+          <a:xfrm>
+            <a:off x="8601693" y="4297878"/>
+            <a:ext cx="2133600" cy="2133600"/>
+          </a:xfrm>
+          <a:prstGeom prst="rect">
+            <a:avLst/>
+          </a:prstGeom>
+        </p:spPr>
+      </p:pic>
+    </p:spTree>
+    <p:extLst>
+      <p:ext uri="{BB962C8B-B14F-4D97-AF65-F5344CB8AC3E}">
+        <p14:creationId xmlns:p14="http://schemas.microsoft.com/office/powerpoint/2010/main" val="181218093"/>
+      </p:ext>
+    </p:extLst>
+  </p:cSld>
+  <p:clrMapOvr>
+    <a:masterClrMapping/>
+  </p:clrMapOvr>
+</p:sld>
+</file>
+
+<file path=ppt/slides/slide17.xml><?xml version="1.0" encoding="utf-8"?>
+<p:sld xmlns:a="http://schemas.openxmlformats.org/drawingml/2006/main" xmlns:r="http://schemas.openxmlformats.org/officeDocument/2006/relationships" xmlns:p="http://schemas.openxmlformats.org/presentationml/2006/main">
+  <p:cSld>
+    <p:spTree>
+      <p:nvGrpSpPr>
+        <p:cNvPr id="1" name=""/>
+        <p:cNvGrpSpPr/>
+        <p:nvPr/>
+      </p:nvGrpSpPr>
+      <p:grpSpPr>
+        <a:xfrm>
+          <a:off x="0" y="0"/>
+          <a:ext cx="0" cy="0"/>
+          <a:chOff x="0" y="0"/>
+          <a:chExt cx="0" cy="0"/>
+        </a:xfrm>
+      </p:grpSpPr>
+      <p:sp>
+        <p:nvSpPr>
+          <p:cNvPr id="2" name="Titel 1">
+            <a:extLst>
+              <a:ext uri="{FF2B5EF4-FFF2-40B4-BE49-F238E27FC236}">
+                <a16:creationId xmlns:a16="http://schemas.microsoft.com/office/drawing/2014/main" id="{FA0E998A-8B92-4AB3-A9A8-1DE5D112DC24}"/>
+              </a:ext>
+            </a:extLst>
+          </p:cNvPr>
+          <p:cNvSpPr>
+            <a:spLocks noGrp="1"/>
+          </p:cNvSpPr>
+          <p:nvPr>
+            <p:ph type="title"/>
+          </p:nvPr>
+        </p:nvSpPr>
+        <p:spPr/>
+        <p:txBody>
+          <a:bodyPr/>
+          <a:lstStyle/>
+          <a:p>
+            <a:r>
+              <a:rPr lang="de-DE" dirty="0"/>
+              <a:t>ResNet50 on </a:t>
+            </a:r>
+            <a:r>
+              <a:rPr lang="de-DE" dirty="0" err="1"/>
+              <a:t>new</a:t>
+            </a:r>
+            <a:r>
+              <a:rPr lang="de-DE" dirty="0"/>
+              <a:t> Dataset</a:t>
+            </a:r>
+          </a:p>
+        </p:txBody>
+      </p:sp>
+      <p:sp>
+        <p:nvSpPr>
+          <p:cNvPr id="3" name="Inhaltsplatzhalter 2">
+            <a:extLst>
+              <a:ext uri="{FF2B5EF4-FFF2-40B4-BE49-F238E27FC236}">
+                <a16:creationId xmlns:a16="http://schemas.microsoft.com/office/drawing/2014/main" id="{03FCA3D9-EE93-495D-BB38-42608EA49BF0}"/>
+              </a:ext>
+            </a:extLst>
+          </p:cNvPr>
+          <p:cNvSpPr>
+            <a:spLocks noGrp="1"/>
+          </p:cNvSpPr>
+          <p:nvPr>
+            <p:ph idx="1"/>
+          </p:nvPr>
+        </p:nvSpPr>
+        <p:spPr/>
+        <p:txBody>
+          <a:bodyPr/>
+          <a:lstStyle/>
+          <a:p>
+            <a:r>
+              <a:rPr lang="de-DE" dirty="0" err="1"/>
+              <a:t>Augmentierung</a:t>
+            </a:r>
+            <a:r>
+              <a:rPr lang="de-DE" dirty="0"/>
+              <a:t>: Spiegeln, </a:t>
+            </a:r>
+            <a:r>
+              <a:rPr lang="de-DE" dirty="0" err="1"/>
+              <a:t>Crop</a:t>
+            </a:r>
+            <a:r>
+              <a:rPr lang="de-DE" dirty="0"/>
+              <a:t> </a:t>
+            </a:r>
+            <a:r>
+              <a:rPr lang="de-DE" dirty="0" err="1"/>
+              <a:t>with</a:t>
+            </a:r>
+            <a:r>
+              <a:rPr lang="de-DE" dirty="0"/>
+              <a:t> </a:t>
+            </a:r>
+            <a:r>
+              <a:rPr lang="de-DE" dirty="0" err="1"/>
+              <a:t>padding</a:t>
+            </a:r>
+            <a:r>
+              <a:rPr lang="de-DE" dirty="0"/>
+              <a:t> n = 4</a:t>
+            </a:r>
+          </a:p>
+        </p:txBody>
+      </p:sp>
+    </p:spTree>
+    <p:extLst>
+      <p:ext uri="{BB962C8B-B14F-4D97-AF65-F5344CB8AC3E}">
+        <p14:creationId xmlns:p14="http://schemas.microsoft.com/office/powerpoint/2010/main" val="3635575258"/>
+      </p:ext>
+    </p:extLst>
+  </p:cSld>
+  <p:clrMapOvr>
+    <a:masterClrMapping/>
+  </p:clrMapOvr>
+</p:sld>
+</file>
+
+<file path=ppt/slides/slide18.xml><?xml version="1.0" encoding="utf-8"?>
+<p:sld xmlns:a="http://schemas.openxmlformats.org/drawingml/2006/main" xmlns:r="http://schemas.openxmlformats.org/officeDocument/2006/relationships" xmlns:p="http://schemas.openxmlformats.org/presentationml/2006/main">
+  <p:cSld>
+    <p:spTree>
+      <p:nvGrpSpPr>
+        <p:cNvPr id="1" name=""/>
+        <p:cNvGrpSpPr/>
+        <p:nvPr/>
+      </p:nvGrpSpPr>
+      <p:grpSpPr>
+        <a:xfrm>
+          <a:off x="0" y="0"/>
+          <a:ext cx="0" cy="0"/>
+          <a:chOff x="0" y="0"/>
+          <a:chExt cx="0" cy="0"/>
+        </a:xfrm>
+      </p:grpSpPr>
+      <p:sp>
+        <p:nvSpPr>
+          <p:cNvPr id="10" name="Textfeld 9">
+            <a:extLst>
+              <a:ext uri="{FF2B5EF4-FFF2-40B4-BE49-F238E27FC236}">
+                <a16:creationId xmlns:a16="http://schemas.microsoft.com/office/drawing/2014/main" id="{8214A440-4372-42B2-95FA-FB333F1ACF7C}"/>
+              </a:ext>
+            </a:extLst>
+          </p:cNvPr>
+          <p:cNvSpPr txBox="1"/>
+          <p:nvPr/>
+        </p:nvSpPr>
+        <p:spPr>
+          <a:xfrm>
+            <a:off x="700644" y="197346"/>
+            <a:ext cx="10747169" cy="6463308"/>
+          </a:xfrm>
+          <a:prstGeom prst="rect">
+            <a:avLst/>
+          </a:prstGeom>
+          <a:noFill/>
+        </p:spPr>
+        <p:txBody>
+          <a:bodyPr wrap="square">
+            <a:spAutoFit/>
+          </a:bodyPr>
+          <a:lstStyle/>
+          <a:p>
+            <a:r>
+              <a:rPr lang="de-DE" dirty="0"/>
+              <a:t>Trial 0 </a:t>
+            </a:r>
+            <a:r>
+              <a:rPr lang="de-DE" dirty="0" err="1"/>
+              <a:t>finished</a:t>
+            </a:r>
+            <a:r>
+              <a:rPr lang="de-DE" dirty="0"/>
+              <a:t> </a:t>
+            </a:r>
+            <a:r>
+              <a:rPr lang="de-DE" dirty="0" err="1"/>
+              <a:t>with</a:t>
+            </a:r>
+            <a:r>
+              <a:rPr lang="de-DE" dirty="0"/>
+              <a:t> </a:t>
+            </a:r>
+            <a:r>
+              <a:rPr lang="de-DE" dirty="0" err="1"/>
+              <a:t>value</a:t>
+            </a:r>
+            <a:r>
+              <a:rPr lang="de-DE" dirty="0"/>
+              <a:t>: 0.7784011220196353 and </a:t>
+            </a:r>
+            <a:r>
+              <a:rPr lang="de-DE" dirty="0" err="1"/>
+              <a:t>parameters</a:t>
+            </a:r>
+            <a:r>
+              <a:rPr lang="de-DE" dirty="0"/>
+              <a:t>: {'</a:t>
+            </a:r>
+            <a:r>
+              <a:rPr lang="de-DE" dirty="0" err="1"/>
+              <a:t>learning_rate</a:t>
+            </a:r>
+            <a:r>
+              <a:rPr lang="de-DE" dirty="0"/>
+              <a:t>': 0.0006965942314459044, '</a:t>
+            </a:r>
+            <a:r>
+              <a:rPr lang="de-DE" dirty="0" err="1"/>
+              <a:t>batch_size</a:t>
+            </a:r>
+            <a:r>
+              <a:rPr lang="de-DE" dirty="0"/>
+              <a:t>': 64, '</a:t>
+            </a:r>
+            <a:r>
+              <a:rPr lang="de-DE" dirty="0" err="1"/>
+              <a:t>num_epochs</a:t>
+            </a:r>
+            <a:r>
+              <a:rPr lang="de-DE" dirty="0"/>
+              <a:t>': 10}. Best </a:t>
+            </a:r>
+            <a:r>
+              <a:rPr lang="de-DE" dirty="0" err="1"/>
+              <a:t>is</a:t>
+            </a:r>
+            <a:r>
+              <a:rPr lang="de-DE" dirty="0"/>
+              <a:t> </a:t>
+            </a:r>
+            <a:r>
+              <a:rPr lang="de-DE" dirty="0" err="1"/>
+              <a:t>trial</a:t>
+            </a:r>
+            <a:r>
+              <a:rPr lang="de-DE" dirty="0"/>
+              <a:t> 0 </a:t>
+            </a:r>
+            <a:r>
+              <a:rPr lang="de-DE" dirty="0" err="1"/>
+              <a:t>with</a:t>
+            </a:r>
+            <a:r>
+              <a:rPr lang="de-DE" dirty="0"/>
+              <a:t> </a:t>
+            </a:r>
+            <a:r>
+              <a:rPr lang="de-DE" dirty="0" err="1"/>
+              <a:t>value</a:t>
+            </a:r>
+            <a:r>
+              <a:rPr lang="de-DE" dirty="0"/>
+              <a:t>: 0.7784011220196353.</a:t>
+            </a:r>
+          </a:p>
+          <a:p>
+            <a:endParaRPr lang="de-DE" dirty="0"/>
+          </a:p>
+          <a:p>
+            <a:r>
+              <a:rPr lang="de-DE" dirty="0"/>
+              <a:t>Beste Hyperparameter: {'</a:t>
+            </a:r>
+            <a:r>
+              <a:rPr lang="de-DE" dirty="0" err="1"/>
+              <a:t>learning_rate</a:t>
+            </a:r>
+            <a:r>
+              <a:rPr lang="de-DE" dirty="0"/>
+              <a:t>': 0.0006965942314459044, '</a:t>
+            </a:r>
+            <a:r>
+              <a:rPr lang="de-DE" dirty="0" err="1"/>
+              <a:t>batch_size</a:t>
+            </a:r>
+            <a:r>
+              <a:rPr lang="de-DE" dirty="0"/>
+              <a:t>': 64, '</a:t>
+            </a:r>
+            <a:r>
+              <a:rPr lang="de-DE" dirty="0" err="1"/>
+              <a:t>num_epochs</a:t>
+            </a:r>
+            <a:r>
+              <a:rPr lang="de-DE" dirty="0"/>
+              <a:t>': 10}</a:t>
+            </a:r>
+          </a:p>
+          <a:p>
+            <a:r>
+              <a:rPr lang="de-DE" dirty="0"/>
+              <a:t>Bester Validierungsverlust: 0.7784011220196353</a:t>
+            </a:r>
+          </a:p>
+          <a:p>
+            <a:endParaRPr lang="de-DE" dirty="0"/>
+          </a:p>
+          <a:p>
+            <a:r>
+              <a:rPr lang="de-DE" dirty="0" err="1"/>
+              <a:t>Epoch</a:t>
+            </a:r>
+            <a:r>
+              <a:rPr lang="de-DE" dirty="0"/>
+              <a:t> 1/10, Loss: 2.6664, </a:t>
+            </a:r>
+            <a:r>
+              <a:rPr lang="de-DE" dirty="0" err="1"/>
+              <a:t>Accuracy</a:t>
+            </a:r>
+            <a:r>
+              <a:rPr lang="de-DE" dirty="0"/>
+              <a:t>: 0.3958</a:t>
+            </a:r>
+          </a:p>
+          <a:p>
+            <a:r>
+              <a:rPr lang="de-DE" dirty="0" err="1"/>
+              <a:t>Epoch</a:t>
+            </a:r>
+            <a:r>
+              <a:rPr lang="de-DE" dirty="0"/>
+              <a:t> 2/10, Loss: 1.9060, </a:t>
+            </a:r>
+            <a:r>
+              <a:rPr lang="de-DE" dirty="0" err="1"/>
+              <a:t>Accuracy</a:t>
+            </a:r>
+            <a:r>
+              <a:rPr lang="de-DE" dirty="0"/>
+              <a:t>: 0.6386</a:t>
+            </a:r>
+          </a:p>
+          <a:p>
+            <a:r>
+              <a:rPr lang="de-DE" dirty="0" err="1"/>
+              <a:t>Epoch</a:t>
+            </a:r>
+            <a:r>
+              <a:rPr lang="de-DE" dirty="0"/>
+              <a:t> 3/10, Loss: 1.5304, </a:t>
+            </a:r>
+            <a:r>
+              <a:rPr lang="de-DE" dirty="0" err="1"/>
+              <a:t>Accuracy</a:t>
+            </a:r>
+            <a:r>
+              <a:rPr lang="de-DE" dirty="0"/>
+              <a:t>: 0.7085</a:t>
+            </a:r>
+          </a:p>
+          <a:p>
+            <a:r>
+              <a:rPr lang="de-DE" dirty="0" err="1"/>
+              <a:t>Epoch</a:t>
+            </a:r>
+            <a:r>
+              <a:rPr lang="de-DE" dirty="0"/>
+              <a:t> 4/10, Loss: 1.3135, </a:t>
+            </a:r>
+            <a:r>
+              <a:rPr lang="de-DE" dirty="0" err="1"/>
+              <a:t>Accuracy</a:t>
+            </a:r>
+            <a:r>
+              <a:rPr lang="de-DE" dirty="0"/>
+              <a:t>: 0.7431</a:t>
+            </a:r>
+          </a:p>
+          <a:p>
+            <a:r>
+              <a:rPr lang="de-DE" dirty="0" err="1"/>
+              <a:t>Epoch</a:t>
+            </a:r>
+            <a:r>
+              <a:rPr lang="de-DE" dirty="0"/>
+              <a:t> 5/10, Loss: 1.1643, </a:t>
+            </a:r>
+            <a:r>
+              <a:rPr lang="de-DE" dirty="0" err="1"/>
+              <a:t>Accuracy</a:t>
+            </a:r>
+            <a:r>
+              <a:rPr lang="de-DE" dirty="0"/>
+              <a:t>: 0.7680</a:t>
+            </a:r>
+          </a:p>
+          <a:p>
+            <a:r>
+              <a:rPr lang="de-DE" dirty="0" err="1"/>
+              <a:t>Epoch</a:t>
+            </a:r>
+            <a:r>
+              <a:rPr lang="de-DE" dirty="0"/>
+              <a:t> 6/10, Loss: 1.0487, </a:t>
+            </a:r>
+            <a:r>
+              <a:rPr lang="de-DE" dirty="0" err="1"/>
+              <a:t>Accuracy</a:t>
+            </a:r>
+            <a:r>
+              <a:rPr lang="de-DE" dirty="0"/>
+              <a:t>: 0.7863</a:t>
+            </a:r>
+          </a:p>
+          <a:p>
+            <a:r>
+              <a:rPr lang="de-DE" dirty="0" err="1"/>
+              <a:t>Epoch</a:t>
+            </a:r>
+            <a:r>
+              <a:rPr lang="de-DE" dirty="0"/>
+              <a:t> 7/10, Loss: 0.9651, </a:t>
+            </a:r>
+            <a:r>
+              <a:rPr lang="de-DE" dirty="0" err="1"/>
+              <a:t>Accuracy</a:t>
+            </a:r>
+            <a:r>
+              <a:rPr lang="de-DE" dirty="0"/>
+              <a:t>: 0.7986</a:t>
+            </a:r>
+          </a:p>
+          <a:p>
+            <a:r>
+              <a:rPr lang="de-DE" dirty="0" err="1"/>
+              <a:t>Epoch</a:t>
+            </a:r>
+            <a:r>
+              <a:rPr lang="de-DE" dirty="0"/>
+              <a:t> 8/10, Loss: 0.9009, </a:t>
+            </a:r>
+            <a:r>
+              <a:rPr lang="de-DE" dirty="0" err="1"/>
+              <a:t>Accuracy</a:t>
+            </a:r>
+            <a:r>
+              <a:rPr lang="de-DE" dirty="0"/>
+              <a:t>: 0.8123</a:t>
+            </a:r>
+          </a:p>
+          <a:p>
+            <a:r>
+              <a:rPr lang="de-DE" dirty="0" err="1"/>
+              <a:t>Epoch</a:t>
+            </a:r>
+            <a:r>
+              <a:rPr lang="de-DE" dirty="0"/>
+              <a:t> 9/10, Loss: 0.8358, </a:t>
+            </a:r>
+            <a:r>
+              <a:rPr lang="de-DE" dirty="0" err="1"/>
+              <a:t>Accuracy</a:t>
+            </a:r>
+            <a:r>
+              <a:rPr lang="de-DE" dirty="0"/>
+              <a:t>: 0.8261</a:t>
+            </a:r>
+          </a:p>
+          <a:p>
+            <a:r>
+              <a:rPr lang="de-DE" dirty="0" err="1"/>
+              <a:t>Epoch</a:t>
+            </a:r>
+            <a:r>
+              <a:rPr lang="de-DE" dirty="0"/>
+              <a:t> 10/10, Loss: 0.7837, </a:t>
+            </a:r>
+            <a:r>
+              <a:rPr lang="de-DE" dirty="0" err="1"/>
+              <a:t>Accuracy</a:t>
+            </a:r>
+            <a:r>
+              <a:rPr lang="de-DE" dirty="0"/>
+              <a:t>: 0.8329</a:t>
+            </a:r>
+          </a:p>
+          <a:p>
+            <a:endParaRPr lang="de-DE" dirty="0"/>
+          </a:p>
+          <a:p>
+            <a:r>
+              <a:rPr lang="de-DE" dirty="0"/>
+              <a:t>Final Validation Loss: 0.9445, Final Validation </a:t>
+            </a:r>
+            <a:r>
+              <a:rPr lang="de-DE" dirty="0" err="1"/>
+              <a:t>Accuracy</a:t>
+            </a:r>
+            <a:r>
+              <a:rPr lang="de-DE" dirty="0"/>
+              <a:t>: 0.7714</a:t>
+            </a:r>
+          </a:p>
+          <a:p>
+            <a:r>
+              <a:rPr lang="de-DE" dirty="0"/>
+              <a:t>Test </a:t>
+            </a:r>
+            <a:r>
+              <a:rPr lang="de-DE" dirty="0" err="1"/>
+              <a:t>Accuracy</a:t>
+            </a:r>
+            <a:r>
+              <a:rPr lang="de-DE" dirty="0"/>
+              <a:t>: 0.7811</a:t>
+            </a:r>
+          </a:p>
+          <a:p>
+            <a:r>
+              <a:rPr lang="de-DE" dirty="0"/>
+              <a:t>Test </a:t>
+            </a:r>
+            <a:r>
+              <a:rPr lang="de-DE" dirty="0" err="1"/>
+              <a:t>Accuracy</a:t>
+            </a:r>
+            <a:r>
+              <a:rPr lang="de-DE" dirty="0"/>
+              <a:t>: 0.7811</a:t>
+            </a:r>
+          </a:p>
+          <a:p>
+            <a:r>
+              <a:rPr lang="de-DE" dirty="0"/>
+              <a:t>Precision: 0.7849</a:t>
+            </a:r>
+          </a:p>
+          <a:p>
+            <a:r>
+              <a:rPr lang="de-DE" dirty="0"/>
+              <a:t>Recall: 0.7811</a:t>
+            </a:r>
+          </a:p>
+          <a:p>
+            <a:r>
+              <a:rPr lang="de-DE" dirty="0"/>
+              <a:t>F1-Score: 0.7808</a:t>
+            </a:r>
+          </a:p>
+        </p:txBody>
+      </p:sp>
+    </p:spTree>
+    <p:extLst>
+      <p:ext uri="{BB962C8B-B14F-4D97-AF65-F5344CB8AC3E}">
+        <p14:creationId xmlns:p14="http://schemas.microsoft.com/office/powerpoint/2010/main" val="946259710"/>
+      </p:ext>
+    </p:extLst>
+  </p:cSld>
+  <p:clrMapOvr>
+    <a:masterClrMapping/>
+  </p:clrMapOvr>
+</p:sld>
+</file>
+
+<file path=ppt/slides/slide19.xml><?xml version="1.0" encoding="utf-8"?>
+<p:sld xmlns:a="http://schemas.openxmlformats.org/drawingml/2006/main" xmlns:r="http://schemas.openxmlformats.org/officeDocument/2006/relationships" xmlns:p="http://schemas.openxmlformats.org/presentationml/2006/main">
+  <p:cSld>
+    <p:spTree>
+      <p:nvGrpSpPr>
+        <p:cNvPr id="1" name=""/>
+        <p:cNvGrpSpPr/>
+        <p:nvPr/>
+      </p:nvGrpSpPr>
+      <p:grpSpPr>
+        <a:xfrm>
+          <a:off x="0" y="0"/>
+          <a:ext cx="0" cy="0"/>
+          <a:chOff x="0" y="0"/>
+          <a:chExt cx="0" cy="0"/>
+        </a:xfrm>
+      </p:grpSpPr>
+      <p:sp>
+        <p:nvSpPr>
           <p:cNvPr id="11" name="Textfeld 10">
             <a:extLst>
               <a:ext uri="{FF2B5EF4-FFF2-40B4-BE49-F238E27FC236}">
@@ -4920,7 +5435,62 @@
 </p:sld>
 </file>
 
-<file path=ppt/slides/slide17.xml><?xml version="1.0" encoding="utf-8"?>
+<file path=ppt/slides/slide2.xml><?xml version="1.0" encoding="utf-8"?>
+<p:sld xmlns:a="http://schemas.openxmlformats.org/drawingml/2006/main" xmlns:r="http://schemas.openxmlformats.org/officeDocument/2006/relationships" xmlns:p="http://schemas.openxmlformats.org/presentationml/2006/main">
+  <p:cSld>
+    <p:spTree>
+      <p:nvGrpSpPr>
+        <p:cNvPr id="1" name=""/>
+        <p:cNvGrpSpPr/>
+        <p:nvPr/>
+      </p:nvGrpSpPr>
+      <p:grpSpPr>
+        <a:xfrm>
+          <a:off x="0" y="0"/>
+          <a:ext cx="0" cy="0"/>
+          <a:chOff x="0" y="0"/>
+          <a:chExt cx="0" cy="0"/>
+        </a:xfrm>
+      </p:grpSpPr>
+      <p:sp>
+        <p:nvSpPr>
+          <p:cNvPr id="2" name="Titel 1">
+            <a:extLst>
+              <a:ext uri="{FF2B5EF4-FFF2-40B4-BE49-F238E27FC236}">
+                <a16:creationId xmlns:a16="http://schemas.microsoft.com/office/drawing/2014/main" id="{F460CF33-D61D-45E6-A010-57D8D85767E5}"/>
+              </a:ext>
+            </a:extLst>
+          </p:cNvPr>
+          <p:cNvSpPr>
+            <a:spLocks noGrp="1"/>
+          </p:cNvSpPr>
+          <p:nvPr>
+            <p:ph type="title"/>
+          </p:nvPr>
+        </p:nvSpPr>
+        <p:spPr/>
+        <p:txBody>
+          <a:bodyPr/>
+          <a:lstStyle/>
+          <a:p>
+            <a:endParaRPr lang="de-DE"/>
+          </a:p>
+        </p:txBody>
+      </p:sp>
+    </p:spTree>
+    <p:extLst>
+      <p:ext uri="{BB962C8B-B14F-4D97-AF65-F5344CB8AC3E}">
+        <p14:creationId xmlns:p14="http://schemas.microsoft.com/office/powerpoint/2010/main" val="2016747559"/>
+      </p:ext>
+    </p:extLst>
+  </p:cSld>
+  <p:clrMapOvr>
+    <a:masterClrMapping/>
+  </p:clrMapOvr>
+</p:sld>
+</file>
+
+<file path=ppt/slides/slide20.xml><?xml version="1.0" encoding="utf-8"?>
 <p:sld xmlns:a="http://schemas.openxmlformats.org/drawingml/2006/main" xmlns:r="http://schemas.openxmlformats.org/officeDocument/2006/relationships" xmlns:p="http://schemas.openxmlformats.org/presentationml/2006/main">
   <p:cSld>
     <p:spTree>
@@ -5050,7 +5620,7 @@
 </p:sld>
 </file>
 
-<file path=ppt/slides/slide18.xml><?xml version="1.0" encoding="utf-8"?>
+<file path=ppt/slides/slide21.xml><?xml version="1.0" encoding="utf-8"?>
 <p:sld xmlns:a="http://schemas.openxmlformats.org/drawingml/2006/main" xmlns:r="http://schemas.openxmlformats.org/officeDocument/2006/relationships" xmlns:p="http://schemas.openxmlformats.org/presentationml/2006/main">
   <p:cSld>
     <p:spTree>
@@ -5138,745 +5708,6 @@
     <p:extLst>
       <p:ext uri="{BB962C8B-B14F-4D97-AF65-F5344CB8AC3E}">
         <p14:creationId xmlns:p14="http://schemas.microsoft.com/office/powerpoint/2010/main" val="40669009"/>
-      </p:ext>
-    </p:extLst>
-  </p:cSld>
-  <p:clrMapOvr>
-    <a:masterClrMapping/>
-  </p:clrMapOvr>
-</p:sld>
-</file>
-
-<file path=ppt/slides/slide19.xml><?xml version="1.0" encoding="utf-8"?>
-<p:sld xmlns:a="http://schemas.openxmlformats.org/drawingml/2006/main" xmlns:r="http://schemas.openxmlformats.org/officeDocument/2006/relationships" xmlns:p="http://schemas.openxmlformats.org/presentationml/2006/main">
-  <p:cSld>
-    <p:spTree>
-      <p:nvGrpSpPr>
-        <p:cNvPr id="1" name=""/>
-        <p:cNvGrpSpPr/>
-        <p:nvPr/>
-      </p:nvGrpSpPr>
-      <p:grpSpPr>
-        <a:xfrm>
-          <a:off x="0" y="0"/>
-          <a:ext cx="0" cy="0"/>
-          <a:chOff x="0" y="0"/>
-          <a:chExt cx="0" cy="0"/>
-        </a:xfrm>
-      </p:grpSpPr>
-      <p:sp>
-        <p:nvSpPr>
-          <p:cNvPr id="3" name="Titel 1">
-            <a:extLst>
-              <a:ext uri="{FF2B5EF4-FFF2-40B4-BE49-F238E27FC236}">
-                <a16:creationId xmlns:a16="http://schemas.microsoft.com/office/drawing/2014/main" id="{33062B24-559F-41F6-8766-1B8B53C3E0C1}"/>
-              </a:ext>
-            </a:extLst>
-          </p:cNvPr>
-          <p:cNvSpPr txBox="1">
-            <a:spLocks/>
-          </p:cNvSpPr>
-          <p:nvPr/>
-        </p:nvSpPr>
-        <p:spPr>
-          <a:xfrm>
-            <a:off x="415636" y="317623"/>
-            <a:ext cx="11014364" cy="1325563"/>
-          </a:xfrm>
-          <a:prstGeom prst="rect">
-            <a:avLst/>
-          </a:prstGeom>
-        </p:spPr>
-        <p:txBody>
-          <a:bodyPr vert="horz" lIns="91440" tIns="45720" rIns="91440" bIns="45720" rtlCol="0" anchor="ctr">
-            <a:normAutofit/>
-          </a:bodyPr>
-          <a:lstStyle>
-            <a:lvl1pPr algn="l" defTabSz="914400" rtl="0" eaLnBrk="1" latinLnBrk="0" hangingPunct="1">
-              <a:lnSpc>
-                <a:spcPct val="90000"/>
-              </a:lnSpc>
-              <a:spcBef>
-                <a:spcPct val="0"/>
-              </a:spcBef>
-              <a:buNone/>
-              <a:defRPr sz="4400" kern="1200">
-                <a:solidFill>
-                  <a:schemeClr val="tx1"/>
-                </a:solidFill>
-                <a:latin typeface="+mj-lt"/>
-                <a:ea typeface="+mj-ea"/>
-                <a:cs typeface="+mj-cs"/>
-              </a:defRPr>
-            </a:lvl1pPr>
-          </a:lstStyle>
-          <a:p>
-            <a:r>
-              <a:rPr lang="de-DE" dirty="0"/>
-              <a:t>ResNet50 on </a:t>
-            </a:r>
-            <a:r>
-              <a:rPr lang="de-DE" dirty="0" err="1"/>
-              <a:t>new</a:t>
-            </a:r>
-            <a:r>
-              <a:rPr lang="de-DE" dirty="0"/>
-              <a:t> Dataset – </a:t>
-            </a:r>
-            <a:r>
-              <a:rPr lang="de-DE" dirty="0" err="1"/>
-              <a:t>Saliency</a:t>
-            </a:r>
-            <a:r>
-              <a:rPr lang="de-DE" dirty="0"/>
-              <a:t> Maps</a:t>
-            </a:r>
-          </a:p>
-        </p:txBody>
-      </p:sp>
-    </p:spTree>
-    <p:extLst>
-      <p:ext uri="{BB962C8B-B14F-4D97-AF65-F5344CB8AC3E}">
-        <p14:creationId xmlns:p14="http://schemas.microsoft.com/office/powerpoint/2010/main" val="3587953171"/>
-      </p:ext>
-    </p:extLst>
-  </p:cSld>
-  <p:clrMapOvr>
-    <a:masterClrMapping/>
-  </p:clrMapOvr>
-</p:sld>
-</file>
-
-<file path=ppt/slides/slide2.xml><?xml version="1.0" encoding="utf-8"?>
-<p:sld xmlns:a="http://schemas.openxmlformats.org/drawingml/2006/main" xmlns:r="http://schemas.openxmlformats.org/officeDocument/2006/relationships" xmlns:p="http://schemas.openxmlformats.org/presentationml/2006/main">
-  <p:cSld>
-    <p:spTree>
-      <p:nvGrpSpPr>
-        <p:cNvPr id="1" name=""/>
-        <p:cNvGrpSpPr/>
-        <p:nvPr/>
-      </p:nvGrpSpPr>
-      <p:grpSpPr>
-        <a:xfrm>
-          <a:off x="0" y="0"/>
-          <a:ext cx="0" cy="0"/>
-          <a:chOff x="0" y="0"/>
-          <a:chExt cx="0" cy="0"/>
-        </a:xfrm>
-      </p:grpSpPr>
-      <p:sp>
-        <p:nvSpPr>
-          <p:cNvPr id="2" name="Titel 1">
-            <a:extLst>
-              <a:ext uri="{FF2B5EF4-FFF2-40B4-BE49-F238E27FC236}">
-                <a16:creationId xmlns:a16="http://schemas.microsoft.com/office/drawing/2014/main" id="{F460CF33-D61D-45E6-A010-57D8D85767E5}"/>
-              </a:ext>
-            </a:extLst>
-          </p:cNvPr>
-          <p:cNvSpPr>
-            <a:spLocks noGrp="1"/>
-          </p:cNvSpPr>
-          <p:nvPr>
-            <p:ph type="title"/>
-          </p:nvPr>
-        </p:nvSpPr>
-        <p:spPr/>
-        <p:txBody>
-          <a:bodyPr/>
-          <a:lstStyle/>
-          <a:p>
-            <a:endParaRPr lang="de-DE"/>
-          </a:p>
-        </p:txBody>
-      </p:sp>
-    </p:spTree>
-    <p:extLst>
-      <p:ext uri="{BB962C8B-B14F-4D97-AF65-F5344CB8AC3E}">
-        <p14:creationId xmlns:p14="http://schemas.microsoft.com/office/powerpoint/2010/main" val="2016747559"/>
-      </p:ext>
-    </p:extLst>
-  </p:cSld>
-  <p:clrMapOvr>
-    <a:masterClrMapping/>
-  </p:clrMapOvr>
-</p:sld>
-</file>
-
-<file path=ppt/slides/slide20.xml><?xml version="1.0" encoding="utf-8"?>
-<p:sld xmlns:a="http://schemas.openxmlformats.org/drawingml/2006/main" xmlns:r="http://schemas.openxmlformats.org/officeDocument/2006/relationships" xmlns:p="http://schemas.openxmlformats.org/presentationml/2006/main">
-  <p:cSld>
-    <p:spTree>
-      <p:nvGrpSpPr>
-        <p:cNvPr id="1" name=""/>
-        <p:cNvGrpSpPr/>
-        <p:nvPr/>
-      </p:nvGrpSpPr>
-      <p:grpSpPr>
-        <a:xfrm>
-          <a:off x="0" y="0"/>
-          <a:ext cx="0" cy="0"/>
-          <a:chOff x="0" y="0"/>
-          <a:chExt cx="0" cy="0"/>
-        </a:xfrm>
-      </p:grpSpPr>
-      <p:sp>
-        <p:nvSpPr>
-          <p:cNvPr id="2" name="Titel 1">
-            <a:extLst>
-              <a:ext uri="{FF2B5EF4-FFF2-40B4-BE49-F238E27FC236}">
-                <a16:creationId xmlns:a16="http://schemas.microsoft.com/office/drawing/2014/main" id="{FA0E998A-8B92-4AB3-A9A8-1DE5D112DC24}"/>
-              </a:ext>
-            </a:extLst>
-          </p:cNvPr>
-          <p:cNvSpPr>
-            <a:spLocks noGrp="1"/>
-          </p:cNvSpPr>
-          <p:nvPr>
-            <p:ph type="title"/>
-          </p:nvPr>
-        </p:nvSpPr>
-        <p:spPr/>
-        <p:txBody>
-          <a:bodyPr/>
-          <a:lstStyle/>
-          <a:p>
-            <a:r>
-              <a:rPr lang="de-DE" dirty="0"/>
-              <a:t>Vision Transformer on </a:t>
-            </a:r>
-            <a:r>
-              <a:rPr lang="de-DE" dirty="0" err="1"/>
-              <a:t>new</a:t>
-            </a:r>
-            <a:r>
-              <a:rPr lang="de-DE" dirty="0"/>
-              <a:t> Dataset</a:t>
-            </a:r>
-          </a:p>
-        </p:txBody>
-      </p:sp>
-      <p:sp>
-        <p:nvSpPr>
-          <p:cNvPr id="3" name="Inhaltsplatzhalter 2">
-            <a:extLst>
-              <a:ext uri="{FF2B5EF4-FFF2-40B4-BE49-F238E27FC236}">
-                <a16:creationId xmlns:a16="http://schemas.microsoft.com/office/drawing/2014/main" id="{03FCA3D9-EE93-495D-BB38-42608EA49BF0}"/>
-              </a:ext>
-            </a:extLst>
-          </p:cNvPr>
-          <p:cNvSpPr>
-            <a:spLocks noGrp="1"/>
-          </p:cNvSpPr>
-          <p:nvPr>
-            <p:ph idx="1"/>
-          </p:nvPr>
-        </p:nvSpPr>
-        <p:spPr/>
-        <p:txBody>
-          <a:bodyPr/>
-          <a:lstStyle/>
-          <a:p>
-            <a:r>
-              <a:rPr lang="de-DE" dirty="0" err="1"/>
-              <a:t>Augmentierung</a:t>
-            </a:r>
-            <a:r>
-              <a:rPr lang="de-DE" dirty="0"/>
-              <a:t>: Spiegeln, </a:t>
-            </a:r>
-            <a:r>
-              <a:rPr lang="de-DE" dirty="0" err="1"/>
-              <a:t>Crop</a:t>
-            </a:r>
-            <a:r>
-              <a:rPr lang="de-DE" dirty="0"/>
-              <a:t> </a:t>
-            </a:r>
-            <a:r>
-              <a:rPr lang="de-DE" dirty="0" err="1"/>
-              <a:t>with</a:t>
-            </a:r>
-            <a:r>
-              <a:rPr lang="de-DE" dirty="0"/>
-              <a:t> </a:t>
-            </a:r>
-            <a:r>
-              <a:rPr lang="de-DE" dirty="0" err="1"/>
-              <a:t>padding</a:t>
-            </a:r>
-            <a:r>
-              <a:rPr lang="de-DE" dirty="0"/>
-              <a:t> n = 4</a:t>
-            </a:r>
-          </a:p>
-        </p:txBody>
-      </p:sp>
-    </p:spTree>
-    <p:extLst>
-      <p:ext uri="{BB962C8B-B14F-4D97-AF65-F5344CB8AC3E}">
-        <p14:creationId xmlns:p14="http://schemas.microsoft.com/office/powerpoint/2010/main" val="4081882343"/>
-      </p:ext>
-    </p:extLst>
-  </p:cSld>
-  <p:clrMapOvr>
-    <a:masterClrMapping/>
-  </p:clrMapOvr>
-</p:sld>
-</file>
-
-<file path=ppt/slides/slide21.xml><?xml version="1.0" encoding="utf-8"?>
-<p:sld xmlns:a="http://schemas.openxmlformats.org/drawingml/2006/main" xmlns:r="http://schemas.openxmlformats.org/officeDocument/2006/relationships" xmlns:p="http://schemas.openxmlformats.org/presentationml/2006/main">
-  <p:cSld>
-    <p:spTree>
-      <p:nvGrpSpPr>
-        <p:cNvPr id="1" name=""/>
-        <p:cNvGrpSpPr/>
-        <p:nvPr/>
-      </p:nvGrpSpPr>
-      <p:grpSpPr>
-        <a:xfrm>
-          <a:off x="0" y="0"/>
-          <a:ext cx="0" cy="0"/>
-          <a:chOff x="0" y="0"/>
-          <a:chExt cx="0" cy="0"/>
-        </a:xfrm>
-      </p:grpSpPr>
-      <p:sp>
-        <p:nvSpPr>
-          <p:cNvPr id="2" name="Titel 1">
-            <a:extLst>
-              <a:ext uri="{FF2B5EF4-FFF2-40B4-BE49-F238E27FC236}">
-                <a16:creationId xmlns:a16="http://schemas.microsoft.com/office/drawing/2014/main" id="{FA0E998A-8B92-4AB3-A9A8-1DE5D112DC24}"/>
-              </a:ext>
-            </a:extLst>
-          </p:cNvPr>
-          <p:cNvSpPr>
-            <a:spLocks noGrp="1"/>
-          </p:cNvSpPr>
-          <p:nvPr>
-            <p:ph type="title"/>
-          </p:nvPr>
-        </p:nvSpPr>
-        <p:spPr/>
-        <p:txBody>
-          <a:bodyPr/>
-          <a:lstStyle/>
-          <a:p>
-            <a:r>
-              <a:rPr lang="de-DE" dirty="0"/>
-              <a:t>Vision Transformer on </a:t>
-            </a:r>
-            <a:r>
-              <a:rPr lang="de-DE" dirty="0" err="1"/>
-              <a:t>new</a:t>
-            </a:r>
-            <a:r>
-              <a:rPr lang="de-DE" dirty="0"/>
-              <a:t> Dataset</a:t>
-            </a:r>
-          </a:p>
-        </p:txBody>
-      </p:sp>
-      <p:sp>
-        <p:nvSpPr>
-          <p:cNvPr id="3" name="Inhaltsplatzhalter 2">
-            <a:extLst>
-              <a:ext uri="{FF2B5EF4-FFF2-40B4-BE49-F238E27FC236}">
-                <a16:creationId xmlns:a16="http://schemas.microsoft.com/office/drawing/2014/main" id="{03FCA3D9-EE93-495D-BB38-42608EA49BF0}"/>
-              </a:ext>
-            </a:extLst>
-          </p:cNvPr>
-          <p:cNvSpPr>
-            <a:spLocks noGrp="1"/>
-          </p:cNvSpPr>
-          <p:nvPr>
-            <p:ph idx="1"/>
-          </p:nvPr>
-        </p:nvSpPr>
-        <p:spPr/>
-        <p:txBody>
-          <a:bodyPr>
-            <a:normAutofit fontScale="47500" lnSpcReduction="20000"/>
-          </a:bodyPr>
-          <a:lstStyle/>
-          <a:p>
-            <a:pPr marL="0" indent="0">
-              <a:buNone/>
-            </a:pPr>
-            <a:r>
-              <a:rPr lang="de-DE" dirty="0"/>
-              <a:t>Trial 0 </a:t>
-            </a:r>
-            <a:r>
-              <a:rPr lang="de-DE" dirty="0" err="1"/>
-              <a:t>finished</a:t>
-            </a:r>
-            <a:r>
-              <a:rPr lang="de-DE" dirty="0"/>
-              <a:t> </a:t>
-            </a:r>
-            <a:r>
-              <a:rPr lang="de-DE" dirty="0" err="1"/>
-              <a:t>with</a:t>
-            </a:r>
-            <a:r>
-              <a:rPr lang="de-DE" dirty="0"/>
-              <a:t> </a:t>
-            </a:r>
-            <a:r>
-              <a:rPr lang="de-DE" dirty="0" err="1"/>
-              <a:t>value</a:t>
-            </a:r>
-            <a:r>
-              <a:rPr lang="de-DE" dirty="0"/>
-              <a:t>: 0.8842917251051893 and </a:t>
-            </a:r>
-            <a:r>
-              <a:rPr lang="de-DE" dirty="0" err="1"/>
-              <a:t>parameters</a:t>
-            </a:r>
-            <a:r>
-              <a:rPr lang="de-DE" dirty="0"/>
-              <a:t>: {'</a:t>
-            </a:r>
-            <a:r>
-              <a:rPr lang="de-DE" dirty="0" err="1"/>
-              <a:t>learning_rate</a:t>
-            </a:r>
-            <a:r>
-              <a:rPr lang="de-DE" dirty="0"/>
-              <a:t>': 0.004285920769950295, '</a:t>
-            </a:r>
-            <a:r>
-              <a:rPr lang="de-DE" dirty="0" err="1"/>
-              <a:t>batch_size</a:t>
-            </a:r>
-            <a:r>
-              <a:rPr lang="de-DE" dirty="0"/>
-              <a:t>': 64, '</a:t>
-            </a:r>
-            <a:r>
-              <a:rPr lang="de-DE" dirty="0" err="1"/>
-              <a:t>num_epochs</a:t>
-            </a:r>
-            <a:r>
-              <a:rPr lang="de-DE" dirty="0"/>
-              <a:t>': 10}. Best </a:t>
-            </a:r>
-            <a:r>
-              <a:rPr lang="de-DE" dirty="0" err="1"/>
-              <a:t>is</a:t>
-            </a:r>
-            <a:r>
-              <a:rPr lang="de-DE" dirty="0"/>
-              <a:t> </a:t>
-            </a:r>
-            <a:r>
-              <a:rPr lang="de-DE" dirty="0" err="1"/>
-              <a:t>trial</a:t>
-            </a:r>
-            <a:r>
-              <a:rPr lang="de-DE" dirty="0"/>
-              <a:t> 0 </a:t>
-            </a:r>
-            <a:r>
-              <a:rPr lang="de-DE" dirty="0" err="1"/>
-              <a:t>with</a:t>
-            </a:r>
-            <a:r>
-              <a:rPr lang="de-DE" dirty="0"/>
-              <a:t> </a:t>
-            </a:r>
-            <a:r>
-              <a:rPr lang="de-DE" dirty="0" err="1"/>
-              <a:t>value</a:t>
-            </a:r>
-            <a:r>
-              <a:rPr lang="de-DE" dirty="0"/>
-              <a:t>: 0.8842917251051893.</a:t>
-            </a:r>
-          </a:p>
-          <a:p>
-            <a:pPr marL="0" indent="0">
-              <a:buNone/>
-            </a:pPr>
-            <a:endParaRPr lang="de-DE" dirty="0"/>
-          </a:p>
-          <a:p>
-            <a:pPr marL="0" indent="0">
-              <a:buNone/>
-            </a:pPr>
-            <a:r>
-              <a:rPr lang="de-DE" dirty="0"/>
-              <a:t>Beste Hyperparameter: {'</a:t>
-            </a:r>
-            <a:r>
-              <a:rPr lang="de-DE" dirty="0" err="1"/>
-              <a:t>learning_rate</a:t>
-            </a:r>
-            <a:r>
-              <a:rPr lang="de-DE" dirty="0"/>
-              <a:t>': 0.004285920769950295, '</a:t>
-            </a:r>
-            <a:r>
-              <a:rPr lang="de-DE" dirty="0" err="1"/>
-              <a:t>batch_size</a:t>
-            </a:r>
-            <a:r>
-              <a:rPr lang="de-DE" dirty="0"/>
-              <a:t>': 64, '</a:t>
-            </a:r>
-            <a:r>
-              <a:rPr lang="de-DE" dirty="0" err="1"/>
-              <a:t>num_epochs</a:t>
-            </a:r>
-            <a:r>
-              <a:rPr lang="de-DE" dirty="0"/>
-              <a:t>': 10}</a:t>
-            </a:r>
-          </a:p>
-          <a:p>
-            <a:pPr marL="0" indent="0">
-              <a:buNone/>
-            </a:pPr>
-            <a:r>
-              <a:rPr lang="de-DE" dirty="0"/>
-              <a:t>Bester Validierungsverlust: 0.8842917251051893</a:t>
-            </a:r>
-          </a:p>
-          <a:p>
-            <a:pPr marL="0" indent="0">
-              <a:buNone/>
-            </a:pPr>
-            <a:r>
-              <a:rPr lang="de-DE" dirty="0" err="1"/>
-              <a:t>Epoch</a:t>
-            </a:r>
-            <a:r>
-              <a:rPr lang="de-DE" dirty="0"/>
-              <a:t> 1/10, Loss: 1.0807, </a:t>
-            </a:r>
-            <a:r>
-              <a:rPr lang="de-DE" dirty="0" err="1"/>
-              <a:t>Accuracy</a:t>
-            </a:r>
-            <a:r>
-              <a:rPr lang="de-DE" dirty="0"/>
-              <a:t>: 0.7005</a:t>
-            </a:r>
-          </a:p>
-          <a:p>
-            <a:pPr marL="0" indent="0">
-              <a:buNone/>
-            </a:pPr>
-            <a:r>
-              <a:rPr lang="de-DE" dirty="0" err="1"/>
-              <a:t>Epoch</a:t>
-            </a:r>
-            <a:r>
-              <a:rPr lang="de-DE" dirty="0"/>
-              <a:t> 2/10, Loss: 0.4877, </a:t>
-            </a:r>
-            <a:r>
-              <a:rPr lang="de-DE" dirty="0" err="1"/>
-              <a:t>Accuracy</a:t>
-            </a:r>
-            <a:r>
-              <a:rPr lang="de-DE" dirty="0"/>
-              <a:t>: 0.8651</a:t>
-            </a:r>
-          </a:p>
-          <a:p>
-            <a:pPr marL="0" indent="0">
-              <a:buNone/>
-            </a:pPr>
-            <a:r>
-              <a:rPr lang="de-DE" dirty="0" err="1"/>
-              <a:t>Epoch</a:t>
-            </a:r>
-            <a:r>
-              <a:rPr lang="de-DE" dirty="0"/>
-              <a:t> 3/10, Loss: 0.3679, </a:t>
-            </a:r>
-            <a:r>
-              <a:rPr lang="de-DE" dirty="0" err="1"/>
-              <a:t>Accuracy</a:t>
-            </a:r>
-            <a:r>
-              <a:rPr lang="de-DE" dirty="0"/>
-              <a:t>: 0.8959</a:t>
-            </a:r>
-          </a:p>
-          <a:p>
-            <a:pPr marL="0" indent="0">
-              <a:buNone/>
-            </a:pPr>
-            <a:r>
-              <a:rPr lang="de-DE" dirty="0" err="1"/>
-              <a:t>Epoch</a:t>
-            </a:r>
-            <a:r>
-              <a:rPr lang="de-DE" dirty="0"/>
-              <a:t> 4/10, Loss: 0.3177, </a:t>
-            </a:r>
-            <a:r>
-              <a:rPr lang="de-DE" dirty="0" err="1"/>
-              <a:t>Accuracy</a:t>
-            </a:r>
-            <a:r>
-              <a:rPr lang="de-DE" dirty="0"/>
-              <a:t>: 0.9037</a:t>
-            </a:r>
-          </a:p>
-          <a:p>
-            <a:pPr marL="0" indent="0">
-              <a:buNone/>
-            </a:pPr>
-            <a:r>
-              <a:rPr lang="de-DE" dirty="0" err="1"/>
-              <a:t>Epoch</a:t>
-            </a:r>
-            <a:r>
-              <a:rPr lang="de-DE" dirty="0"/>
-              <a:t> 5/10, Loss: 0.2599, </a:t>
-            </a:r>
-            <a:r>
-              <a:rPr lang="de-DE" dirty="0" err="1"/>
-              <a:t>Accuracy</a:t>
-            </a:r>
-            <a:r>
-              <a:rPr lang="de-DE" dirty="0"/>
-              <a:t>: 0.9241</a:t>
-            </a:r>
-          </a:p>
-          <a:p>
-            <a:pPr marL="0" indent="0">
-              <a:buNone/>
-            </a:pPr>
-            <a:r>
-              <a:rPr lang="de-DE" dirty="0" err="1"/>
-              <a:t>Epoch</a:t>
-            </a:r>
-            <a:r>
-              <a:rPr lang="de-DE" dirty="0"/>
-              <a:t> 6/10, Loss: 0.2318, </a:t>
-            </a:r>
-            <a:r>
-              <a:rPr lang="de-DE" dirty="0" err="1"/>
-              <a:t>Accuracy</a:t>
-            </a:r>
-            <a:r>
-              <a:rPr lang="de-DE" dirty="0"/>
-              <a:t>: 0.9322</a:t>
-            </a:r>
-          </a:p>
-          <a:p>
-            <a:pPr marL="0" indent="0">
-              <a:buNone/>
-            </a:pPr>
-            <a:r>
-              <a:rPr lang="de-DE" dirty="0" err="1"/>
-              <a:t>Epoch</a:t>
-            </a:r>
-            <a:r>
-              <a:rPr lang="de-DE" dirty="0"/>
-              <a:t> 7/10, Loss: 0.2091, </a:t>
-            </a:r>
-            <a:r>
-              <a:rPr lang="de-DE" dirty="0" err="1"/>
-              <a:t>Accuracy</a:t>
-            </a:r>
-            <a:r>
-              <a:rPr lang="de-DE" dirty="0"/>
-              <a:t>: 0.9394</a:t>
-            </a:r>
-          </a:p>
-          <a:p>
-            <a:pPr marL="0" indent="0">
-              <a:buNone/>
-            </a:pPr>
-            <a:r>
-              <a:rPr lang="de-DE" dirty="0" err="1"/>
-              <a:t>Epoch</a:t>
-            </a:r>
-            <a:r>
-              <a:rPr lang="de-DE" dirty="0"/>
-              <a:t> 8/10, Loss: 0.1951, </a:t>
-            </a:r>
-            <a:r>
-              <a:rPr lang="de-DE" dirty="0" err="1"/>
-              <a:t>Accuracy</a:t>
-            </a:r>
-            <a:r>
-              <a:rPr lang="de-DE" dirty="0"/>
-              <a:t>: 0.9430</a:t>
-            </a:r>
-          </a:p>
-          <a:p>
-            <a:pPr marL="0" indent="0">
-              <a:buNone/>
-            </a:pPr>
-            <a:r>
-              <a:rPr lang="de-DE" dirty="0" err="1"/>
-              <a:t>Epoch</a:t>
-            </a:r>
-            <a:r>
-              <a:rPr lang="de-DE" dirty="0"/>
-              <a:t> 9/10, Loss: 0.1852, </a:t>
-            </a:r>
-            <a:r>
-              <a:rPr lang="de-DE" dirty="0" err="1"/>
-              <a:t>Accuracy</a:t>
-            </a:r>
-            <a:r>
-              <a:rPr lang="de-DE" dirty="0"/>
-              <a:t>: 0.9455</a:t>
-            </a:r>
-          </a:p>
-          <a:p>
-            <a:pPr marL="0" indent="0">
-              <a:buNone/>
-            </a:pPr>
-            <a:r>
-              <a:rPr lang="de-DE" dirty="0" err="1"/>
-              <a:t>Epoch</a:t>
-            </a:r>
-            <a:r>
-              <a:rPr lang="de-DE" dirty="0"/>
-              <a:t> 10/10, Loss: 0.1602, </a:t>
-            </a:r>
-            <a:r>
-              <a:rPr lang="de-DE" dirty="0" err="1"/>
-              <a:t>Accuracy</a:t>
-            </a:r>
-            <a:r>
-              <a:rPr lang="de-DE" dirty="0"/>
-              <a:t>: 0.9512</a:t>
-            </a:r>
-          </a:p>
-          <a:p>
-            <a:pPr marL="0" indent="0">
-              <a:buNone/>
-            </a:pPr>
-            <a:r>
-              <a:rPr lang="de-DE" dirty="0"/>
-              <a:t>Final Validation Loss: 0.4258, Final Validation </a:t>
-            </a:r>
-            <a:r>
-              <a:rPr lang="de-DE" dirty="0" err="1"/>
-              <a:t>Accuracy</a:t>
-            </a:r>
-            <a:r>
-              <a:rPr lang="de-DE" dirty="0"/>
-              <a:t>: 0.8773</a:t>
-            </a:r>
-          </a:p>
-        </p:txBody>
-      </p:sp>
-    </p:spTree>
-    <p:extLst>
-      <p:ext uri="{BB962C8B-B14F-4D97-AF65-F5344CB8AC3E}">
-        <p14:creationId xmlns:p14="http://schemas.microsoft.com/office/powerpoint/2010/main" val="558545656"/>
       </p:ext>
     </p:extLst>
   </p:cSld>
@@ -5905,6 +5736,690 @@
       </p:grpSpPr>
       <p:sp>
         <p:nvSpPr>
+          <p:cNvPr id="3" name="Titel 1">
+            <a:extLst>
+              <a:ext uri="{FF2B5EF4-FFF2-40B4-BE49-F238E27FC236}">
+                <a16:creationId xmlns:a16="http://schemas.microsoft.com/office/drawing/2014/main" id="{33062B24-559F-41F6-8766-1B8B53C3E0C1}"/>
+              </a:ext>
+            </a:extLst>
+          </p:cNvPr>
+          <p:cNvSpPr txBox="1">
+            <a:spLocks/>
+          </p:cNvSpPr>
+          <p:nvPr/>
+        </p:nvSpPr>
+        <p:spPr>
+          <a:xfrm>
+            <a:off x="415636" y="317623"/>
+            <a:ext cx="11014364" cy="1325563"/>
+          </a:xfrm>
+          <a:prstGeom prst="rect">
+            <a:avLst/>
+          </a:prstGeom>
+        </p:spPr>
+        <p:txBody>
+          <a:bodyPr vert="horz" lIns="91440" tIns="45720" rIns="91440" bIns="45720" rtlCol="0" anchor="ctr">
+            <a:normAutofit/>
+          </a:bodyPr>
+          <a:lstStyle>
+            <a:lvl1pPr algn="l" defTabSz="914400" rtl="0" eaLnBrk="1" latinLnBrk="0" hangingPunct="1">
+              <a:lnSpc>
+                <a:spcPct val="90000"/>
+              </a:lnSpc>
+              <a:spcBef>
+                <a:spcPct val="0"/>
+              </a:spcBef>
+              <a:buNone/>
+              <a:defRPr sz="4400" kern="1200">
+                <a:solidFill>
+                  <a:schemeClr val="tx1"/>
+                </a:solidFill>
+                <a:latin typeface="+mj-lt"/>
+                <a:ea typeface="+mj-ea"/>
+                <a:cs typeface="+mj-cs"/>
+              </a:defRPr>
+            </a:lvl1pPr>
+          </a:lstStyle>
+          <a:p>
+            <a:r>
+              <a:rPr lang="de-DE" dirty="0"/>
+              <a:t>ResNet50 on </a:t>
+            </a:r>
+            <a:r>
+              <a:rPr lang="de-DE" dirty="0" err="1"/>
+              <a:t>new</a:t>
+            </a:r>
+            <a:r>
+              <a:rPr lang="de-DE" dirty="0"/>
+              <a:t> Dataset – </a:t>
+            </a:r>
+            <a:r>
+              <a:rPr lang="de-DE" dirty="0" err="1"/>
+              <a:t>Saliency</a:t>
+            </a:r>
+            <a:r>
+              <a:rPr lang="de-DE" dirty="0"/>
+              <a:t> Maps</a:t>
+            </a:r>
+          </a:p>
+        </p:txBody>
+      </p:sp>
+    </p:spTree>
+    <p:extLst>
+      <p:ext uri="{BB962C8B-B14F-4D97-AF65-F5344CB8AC3E}">
+        <p14:creationId xmlns:p14="http://schemas.microsoft.com/office/powerpoint/2010/main" val="3587953171"/>
+      </p:ext>
+    </p:extLst>
+  </p:cSld>
+  <p:clrMapOvr>
+    <a:masterClrMapping/>
+  </p:clrMapOvr>
+</p:sld>
+</file>
+
+<file path=ppt/slides/slide23.xml><?xml version="1.0" encoding="utf-8"?>
+<p:sld xmlns:a="http://schemas.openxmlformats.org/drawingml/2006/main" xmlns:r="http://schemas.openxmlformats.org/officeDocument/2006/relationships" xmlns:p="http://schemas.openxmlformats.org/presentationml/2006/main">
+  <p:cSld>
+    <p:spTree>
+      <p:nvGrpSpPr>
+        <p:cNvPr id="1" name=""/>
+        <p:cNvGrpSpPr/>
+        <p:nvPr/>
+      </p:nvGrpSpPr>
+      <p:grpSpPr>
+        <a:xfrm>
+          <a:off x="0" y="0"/>
+          <a:ext cx="0" cy="0"/>
+          <a:chOff x="0" y="0"/>
+          <a:chExt cx="0" cy="0"/>
+        </a:xfrm>
+      </p:grpSpPr>
+      <p:sp>
+        <p:nvSpPr>
+          <p:cNvPr id="2" name="Titel 1">
+            <a:extLst>
+              <a:ext uri="{FF2B5EF4-FFF2-40B4-BE49-F238E27FC236}">
+                <a16:creationId xmlns:a16="http://schemas.microsoft.com/office/drawing/2014/main" id="{FA0E998A-8B92-4AB3-A9A8-1DE5D112DC24}"/>
+              </a:ext>
+            </a:extLst>
+          </p:cNvPr>
+          <p:cNvSpPr>
+            <a:spLocks noGrp="1"/>
+          </p:cNvSpPr>
+          <p:nvPr>
+            <p:ph type="title"/>
+          </p:nvPr>
+        </p:nvSpPr>
+        <p:spPr/>
+        <p:txBody>
+          <a:bodyPr/>
+          <a:lstStyle/>
+          <a:p>
+            <a:r>
+              <a:rPr lang="de-DE" dirty="0"/>
+              <a:t>Vision Transformer on </a:t>
+            </a:r>
+            <a:r>
+              <a:rPr lang="de-DE" dirty="0" err="1"/>
+              <a:t>new</a:t>
+            </a:r>
+            <a:r>
+              <a:rPr lang="de-DE" dirty="0"/>
+              <a:t> Dataset</a:t>
+            </a:r>
+          </a:p>
+        </p:txBody>
+      </p:sp>
+      <p:sp>
+        <p:nvSpPr>
+          <p:cNvPr id="3" name="Inhaltsplatzhalter 2">
+            <a:extLst>
+              <a:ext uri="{FF2B5EF4-FFF2-40B4-BE49-F238E27FC236}">
+                <a16:creationId xmlns:a16="http://schemas.microsoft.com/office/drawing/2014/main" id="{03FCA3D9-EE93-495D-BB38-42608EA49BF0}"/>
+              </a:ext>
+            </a:extLst>
+          </p:cNvPr>
+          <p:cNvSpPr>
+            <a:spLocks noGrp="1"/>
+          </p:cNvSpPr>
+          <p:nvPr>
+            <p:ph idx="1"/>
+          </p:nvPr>
+        </p:nvSpPr>
+        <p:spPr/>
+        <p:txBody>
+          <a:bodyPr/>
+          <a:lstStyle/>
+          <a:p>
+            <a:r>
+              <a:rPr lang="de-DE" dirty="0" err="1"/>
+              <a:t>Augmentierung</a:t>
+            </a:r>
+            <a:r>
+              <a:rPr lang="de-DE" dirty="0"/>
+              <a:t>: Spiegeln, </a:t>
+            </a:r>
+            <a:r>
+              <a:rPr lang="de-DE" dirty="0" err="1"/>
+              <a:t>Crop</a:t>
+            </a:r>
+            <a:r>
+              <a:rPr lang="de-DE" dirty="0"/>
+              <a:t> </a:t>
+            </a:r>
+            <a:r>
+              <a:rPr lang="de-DE" dirty="0" err="1"/>
+              <a:t>with</a:t>
+            </a:r>
+            <a:r>
+              <a:rPr lang="de-DE" dirty="0"/>
+              <a:t> </a:t>
+            </a:r>
+            <a:r>
+              <a:rPr lang="de-DE" dirty="0" err="1"/>
+              <a:t>padding</a:t>
+            </a:r>
+            <a:r>
+              <a:rPr lang="de-DE" dirty="0"/>
+              <a:t> n = 4</a:t>
+            </a:r>
+          </a:p>
+        </p:txBody>
+      </p:sp>
+    </p:spTree>
+    <p:extLst>
+      <p:ext uri="{BB962C8B-B14F-4D97-AF65-F5344CB8AC3E}">
+        <p14:creationId xmlns:p14="http://schemas.microsoft.com/office/powerpoint/2010/main" val="4081882343"/>
+      </p:ext>
+    </p:extLst>
+  </p:cSld>
+  <p:clrMapOvr>
+    <a:masterClrMapping/>
+  </p:clrMapOvr>
+</p:sld>
+</file>
+
+<file path=ppt/slides/slide24.xml><?xml version="1.0" encoding="utf-8"?>
+<p:sld xmlns:a="http://schemas.openxmlformats.org/drawingml/2006/main" xmlns:r="http://schemas.openxmlformats.org/officeDocument/2006/relationships" xmlns:p="http://schemas.openxmlformats.org/presentationml/2006/main">
+  <p:cSld>
+    <p:spTree>
+      <p:nvGrpSpPr>
+        <p:cNvPr id="1" name=""/>
+        <p:cNvGrpSpPr/>
+        <p:nvPr/>
+      </p:nvGrpSpPr>
+      <p:grpSpPr>
+        <a:xfrm>
+          <a:off x="0" y="0"/>
+          <a:ext cx="0" cy="0"/>
+          <a:chOff x="0" y="0"/>
+          <a:chExt cx="0" cy="0"/>
+        </a:xfrm>
+      </p:grpSpPr>
+      <p:sp>
+        <p:nvSpPr>
+          <p:cNvPr id="2" name="Titel 1">
+            <a:extLst>
+              <a:ext uri="{FF2B5EF4-FFF2-40B4-BE49-F238E27FC236}">
+                <a16:creationId xmlns:a16="http://schemas.microsoft.com/office/drawing/2014/main" id="{FA0E998A-8B92-4AB3-A9A8-1DE5D112DC24}"/>
+              </a:ext>
+            </a:extLst>
+          </p:cNvPr>
+          <p:cNvSpPr>
+            <a:spLocks noGrp="1"/>
+          </p:cNvSpPr>
+          <p:nvPr>
+            <p:ph type="title"/>
+          </p:nvPr>
+        </p:nvSpPr>
+        <p:spPr/>
+        <p:txBody>
+          <a:bodyPr/>
+          <a:lstStyle/>
+          <a:p>
+            <a:r>
+              <a:rPr lang="de-DE" dirty="0"/>
+              <a:t>Vision Transformer on </a:t>
+            </a:r>
+            <a:r>
+              <a:rPr lang="de-DE" dirty="0" err="1"/>
+              <a:t>new</a:t>
+            </a:r>
+            <a:r>
+              <a:rPr lang="de-DE" dirty="0"/>
+              <a:t> Dataset</a:t>
+            </a:r>
+          </a:p>
+        </p:txBody>
+      </p:sp>
+      <p:sp>
+        <p:nvSpPr>
+          <p:cNvPr id="3" name="Inhaltsplatzhalter 2">
+            <a:extLst>
+              <a:ext uri="{FF2B5EF4-FFF2-40B4-BE49-F238E27FC236}">
+                <a16:creationId xmlns:a16="http://schemas.microsoft.com/office/drawing/2014/main" id="{03FCA3D9-EE93-495D-BB38-42608EA49BF0}"/>
+              </a:ext>
+            </a:extLst>
+          </p:cNvPr>
+          <p:cNvSpPr>
+            <a:spLocks noGrp="1"/>
+          </p:cNvSpPr>
+          <p:nvPr>
+            <p:ph idx="1"/>
+          </p:nvPr>
+        </p:nvSpPr>
+        <p:spPr/>
+        <p:txBody>
+          <a:bodyPr>
+            <a:normAutofit fontScale="47500" lnSpcReduction="20000"/>
+          </a:bodyPr>
+          <a:lstStyle/>
+          <a:p>
+            <a:pPr marL="0" indent="0">
+              <a:buNone/>
+            </a:pPr>
+            <a:r>
+              <a:rPr lang="de-DE" dirty="0"/>
+              <a:t>Trial 0 </a:t>
+            </a:r>
+            <a:r>
+              <a:rPr lang="de-DE" dirty="0" err="1"/>
+              <a:t>finished</a:t>
+            </a:r>
+            <a:r>
+              <a:rPr lang="de-DE" dirty="0"/>
+              <a:t> </a:t>
+            </a:r>
+            <a:r>
+              <a:rPr lang="de-DE" dirty="0" err="1"/>
+              <a:t>with</a:t>
+            </a:r>
+            <a:r>
+              <a:rPr lang="de-DE" dirty="0"/>
+              <a:t> </a:t>
+            </a:r>
+            <a:r>
+              <a:rPr lang="de-DE" dirty="0" err="1"/>
+              <a:t>value</a:t>
+            </a:r>
+            <a:r>
+              <a:rPr lang="de-DE" dirty="0"/>
+              <a:t>: 0.8842917251051893 and </a:t>
+            </a:r>
+            <a:r>
+              <a:rPr lang="de-DE" dirty="0" err="1"/>
+              <a:t>parameters</a:t>
+            </a:r>
+            <a:r>
+              <a:rPr lang="de-DE" dirty="0"/>
+              <a:t>: {'</a:t>
+            </a:r>
+            <a:r>
+              <a:rPr lang="de-DE" dirty="0" err="1"/>
+              <a:t>learning_rate</a:t>
+            </a:r>
+            <a:r>
+              <a:rPr lang="de-DE" dirty="0"/>
+              <a:t>': 0.004285920769950295, '</a:t>
+            </a:r>
+            <a:r>
+              <a:rPr lang="de-DE" dirty="0" err="1"/>
+              <a:t>batch_size</a:t>
+            </a:r>
+            <a:r>
+              <a:rPr lang="de-DE" dirty="0"/>
+              <a:t>': 64, '</a:t>
+            </a:r>
+            <a:r>
+              <a:rPr lang="de-DE" dirty="0" err="1"/>
+              <a:t>num_epochs</a:t>
+            </a:r>
+            <a:r>
+              <a:rPr lang="de-DE" dirty="0"/>
+              <a:t>': 10}. Best </a:t>
+            </a:r>
+            <a:r>
+              <a:rPr lang="de-DE" dirty="0" err="1"/>
+              <a:t>is</a:t>
+            </a:r>
+            <a:r>
+              <a:rPr lang="de-DE" dirty="0"/>
+              <a:t> </a:t>
+            </a:r>
+            <a:r>
+              <a:rPr lang="de-DE" dirty="0" err="1"/>
+              <a:t>trial</a:t>
+            </a:r>
+            <a:r>
+              <a:rPr lang="de-DE" dirty="0"/>
+              <a:t> 0 </a:t>
+            </a:r>
+            <a:r>
+              <a:rPr lang="de-DE" dirty="0" err="1"/>
+              <a:t>with</a:t>
+            </a:r>
+            <a:r>
+              <a:rPr lang="de-DE" dirty="0"/>
+              <a:t> </a:t>
+            </a:r>
+            <a:r>
+              <a:rPr lang="de-DE" dirty="0" err="1"/>
+              <a:t>value</a:t>
+            </a:r>
+            <a:r>
+              <a:rPr lang="de-DE" dirty="0"/>
+              <a:t>: 0.8842917251051893.</a:t>
+            </a:r>
+          </a:p>
+          <a:p>
+            <a:pPr marL="0" indent="0">
+              <a:buNone/>
+            </a:pPr>
+            <a:endParaRPr lang="de-DE" dirty="0"/>
+          </a:p>
+          <a:p>
+            <a:pPr marL="0" indent="0">
+              <a:buNone/>
+            </a:pPr>
+            <a:r>
+              <a:rPr lang="de-DE" dirty="0"/>
+              <a:t>Beste Hyperparameter: {'</a:t>
+            </a:r>
+            <a:r>
+              <a:rPr lang="de-DE" dirty="0" err="1"/>
+              <a:t>learning_rate</a:t>
+            </a:r>
+            <a:r>
+              <a:rPr lang="de-DE" dirty="0"/>
+              <a:t>': 0.004285920769950295, '</a:t>
+            </a:r>
+            <a:r>
+              <a:rPr lang="de-DE" dirty="0" err="1"/>
+              <a:t>batch_size</a:t>
+            </a:r>
+            <a:r>
+              <a:rPr lang="de-DE" dirty="0"/>
+              <a:t>': 64, '</a:t>
+            </a:r>
+            <a:r>
+              <a:rPr lang="de-DE" dirty="0" err="1"/>
+              <a:t>num_epochs</a:t>
+            </a:r>
+            <a:r>
+              <a:rPr lang="de-DE" dirty="0"/>
+              <a:t>': 10}</a:t>
+            </a:r>
+          </a:p>
+          <a:p>
+            <a:pPr marL="0" indent="0">
+              <a:buNone/>
+            </a:pPr>
+            <a:r>
+              <a:rPr lang="de-DE" dirty="0"/>
+              <a:t>Bester Validierungsverlust: 0.8842917251051893</a:t>
+            </a:r>
+          </a:p>
+          <a:p>
+            <a:pPr marL="0" indent="0">
+              <a:buNone/>
+            </a:pPr>
+            <a:r>
+              <a:rPr lang="de-DE" dirty="0" err="1"/>
+              <a:t>Epoch</a:t>
+            </a:r>
+            <a:r>
+              <a:rPr lang="de-DE" dirty="0"/>
+              <a:t> 1/10, Loss: 1.0807, </a:t>
+            </a:r>
+            <a:r>
+              <a:rPr lang="de-DE" dirty="0" err="1"/>
+              <a:t>Accuracy</a:t>
+            </a:r>
+            <a:r>
+              <a:rPr lang="de-DE" dirty="0"/>
+              <a:t>: 0.7005</a:t>
+            </a:r>
+          </a:p>
+          <a:p>
+            <a:pPr marL="0" indent="0">
+              <a:buNone/>
+            </a:pPr>
+            <a:r>
+              <a:rPr lang="de-DE" dirty="0" err="1"/>
+              <a:t>Epoch</a:t>
+            </a:r>
+            <a:r>
+              <a:rPr lang="de-DE" dirty="0"/>
+              <a:t> 2/10, Loss: 0.4877, </a:t>
+            </a:r>
+            <a:r>
+              <a:rPr lang="de-DE" dirty="0" err="1"/>
+              <a:t>Accuracy</a:t>
+            </a:r>
+            <a:r>
+              <a:rPr lang="de-DE" dirty="0"/>
+              <a:t>: 0.8651</a:t>
+            </a:r>
+          </a:p>
+          <a:p>
+            <a:pPr marL="0" indent="0">
+              <a:buNone/>
+            </a:pPr>
+            <a:r>
+              <a:rPr lang="de-DE" dirty="0" err="1"/>
+              <a:t>Epoch</a:t>
+            </a:r>
+            <a:r>
+              <a:rPr lang="de-DE" dirty="0"/>
+              <a:t> 3/10, Loss: 0.3679, </a:t>
+            </a:r>
+            <a:r>
+              <a:rPr lang="de-DE" dirty="0" err="1"/>
+              <a:t>Accuracy</a:t>
+            </a:r>
+            <a:r>
+              <a:rPr lang="de-DE" dirty="0"/>
+              <a:t>: 0.8959</a:t>
+            </a:r>
+          </a:p>
+          <a:p>
+            <a:pPr marL="0" indent="0">
+              <a:buNone/>
+            </a:pPr>
+            <a:r>
+              <a:rPr lang="de-DE" dirty="0" err="1"/>
+              <a:t>Epoch</a:t>
+            </a:r>
+            <a:r>
+              <a:rPr lang="de-DE" dirty="0"/>
+              <a:t> 4/10, Loss: 0.3177, </a:t>
+            </a:r>
+            <a:r>
+              <a:rPr lang="de-DE" dirty="0" err="1"/>
+              <a:t>Accuracy</a:t>
+            </a:r>
+            <a:r>
+              <a:rPr lang="de-DE" dirty="0"/>
+              <a:t>: 0.9037</a:t>
+            </a:r>
+          </a:p>
+          <a:p>
+            <a:pPr marL="0" indent="0">
+              <a:buNone/>
+            </a:pPr>
+            <a:r>
+              <a:rPr lang="de-DE" dirty="0" err="1"/>
+              <a:t>Epoch</a:t>
+            </a:r>
+            <a:r>
+              <a:rPr lang="de-DE" dirty="0"/>
+              <a:t> 5/10, Loss: 0.2599, </a:t>
+            </a:r>
+            <a:r>
+              <a:rPr lang="de-DE" dirty="0" err="1"/>
+              <a:t>Accuracy</a:t>
+            </a:r>
+            <a:r>
+              <a:rPr lang="de-DE" dirty="0"/>
+              <a:t>: 0.9241</a:t>
+            </a:r>
+          </a:p>
+          <a:p>
+            <a:pPr marL="0" indent="0">
+              <a:buNone/>
+            </a:pPr>
+            <a:r>
+              <a:rPr lang="de-DE" dirty="0" err="1"/>
+              <a:t>Epoch</a:t>
+            </a:r>
+            <a:r>
+              <a:rPr lang="de-DE" dirty="0"/>
+              <a:t> 6/10, Loss: 0.2318, </a:t>
+            </a:r>
+            <a:r>
+              <a:rPr lang="de-DE" dirty="0" err="1"/>
+              <a:t>Accuracy</a:t>
+            </a:r>
+            <a:r>
+              <a:rPr lang="de-DE" dirty="0"/>
+              <a:t>: 0.9322</a:t>
+            </a:r>
+          </a:p>
+          <a:p>
+            <a:pPr marL="0" indent="0">
+              <a:buNone/>
+            </a:pPr>
+            <a:r>
+              <a:rPr lang="de-DE" dirty="0" err="1"/>
+              <a:t>Epoch</a:t>
+            </a:r>
+            <a:r>
+              <a:rPr lang="de-DE" dirty="0"/>
+              <a:t> 7/10, Loss: 0.2091, </a:t>
+            </a:r>
+            <a:r>
+              <a:rPr lang="de-DE" dirty="0" err="1"/>
+              <a:t>Accuracy</a:t>
+            </a:r>
+            <a:r>
+              <a:rPr lang="de-DE" dirty="0"/>
+              <a:t>: 0.9394</a:t>
+            </a:r>
+          </a:p>
+          <a:p>
+            <a:pPr marL="0" indent="0">
+              <a:buNone/>
+            </a:pPr>
+            <a:r>
+              <a:rPr lang="de-DE" dirty="0" err="1"/>
+              <a:t>Epoch</a:t>
+            </a:r>
+            <a:r>
+              <a:rPr lang="de-DE" dirty="0"/>
+              <a:t> 8/10, Loss: 0.1951, </a:t>
+            </a:r>
+            <a:r>
+              <a:rPr lang="de-DE" dirty="0" err="1"/>
+              <a:t>Accuracy</a:t>
+            </a:r>
+            <a:r>
+              <a:rPr lang="de-DE" dirty="0"/>
+              <a:t>: 0.9430</a:t>
+            </a:r>
+          </a:p>
+          <a:p>
+            <a:pPr marL="0" indent="0">
+              <a:buNone/>
+            </a:pPr>
+            <a:r>
+              <a:rPr lang="de-DE" dirty="0" err="1"/>
+              <a:t>Epoch</a:t>
+            </a:r>
+            <a:r>
+              <a:rPr lang="de-DE" dirty="0"/>
+              <a:t> 9/10, Loss: 0.1852, </a:t>
+            </a:r>
+            <a:r>
+              <a:rPr lang="de-DE" dirty="0" err="1"/>
+              <a:t>Accuracy</a:t>
+            </a:r>
+            <a:r>
+              <a:rPr lang="de-DE" dirty="0"/>
+              <a:t>: 0.9455</a:t>
+            </a:r>
+          </a:p>
+          <a:p>
+            <a:pPr marL="0" indent="0">
+              <a:buNone/>
+            </a:pPr>
+            <a:r>
+              <a:rPr lang="de-DE" dirty="0" err="1"/>
+              <a:t>Epoch</a:t>
+            </a:r>
+            <a:r>
+              <a:rPr lang="de-DE" dirty="0"/>
+              <a:t> 10/10, Loss: 0.1602, </a:t>
+            </a:r>
+            <a:r>
+              <a:rPr lang="de-DE" dirty="0" err="1"/>
+              <a:t>Accuracy</a:t>
+            </a:r>
+            <a:r>
+              <a:rPr lang="de-DE" dirty="0"/>
+              <a:t>: 0.9512</a:t>
+            </a:r>
+          </a:p>
+          <a:p>
+            <a:pPr marL="0" indent="0">
+              <a:buNone/>
+            </a:pPr>
+            <a:r>
+              <a:rPr lang="de-DE" dirty="0"/>
+              <a:t>Final Validation Loss: 0.4258, Final Validation </a:t>
+            </a:r>
+            <a:r>
+              <a:rPr lang="de-DE" dirty="0" err="1"/>
+              <a:t>Accuracy</a:t>
+            </a:r>
+            <a:r>
+              <a:rPr lang="de-DE" dirty="0"/>
+              <a:t>: 0.8773</a:t>
+            </a:r>
+          </a:p>
+        </p:txBody>
+      </p:sp>
+    </p:spTree>
+    <p:extLst>
+      <p:ext uri="{BB962C8B-B14F-4D97-AF65-F5344CB8AC3E}">
+        <p14:creationId xmlns:p14="http://schemas.microsoft.com/office/powerpoint/2010/main" val="558545656"/>
+      </p:ext>
+    </p:extLst>
+  </p:cSld>
+  <p:clrMapOvr>
+    <a:masterClrMapping/>
+  </p:clrMapOvr>
+</p:sld>
+</file>
+
+<file path=ppt/slides/slide25.xml><?xml version="1.0" encoding="utf-8"?>
+<p:sld xmlns:a="http://schemas.openxmlformats.org/drawingml/2006/main" xmlns:r="http://schemas.openxmlformats.org/officeDocument/2006/relationships" xmlns:p="http://schemas.openxmlformats.org/presentationml/2006/main">
+  <p:cSld>
+    <p:spTree>
+      <p:nvGrpSpPr>
+        <p:cNvPr id="1" name=""/>
+        <p:cNvGrpSpPr/>
+        <p:nvPr/>
+      </p:nvGrpSpPr>
+      <p:grpSpPr>
+        <a:xfrm>
+          <a:off x="0" y="0"/>
+          <a:ext cx="0" cy="0"/>
+          <a:chOff x="0" y="0"/>
+          <a:chExt cx="0" cy="0"/>
+        </a:xfrm>
+      </p:grpSpPr>
+      <p:sp>
+        <p:nvSpPr>
           <p:cNvPr id="11" name="Textfeld 10">
             <a:extLst>
               <a:ext uri="{FF2B5EF4-FFF2-40B4-BE49-F238E27FC236}">
@@ -6073,7 +6588,7 @@
 </p:sld>
 </file>
 
-<file path=ppt/slides/slide23.xml><?xml version="1.0" encoding="utf-8"?>
+<file path=ppt/slides/slide26.xml><?xml version="1.0" encoding="utf-8"?>
 <p:sld xmlns:a="http://schemas.openxmlformats.org/drawingml/2006/main" xmlns:r="http://schemas.openxmlformats.org/officeDocument/2006/relationships" xmlns:p="http://schemas.openxmlformats.org/presentationml/2006/main">
   <p:cSld>
     <p:spTree>
@@ -6203,7 +6718,7 @@
 </p:sld>
 </file>
 
-<file path=ppt/slides/slide24.xml><?xml version="1.0" encoding="utf-8"?>
+<file path=ppt/slides/slide27.xml><?xml version="1.0" encoding="utf-8"?>
 <p:sld xmlns:a="http://schemas.openxmlformats.org/drawingml/2006/main" xmlns:r="http://schemas.openxmlformats.org/officeDocument/2006/relationships" xmlns:p="http://schemas.openxmlformats.org/presentationml/2006/main">
   <p:cSld>
     <p:spTree>
@@ -6300,7 +6815,7 @@
 </p:sld>
 </file>
 
-<file path=ppt/slides/slide25.xml><?xml version="1.0" encoding="utf-8"?>
+<file path=ppt/slides/slide28.xml><?xml version="1.0" encoding="utf-8"?>
 <p:sld xmlns:a="http://schemas.openxmlformats.org/drawingml/2006/main" xmlns:r="http://schemas.openxmlformats.org/officeDocument/2006/relationships" xmlns:p="http://schemas.openxmlformats.org/presentationml/2006/main">
   <p:cSld>
     <p:spTree>

</xml_diff>

<commit_message>
llm agent and diffusion model modifications
</commit_message>
<xml_diff>
--- a/Präsentation1 (3).pptx
+++ b/Präsentation1 (3).pptx
@@ -5,35 +5,34 @@
     <p:sldMasterId id="2147483648" r:id="rId1"/>
   </p:sldMasterIdLst>
   <p:sldIdLst>
-    <p:sldId id="256" r:id="rId2"/>
-    <p:sldId id="257" r:id="rId3"/>
-    <p:sldId id="258" r:id="rId4"/>
-    <p:sldId id="262" r:id="rId5"/>
-    <p:sldId id="264" r:id="rId6"/>
-    <p:sldId id="263" r:id="rId7"/>
-    <p:sldId id="261" r:id="rId8"/>
-    <p:sldId id="265" r:id="rId9"/>
-    <p:sldId id="267" r:id="rId10"/>
-    <p:sldId id="266" r:id="rId11"/>
-    <p:sldId id="268" r:id="rId12"/>
-    <p:sldId id="269" r:id="rId13"/>
-    <p:sldId id="282" r:id="rId14"/>
-    <p:sldId id="283" r:id="rId15"/>
-    <p:sldId id="284" r:id="rId16"/>
-    <p:sldId id="285" r:id="rId17"/>
-    <p:sldId id="286" r:id="rId18"/>
-    <p:sldId id="271" r:id="rId19"/>
-    <p:sldId id="270" r:id="rId20"/>
-    <p:sldId id="272" r:id="rId21"/>
-    <p:sldId id="273" r:id="rId22"/>
-    <p:sldId id="274" r:id="rId23"/>
-    <p:sldId id="276" r:id="rId24"/>
-    <p:sldId id="275" r:id="rId25"/>
-    <p:sldId id="279" r:id="rId26"/>
-    <p:sldId id="277" r:id="rId27"/>
-    <p:sldId id="278" r:id="rId28"/>
-    <p:sldId id="280" r:id="rId29"/>
-    <p:sldId id="281" r:id="rId30"/>
+    <p:sldId id="287" r:id="rId2"/>
+    <p:sldId id="258" r:id="rId3"/>
+    <p:sldId id="262" r:id="rId4"/>
+    <p:sldId id="264" r:id="rId5"/>
+    <p:sldId id="263" r:id="rId6"/>
+    <p:sldId id="261" r:id="rId7"/>
+    <p:sldId id="265" r:id="rId8"/>
+    <p:sldId id="267" r:id="rId9"/>
+    <p:sldId id="266" r:id="rId10"/>
+    <p:sldId id="268" r:id="rId11"/>
+    <p:sldId id="269" r:id="rId12"/>
+    <p:sldId id="282" r:id="rId13"/>
+    <p:sldId id="283" r:id="rId14"/>
+    <p:sldId id="284" r:id="rId15"/>
+    <p:sldId id="285" r:id="rId16"/>
+    <p:sldId id="286" r:id="rId17"/>
+    <p:sldId id="271" r:id="rId18"/>
+    <p:sldId id="270" r:id="rId19"/>
+    <p:sldId id="272" r:id="rId20"/>
+    <p:sldId id="273" r:id="rId21"/>
+    <p:sldId id="274" r:id="rId22"/>
+    <p:sldId id="276" r:id="rId23"/>
+    <p:sldId id="275" r:id="rId24"/>
+    <p:sldId id="279" r:id="rId25"/>
+    <p:sldId id="277" r:id="rId26"/>
+    <p:sldId id="278" r:id="rId27"/>
+    <p:sldId id="280" r:id="rId28"/>
+    <p:sldId id="281" r:id="rId29"/>
   </p:sldIdLst>
   <p:sldSz cx="12192000" cy="6858000"/>
   <p:notesSz cx="6858000" cy="9144000"/>
@@ -3359,15 +3358,15 @@
           <p:cNvPr id="2" name="Titel 1">
             <a:extLst>
               <a:ext uri="{FF2B5EF4-FFF2-40B4-BE49-F238E27FC236}">
-                <a16:creationId xmlns:a16="http://schemas.microsoft.com/office/drawing/2014/main" id="{35895132-DE23-4A00-8E1E-E054001DF0F0}"/>
-              </a:ext>
-            </a:extLst>
-          </p:cNvPr>
-          <p:cNvSpPr>
-            <a:spLocks noGrp="1"/>
-          </p:cNvSpPr>
-          <p:nvPr>
-            <p:ph type="ctrTitle"/>
+                <a16:creationId xmlns:a16="http://schemas.microsoft.com/office/drawing/2014/main" id="{D4E5A832-A9FC-4209-A7B1-EB1053CCCA8F}"/>
+              </a:ext>
+            </a:extLst>
+          </p:cNvPr>
+          <p:cNvSpPr>
+            <a:spLocks noGrp="1"/>
+          </p:cNvSpPr>
+          <p:nvPr>
+            <p:ph type="title"/>
           </p:nvPr>
         </p:nvSpPr>
         <p:spPr/>
@@ -3375,24 +3374,31 @@
           <a:bodyPr/>
           <a:lstStyle/>
           <a:p>
-            <a:endParaRPr lang="de-DE"/>
-          </a:p>
-        </p:txBody>
-      </p:sp>
-      <p:sp>
-        <p:nvSpPr>
-          <p:cNvPr id="3" name="Untertitel 2">
-            <a:extLst>
-              <a:ext uri="{FF2B5EF4-FFF2-40B4-BE49-F238E27FC236}">
-                <a16:creationId xmlns:a16="http://schemas.microsoft.com/office/drawing/2014/main" id="{2BFB556B-F266-43C2-9F0F-498A82864EBB}"/>
-              </a:ext>
-            </a:extLst>
-          </p:cNvPr>
-          <p:cNvSpPr>
-            <a:spLocks noGrp="1"/>
-          </p:cNvSpPr>
-          <p:nvPr>
-            <p:ph type="subTitle" idx="1"/>
+            <a:r>
+              <a:rPr lang="en-US" dirty="0" err="1"/>
+              <a:t>Dienstag</a:t>
+            </a:r>
+            <a:r>
+              <a:rPr lang="en-US" dirty="0"/>
+              <a:t>, 21.01., 10 Uhr</a:t>
+            </a:r>
+          </a:p>
+        </p:txBody>
+      </p:sp>
+      <p:sp>
+        <p:nvSpPr>
+          <p:cNvPr id="3" name="Inhaltsplatzhalter 2">
+            <a:extLst>
+              <a:ext uri="{FF2B5EF4-FFF2-40B4-BE49-F238E27FC236}">
+                <a16:creationId xmlns:a16="http://schemas.microsoft.com/office/drawing/2014/main" id="{8B6E7A48-4F93-48C2-744D-9A23082ED4F4}"/>
+              </a:ext>
+            </a:extLst>
+          </p:cNvPr>
+          <p:cNvSpPr>
+            <a:spLocks noGrp="1"/>
+          </p:cNvSpPr>
+          <p:nvPr>
+            <p:ph idx="1"/>
           </p:nvPr>
         </p:nvSpPr>
         <p:spPr/>
@@ -3400,14 +3406,108 @@
           <a:bodyPr/>
           <a:lstStyle/>
           <a:p>
-            <a:endParaRPr lang="de-DE"/>
+            <a:r>
+              <a:rPr lang="en-US" dirty="0" err="1"/>
+              <a:t>Fragestellung</a:t>
+            </a:r>
+            <a:r>
+              <a:rPr lang="en-US" dirty="0"/>
+              <a:t>, Problem, </a:t>
+            </a:r>
+            <a:r>
+              <a:rPr lang="en-US" dirty="0" err="1"/>
+              <a:t>Datensatz</a:t>
+            </a:r>
+            <a:endParaRPr lang="en-US" dirty="0"/>
+          </a:p>
+          <a:p>
+            <a:r>
+              <a:rPr lang="en-US" dirty="0" err="1"/>
+              <a:t>Klassifikator</a:t>
+            </a:r>
+            <a:endParaRPr lang="en-US" dirty="0"/>
+          </a:p>
+          <a:p>
+            <a:r>
+              <a:rPr lang="en-US" dirty="0" err="1"/>
+              <a:t>Generierungsprozess</a:t>
+            </a:r>
+            <a:endParaRPr lang="en-US" dirty="0"/>
+          </a:p>
+          <a:p>
+            <a:r>
+              <a:rPr lang="en-US" dirty="0"/>
+              <a:t>LLM </a:t>
+            </a:r>
+            <a:r>
+              <a:rPr lang="en-US" dirty="0">
+                <a:sym typeface="Wingdings" panose="05000000000000000000" pitchFamily="2" charset="2"/>
+              </a:rPr>
+              <a:t> agent</a:t>
+            </a:r>
+          </a:p>
+          <a:p>
+            <a:r>
+              <a:rPr lang="en-US" dirty="0" err="1">
+                <a:sym typeface="Wingdings" panose="05000000000000000000" pitchFamily="2" charset="2"/>
+              </a:rPr>
+              <a:t>Anhang</a:t>
+            </a:r>
+            <a:r>
+              <a:rPr lang="en-US" dirty="0">
+                <a:sym typeface="Wingdings" panose="05000000000000000000" pitchFamily="2" charset="2"/>
+              </a:rPr>
+              <a:t> </a:t>
+            </a:r>
+            <a:r>
+              <a:rPr lang="en-US" dirty="0" err="1">
+                <a:sym typeface="Wingdings" panose="05000000000000000000" pitchFamily="2" charset="2"/>
+              </a:rPr>
+              <a:t>mit</a:t>
+            </a:r>
+            <a:r>
+              <a:rPr lang="en-US" dirty="0">
+                <a:sym typeface="Wingdings" panose="05000000000000000000" pitchFamily="2" charset="2"/>
+              </a:rPr>
+              <a:t> </a:t>
+            </a:r>
+            <a:r>
+              <a:rPr lang="en-US" dirty="0" err="1">
+                <a:sym typeface="Wingdings" panose="05000000000000000000" pitchFamily="2" charset="2"/>
+              </a:rPr>
+              <a:t>Ausführungsschritte</a:t>
+            </a:r>
+            <a:endParaRPr lang="en-US" dirty="0">
+              <a:sym typeface="Wingdings" panose="05000000000000000000" pitchFamily="2" charset="2"/>
+            </a:endParaRPr>
+          </a:p>
+          <a:p>
+            <a:r>
+              <a:rPr lang="en-US" dirty="0" err="1">
+                <a:sym typeface="Wingdings" panose="05000000000000000000" pitchFamily="2" charset="2"/>
+              </a:rPr>
+              <a:t>Ergebnis</a:t>
+            </a:r>
+            <a:r>
+              <a:rPr lang="en-US" dirty="0">
+                <a:sym typeface="Wingdings" panose="05000000000000000000" pitchFamily="2" charset="2"/>
+              </a:rPr>
+              <a:t>: </a:t>
+            </a:r>
+            <a:r>
+              <a:rPr lang="en-US" dirty="0" err="1">
+                <a:sym typeface="Wingdings" panose="05000000000000000000" pitchFamily="2" charset="2"/>
+              </a:rPr>
+              <a:t>Beispielartikel</a:t>
+            </a:r>
+            <a:endParaRPr lang="en-US" dirty="0"/>
           </a:p>
         </p:txBody>
       </p:sp>
     </p:spTree>
     <p:extLst>
       <p:ext uri="{BB962C8B-B14F-4D97-AF65-F5344CB8AC3E}">
-        <p14:creationId xmlns:p14="http://schemas.microsoft.com/office/powerpoint/2010/main" val="88106371"/>
+        <p14:creationId xmlns:p14="http://schemas.microsoft.com/office/powerpoint/2010/main" val="464440596"/>
       </p:ext>
     </p:extLst>
   </p:cSld>
@@ -3418,156 +3518,6 @@
 </file>
 
 <file path=ppt/slides/slide10.xml><?xml version="1.0" encoding="utf-8"?>
-<p:sld xmlns:a="http://schemas.openxmlformats.org/drawingml/2006/main" xmlns:r="http://schemas.openxmlformats.org/officeDocument/2006/relationships" xmlns:p="http://schemas.openxmlformats.org/presentationml/2006/main">
-  <p:cSld>
-    <p:spTree>
-      <p:nvGrpSpPr>
-        <p:cNvPr id="1" name=""/>
-        <p:cNvGrpSpPr/>
-        <p:nvPr/>
-      </p:nvGrpSpPr>
-      <p:grpSpPr>
-        <a:xfrm>
-          <a:off x="0" y="0"/>
-          <a:ext cx="0" cy="0"/>
-          <a:chOff x="0" y="0"/>
-          <a:chExt cx="0" cy="0"/>
-        </a:xfrm>
-      </p:grpSpPr>
-      <p:sp>
-        <p:nvSpPr>
-          <p:cNvPr id="2" name="Titel 1">
-            <a:extLst>
-              <a:ext uri="{FF2B5EF4-FFF2-40B4-BE49-F238E27FC236}">
-                <a16:creationId xmlns:a16="http://schemas.microsoft.com/office/drawing/2014/main" id="{1F20CAF2-C127-4F0A-B316-19CC56055294}"/>
-              </a:ext>
-            </a:extLst>
-          </p:cNvPr>
-          <p:cNvSpPr>
-            <a:spLocks noGrp="1"/>
-          </p:cNvSpPr>
-          <p:nvPr>
-            <p:ph type="title"/>
-          </p:nvPr>
-        </p:nvSpPr>
-        <p:spPr/>
-        <p:txBody>
-          <a:bodyPr/>
-          <a:lstStyle/>
-          <a:p>
-            <a:r>
-              <a:rPr lang="de-DE" dirty="0"/>
-              <a:t>ResNet50 (no.1) – Labels</a:t>
-            </a:r>
-          </a:p>
-        </p:txBody>
-      </p:sp>
-      <p:sp>
-        <p:nvSpPr>
-          <p:cNvPr id="4" name="Textfeld 3">
-            <a:extLst>
-              <a:ext uri="{FF2B5EF4-FFF2-40B4-BE49-F238E27FC236}">
-                <a16:creationId xmlns:a16="http://schemas.microsoft.com/office/drawing/2014/main" id="{A8C06F69-4BBE-4E8B-9564-6E5737B41EB9}"/>
-              </a:ext>
-            </a:extLst>
-          </p:cNvPr>
-          <p:cNvSpPr txBox="1"/>
-          <p:nvPr/>
-        </p:nvSpPr>
-        <p:spPr>
-          <a:xfrm>
-            <a:off x="326572" y="1517032"/>
-            <a:ext cx="11703131" cy="1938992"/>
-          </a:xfrm>
-          <a:prstGeom prst="rect">
-            <a:avLst/>
-          </a:prstGeom>
-          <a:noFill/>
-        </p:spPr>
-        <p:txBody>
-          <a:bodyPr wrap="square">
-            <a:spAutoFit/>
-          </a:bodyPr>
-          <a:lstStyle/>
-          <a:p>
-            <a:r>
-              <a:rPr lang="de-DE" sz="600" b="1" u="sng" dirty="0"/>
-              <a:t>Labels Testdaten: </a:t>
-            </a:r>
-          </a:p>
-          <a:p>
-            <a:r>
-              <a:rPr lang="de-DE" sz="600" dirty="0"/>
-              <a:t>[1, 7, 16, 21, 3, 22, 0, 25, 17, 19, 8, 4, 25, 2, 0, 16, 10, 9, 20, 21, 24, 18, 16, 15, 23, 8, 13, 1, 19, 3, 4, 10, 3, 17, 9, 8, 25, 24, 0, 20, 18, 21, 14, 3, 14, 16, 12, 9, 0, 2, 20, 14, 4, 25, 12, 13, 22, 0, 7, 11, 13, 22, 12, 19, 6, 18, 22, 5, 11, 14, 23, 3, 14, 22, 1, 25, 10, 12, 9, 24, 22, 3, 8, 25, 21, 11, 13, 5, 3, 23, 14, 6, 7, 21, 15, 4, 13, 10, 25, 20, 19, 19, 16, 1, 2, 11, 5, 5, 24, 25, 15, 20, 18, 20, 9, 6, 5, 20, 21, 7, 6, 7, 0, 17, 12, 11, 15, 2, 18, 6, </a:t>
-            </a:r>
-          </a:p>
-          <a:p>
-            <a:r>
-              <a:rPr lang="de-DE" sz="600" dirty="0"/>
-              <a:t>6, 22, 9, 24, 25, 9, 15, 13, 16, 4, 10, 7, 17, 11, 4, 16, 23, 18, 5, 14, 24, 7, 10, 11, 20, 1, 19, 19, 8, 10, 8, 20, 5, 19, 10, 18, 18, 15, 5, 8, 10, 15, 8, 2, 11, 8, 9, 18, 10, 3, 6, 3, 24, 2, 12, 22, 15, 11, 15, 2, 21, 0, 25, 18, 16, 1, 19, 11, 12, 7, 24, 16, 1, 17, 11, 6, 4, 2, 20, 20, 13, 6, 4, 4, 2, 3, 13, 20, 19, 25, 15, 5, 8, 11, 8, 18, 18, 1, 12, 2, 15, 0, 10, 11, 1, 13, 13, 13, 18, 2, 4, 22, 15, 17, 16, 24, 17, 12, 18, 24, 9, 1, 9, 14, 25, 25, 15, 19, 5, 25, 21, 4, 13, 22, 16, 1, 0, 13, 7, 0, 5, 25, 18, 2, 23, 7, 25, 21, 6, 3, 21, 3, 3, 0, 6, 10, 24, 16, 18, 17, 14, 20, 14, 0, 1, 9, 23, 21, 22, 17, 25, 14, 16, 25, 10, 10, 3, 23, 4, 18, 19, 24, 4, 7, 20, 12, 4, 9, 6, 10, 22, 23, 17, 5, 24, 8, 15, 6, 21, 15, 21, 19, 23, 5, 15, 23, 23, 12, 6, 1, 20, 14, 22, 3, 16, 8, 25, 23, 7, 9, 3, 16, 7, 1, 10, 2, 8, 12, 18, 4, 9, 22, 6, 2, 5, 14, 10, 12, 17, 7, 4, 22, 14, 13, 18, 12, 4, 2, 11, 10, 7, 21, 15, 22, 8, 25, 6, 16, 23, 20, 24, 7, 3, 1, 1, 10, 19, 19, 23, 11, 17, 21, 14, 13, 1, 17, 22, 2, 7, 22, 17, 20, 20, 5, 0, 15, 12, 24, 12, 2, 17, 20, 14, 20, 4, 19, 3, 17, 22, 8, 1, 7, 5, 17, 14, 21, 6, 8, 11, 0, 2, 21, 10, 12, 10, 13, 5, 18, 24, 22, 9, 0, 21, 3, 10, 17, 12, 20, 13, 7, 17, 16, 9, 17, 20, 6, 21, 7, </a:t>
-            </a:r>
-          </a:p>
-          <a:p>
-            <a:r>
-              <a:rPr lang="de-DE" sz="600" dirty="0"/>
-              <a:t>11, 18, 17, 18, 14, 19, 24, 3, 19, 23, 4, 5, 5, 10, 24, 23, 5, 6, 22, 14, 9, 19, 10, 23, 8, 19, 25, 18, 17, 18, 6, 22, 21, 9, 21, 6, 1, 1, 23, 8, 0, 14, 23, 23, 21, 25, 24, 8, 16, 17, 12, 11, 5, 16, 11, 22, 12, 7, 3, 0, 25, 1, 10, 8, 11, 24, 19, 20, 7, 3, 19, 0, 17, 9, 15, 22, 0, 9, 3, 16, 17, 4, 0, 15, 5, 0, 13, 18, 9, 1, 5, 5, 16, 4, 16, 18, 9, 24, 17, 13, 0, 22, 1, 10, 21, 25, 0, 16, 6, 25, 4, 19, 22, 3, 17, 10, 18, 8, 24, 8, 1, 13, 21, 23, 9, 8, 4, 6, 1, 7, 5, 19, 20, 11, 6, 8, 7, </a:t>
-            </a:r>
-          </a:p>
-          <a:p>
-            <a:r>
-              <a:rPr lang="de-DE" sz="600" dirty="0"/>
-              <a:t>4, 14, 12, 24, 6, 1, 2, 14, 0, 25, 19, 12, 15, 20, 9, 23, 22, 15, 0, 9, 2, 0, 15, 15, 24, 15, 1, 15, 11, 14, 13, 19, 12, 22, 14, 12, 16, 18, 7, 20, 17, 3, 0, 9, 14, 3, 14, 15, 7, 1, 14, 12, 13, 23, 5, 11, 21, 8, 24, 2, 13, 21, 2, 2, 16, 22, 25, </a:t>
-            </a:r>
-          </a:p>
-          <a:p>
-            <a:r>
-              <a:rPr lang="de-DE" sz="600" dirty="0"/>
-              <a:t>14, 20, 3, 17, 18, 10, 11, 18, 17, 9, 2, 6, 13, 21, 24, 16, 4, 4, 4, 11, 12, 14, 16, 11, 15, 13, 13, 24, 13, 19, 4, 24, 8, 11, 19, 21, 23, 23, 3, 1, 7, 5, 7, 3, 23, 4, 11, 9, 10, 6, 8, 1, 23, 16, 5, 0, 21, 23, 8, 2, 9, 13, 2, 7, 2, 25, 25, 2, 19, 15, 5, 9, 12, 6, 11, 11, 0, 12, 13, 14, 15, 6, 20, 16, 22, 2, 8, 10, 24, 3, 24, 7, 23, 5, 13, 12, 12, 21, 25, 16, 20, 2, 0, 6, 23, 19, 4, 20]</a:t>
-            </a:r>
-          </a:p>
-          <a:p>
-            <a:endParaRPr lang="de-DE" sz="600" b="1" u="sng" dirty="0"/>
-          </a:p>
-          <a:p>
-            <a:r>
-              <a:rPr lang="de-DE" sz="600" b="1" u="sng" dirty="0"/>
-              <a:t>vorhergesagte Testdaten:</a:t>
-            </a:r>
-          </a:p>
-          <a:p>
-            <a:r>
-              <a:rPr lang="de-DE" sz="600" dirty="0"/>
-              <a:t> [1, 7, 15, 21, 3, 22, 4, 25, 17, 19, 8, 4, 8, 2, 0, 16, 10, 6, 20, 21, 24, 24, 16, 15, 23, 1, 13, 1, 19, 3, 4, 10, 3, 17, 6, 21, 23, 24, 0, 20, 4, 21, 14, 3, 14, 16, 12, 9, 0, 2, 20, 14, 4, 25, 12, 13, 22, 0, 2, 11, 13, </a:t>
-            </a:r>
-          </a:p>
-          <a:p>
-            <a:r>
-              <a:rPr lang="de-DE" sz="600" dirty="0"/>
-              <a:t>22, 12, 19, 7, 4, 22, 21, 11, 14, 4, 3, 14, 22, 1, 20, 10, 12, 9, 24, 22, 3, 21, 25, 21, 11, 13, 5, 8, 23, 14, 2, 7, 22, 15, 4, 13, 10, 2, 17, 19, 19, 16, 1, 2, 11, 5, 5, 11, 25, 15, 20, 23, 20, 16, 2, 5, 20, 21, 7, 6, 7, 0, 11, 12, 11, 15, 2, 4, 6, 7, 21, 25, 24, 21, 6, 15, 4, 16, 4, 10, 7, 17, 11, 4, 16, 18, 12, 5, 14, 24, 7, 10, 11, 17, 10, 19, 0, 6, 10, 8, 20, 22, 19, 10, 18, 18, 15, 5, 8, 10, 15, 25, 2, 11, 8, 9, 0, 10, 3, 6, 3, 24, 2, 12, 22, 15, 24, 15, 2, 21, 12, 25, 2, 16, 1, </a:t>
-            </a:r>
-          </a:p>
-          <a:p>
-            <a:r>
-              <a:rPr lang="de-DE" sz="600" dirty="0"/>
-              <a:t>19, 11, 12, 7, 24, 16, 1, 17, 11, 6, 4, 2, 21, 17, 12, 6, 4, 0, 3, 3, 13, 21, 19, 25, 15, 5, 8, 11, 8, 12, 18, 1, 12, 2, 6, 0, 10, 11, 1, 13, 13, 13, 18, 2, 4, 22, 15, 17, 16, 24, 17, 12, 18, 0, 9, 10, 9, 14, 25, 25, 15, 19, 5, 25, 21, 4, 13, 22, 16, 1, 19, 13, 7, 0, 5, 25, 12, 2, 23, 7, 25, 21, 6, 3, 23, 3, 3, 22, 6, 21, 24, 16, 18, 20, 14, 10, 14, 0, 1, 9, 23, 21, 21, 17, 25, 14, 16, 25, 10, 10, 3, 23, 4, 18, 13, 19, 4, 7, 17, 13, 4, 9, 6, 10, 22, 17, 17, 5, 24, 8, 15, 2, 21, 15, 21, 19, 6, 5, 15, 23, 23, 12, 6, 1, 20, 14, 22, 3, 16, 1, 25, 23, 7, 9, 3, 15, 7, 1, 10, 2, 0, 18, 14, 4, 9, 22, 1, 2, 5, 14, 21, 3, 17, 7, 25, 22, 14, 13, 18, 4, 4, 2, 11, 21, 1, 21, 15, 21, 1, 25, 6, 16, 23, 1, 24, 10, 1, 1, 1, 10, 19, 19, 23, 24, 23, 21, 14, 13, 1, 17, 22, 2, 23, 21, 17, 20, 20, 5, 0, 15, 18, 24, 12, 2, 3, 20, 14, 20, 4, 24, 3, 21, 22, 8, 1, 7, 5, 17, 14, 21, 6, 8, 11, 0, 2, 21, 21, 13, 10, 4, 22, 0, 24, 21, 9, 0, 23, 25, 10, 17, 12, 20, 12, 7, 17, 16, 9, 17, 20, 6, 21, 7, 3, 23, 3, 18, 14, 19, 24, 3, 19, 23, 0, 5, 5, 21, 24, 23, 5, 6, 22, 14, 8, 19, 25, 23, 8, 19, 4, 0, 17, 18, 16, 21, 21, 9, 21, 6, 1, 1, 23, 4, 21, 14, 8, 8, 21, 23, 24, 8, 16, 17, 12, 11, 5, 16, 11, 22, 12, 7, 3, 0, 25, 1, 10, 8, 11, 24, 23, 24, 21, 3, 24, 0, 17, 9, 15, 22, 0, 6, 3, 16, 18, 4, 0, 15, 5, 18, 13, 21, 9, 1, 5, 5, 16, 4, 16, 18, 9, 10, 17, 13, 0, 21, 1, 21, 22, 12, 18, 16, 6, 25, 4, 19, 22, 3, 17, 19, 4, 5, 24, 8, 1, 13, 22, 13, 9, 8, 4, 21, 1, 2, 3, 19, 20, 11, 6, 8, 7, 1, 14, 12, 24, 6, 1, 3, 14, 0, 25, 21, 12, 15, 14, 9, 23, 21, 15, 0, 9, 2, 0, 15, 19, 24, 15, 1, 15, 11, 2, 13, 24, 12, 21, 14, 12, 16, 18, 7, 20, 17, 3, 0, 9, 14, 5, 14, 15, 7, 1, 14, 12, 13, 17, 5, 11, 10, 8, 5, 2, 13, 21, 2, 2, 16, 22, 25, 14, 24, 3, 17, 18, 10, 11, 18, 17, 9, 2, 6, 13, 21, 24, 16, 9, 1, 4, 11, 12, 14, 16, 11, 15, 13, 13, 24, 13, 19, 4, 24, 5, 11, 19, 21, 23, 23, 3, 1, 7, 5, 7, 3, 23, 4, 11, 9, 10, 6, 8, 1, 19, 13, 1, 1, 21, 23, 8, 2, 2, 13, 2, 0, 2, 25, 25, 15, 21, 15, 5, 9, 12, 6, 11, 11, 0, 12, 13, 14, 15, 7, 20, 7, 22, 2, 8, 10, 24, 3, 24, 7, 17, 5, 13, 12, 12, 21, 25, 16, 20, 2, 0, 6, 23, 19, 4, 0]</a:t>
-            </a:r>
-          </a:p>
-        </p:txBody>
-      </p:sp>
-    </p:spTree>
-    <p:extLst>
-      <p:ext uri="{BB962C8B-B14F-4D97-AF65-F5344CB8AC3E}">
-        <p14:creationId xmlns:p14="http://schemas.microsoft.com/office/powerpoint/2010/main" val="2088907051"/>
-      </p:ext>
-    </p:extLst>
-  </p:cSld>
-  <p:clrMapOvr>
-    <a:masterClrMapping/>
-  </p:clrMapOvr>
-</p:sld>
-</file>
-
-<file path=ppt/slides/slide11.xml><?xml version="1.0" encoding="utf-8"?>
 <p:sld xmlns:a="http://schemas.openxmlformats.org/drawingml/2006/main" xmlns:r="http://schemas.openxmlformats.org/officeDocument/2006/relationships" xmlns:p="http://schemas.openxmlformats.org/presentationml/2006/main">
   <p:cSld>
     <p:spTree>
@@ -3660,7 +3610,7 @@
 </p:sld>
 </file>
 
-<file path=ppt/slides/slide12.xml><?xml version="1.0" encoding="utf-8"?>
+<file path=ppt/slides/slide11.xml><?xml version="1.0" encoding="utf-8"?>
 <p:sld xmlns:a="http://schemas.openxmlformats.org/drawingml/2006/main" xmlns:r="http://schemas.openxmlformats.org/officeDocument/2006/relationships" xmlns:p="http://schemas.openxmlformats.org/presentationml/2006/main">
   <p:cSld>
     <p:spTree>
@@ -4008,7 +3958,7 @@
 </p:sld>
 </file>
 
-<file path=ppt/slides/slide13.xml><?xml version="1.0" encoding="utf-8"?>
+<file path=ppt/slides/slide12.xml><?xml version="1.0" encoding="utf-8"?>
 <p:sld xmlns:a="http://schemas.openxmlformats.org/drawingml/2006/main" xmlns:r="http://schemas.openxmlformats.org/officeDocument/2006/relationships" xmlns:p="http://schemas.openxmlformats.org/presentationml/2006/main">
   <p:cSld>
     <p:spTree>
@@ -4113,7 +4063,7 @@
 </p:sld>
 </file>
 
-<file path=ppt/slides/slide14.xml><?xml version="1.0" encoding="utf-8"?>
+<file path=ppt/slides/slide13.xml><?xml version="1.0" encoding="utf-8"?>
 <p:sld xmlns:a="http://schemas.openxmlformats.org/drawingml/2006/main" xmlns:r="http://schemas.openxmlformats.org/officeDocument/2006/relationships" xmlns:p="http://schemas.openxmlformats.org/presentationml/2006/main">
   <p:cSld>
     <p:spTree>
@@ -4303,7 +4253,7 @@
 </p:sld>
 </file>
 
-<file path=ppt/slides/slide15.xml><?xml version="1.0" encoding="utf-8"?>
+<file path=ppt/slides/slide14.xml><?xml version="1.0" encoding="utf-8"?>
 <p:sld xmlns:a="http://schemas.openxmlformats.org/drawingml/2006/main" xmlns:r="http://schemas.openxmlformats.org/officeDocument/2006/relationships" xmlns:p="http://schemas.openxmlformats.org/presentationml/2006/main">
   <p:cSld>
     <p:spTree>
@@ -4400,7 +4350,7 @@
 </p:sld>
 </file>
 
-<file path=ppt/slides/slide16.xml><?xml version="1.0" encoding="utf-8"?>
+<file path=ppt/slides/slide15.xml><?xml version="1.0" encoding="utf-8"?>
 <p:sld xmlns:a="http://schemas.openxmlformats.org/drawingml/2006/main" xmlns:r="http://schemas.openxmlformats.org/officeDocument/2006/relationships" xmlns:p="http://schemas.openxmlformats.org/presentationml/2006/main">
   <p:cSld>
     <p:spTree>
@@ -4710,7 +4660,7 @@
 </p:sld>
 </file>
 
-<file path=ppt/slides/slide17.xml><?xml version="1.0" encoding="utf-8"?>
+<file path=ppt/slides/slide16.xml><?xml version="1.0" encoding="utf-8"?>
 <p:sld xmlns:a="http://schemas.openxmlformats.org/drawingml/2006/main" xmlns:r="http://schemas.openxmlformats.org/officeDocument/2006/relationships" xmlns:p="http://schemas.openxmlformats.org/presentationml/2006/main">
   <p:cSld>
     <p:spTree>
@@ -4749,8 +4699,8 @@
         </p:blipFill>
         <p:spPr>
           <a:xfrm>
-            <a:off x="1178626" y="976441"/>
-            <a:ext cx="9834748" cy="5295633"/>
+            <a:off x="1279527" y="835515"/>
+            <a:ext cx="9632946" cy="5186970"/>
           </a:xfrm>
           <a:prstGeom prst="rect">
             <a:avLst/>
@@ -4761,6 +4711,128 @@
     <p:extLst>
       <p:ext uri="{BB962C8B-B14F-4D97-AF65-F5344CB8AC3E}">
         <p14:creationId xmlns:p14="http://schemas.microsoft.com/office/powerpoint/2010/main" val="306511072"/>
+      </p:ext>
+    </p:extLst>
+  </p:cSld>
+  <p:clrMapOvr>
+    <a:masterClrMapping/>
+  </p:clrMapOvr>
+</p:sld>
+</file>
+
+<file path=ppt/slides/slide17.xml><?xml version="1.0" encoding="utf-8"?>
+<p:sld xmlns:a="http://schemas.openxmlformats.org/drawingml/2006/main" xmlns:r="http://schemas.openxmlformats.org/officeDocument/2006/relationships" xmlns:p="http://schemas.openxmlformats.org/presentationml/2006/main">
+  <p:cSld>
+    <p:spTree>
+      <p:nvGrpSpPr>
+        <p:cNvPr id="1" name=""/>
+        <p:cNvGrpSpPr/>
+        <p:nvPr/>
+      </p:nvGrpSpPr>
+      <p:grpSpPr>
+        <a:xfrm>
+          <a:off x="0" y="0"/>
+          <a:ext cx="0" cy="0"/>
+          <a:chOff x="0" y="0"/>
+          <a:chExt cx="0" cy="0"/>
+        </a:xfrm>
+      </p:grpSpPr>
+      <p:sp>
+        <p:nvSpPr>
+          <p:cNvPr id="2" name="Titel 1">
+            <a:extLst>
+              <a:ext uri="{FF2B5EF4-FFF2-40B4-BE49-F238E27FC236}">
+                <a16:creationId xmlns:a16="http://schemas.microsoft.com/office/drawing/2014/main" id="{FA0E998A-8B92-4AB3-A9A8-1DE5D112DC24}"/>
+              </a:ext>
+            </a:extLst>
+          </p:cNvPr>
+          <p:cNvSpPr>
+            <a:spLocks noGrp="1"/>
+          </p:cNvSpPr>
+          <p:nvPr>
+            <p:ph type="title"/>
+          </p:nvPr>
+        </p:nvSpPr>
+        <p:spPr/>
+        <p:txBody>
+          <a:bodyPr/>
+          <a:lstStyle/>
+          <a:p>
+            <a:r>
+              <a:rPr lang="de-DE" dirty="0"/>
+              <a:t>ResNet50 on </a:t>
+            </a:r>
+            <a:r>
+              <a:rPr lang="de-DE" dirty="0" err="1"/>
+              <a:t>new</a:t>
+            </a:r>
+            <a:r>
+              <a:rPr lang="de-DE" dirty="0"/>
+              <a:t> Dataset</a:t>
+            </a:r>
+          </a:p>
+        </p:txBody>
+      </p:sp>
+      <p:sp>
+        <p:nvSpPr>
+          <p:cNvPr id="3" name="Inhaltsplatzhalter 2">
+            <a:extLst>
+              <a:ext uri="{FF2B5EF4-FFF2-40B4-BE49-F238E27FC236}">
+                <a16:creationId xmlns:a16="http://schemas.microsoft.com/office/drawing/2014/main" id="{03FCA3D9-EE93-495D-BB38-42608EA49BF0}"/>
+              </a:ext>
+            </a:extLst>
+          </p:cNvPr>
+          <p:cNvSpPr>
+            <a:spLocks noGrp="1"/>
+          </p:cNvSpPr>
+          <p:nvPr>
+            <p:ph idx="1"/>
+          </p:nvPr>
+        </p:nvSpPr>
+        <p:spPr/>
+        <p:txBody>
+          <a:bodyPr/>
+          <a:lstStyle/>
+          <a:p>
+            <a:r>
+              <a:rPr lang="de-DE" dirty="0" err="1"/>
+              <a:t>Augmentierung</a:t>
+            </a:r>
+            <a:r>
+              <a:rPr lang="de-DE" dirty="0"/>
+              <a:t>: Spiegeln, </a:t>
+            </a:r>
+            <a:r>
+              <a:rPr lang="de-DE" dirty="0" err="1"/>
+              <a:t>Crop</a:t>
+            </a:r>
+            <a:r>
+              <a:rPr lang="de-DE" dirty="0"/>
+              <a:t> </a:t>
+            </a:r>
+            <a:r>
+              <a:rPr lang="de-DE" dirty="0" err="1"/>
+              <a:t>with</a:t>
+            </a:r>
+            <a:r>
+              <a:rPr lang="de-DE" dirty="0"/>
+              <a:t> </a:t>
+            </a:r>
+            <a:r>
+              <a:rPr lang="de-DE" dirty="0" err="1"/>
+              <a:t>padding</a:t>
+            </a:r>
+            <a:r>
+              <a:rPr lang="de-DE" dirty="0"/>
+              <a:t> n = 4</a:t>
+            </a:r>
+          </a:p>
+        </p:txBody>
+      </p:sp>
+    </p:spTree>
+    <p:extLst>
+      <p:ext uri="{BB962C8B-B14F-4D97-AF65-F5344CB8AC3E}">
+        <p14:creationId xmlns:p14="http://schemas.microsoft.com/office/powerpoint/2010/main" val="3635575258"/>
       </p:ext>
     </p:extLst>
   </p:cSld>
@@ -4789,72 +4861,39 @@
       </p:grpSpPr>
       <p:sp>
         <p:nvSpPr>
-          <p:cNvPr id="2" name="Titel 1">
-            <a:extLst>
-              <a:ext uri="{FF2B5EF4-FFF2-40B4-BE49-F238E27FC236}">
-                <a16:creationId xmlns:a16="http://schemas.microsoft.com/office/drawing/2014/main" id="{FA0E998A-8B92-4AB3-A9A8-1DE5D112DC24}"/>
-              </a:ext>
-            </a:extLst>
-          </p:cNvPr>
-          <p:cNvSpPr>
-            <a:spLocks noGrp="1"/>
-          </p:cNvSpPr>
-          <p:nvPr>
-            <p:ph type="title"/>
-          </p:nvPr>
-        </p:nvSpPr>
-        <p:spPr/>
-        <p:txBody>
-          <a:bodyPr/>
+          <p:cNvPr id="10" name="Textfeld 9">
+            <a:extLst>
+              <a:ext uri="{FF2B5EF4-FFF2-40B4-BE49-F238E27FC236}">
+                <a16:creationId xmlns:a16="http://schemas.microsoft.com/office/drawing/2014/main" id="{8214A440-4372-42B2-95FA-FB333F1ACF7C}"/>
+              </a:ext>
+            </a:extLst>
+          </p:cNvPr>
+          <p:cNvSpPr txBox="1"/>
+          <p:nvPr/>
+        </p:nvSpPr>
+        <p:spPr>
+          <a:xfrm>
+            <a:off x="700644" y="197346"/>
+            <a:ext cx="10747169" cy="6463308"/>
+          </a:xfrm>
+          <a:prstGeom prst="rect">
+            <a:avLst/>
+          </a:prstGeom>
+          <a:noFill/>
+        </p:spPr>
+        <p:txBody>
+          <a:bodyPr wrap="square">
+            <a:spAutoFit/>
+          </a:bodyPr>
           <a:lstStyle/>
           <a:p>
             <a:r>
               <a:rPr lang="de-DE" dirty="0"/>
-              <a:t>ResNet50 on </a:t>
-            </a:r>
-            <a:r>
-              <a:rPr lang="de-DE" dirty="0" err="1"/>
-              <a:t>new</a:t>
-            </a:r>
-            <a:r>
-              <a:rPr lang="de-DE" dirty="0"/>
-              <a:t> Dataset</a:t>
-            </a:r>
-          </a:p>
-        </p:txBody>
-      </p:sp>
-      <p:sp>
-        <p:nvSpPr>
-          <p:cNvPr id="3" name="Inhaltsplatzhalter 2">
-            <a:extLst>
-              <a:ext uri="{FF2B5EF4-FFF2-40B4-BE49-F238E27FC236}">
-                <a16:creationId xmlns:a16="http://schemas.microsoft.com/office/drawing/2014/main" id="{03FCA3D9-EE93-495D-BB38-42608EA49BF0}"/>
-              </a:ext>
-            </a:extLst>
-          </p:cNvPr>
-          <p:cNvSpPr>
-            <a:spLocks noGrp="1"/>
-          </p:cNvSpPr>
-          <p:nvPr>
-            <p:ph idx="1"/>
-          </p:nvPr>
-        </p:nvSpPr>
-        <p:spPr/>
-        <p:txBody>
-          <a:bodyPr/>
-          <a:lstStyle/>
-          <a:p>
-            <a:r>
-              <a:rPr lang="de-DE" dirty="0" err="1"/>
-              <a:t>Augmentierung</a:t>
-            </a:r>
-            <a:r>
-              <a:rPr lang="de-DE" dirty="0"/>
-              <a:t>: Spiegeln, </a:t>
-            </a:r>
-            <a:r>
-              <a:rPr lang="de-DE" dirty="0" err="1"/>
-              <a:t>Crop</a:t>
+              <a:t>Trial 0 </a:t>
+            </a:r>
+            <a:r>
+              <a:rPr lang="de-DE" dirty="0" err="1"/>
+              <a:t>finished</a:t>
             </a:r>
             <a:r>
               <a:rPr lang="de-DE" dirty="0"/>
@@ -4870,11 +4909,360 @@
             </a:r>
             <a:r>
               <a:rPr lang="de-DE" dirty="0" err="1"/>
-              <a:t>padding</a:t>
-            </a:r>
-            <a:r>
-              <a:rPr lang="de-DE" dirty="0"/>
-              <a:t> n = 4</a:t>
+              <a:t>value</a:t>
+            </a:r>
+            <a:r>
+              <a:rPr lang="de-DE" dirty="0"/>
+              <a:t>: 0.7784011220196353 and </a:t>
+            </a:r>
+            <a:r>
+              <a:rPr lang="de-DE" dirty="0" err="1"/>
+              <a:t>parameters</a:t>
+            </a:r>
+            <a:r>
+              <a:rPr lang="de-DE" dirty="0"/>
+              <a:t>: {'</a:t>
+            </a:r>
+            <a:r>
+              <a:rPr lang="de-DE" dirty="0" err="1"/>
+              <a:t>learning_rate</a:t>
+            </a:r>
+            <a:r>
+              <a:rPr lang="de-DE" dirty="0"/>
+              <a:t>': 0.0006965942314459044, '</a:t>
+            </a:r>
+            <a:r>
+              <a:rPr lang="de-DE" dirty="0" err="1"/>
+              <a:t>batch_size</a:t>
+            </a:r>
+            <a:r>
+              <a:rPr lang="de-DE" dirty="0"/>
+              <a:t>': 64, '</a:t>
+            </a:r>
+            <a:r>
+              <a:rPr lang="de-DE" dirty="0" err="1"/>
+              <a:t>num_epochs</a:t>
+            </a:r>
+            <a:r>
+              <a:rPr lang="de-DE" dirty="0"/>
+              <a:t>': 10}. Best </a:t>
+            </a:r>
+            <a:r>
+              <a:rPr lang="de-DE" dirty="0" err="1"/>
+              <a:t>is</a:t>
+            </a:r>
+            <a:r>
+              <a:rPr lang="de-DE" dirty="0"/>
+              <a:t> </a:t>
+            </a:r>
+            <a:r>
+              <a:rPr lang="de-DE" dirty="0" err="1"/>
+              <a:t>trial</a:t>
+            </a:r>
+            <a:r>
+              <a:rPr lang="de-DE" dirty="0"/>
+              <a:t> 0 </a:t>
+            </a:r>
+            <a:r>
+              <a:rPr lang="de-DE" dirty="0" err="1"/>
+              <a:t>with</a:t>
+            </a:r>
+            <a:r>
+              <a:rPr lang="de-DE" dirty="0"/>
+              <a:t> </a:t>
+            </a:r>
+            <a:r>
+              <a:rPr lang="de-DE" dirty="0" err="1"/>
+              <a:t>value</a:t>
+            </a:r>
+            <a:r>
+              <a:rPr lang="de-DE" dirty="0"/>
+              <a:t>: 0.7784011220196353.</a:t>
+            </a:r>
+          </a:p>
+          <a:p>
+            <a:endParaRPr lang="de-DE" dirty="0"/>
+          </a:p>
+          <a:p>
+            <a:r>
+              <a:rPr lang="de-DE" dirty="0"/>
+              <a:t>Beste Hyperparameter: {'</a:t>
+            </a:r>
+            <a:r>
+              <a:rPr lang="de-DE" dirty="0" err="1"/>
+              <a:t>learning_rate</a:t>
+            </a:r>
+            <a:r>
+              <a:rPr lang="de-DE" dirty="0"/>
+              <a:t>': 0.0006965942314459044, '</a:t>
+            </a:r>
+            <a:r>
+              <a:rPr lang="de-DE" dirty="0" err="1"/>
+              <a:t>batch_size</a:t>
+            </a:r>
+            <a:r>
+              <a:rPr lang="de-DE" dirty="0"/>
+              <a:t>': 64, '</a:t>
+            </a:r>
+            <a:r>
+              <a:rPr lang="de-DE" dirty="0" err="1"/>
+              <a:t>num_epochs</a:t>
+            </a:r>
+            <a:r>
+              <a:rPr lang="de-DE" dirty="0"/>
+              <a:t>': 10}</a:t>
+            </a:r>
+          </a:p>
+          <a:p>
+            <a:r>
+              <a:rPr lang="de-DE" dirty="0"/>
+              <a:t>Bester Validierungsverlust: 0.7784011220196353</a:t>
+            </a:r>
+          </a:p>
+          <a:p>
+            <a:endParaRPr lang="de-DE" dirty="0"/>
+          </a:p>
+          <a:p>
+            <a:r>
+              <a:rPr lang="de-DE" dirty="0" err="1"/>
+              <a:t>Epoch</a:t>
+            </a:r>
+            <a:r>
+              <a:rPr lang="de-DE" dirty="0"/>
+              <a:t> 1/10, Loss: 2.6664, </a:t>
+            </a:r>
+            <a:r>
+              <a:rPr lang="de-DE" dirty="0" err="1"/>
+              <a:t>Accuracy</a:t>
+            </a:r>
+            <a:r>
+              <a:rPr lang="de-DE" dirty="0"/>
+              <a:t>: 0.3958</a:t>
+            </a:r>
+          </a:p>
+          <a:p>
+            <a:r>
+              <a:rPr lang="de-DE" dirty="0" err="1"/>
+              <a:t>Epoch</a:t>
+            </a:r>
+            <a:r>
+              <a:rPr lang="de-DE" dirty="0"/>
+              <a:t> 2/10, Loss: 1.9060, </a:t>
+            </a:r>
+            <a:r>
+              <a:rPr lang="de-DE" dirty="0" err="1"/>
+              <a:t>Accuracy</a:t>
+            </a:r>
+            <a:r>
+              <a:rPr lang="de-DE" dirty="0"/>
+              <a:t>: 0.6386</a:t>
+            </a:r>
+          </a:p>
+          <a:p>
+            <a:r>
+              <a:rPr lang="de-DE" dirty="0" err="1"/>
+              <a:t>Epoch</a:t>
+            </a:r>
+            <a:r>
+              <a:rPr lang="de-DE" dirty="0"/>
+              <a:t> 3/10, Loss: 1.5304, </a:t>
+            </a:r>
+            <a:r>
+              <a:rPr lang="de-DE" dirty="0" err="1"/>
+              <a:t>Accuracy</a:t>
+            </a:r>
+            <a:r>
+              <a:rPr lang="de-DE" dirty="0"/>
+              <a:t>: 0.7085</a:t>
+            </a:r>
+          </a:p>
+          <a:p>
+            <a:r>
+              <a:rPr lang="de-DE" dirty="0" err="1"/>
+              <a:t>Epoch</a:t>
+            </a:r>
+            <a:r>
+              <a:rPr lang="de-DE" dirty="0"/>
+              <a:t> 4/10, Loss: 1.3135, </a:t>
+            </a:r>
+            <a:r>
+              <a:rPr lang="de-DE" dirty="0" err="1"/>
+              <a:t>Accuracy</a:t>
+            </a:r>
+            <a:r>
+              <a:rPr lang="de-DE" dirty="0"/>
+              <a:t>: 0.7431</a:t>
+            </a:r>
+          </a:p>
+          <a:p>
+            <a:r>
+              <a:rPr lang="de-DE" dirty="0" err="1"/>
+              <a:t>Epoch</a:t>
+            </a:r>
+            <a:r>
+              <a:rPr lang="de-DE" dirty="0"/>
+              <a:t> 5/10, Loss: 1.1643, </a:t>
+            </a:r>
+            <a:r>
+              <a:rPr lang="de-DE" dirty="0" err="1"/>
+              <a:t>Accuracy</a:t>
+            </a:r>
+            <a:r>
+              <a:rPr lang="de-DE" dirty="0"/>
+              <a:t>: 0.7680</a:t>
+            </a:r>
+          </a:p>
+          <a:p>
+            <a:r>
+              <a:rPr lang="de-DE" dirty="0" err="1"/>
+              <a:t>Epoch</a:t>
+            </a:r>
+            <a:r>
+              <a:rPr lang="de-DE" dirty="0"/>
+              <a:t> 6/10, Loss: 1.0487, </a:t>
+            </a:r>
+            <a:r>
+              <a:rPr lang="de-DE" dirty="0" err="1"/>
+              <a:t>Accuracy</a:t>
+            </a:r>
+            <a:r>
+              <a:rPr lang="de-DE" dirty="0"/>
+              <a:t>: 0.7863</a:t>
+            </a:r>
+          </a:p>
+          <a:p>
+            <a:r>
+              <a:rPr lang="de-DE" dirty="0" err="1"/>
+              <a:t>Epoch</a:t>
+            </a:r>
+            <a:r>
+              <a:rPr lang="de-DE" dirty="0"/>
+              <a:t> 7/10, Loss: 0.9651, </a:t>
+            </a:r>
+            <a:r>
+              <a:rPr lang="de-DE" dirty="0" err="1"/>
+              <a:t>Accuracy</a:t>
+            </a:r>
+            <a:r>
+              <a:rPr lang="de-DE" dirty="0"/>
+              <a:t>: 0.7986</a:t>
+            </a:r>
+          </a:p>
+          <a:p>
+            <a:r>
+              <a:rPr lang="de-DE" dirty="0" err="1"/>
+              <a:t>Epoch</a:t>
+            </a:r>
+            <a:r>
+              <a:rPr lang="de-DE" dirty="0"/>
+              <a:t> 8/10, Loss: 0.9009, </a:t>
+            </a:r>
+            <a:r>
+              <a:rPr lang="de-DE" dirty="0" err="1"/>
+              <a:t>Accuracy</a:t>
+            </a:r>
+            <a:r>
+              <a:rPr lang="de-DE" dirty="0"/>
+              <a:t>: 0.8123</a:t>
+            </a:r>
+          </a:p>
+          <a:p>
+            <a:r>
+              <a:rPr lang="de-DE" dirty="0" err="1"/>
+              <a:t>Epoch</a:t>
+            </a:r>
+            <a:r>
+              <a:rPr lang="de-DE" dirty="0"/>
+              <a:t> 9/10, Loss: 0.8358, </a:t>
+            </a:r>
+            <a:r>
+              <a:rPr lang="de-DE" dirty="0" err="1"/>
+              <a:t>Accuracy</a:t>
+            </a:r>
+            <a:r>
+              <a:rPr lang="de-DE" dirty="0"/>
+              <a:t>: 0.8261</a:t>
+            </a:r>
+          </a:p>
+          <a:p>
+            <a:r>
+              <a:rPr lang="de-DE" dirty="0" err="1"/>
+              <a:t>Epoch</a:t>
+            </a:r>
+            <a:r>
+              <a:rPr lang="de-DE" dirty="0"/>
+              <a:t> 10/10, Loss: 0.7837, </a:t>
+            </a:r>
+            <a:r>
+              <a:rPr lang="de-DE" dirty="0" err="1"/>
+              <a:t>Accuracy</a:t>
+            </a:r>
+            <a:r>
+              <a:rPr lang="de-DE" dirty="0"/>
+              <a:t>: 0.8329</a:t>
+            </a:r>
+          </a:p>
+          <a:p>
+            <a:endParaRPr lang="de-DE" dirty="0"/>
+          </a:p>
+          <a:p>
+            <a:r>
+              <a:rPr lang="de-DE" dirty="0"/>
+              <a:t>Final Validation Loss: 0.9445, Final Validation </a:t>
+            </a:r>
+            <a:r>
+              <a:rPr lang="de-DE" dirty="0" err="1"/>
+              <a:t>Accuracy</a:t>
+            </a:r>
+            <a:r>
+              <a:rPr lang="de-DE" dirty="0"/>
+              <a:t>: 0.7714</a:t>
+            </a:r>
+          </a:p>
+          <a:p>
+            <a:r>
+              <a:rPr lang="de-DE" dirty="0"/>
+              <a:t>Test </a:t>
+            </a:r>
+            <a:r>
+              <a:rPr lang="de-DE" dirty="0" err="1"/>
+              <a:t>Accuracy</a:t>
+            </a:r>
+            <a:r>
+              <a:rPr lang="de-DE" dirty="0"/>
+              <a:t>: 0.7811</a:t>
+            </a:r>
+          </a:p>
+          <a:p>
+            <a:r>
+              <a:rPr lang="de-DE" dirty="0"/>
+              <a:t>Test </a:t>
+            </a:r>
+            <a:r>
+              <a:rPr lang="de-DE" dirty="0" err="1"/>
+              <a:t>Accuracy</a:t>
+            </a:r>
+            <a:r>
+              <a:rPr lang="de-DE" dirty="0"/>
+              <a:t>: 0.7811</a:t>
+            </a:r>
+          </a:p>
+          <a:p>
+            <a:r>
+              <a:rPr lang="de-DE" dirty="0"/>
+              <a:t>Precision: 0.7849</a:t>
+            </a:r>
+          </a:p>
+          <a:p>
+            <a:r>
+              <a:rPr lang="de-DE" dirty="0"/>
+              <a:t>Recall: 0.7811</a:t>
+            </a:r>
+          </a:p>
+          <a:p>
+            <a:r>
+              <a:rPr lang="de-DE" dirty="0"/>
+              <a:t>F1-Score: 0.7808</a:t>
             </a:r>
           </a:p>
         </p:txBody>
@@ -4882,7 +5270,7 @@
     </p:spTree>
     <p:extLst>
       <p:ext uri="{BB962C8B-B14F-4D97-AF65-F5344CB8AC3E}">
-        <p14:creationId xmlns:p14="http://schemas.microsoft.com/office/powerpoint/2010/main" val="3635575258"/>
+        <p14:creationId xmlns:p14="http://schemas.microsoft.com/office/powerpoint/2010/main" val="946259710"/>
       </p:ext>
     </p:extLst>
   </p:cSld>
@@ -4911,10 +5299,10 @@
       </p:grpSpPr>
       <p:sp>
         <p:nvSpPr>
-          <p:cNvPr id="10" name="Textfeld 9">
-            <a:extLst>
-              <a:ext uri="{FF2B5EF4-FFF2-40B4-BE49-F238E27FC236}">
-                <a16:creationId xmlns:a16="http://schemas.microsoft.com/office/drawing/2014/main" id="{8214A440-4372-42B2-95FA-FB333F1ACF7C}"/>
+          <p:cNvPr id="11" name="Textfeld 10">
+            <a:extLst>
+              <a:ext uri="{FF2B5EF4-FFF2-40B4-BE49-F238E27FC236}">
+                <a16:creationId xmlns:a16="http://schemas.microsoft.com/office/drawing/2014/main" id="{4E05C3E3-6957-4521-AEFD-236E914B26E5}"/>
               </a:ext>
             </a:extLst>
           </p:cNvPr>
@@ -4923,8 +5311,8 @@
         </p:nvSpPr>
         <p:spPr>
           <a:xfrm>
-            <a:off x="700644" y="197346"/>
-            <a:ext cx="10747169" cy="6463308"/>
+            <a:off x="415636" y="1858488"/>
+            <a:ext cx="11542816" cy="3139321"/>
           </a:xfrm>
           <a:prstGeom prst="rect">
             <a:avLst/>
@@ -4938,381 +5326,109 @@
           <a:lstStyle/>
           <a:p>
             <a:r>
-              <a:rPr lang="de-DE" dirty="0"/>
-              <a:t>Trial 0 </a:t>
-            </a:r>
-            <a:r>
-              <a:rPr lang="de-DE" dirty="0" err="1"/>
-              <a:t>finished</a:t>
-            </a:r>
-            <a:r>
-              <a:rPr lang="de-DE" dirty="0"/>
-              <a:t> </a:t>
-            </a:r>
-            <a:r>
-              <a:rPr lang="de-DE" dirty="0" err="1"/>
-              <a:t>with</a:t>
-            </a:r>
-            <a:r>
-              <a:rPr lang="de-DE" dirty="0"/>
-              <a:t> </a:t>
-            </a:r>
-            <a:r>
-              <a:rPr lang="de-DE" dirty="0" err="1"/>
-              <a:t>value</a:t>
-            </a:r>
-            <a:r>
-              <a:rPr lang="de-DE" dirty="0"/>
-              <a:t>: 0.7784011220196353 and </a:t>
-            </a:r>
-            <a:r>
-              <a:rPr lang="de-DE" dirty="0" err="1"/>
-              <a:t>parameters</a:t>
-            </a:r>
-            <a:r>
-              <a:rPr lang="de-DE" dirty="0"/>
-              <a:t>: {'</a:t>
-            </a:r>
-            <a:r>
-              <a:rPr lang="de-DE" dirty="0" err="1"/>
-              <a:t>learning_rate</a:t>
-            </a:r>
-            <a:r>
-              <a:rPr lang="de-DE" dirty="0"/>
-              <a:t>': 0.0006965942314459044, '</a:t>
-            </a:r>
-            <a:r>
-              <a:rPr lang="de-DE" dirty="0" err="1"/>
-              <a:t>batch_size</a:t>
-            </a:r>
-            <a:r>
-              <a:rPr lang="de-DE" dirty="0"/>
-              <a:t>': 64, '</a:t>
-            </a:r>
-            <a:r>
-              <a:rPr lang="de-DE" dirty="0" err="1"/>
-              <a:t>num_epochs</a:t>
-            </a:r>
-            <a:r>
-              <a:rPr lang="de-DE" dirty="0"/>
-              <a:t>': 10}. Best </a:t>
-            </a:r>
-            <a:r>
-              <a:rPr lang="de-DE" dirty="0" err="1"/>
-              <a:t>is</a:t>
-            </a:r>
-            <a:r>
-              <a:rPr lang="de-DE" dirty="0"/>
-              <a:t> </a:t>
-            </a:r>
-            <a:r>
-              <a:rPr lang="de-DE" dirty="0" err="1"/>
-              <a:t>trial</a:t>
-            </a:r>
-            <a:r>
-              <a:rPr lang="de-DE" dirty="0"/>
-              <a:t> 0 </a:t>
-            </a:r>
-            <a:r>
-              <a:rPr lang="de-DE" dirty="0" err="1"/>
-              <a:t>with</a:t>
-            </a:r>
-            <a:r>
-              <a:rPr lang="de-DE" dirty="0"/>
-              <a:t> </a:t>
-            </a:r>
-            <a:r>
-              <a:rPr lang="de-DE" dirty="0" err="1"/>
-              <a:t>value</a:t>
-            </a:r>
-            <a:r>
-              <a:rPr lang="de-DE" dirty="0"/>
-              <a:t>: 0.7784011220196353.</a:t>
-            </a:r>
-          </a:p>
-          <a:p>
-            <a:endParaRPr lang="de-DE" dirty="0"/>
-          </a:p>
-          <a:p>
-            <a:r>
-              <a:rPr lang="de-DE" dirty="0"/>
-              <a:t>Beste Hyperparameter: {'</a:t>
-            </a:r>
-            <a:r>
-              <a:rPr lang="de-DE" dirty="0" err="1"/>
-              <a:t>learning_rate</a:t>
-            </a:r>
-            <a:r>
-              <a:rPr lang="de-DE" dirty="0"/>
-              <a:t>': 0.0006965942314459044, '</a:t>
-            </a:r>
-            <a:r>
-              <a:rPr lang="de-DE" dirty="0" err="1"/>
-              <a:t>batch_size</a:t>
-            </a:r>
-            <a:r>
-              <a:rPr lang="de-DE" dirty="0"/>
-              <a:t>': 64, '</a:t>
-            </a:r>
-            <a:r>
-              <a:rPr lang="de-DE" dirty="0" err="1"/>
-              <a:t>num_epochs</a:t>
-            </a:r>
-            <a:r>
-              <a:rPr lang="de-DE" dirty="0"/>
-              <a:t>': 10}</a:t>
-            </a:r>
-          </a:p>
-          <a:p>
-            <a:r>
-              <a:rPr lang="de-DE" dirty="0"/>
-              <a:t>Bester Validierungsverlust: 0.7784011220196353</a:t>
-            </a:r>
-          </a:p>
-          <a:p>
-            <a:endParaRPr lang="de-DE" dirty="0"/>
-          </a:p>
-          <a:p>
-            <a:r>
-              <a:rPr lang="de-DE" dirty="0" err="1"/>
-              <a:t>Epoch</a:t>
-            </a:r>
-            <a:r>
-              <a:rPr lang="de-DE" dirty="0"/>
-              <a:t> 1/10, Loss: 2.6664, </a:t>
-            </a:r>
-            <a:r>
-              <a:rPr lang="de-DE" dirty="0" err="1"/>
-              <a:t>Accuracy</a:t>
-            </a:r>
-            <a:r>
-              <a:rPr lang="de-DE" dirty="0"/>
-              <a:t>: 0.3958</a:t>
-            </a:r>
-          </a:p>
-          <a:p>
-            <a:r>
-              <a:rPr lang="de-DE" dirty="0" err="1"/>
-              <a:t>Epoch</a:t>
-            </a:r>
-            <a:r>
-              <a:rPr lang="de-DE" dirty="0"/>
-              <a:t> 2/10, Loss: 1.9060, </a:t>
-            </a:r>
-            <a:r>
-              <a:rPr lang="de-DE" dirty="0" err="1"/>
-              <a:t>Accuracy</a:t>
-            </a:r>
-            <a:r>
-              <a:rPr lang="de-DE" dirty="0"/>
-              <a:t>: 0.6386</a:t>
-            </a:r>
-          </a:p>
-          <a:p>
-            <a:r>
-              <a:rPr lang="de-DE" dirty="0" err="1"/>
-              <a:t>Epoch</a:t>
-            </a:r>
-            <a:r>
-              <a:rPr lang="de-DE" dirty="0"/>
-              <a:t> 3/10, Loss: 1.5304, </a:t>
-            </a:r>
-            <a:r>
-              <a:rPr lang="de-DE" dirty="0" err="1"/>
-              <a:t>Accuracy</a:t>
-            </a:r>
-            <a:r>
-              <a:rPr lang="de-DE" dirty="0"/>
-              <a:t>: 0.7085</a:t>
-            </a:r>
-          </a:p>
-          <a:p>
-            <a:r>
-              <a:rPr lang="de-DE" dirty="0" err="1"/>
-              <a:t>Epoch</a:t>
-            </a:r>
-            <a:r>
-              <a:rPr lang="de-DE" dirty="0"/>
-              <a:t> 4/10, Loss: 1.3135, </a:t>
-            </a:r>
-            <a:r>
-              <a:rPr lang="de-DE" dirty="0" err="1"/>
-              <a:t>Accuracy</a:t>
-            </a:r>
-            <a:r>
-              <a:rPr lang="de-DE" dirty="0"/>
-              <a:t>: 0.7431</a:t>
-            </a:r>
-          </a:p>
-          <a:p>
-            <a:r>
-              <a:rPr lang="de-DE" dirty="0" err="1"/>
-              <a:t>Epoch</a:t>
-            </a:r>
-            <a:r>
-              <a:rPr lang="de-DE" dirty="0"/>
-              <a:t> 5/10, Loss: 1.1643, </a:t>
-            </a:r>
-            <a:r>
-              <a:rPr lang="de-DE" dirty="0" err="1"/>
-              <a:t>Accuracy</a:t>
-            </a:r>
-            <a:r>
-              <a:rPr lang="de-DE" dirty="0"/>
-              <a:t>: 0.7680</a:t>
-            </a:r>
-          </a:p>
-          <a:p>
-            <a:r>
-              <a:rPr lang="de-DE" dirty="0" err="1"/>
-              <a:t>Epoch</a:t>
-            </a:r>
-            <a:r>
-              <a:rPr lang="de-DE" dirty="0"/>
-              <a:t> 6/10, Loss: 1.0487, </a:t>
-            </a:r>
-            <a:r>
-              <a:rPr lang="de-DE" dirty="0" err="1"/>
-              <a:t>Accuracy</a:t>
-            </a:r>
-            <a:r>
-              <a:rPr lang="de-DE" dirty="0"/>
-              <a:t>: 0.7863</a:t>
-            </a:r>
-          </a:p>
-          <a:p>
-            <a:r>
-              <a:rPr lang="de-DE" dirty="0" err="1"/>
-              <a:t>Epoch</a:t>
-            </a:r>
-            <a:r>
-              <a:rPr lang="de-DE" dirty="0"/>
-              <a:t> 7/10, Loss: 0.9651, </a:t>
-            </a:r>
-            <a:r>
-              <a:rPr lang="de-DE" dirty="0" err="1"/>
-              <a:t>Accuracy</a:t>
-            </a:r>
-            <a:r>
-              <a:rPr lang="de-DE" dirty="0"/>
-              <a:t>: 0.7986</a:t>
-            </a:r>
-          </a:p>
-          <a:p>
-            <a:r>
-              <a:rPr lang="de-DE" dirty="0" err="1"/>
-              <a:t>Epoch</a:t>
-            </a:r>
-            <a:r>
-              <a:rPr lang="de-DE" dirty="0"/>
-              <a:t> 8/10, Loss: 0.9009, </a:t>
-            </a:r>
-            <a:r>
-              <a:rPr lang="de-DE" dirty="0" err="1"/>
-              <a:t>Accuracy</a:t>
-            </a:r>
-            <a:r>
-              <a:rPr lang="de-DE" dirty="0"/>
-              <a:t>: 0.8123</a:t>
-            </a:r>
-          </a:p>
-          <a:p>
-            <a:r>
-              <a:rPr lang="de-DE" dirty="0" err="1"/>
-              <a:t>Epoch</a:t>
-            </a:r>
-            <a:r>
-              <a:rPr lang="de-DE" dirty="0"/>
-              <a:t> 9/10, Loss: 0.8358, </a:t>
-            </a:r>
-            <a:r>
-              <a:rPr lang="de-DE" dirty="0" err="1"/>
-              <a:t>Accuracy</a:t>
-            </a:r>
-            <a:r>
-              <a:rPr lang="de-DE" dirty="0"/>
-              <a:t>: 0.8261</a:t>
-            </a:r>
-          </a:p>
-          <a:p>
-            <a:r>
-              <a:rPr lang="de-DE" dirty="0" err="1"/>
-              <a:t>Epoch</a:t>
-            </a:r>
-            <a:r>
-              <a:rPr lang="de-DE" dirty="0"/>
-              <a:t> 10/10, Loss: 0.7837, </a:t>
-            </a:r>
-            <a:r>
-              <a:rPr lang="de-DE" dirty="0" err="1"/>
-              <a:t>Accuracy</a:t>
-            </a:r>
-            <a:r>
-              <a:rPr lang="de-DE" dirty="0"/>
-              <a:t>: 0.8329</a:t>
-            </a:r>
-          </a:p>
-          <a:p>
-            <a:endParaRPr lang="de-DE" dirty="0"/>
-          </a:p>
-          <a:p>
-            <a:r>
-              <a:rPr lang="de-DE" dirty="0"/>
-              <a:t>Final Validation Loss: 0.9445, Final Validation </a:t>
-            </a:r>
-            <a:r>
-              <a:rPr lang="de-DE" dirty="0" err="1"/>
-              <a:t>Accuracy</a:t>
-            </a:r>
-            <a:r>
-              <a:rPr lang="de-DE" dirty="0"/>
-              <a:t>: 0.7714</a:t>
-            </a:r>
-          </a:p>
-          <a:p>
-            <a:r>
-              <a:rPr lang="de-DE" dirty="0"/>
-              <a:t>Test </a:t>
-            </a:r>
-            <a:r>
-              <a:rPr lang="de-DE" dirty="0" err="1"/>
-              <a:t>Accuracy</a:t>
-            </a:r>
-            <a:r>
-              <a:rPr lang="de-DE" dirty="0"/>
-              <a:t>: 0.7811</a:t>
-            </a:r>
-          </a:p>
-          <a:p>
-            <a:r>
-              <a:rPr lang="de-DE" dirty="0"/>
-              <a:t>Test </a:t>
-            </a:r>
-            <a:r>
-              <a:rPr lang="de-DE" dirty="0" err="1"/>
-              <a:t>Accuracy</a:t>
-            </a:r>
-            <a:r>
-              <a:rPr lang="de-DE" dirty="0"/>
-              <a:t>: 0.7811</a:t>
-            </a:r>
-          </a:p>
-          <a:p>
-            <a:r>
-              <a:rPr lang="de-DE" dirty="0"/>
-              <a:t>Precision: 0.7849</a:t>
-            </a:r>
-          </a:p>
-          <a:p>
-            <a:r>
-              <a:rPr lang="de-DE" dirty="0"/>
-              <a:t>Recall: 0.7811</a:t>
-            </a:r>
-          </a:p>
-          <a:p>
-            <a:r>
-              <a:rPr lang="de-DE" dirty="0"/>
-              <a:t>F1-Score: 0.7808</a:t>
+              <a:rPr lang="de-DE" sz="600" b="1" u="sng" dirty="0"/>
+              <a:t>Labels Testdaten: </a:t>
+            </a:r>
+          </a:p>
+          <a:p>
+            <a:r>
+              <a:rPr lang="de-DE" sz="600" dirty="0"/>
+              <a:t>[25, 4, 15, 16, 7, 23, 12, 4, 24, 17, 10, 7, 1, 1, 1, 0, 13, 2, 20, 4, 11, 17, 4, 16, 24, 16, 0, 15, 25, 8, 15, 16, 21, 4, 16, 6, 10, 20, 14, 17, 11, 18, 23, 11, 14, 25, 12, 22, 20, 15, 18, 3, 15, 14, 14, 5, 5, 24, 13, 3, 20, 14, 24, 14, 21, 6, 4, 3, 11, 17, 3, 10, 1, 18, 11, 10, 9, 8, 2, 15, 4, 3, 8, 10, 17, 25, 18, 7, 5, 19, 7, 6, 18, 18, 15, 24, 25, 8, 16, 11, 24, 22, 11, 2, 21, 14, 22, 21, 15, 22, 16, 9, 22, 16, 11, 22, 16, 16, 1, 21, 21, 22, 12, 5, 6, 4, 7, 18, 20, 8, 16, 12, 21, 6, 20, 1, 9, 19, 13, 13, 1, 20, 21, 18, 23, 21, 22, 18, 4, 20, 24, 0, 15, 12, 25, 18, 13, 6, 3, 6, 9, 21, 24, 11, 11, 24, 4, 16, 14, 21, 13, 21, 2, 9, 3, 7, 9, 3, 12, 2, 8, 15, 2, 17, 0, 2, 17, 2, 0, 22, 3, 7, 2, 22, 23, 5, 14, 9, 2, 17, 1, 18, 17, 12, 4, 21, 3, 6, 12, 14, 0, 25, 23, 13, 23, 22, 19, 21, 23, 0, 7, 12, 24, 23, 6, 15, 18, 16, 18, 4, 21, 25, 8, 10, 14, 14, 3, 15, 6, 20, 25, 10, 5, 20, 20, 16, 8, 0, 11, 9, 9, 9, 18, 9, 17, 6, 18, 1, 7, 21, 24, 23, 11, 19, 18, 17, 5, 5, 1, 13, 3, 12, 25, 21, 20, 22, 6, 18, 1, 16, 4, 12, 25, 12, 5, 21, 10, 23, 19, 4, 1, 6, 10, 1, 18, 15, 20, 9, 17, 1, 11, 22, 8, 22, 10, 5, 18, 0, 9, 16, 8, 19, 19, 14, 17, 19, 0, 1, 13, 20, 2, 19, 20, 4, 14, 20, 14, 13, 11, 5, 22, 15, 15, 12, 10, 9, 19, 19, 12, 9, 7, 15, 4, 19, 18, 0, 23, 11, 13, 14, 11, 14, 19, 0, 23, 20, 12, 2, 15, 22, 10, 21, 19, 8, 1, 2, 22, 11, 21, 25, 3, 12, 10, 20, 19, 1, 6, 4, 19, 22, 13, 10, 9, 25, 4, 3, 9, 7, 3, 5, 8, 24, 0, 2, 20, 19, 11, 3, 19, 8, 19, 12, 7, 18, 18, 23, 5, 4, 16, 18, 24, 16, 9, 8, 2, 7, 24, 16, 4, 9, 8, 6, 11, 17, 10, 22, 14, 6, 16, 6, 0, 23, 8, 17, 1, 7, 6, 10, 16, 3, 18, 7, 3, 25, 3, 1, 23, 1, 23, 23, 1, 8, 8, 24, 16, 22, 13, 19, 23, 17, 8, 4, 2, 1, 4, 10, 21, 24, 12, 9, 21, 5, 24, 11, 19, 16, 13, 4, 18, 4, 16, 15, 11, 8, 17, 14, 19, 12, 18, 23, 10, 13, 22, 16, 8, 21, 21, 11, 19, 6, 24, 14, 1, 7, 24, 20, 8, 19, 8, 14, 6, 2, 14, 9, 19, 11, 4, 11, 10, 22, 23, 14, 1, 5, 2, 11, 22, 7, 1, 7, 11, 18, 7, 25, 4, 12, 20, 1, 8, 10, 8, 5, 8, 10, 8, 15, 15, 24, 0, 25, 21, 19, 18, 15, 14, 19, 25, 9, 2, 5, 14, 17, 19, 15, 16, 6, 22, 13, 12, 22, 12, 13, 20, 11, 14, 7, 9, 11, 17, 3, 24, 9, 11, 9, 4, 7, 5, 11, 18, 8, 7, 1, 25, 6, 2, 4, 24, 10, 22, 10, 23, 13, 22, 4, 2, </a:t>
+            </a:r>
+          </a:p>
+          <a:p>
+            <a:r>
+              <a:rPr lang="de-DE" sz="600" dirty="0"/>
+              <a:t>23, 13, 6, 6, 1, 23, 15, 12, 16, 7, 17, 22, 15, 23, 0, 25, 2, 14, 9, 14, 25, 5, 11, 6, 8, 0, 0, 2, 4, 22, 6, 21, 21, 12, 24, 9, 4, 2, 19, 16, 0, 3, 10, 9, 10, 15, 21, 10, 10, 12, 9, 11, 15, 22, 0, 12, 15, 6, 23, 2, 20, 21, 3, 5, 7, 9, 23, 2, 25, 12, 23, 1, 8, 14, 5, 6, 5, 7, 5, 11, 9, 5, 5, 17, 8, 19, 3, 25, 18, 1, 17, 24, 0, 11, 2, 0, 2, 8, 2, 3, 23, 24, 21, 15, 13, 20, 24, 16, 11, 19, 25, 24, 12, 17, 24, 7, 22, 10, 3, 12, 8, 18, 9, 5, 24, 14, 15, 4, 25, 23, 3, 3, 14, 24, 8, 0, 16, 1, 2, 14, 0, 0, 5, 22, 1, 12, 6, 14, 15, 5, 18, 1, 1, 11, 5, 19, 5, 18, 24, 13, 16, 1, 24, 2, 24, 9, 3, 19, 10, 13, 21, 10, 20, 25, 22, 18, 16, </a:t>
+            </a:r>
+          </a:p>
+          <a:p>
+            <a:r>
+              <a:rPr lang="de-DE" sz="600" dirty="0"/>
+              <a:t>3, 5, 21, 1, 10, 5, 22, 7, 5, 8, 5, 21, 4, 25, 12, 14, 16, 19, 21, 9, 8, 0, 19, 1, 22, 0, 7, 6, 5, 7, 2, 24, 17, 6, 5, 18, 24, 7, 8, 23, 23, 8, 20, 10, 16, 11, 15, 19, 3, 9, 22, 12, 12, 21, 23, 24, 19, 11, 21, 3, 15, 13, 8, 25, 1, 9, 7, 20, 23, 18, 1, 16, 18, 13, 16, 21, 9, 15, 7, 16, 13, 15, 22, 6, 6, 16, 13, 22, </a:t>
+            </a:r>
+          </a:p>
+          <a:p>
+            <a:r>
+              <a:rPr lang="de-DE" sz="600" dirty="0"/>
+              <a:t>23, 0, 9, 23, 3, 22, 16, 20, 17, 20, 3, 20, 8, 10, 4, 25, 24, 20, 23, 15, 23, 8, 6, 25, 8, 13, 10, 0, 22, 23, 7, 25, 9, 0, 23, 0, 5, 19, 19, 15, 2, 4, 23, 8, 1, 25, 10, 24, 1, 3, 13, 18, 7, 19, 25, 16, 15, 6, 24, 5, 17, 17, 7, 13, 14, 1, 2, 12, 15, 18, 14, 22, 6, 2, 10, 6, 2, 25, 22, 8, 21, 14, 1, 0, 11, 23, 21, 3, 9, 13, 20, 12, 0, 21, 16, 3, 1, 24, 5, 1, 18, 18, 25, 25, 7, 19, 5, 5, 19, 12, 9, 2, 5, 12, 14, 16, 9, 18, 8, 10, 5, 0, 17, 20, 22, 19, 3, 24, 21, 23, 1, 14, 15, 24, 7, 11, 6, 17, 25, 3, 25, 11, 3, 16, 17, 9, 13, 7, 6, 13, 15, 3, 14, 17, 12, 10, 22, 9, 21, 18, 20, 2, 14, 6, 1, 10, 6, 22, 19, 16, 13, 19, 23, 11, 1, 0, 0, 22, 5, 0, 1, 5, 12, 14, 3, 17, 10, 9, 7, 12, 13, 4, 10, 5, 8, 12, 1, 20, 9, 8, 17, 10, 4, 21, 19, 7, 25, 25, 22, 13, 18, 5, 11, 24, 23, 25, 14, 11, 19, 24, 24, 15, 2, 5, 15, 15, 23, 4, 21, 2, 21, 5, 13, 17, 15, 0, 7, 17, 24, 17, 11, 1, 9, 20, 6, 16, 10, 25, 9, 3, 24, 17, 3, 10, 14, 9, 6, 6, 1, 5, 14, 9, 9, 20, 0, 9, 4, 10, 11, 18, 13, 21, 5, 5, 24, 17, 17, 4, 6, 17, 16, 19, 7, 10, 13, 2, 9, 4, 23, 6, 0, 3, 24, 18, 22, 0, 1, 8, 0, 3, 14, 20, 9, 0, 4, 11, 12, 24, 17, 22, 10, 24, 18, 19, 8, 20, 0, 6, 6, 24, 22, 17, 17, 7, 25, 20, 14, 20, 25, 22, 2, 15, 7, 21, 11, 22, 23, 13, 3, 1, 17, 23, 13, 16, 4, 12, 18, 6, 0, 17, 4, </a:t>
+            </a:r>
+          </a:p>
+          <a:p>
+            <a:r>
+              <a:rPr lang="de-DE" sz="600" dirty="0"/>
+              <a:t>10, 19, 23, 1, 5, 7, 18, 4, 2, 7, 8, 20, 7, 9, 15, 17, 6, 9, 3, 20, 18, 3, 7, 7, 3, 13, 12, 3, 7, 2, 8, 5, 10, 22, 17, 21, 2, 10, 2, 25, 0, 23, 25, 2, 13, 0, 22, 18, 9, 11, 2, 14, 3, 8, 21, 2, 15, 8, 15, 6, 14, 8, 3, 12, 17, 4, 0, 25, 23, 14, 6, 20, 3, 3, 0, 0, 16, 6, 10, 15, 17, 7, 14, 7, 16, 14, 18, 1, 2, 18, 11, 22, 20, 23, 22, 8, 2, 7, 20, 20, 20, 21, 11, 16, 6, 20, 17, 0, 20, 16, 18, 15, 17, 14, 10, 25, 19, 16, 12, 21, 0, 12, 4, 6, 21, 7, 20, 21, 5, 13, 2, 0, 21, 17, 13, 10, 23, 3, 25, 4, 4, 20, 24, 17, 23, 6, 22, 15, 1, 13, 19, 17, 10, 12, 4, 17, 10, 24, 20, 24, 17, 24, 18, 11, 12, 25, 7, 5, 3, 14, 7, 6, 20, 10, 13, 10, 15, 25, 14, 0, 8, 24, 8, 18, 2, 18, 3, 25, 4, 19, 10, 5, 1, 21, 14, 12, 12, 18, 11, 17]</a:t>
+            </a:r>
+          </a:p>
+          <a:p>
+            <a:endParaRPr lang="de-DE" sz="600" dirty="0"/>
+          </a:p>
+          <a:p>
+            <a:r>
+              <a:rPr lang="de-DE" sz="600" b="1" u="sng" dirty="0"/>
+              <a:t>vorhergesagte Testdaten: </a:t>
+            </a:r>
+          </a:p>
+          <a:p>
+            <a:r>
+              <a:rPr lang="de-DE" sz="600" dirty="0"/>
+              <a:t>[25, 18, 15, 16, 7, 23, 12, 4, 24, 17, 10, 24, 1, 1, 1, 12, 13, 2, 20, 4, 11, 17, 0, 16, 24, 16, 0, 15, 25, 8, 15, 16, 21, 4, 16, 6, 10, 20, 14, 17, 11, 18, 23, 11, 14, 25, 12, 21, 13, 15, 23, 3, 15, 14, 14, 5, 5, 3, 13, 3, 20, 14, 24, 14, 4, 0, 25, 3, 11, 17, 14, 10, 1, 12, 11, 10, 9, 8, 2, 15, 4, 3, 8, 10, 17, 25, 18, 7, 5, 19, 6, 6, 18, 12, 15, 24, 25, 8, 15, 11, 24, 22, 11, 2, 21, 14, 24, 21, 15, 22, 15, 9, 22, 16, 24, 21, 16, 16, 1, 21, 21, 22, 12, 5, 6, 8, 7, 0, 21, 20, 16, 12, 10, 6, 20, 1, 9, 19, 13, 12, 1, 20, 22, 13, 23, 21, 22, 18, 4, 20, 12, 0, 15, 18, 25, 18, 13, 25, 3, 10, 19, 21, 6, 11, 11, 24, 4, 16, 14, 21, 13, 21, 2, 9, 3, 7, 9, 3, 13, 14, 8, 15, 2, 20, 0, 2, 17, 2, 0, 22, 3, 7, 2, 22, 20, 5, 14, 9, 2, 21, 1, 0, 17, 12, 0, 22, 3, 6, 12, 14, 0, 24, 23, 13, 23, 22, 19, 21, 5, 0, 7, 12, 24, 19, 6, 15, 17, 16, 23, 4, 21, 25, 8, 23, 14, 14, 3, 15, 6, 20, 24, 10, 5, 20, 20, 16, 4, 0, 11, 5, 9, 9, 4, 9, 17, 6, 0, 19, 23, 21, 24, 18, 11, 9, 0, 20, 5, 5, 1, 1, 8, 12, 25, 23, 17, 22, 6, 18, 1, 15, 4, 12, 25, 12, 5, 21, 10, 20, 19, 19, 23, 6, 10, 1, 18, 15, 20, 9, 17, 1, 11, 21, 17, 22, 10, 5, 18, 0, 9, 16, 22, 19, 19, 14, 17, 19, 0, 1, 20, 20, 2, 19, 10, 4, 14, 20, 14, 13, 11, 5, 22, 15, 15, 13, 10, 9, 19, 19, 12, 9, 7, 15, 4, 24, 18, 0, 23, 11, 13, 14, 11, 14, 19, 4, 23, 0, 13, 2, 15, 21, 21, 21, 24, 8, 1, 2, 22, 11, 21, 25, 3, 12, 10, 20, 19, 1, 6, 0, 19, 21, 13, 10, 9, 24, 4, 3, 17, 7, 3, 5, 10, 24, 0, 2, 20, 23, 11, 3, 19, 8, 19, 12, 7, 18, 18, 23, 5, 4, 16, 18, 24, 16, 20, 10, 2, 7, 24, 16, 4, 9, 8, 6, 11, 17, 10, 22, 14, 7, 16, 6, 0, 5, 6, 3, 10, 7, 6, 22, 16, 3, 18, 24, 8, 25, 1, 1, 23, 20, 0, 23, 1, 1, 8, 2, 16, 22, 13, 4, 23, 17, 8, 4, 2, 1, 4, 8, 22, 24, 12, 9, 21, 5, 24, 11, 19, 16, 12, 13, 24, 4, 16, 15, 11, 21, 17, 14, 21, 12, 18, 23, 10, 13, 22, 16, 8, 17, 20, 5, 19, 6, 11, 14, 1, 7, 24, 20, 8, 18, 25, 14, 6, 2, 14, 9, 24, 11, 4, 11, 10, 22, 23, 14, 1, 5, 2, 11, 22, 7, 1, 7, 11, 12, 7, 14, 4, 12, 23, 1, 6, 10, 6, 5, 8, 10, 8, 15, 15, 24, 0, 13, 21, 19, 13, 15, 14, 19, 21, 11, 2, 5, 14, 17, 19, 15, 16, 6, 22, 13, 0, 22, 13, 25, 20, 11, 14, 7, 9, 11, 17, 3, 6, 9, 11, 9, 4, 9, 5, 11, 18, 8, 7, 1, 25, 6, 2, 3, 24, 21, 22, 22, 23, 13, 24, 1, 14, 23, 24, 6, 6, 1, 23, 15, 12, 16, 7, 17, 22, 15, 8, 0, 25, 2, 21, 9, 14, 25, 5, 11, 6, 3, 0, 14, 2, 4, 21, 6, 21, 21, 12, 24, 9, 4, 2, 19, 16, 0, 3, 10, 9, 10, 15, 21, 17, 10, 13, 9, 5, 15, 22, 0, 12, 15, 6, 23, 2, 20, 21, 3, 24, 7, 9, 23, 2, 25, 12, 4, 1, 8, 14, 5, 14, 5, 7, 5, 6, 9, 5, 5, 17, 3, 19, </a:t>
+            </a:r>
+          </a:p>
+          <a:p>
+            <a:r>
+              <a:rPr lang="de-DE" sz="600" dirty="0"/>
+              <a:t>3, 25, 18, 22, 3, 24, 0, 11, 2, 0, 2, 8, 2, 3, 23, 24, 21, 15, 13, 20, 24, 15, 11, 19, 25, 24, 4, 17, 24, 7, 22, 10, 3, 12, 25, 18, 9, 5, 17, 14, 15, 4, 25, 23, 3, 3, 14, 11, 8, 0, 16, 1, 2, 14, 0, 0, 5, 22, 1, 12, 6, 14, 15, 5, 18, 1, 1, 11, 5, 0, 5, 18, 24, 13, 16, 1, 24, 2, 11, 9, 3, 19, 10, 12, 21, 10, 20, 9, 17, 18, 16, 3, 5, 0, 1, 6, 5, 22, 7, 22, 11, 5, 21, 4, 25, 12, 14, 16, 19, 21, 6, 8, 0, 19, 1, 22, 0, 7, 6, 5, 7, 2, 24, 17, 6, 5, 4, 24, 7, 0, 23, 23, 8, 1, 10, 16, 11, 15, 17, 3, 9, 22, 12, 12, 21, 13, 24, 19, 11, 21, 24, 15, 13, 8, 8, 1, 6, 7, 20, 23, 18, 1, 16, 23, 13, 16, 22, 9, 15, 7, 16, 12, 15, 22, 6, 6, 16, 4, 22, 23, 0, 9, 23, 3, 22, 16, 20, 23, 21, 14, 21, 25, 10, 4, 25, 23, 17, 21, 15, 23, 8, 18, 25, 8, 13, 10, 0, 22, 23, 7, 25, 9, 0, 18, 24, 5, 19, 24, 16, 2, 4, 23, 25, 1, 25, 10, 24, 1, 3, 12, 18, 25, 23, 25, 7, 15, 6, 24, 5, 21, 20, 7, 13, 14, 1, 2, 12, 15, 15, 14, 22, 6, 2, 10, 6, 2, 25, 21, 8, 21, 14, 1, 0, 11, 23, 21, 3, 25, 13, 20, 12, 0, 22, 16, 3, 1, 24, 5, 1, 18, 18, 25, 25, 3, 19, 1, 5, 24, 12, 9, 2, 5, 12, 14, 16, 9, 18, 4, 5, 5, 0, 17, 20, 22, 0, 3, 24, 21, 23, 1, 14, 15, 19, 7, 11, 6, 20, 25, 3, 25, 11, 3, 16, 21, 8, 13, 7, 6, 13, 15, 3, 14, 17, 12, 10, 10, 9, 21, 18, 20, 2, 11, 6, 1, 22, 6, 8, 19, 15, 0, 19, </a:t>
+            </a:r>
+          </a:p>
+          <a:p>
+            <a:r>
+              <a:rPr lang="de-DE" sz="600" dirty="0"/>
+              <a:t>17, 11, 1, 0, 0, 22, 22, 0, 1, 12, 12, 14, 3, 17, 10, 9, 7, 1, 13, 4, 10, 5, 8, 12, 1, 20, 9, 8, 17, 10, 1, 21, 19, 7, 11, 25, 22, 13, 18, 5, 11, 10, 23, 25, 14, 11, 19, 24, 5, 7, 25, 5, 15, 15, 18, 4, 10, 2, 21, 5, 13, 17, 15, 0, 7, 17, 24, 17, 3, 1, 24, 20, 6, 16, 1, 25, 9, 3, 24, 20, 3, 10, 14, 9, 6, 6, 1, 5, 14, 9, 9, 20, 0, 8, 4, 21, 11, 18, 13, 22, 5, 5, 24, 17, 20, 4, 24, 7, 16, 19, 7, 10, 13, 2, 9, 4, 23, 6, 0, 3, 12, 2, 22, 19, 2, 8, 0, 3, 14, 20, 9, 0, 4, 11, 18, 24, 17, 22, 21, 24, 18, 19, 8, 20, 1, 6, 7, 2, 22, 17, 17, 7, 25, 21, 14, 23, 15, 22, 2, 15, 7, 21, 11, 22, 8, 13, 3, 1, 17, 23, 12, 16, 4, 18, 4, 7, 0, 17, 0, 10, 19, 23, 1, 5, 7, 18, 4, 2, 6, 18, 20, 7, 9, 6, 17, 6, 9, 3, 12, 18, 3, 7, 7, 3, 13, 12, 11, 7, 6, 8, 5, 10, 4, 20, 21, 4, 20, 2, 20, 0, 23, 11, 10, 13, 22, 22, 18, 9, 11, 2, 14, 3, 8, 21, 2, 15, 8, 15, 7, 14, 20, 3, 12, 17, 23, 18, 25, 23, 14, 6, 20, 3, 3, 0, 0, 16, 6, 10, 15, 17, 7, 14, 7, 16, 17, 18, 10, 14, 4, 11, 22, 20, 23, 21, 8, 2, 7, 20, 22, 20, 10, 11, 16, 6, 17, 17, 0, 17, 16, 17, 15, 17, 14, 10, 4, 19, 16, 12, 21, 0, 12, 0, 6, 21, 7, 20, 21, 5, 13, 2, 0, 21, 17, 13, 0, 0, 3, 25, 4, 4, 17, 6, 17, 23, 14, 21, 15, 1, 13, 19, 17, 10, 12, 4, 17, 25, 24, 4, 24, 17, 24, 21, 11, 20, 20, 7, 5, 3, 14, 7, 6, 17, 10, 13, 10, 16, 25, 14, 0, 19, 24, 8, 18, 2, 0, 3, 25, 0, 8, 10, 22, 1, 10, 14, 13, 12, 13, 4, 17]</a:t>
+            </a:r>
+          </a:p>
+          <a:p>
+            <a:endParaRPr lang="de-DE" sz="600" dirty="0"/>
+          </a:p>
+        </p:txBody>
+      </p:sp>
+      <p:sp>
+        <p:nvSpPr>
+          <p:cNvPr id="16" name="Titel 1">
+            <a:extLst>
+              <a:ext uri="{FF2B5EF4-FFF2-40B4-BE49-F238E27FC236}">
+                <a16:creationId xmlns:a16="http://schemas.microsoft.com/office/drawing/2014/main" id="{CE3C357C-3A6D-4B2D-919B-468E62ADB4A7}"/>
+              </a:ext>
+            </a:extLst>
+          </p:cNvPr>
+          <p:cNvSpPr>
+            <a:spLocks noGrp="1"/>
+          </p:cNvSpPr>
+          <p:nvPr>
+            <p:ph type="title"/>
+          </p:nvPr>
+        </p:nvSpPr>
+        <p:spPr>
+          <a:xfrm>
+            <a:off x="415636" y="317623"/>
+            <a:ext cx="10515600" cy="1325563"/>
+          </a:xfrm>
+        </p:spPr>
+        <p:txBody>
+          <a:bodyPr/>
+          <a:lstStyle/>
+          <a:p>
+            <a:r>
+              <a:rPr lang="de-DE" dirty="0"/>
+              <a:t>ResNet50 on </a:t>
+            </a:r>
+            <a:r>
+              <a:rPr lang="de-DE" dirty="0" err="1"/>
+              <a:t>new</a:t>
+            </a:r>
+            <a:r>
+              <a:rPr lang="de-DE" dirty="0"/>
+              <a:t> Dataset - Labels</a:t>
             </a:r>
           </a:p>
         </p:txBody>
@@ -5320,7 +5436,7 @@
     </p:spTree>
     <p:extLst>
       <p:ext uri="{BB962C8B-B14F-4D97-AF65-F5344CB8AC3E}">
-        <p14:creationId xmlns:p14="http://schemas.microsoft.com/office/powerpoint/2010/main" val="946259710"/>
+        <p14:creationId xmlns:p14="http://schemas.microsoft.com/office/powerpoint/2010/main" val="1256784810"/>
       </p:ext>
     </p:extLst>
   </p:cSld>
@@ -5352,7 +5468,7 @@
           <p:cNvPr id="2" name="Titel 1">
             <a:extLst>
               <a:ext uri="{FF2B5EF4-FFF2-40B4-BE49-F238E27FC236}">
-                <a16:creationId xmlns:a16="http://schemas.microsoft.com/office/drawing/2014/main" id="{F460CF33-D61D-45E6-A010-57D8D85767E5}"/>
+                <a16:creationId xmlns:a16="http://schemas.microsoft.com/office/drawing/2014/main" id="{FA0E998A-8B92-4AB3-A9A8-1DE5D112DC24}"/>
               </a:ext>
             </a:extLst>
           </p:cNvPr>
@@ -5368,14 +5484,93 @@
           <a:bodyPr/>
           <a:lstStyle/>
           <a:p>
-            <a:endParaRPr lang="de-DE"/>
+            <a:r>
+              <a:rPr lang="de-DE" dirty="0" err="1"/>
+              <a:t>Vison</a:t>
+            </a:r>
+            <a:r>
+              <a:rPr lang="de-DE" dirty="0"/>
+              <a:t> Transformer (</a:t>
+            </a:r>
+            <a:r>
+              <a:rPr lang="de-DE" dirty="0" err="1"/>
+              <a:t>without</a:t>
+            </a:r>
+            <a:r>
+              <a:rPr lang="de-DE" dirty="0"/>
+              <a:t> Data </a:t>
+            </a:r>
+            <a:r>
+              <a:rPr lang="de-DE" dirty="0" err="1"/>
+              <a:t>augmentation</a:t>
+            </a:r>
+            <a:r>
+              <a:rPr lang="de-DE" dirty="0"/>
+              <a:t>)(no.1)</a:t>
+            </a:r>
+          </a:p>
+        </p:txBody>
+      </p:sp>
+      <p:sp>
+        <p:nvSpPr>
+          <p:cNvPr id="3" name="Inhaltsplatzhalter 2">
+            <a:extLst>
+              <a:ext uri="{FF2B5EF4-FFF2-40B4-BE49-F238E27FC236}">
+                <a16:creationId xmlns:a16="http://schemas.microsoft.com/office/drawing/2014/main" id="{03FCA3D9-EE93-495D-BB38-42608EA49BF0}"/>
+              </a:ext>
+            </a:extLst>
+          </p:cNvPr>
+          <p:cNvSpPr>
+            <a:spLocks noGrp="1"/>
+          </p:cNvSpPr>
+          <p:nvPr>
+            <p:ph idx="1"/>
+          </p:nvPr>
+        </p:nvSpPr>
+        <p:spPr/>
+        <p:txBody>
+          <a:bodyPr/>
+          <a:lstStyle/>
+          <a:p>
+            <a:r>
+              <a:rPr lang="de-DE" dirty="0" err="1"/>
+              <a:t>Augmentierung</a:t>
+            </a:r>
+            <a:r>
+              <a:rPr lang="de-DE" dirty="0"/>
+              <a:t>: Spiegeln, </a:t>
+            </a:r>
+            <a:r>
+              <a:rPr lang="de-DE" dirty="0" err="1"/>
+              <a:t>Crop</a:t>
+            </a:r>
+            <a:r>
+              <a:rPr lang="de-DE" dirty="0"/>
+              <a:t> </a:t>
+            </a:r>
+            <a:r>
+              <a:rPr lang="de-DE" dirty="0" err="1"/>
+              <a:t>with</a:t>
+            </a:r>
+            <a:r>
+              <a:rPr lang="de-DE" dirty="0"/>
+              <a:t> </a:t>
+            </a:r>
+            <a:r>
+              <a:rPr lang="de-DE" dirty="0" err="1"/>
+              <a:t>padding</a:t>
+            </a:r>
+            <a:r>
+              <a:rPr lang="de-DE" dirty="0"/>
+              <a:t> n = 4</a:t>
+            </a:r>
           </a:p>
         </p:txBody>
       </p:sp>
     </p:spTree>
     <p:extLst>
       <p:ext uri="{BB962C8B-B14F-4D97-AF65-F5344CB8AC3E}">
-        <p14:creationId xmlns:p14="http://schemas.microsoft.com/office/powerpoint/2010/main" val="2016747559"/>
+        <p14:creationId xmlns:p14="http://schemas.microsoft.com/office/powerpoint/2010/main" val="952229307"/>
       </p:ext>
     </p:extLst>
   </p:cSld>
@@ -5386,172 +5581,6 @@
 </file>
 
 <file path=ppt/slides/slide20.xml><?xml version="1.0" encoding="utf-8"?>
-<p:sld xmlns:a="http://schemas.openxmlformats.org/drawingml/2006/main" xmlns:r="http://schemas.openxmlformats.org/officeDocument/2006/relationships" xmlns:p="http://schemas.openxmlformats.org/presentationml/2006/main">
-  <p:cSld>
-    <p:spTree>
-      <p:nvGrpSpPr>
-        <p:cNvPr id="1" name=""/>
-        <p:cNvGrpSpPr/>
-        <p:nvPr/>
-      </p:nvGrpSpPr>
-      <p:grpSpPr>
-        <a:xfrm>
-          <a:off x="0" y="0"/>
-          <a:ext cx="0" cy="0"/>
-          <a:chOff x="0" y="0"/>
-          <a:chExt cx="0" cy="0"/>
-        </a:xfrm>
-      </p:grpSpPr>
-      <p:sp>
-        <p:nvSpPr>
-          <p:cNvPr id="11" name="Textfeld 10">
-            <a:extLst>
-              <a:ext uri="{FF2B5EF4-FFF2-40B4-BE49-F238E27FC236}">
-                <a16:creationId xmlns:a16="http://schemas.microsoft.com/office/drawing/2014/main" id="{4E05C3E3-6957-4521-AEFD-236E914B26E5}"/>
-              </a:ext>
-            </a:extLst>
-          </p:cNvPr>
-          <p:cNvSpPr txBox="1"/>
-          <p:nvPr/>
-        </p:nvSpPr>
-        <p:spPr>
-          <a:xfrm>
-            <a:off x="415636" y="1858488"/>
-            <a:ext cx="11542816" cy="3139321"/>
-          </a:xfrm>
-          <a:prstGeom prst="rect">
-            <a:avLst/>
-          </a:prstGeom>
-          <a:noFill/>
-        </p:spPr>
-        <p:txBody>
-          <a:bodyPr wrap="square">
-            <a:spAutoFit/>
-          </a:bodyPr>
-          <a:lstStyle/>
-          <a:p>
-            <a:r>
-              <a:rPr lang="de-DE" sz="600" b="1" u="sng" dirty="0"/>
-              <a:t>Labels Testdaten: </a:t>
-            </a:r>
-          </a:p>
-          <a:p>
-            <a:r>
-              <a:rPr lang="de-DE" sz="600" dirty="0"/>
-              <a:t>[25, 4, 15, 16, 7, 23, 12, 4, 24, 17, 10, 7, 1, 1, 1, 0, 13, 2, 20, 4, 11, 17, 4, 16, 24, 16, 0, 15, 25, 8, 15, 16, 21, 4, 16, 6, 10, 20, 14, 17, 11, 18, 23, 11, 14, 25, 12, 22, 20, 15, 18, 3, 15, 14, 14, 5, 5, 24, 13, 3, 20, 14, 24, 14, 21, 6, 4, 3, 11, 17, 3, 10, 1, 18, 11, 10, 9, 8, 2, 15, 4, 3, 8, 10, 17, 25, 18, 7, 5, 19, 7, 6, 18, 18, 15, 24, 25, 8, 16, 11, 24, 22, 11, 2, 21, 14, 22, 21, 15, 22, 16, 9, 22, 16, 11, 22, 16, 16, 1, 21, 21, 22, 12, 5, 6, 4, 7, 18, 20, 8, 16, 12, 21, 6, 20, 1, 9, 19, 13, 13, 1, 20, 21, 18, 23, 21, 22, 18, 4, 20, 24, 0, 15, 12, 25, 18, 13, 6, 3, 6, 9, 21, 24, 11, 11, 24, 4, 16, 14, 21, 13, 21, 2, 9, 3, 7, 9, 3, 12, 2, 8, 15, 2, 17, 0, 2, 17, 2, 0, 22, 3, 7, 2, 22, 23, 5, 14, 9, 2, 17, 1, 18, 17, 12, 4, 21, 3, 6, 12, 14, 0, 25, 23, 13, 23, 22, 19, 21, 23, 0, 7, 12, 24, 23, 6, 15, 18, 16, 18, 4, 21, 25, 8, 10, 14, 14, 3, 15, 6, 20, 25, 10, 5, 20, 20, 16, 8, 0, 11, 9, 9, 9, 18, 9, 17, 6, 18, 1, 7, 21, 24, 23, 11, 19, 18, 17, 5, 5, 1, 13, 3, 12, 25, 21, 20, 22, 6, 18, 1, 16, 4, 12, 25, 12, 5, 21, 10, 23, 19, 4, 1, 6, 10, 1, 18, 15, 20, 9, 17, 1, 11, 22, 8, 22, 10, 5, 18, 0, 9, 16, 8, 19, 19, 14, 17, 19, 0, 1, 13, 20, 2, 19, 20, 4, 14, 20, 14, 13, 11, 5, 22, 15, 15, 12, 10, 9, 19, 19, 12, 9, 7, 15, 4, 19, 18, 0, 23, 11, 13, 14, 11, 14, 19, 0, 23, 20, 12, 2, 15, 22, 10, 21, 19, 8, 1, 2, 22, 11, 21, 25, 3, 12, 10, 20, 19, 1, 6, 4, 19, 22, 13, 10, 9, 25, 4, 3, 9, 7, 3, 5, 8, 24, 0, 2, 20, 19, 11, 3, 19, 8, 19, 12, 7, 18, 18, 23, 5, 4, 16, 18, 24, 16, 9, 8, 2, 7, 24, 16, 4, 9, 8, 6, 11, 17, 10, 22, 14, 6, 16, 6, 0, 23, 8, 17, 1, 7, 6, 10, 16, 3, 18, 7, 3, 25, 3, 1, 23, 1, 23, 23, 1, 8, 8, 24, 16, 22, 13, 19, 23, 17, 8, 4, 2, 1, 4, 10, 21, 24, 12, 9, 21, 5, 24, 11, 19, 16, 13, 4, 18, 4, 16, 15, 11, 8, 17, 14, 19, 12, 18, 23, 10, 13, 22, 16, 8, 21, 21, 11, 19, 6, 24, 14, 1, 7, 24, 20, 8, 19, 8, 14, 6, 2, 14, 9, 19, 11, 4, 11, 10, 22, 23, 14, 1, 5, 2, 11, 22, 7, 1, 7, 11, 18, 7, 25, 4, 12, 20, 1, 8, 10, 8, 5, 8, 10, 8, 15, 15, 24, 0, 25, 21, 19, 18, 15, 14, 19, 25, 9, 2, 5, 14, 17, 19, 15, 16, 6, 22, 13, 12, 22, 12, 13, 20, 11, 14, 7, 9, 11, 17, 3, 24, 9, 11, 9, 4, 7, 5, 11, 18, 8, 7, 1, 25, 6, 2, 4, 24, 10, 22, 10, 23, 13, 22, 4, 2, </a:t>
-            </a:r>
-          </a:p>
-          <a:p>
-            <a:r>
-              <a:rPr lang="de-DE" sz="600" dirty="0"/>
-              <a:t>23, 13, 6, 6, 1, 23, 15, 12, 16, 7, 17, 22, 15, 23, 0, 25, 2, 14, 9, 14, 25, 5, 11, 6, 8, 0, 0, 2, 4, 22, 6, 21, 21, 12, 24, 9, 4, 2, 19, 16, 0, 3, 10, 9, 10, 15, 21, 10, 10, 12, 9, 11, 15, 22, 0, 12, 15, 6, 23, 2, 20, 21, 3, 5, 7, 9, 23, 2, 25, 12, 23, 1, 8, 14, 5, 6, 5, 7, 5, 11, 9, 5, 5, 17, 8, 19, 3, 25, 18, 1, 17, 24, 0, 11, 2, 0, 2, 8, 2, 3, 23, 24, 21, 15, 13, 20, 24, 16, 11, 19, 25, 24, 12, 17, 24, 7, 22, 10, 3, 12, 8, 18, 9, 5, 24, 14, 15, 4, 25, 23, 3, 3, 14, 24, 8, 0, 16, 1, 2, 14, 0, 0, 5, 22, 1, 12, 6, 14, 15, 5, 18, 1, 1, 11, 5, 19, 5, 18, 24, 13, 16, 1, 24, 2, 24, 9, 3, 19, 10, 13, 21, 10, 20, 25, 22, 18, 16, </a:t>
-            </a:r>
-          </a:p>
-          <a:p>
-            <a:r>
-              <a:rPr lang="de-DE" sz="600" dirty="0"/>
-              <a:t>3, 5, 21, 1, 10, 5, 22, 7, 5, 8, 5, 21, 4, 25, 12, 14, 16, 19, 21, 9, 8, 0, 19, 1, 22, 0, 7, 6, 5, 7, 2, 24, 17, 6, 5, 18, 24, 7, 8, 23, 23, 8, 20, 10, 16, 11, 15, 19, 3, 9, 22, 12, 12, 21, 23, 24, 19, 11, 21, 3, 15, 13, 8, 25, 1, 9, 7, 20, 23, 18, 1, 16, 18, 13, 16, 21, 9, 15, 7, 16, 13, 15, 22, 6, 6, 16, 13, 22, </a:t>
-            </a:r>
-          </a:p>
-          <a:p>
-            <a:r>
-              <a:rPr lang="de-DE" sz="600" dirty="0"/>
-              <a:t>23, 0, 9, 23, 3, 22, 16, 20, 17, 20, 3, 20, 8, 10, 4, 25, 24, 20, 23, 15, 23, 8, 6, 25, 8, 13, 10, 0, 22, 23, 7, 25, 9, 0, 23, 0, 5, 19, 19, 15, 2, 4, 23, 8, 1, 25, 10, 24, 1, 3, 13, 18, 7, 19, 25, 16, 15, 6, 24, 5, 17, 17, 7, 13, 14, 1, 2, 12, 15, 18, 14, 22, 6, 2, 10, 6, 2, 25, 22, 8, 21, 14, 1, 0, 11, 23, 21, 3, 9, 13, 20, 12, 0, 21, 16, 3, 1, 24, 5, 1, 18, 18, 25, 25, 7, 19, 5, 5, 19, 12, 9, 2, 5, 12, 14, 16, 9, 18, 8, 10, 5, 0, 17, 20, 22, 19, 3, 24, 21, 23, 1, 14, 15, 24, 7, 11, 6, 17, 25, 3, 25, 11, 3, 16, 17, 9, 13, 7, 6, 13, 15, 3, 14, 17, 12, 10, 22, 9, 21, 18, 20, 2, 14, 6, 1, 10, 6, 22, 19, 16, 13, 19, 23, 11, 1, 0, 0, 22, 5, 0, 1, 5, 12, 14, 3, 17, 10, 9, 7, 12, 13, 4, 10, 5, 8, 12, 1, 20, 9, 8, 17, 10, 4, 21, 19, 7, 25, 25, 22, 13, 18, 5, 11, 24, 23, 25, 14, 11, 19, 24, 24, 15, 2, 5, 15, 15, 23, 4, 21, 2, 21, 5, 13, 17, 15, 0, 7, 17, 24, 17, 11, 1, 9, 20, 6, 16, 10, 25, 9, 3, 24, 17, 3, 10, 14, 9, 6, 6, 1, 5, 14, 9, 9, 20, 0, 9, 4, 10, 11, 18, 13, 21, 5, 5, 24, 17, 17, 4, 6, 17, 16, 19, 7, 10, 13, 2, 9, 4, 23, 6, 0, 3, 24, 18, 22, 0, 1, 8, 0, 3, 14, 20, 9, 0, 4, 11, 12, 24, 17, 22, 10, 24, 18, 19, 8, 20, 0, 6, 6, 24, 22, 17, 17, 7, 25, 20, 14, 20, 25, 22, 2, 15, 7, 21, 11, 22, 23, 13, 3, 1, 17, 23, 13, 16, 4, 12, 18, 6, 0, 17, 4, </a:t>
-            </a:r>
-          </a:p>
-          <a:p>
-            <a:r>
-              <a:rPr lang="de-DE" sz="600" dirty="0"/>
-              <a:t>10, 19, 23, 1, 5, 7, 18, 4, 2, 7, 8, 20, 7, 9, 15, 17, 6, 9, 3, 20, 18, 3, 7, 7, 3, 13, 12, 3, 7, 2, 8, 5, 10, 22, 17, 21, 2, 10, 2, 25, 0, 23, 25, 2, 13, 0, 22, 18, 9, 11, 2, 14, 3, 8, 21, 2, 15, 8, 15, 6, 14, 8, 3, 12, 17, 4, 0, 25, 23, 14, 6, 20, 3, 3, 0, 0, 16, 6, 10, 15, 17, 7, 14, 7, 16, 14, 18, 1, 2, 18, 11, 22, 20, 23, 22, 8, 2, 7, 20, 20, 20, 21, 11, 16, 6, 20, 17, 0, 20, 16, 18, 15, 17, 14, 10, 25, 19, 16, 12, 21, 0, 12, 4, 6, 21, 7, 20, 21, 5, 13, 2, 0, 21, 17, 13, 10, 23, 3, 25, 4, 4, 20, 24, 17, 23, 6, 22, 15, 1, 13, 19, 17, 10, 12, 4, 17, 10, 24, 20, 24, 17, 24, 18, 11, 12, 25, 7, 5, 3, 14, 7, 6, 20, 10, 13, 10, 15, 25, 14, 0, 8, 24, 8, 18, 2, 18, 3, 25, 4, 19, 10, 5, 1, 21, 14, 12, 12, 18, 11, 17]</a:t>
-            </a:r>
-          </a:p>
-          <a:p>
-            <a:endParaRPr lang="de-DE" sz="600" dirty="0"/>
-          </a:p>
-          <a:p>
-            <a:r>
-              <a:rPr lang="de-DE" sz="600" b="1" u="sng" dirty="0"/>
-              <a:t>vorhergesagte Testdaten: </a:t>
-            </a:r>
-          </a:p>
-          <a:p>
-            <a:r>
-              <a:rPr lang="de-DE" sz="600" dirty="0"/>
-              <a:t>[25, 18, 15, 16, 7, 23, 12, 4, 24, 17, 10, 24, 1, 1, 1, 12, 13, 2, 20, 4, 11, 17, 0, 16, 24, 16, 0, 15, 25, 8, 15, 16, 21, 4, 16, 6, 10, 20, 14, 17, 11, 18, 23, 11, 14, 25, 12, 21, 13, 15, 23, 3, 15, 14, 14, 5, 5, 3, 13, 3, 20, 14, 24, 14, 4, 0, 25, 3, 11, 17, 14, 10, 1, 12, 11, 10, 9, 8, 2, 15, 4, 3, 8, 10, 17, 25, 18, 7, 5, 19, 6, 6, 18, 12, 15, 24, 25, 8, 15, 11, 24, 22, 11, 2, 21, 14, 24, 21, 15, 22, 15, 9, 22, 16, 24, 21, 16, 16, 1, 21, 21, 22, 12, 5, 6, 8, 7, 0, 21, 20, 16, 12, 10, 6, 20, 1, 9, 19, 13, 12, 1, 20, 22, 13, 23, 21, 22, 18, 4, 20, 12, 0, 15, 18, 25, 18, 13, 25, 3, 10, 19, 21, 6, 11, 11, 24, 4, 16, 14, 21, 13, 21, 2, 9, 3, 7, 9, 3, 13, 14, 8, 15, 2, 20, 0, 2, 17, 2, 0, 22, 3, 7, 2, 22, 20, 5, 14, 9, 2, 21, 1, 0, 17, 12, 0, 22, 3, 6, 12, 14, 0, 24, 23, 13, 23, 22, 19, 21, 5, 0, 7, 12, 24, 19, 6, 15, 17, 16, 23, 4, 21, 25, 8, 23, 14, 14, 3, 15, 6, 20, 24, 10, 5, 20, 20, 16, 4, 0, 11, 5, 9, 9, 4, 9, 17, 6, 0, 19, 23, 21, 24, 18, 11, 9, 0, 20, 5, 5, 1, 1, 8, 12, 25, 23, 17, 22, 6, 18, 1, 15, 4, 12, 25, 12, 5, 21, 10, 20, 19, 19, 23, 6, 10, 1, 18, 15, 20, 9, 17, 1, 11, 21, 17, 22, 10, 5, 18, 0, 9, 16, 22, 19, 19, 14, 17, 19, 0, 1, 20, 20, 2, 19, 10, 4, 14, 20, 14, 13, 11, 5, 22, 15, 15, 13, 10, 9, 19, 19, 12, 9, 7, 15, 4, 24, 18, 0, 23, 11, 13, 14, 11, 14, 19, 4, 23, 0, 13, 2, 15, 21, 21, 21, 24, 8, 1, 2, 22, 11, 21, 25, 3, 12, 10, 20, 19, 1, 6, 0, 19, 21, 13, 10, 9, 24, 4, 3, 17, 7, 3, 5, 10, 24, 0, 2, 20, 23, 11, 3, 19, 8, 19, 12, 7, 18, 18, 23, 5, 4, 16, 18, 24, 16, 20, 10, 2, 7, 24, 16, 4, 9, 8, 6, 11, 17, 10, 22, 14, 7, 16, 6, 0, 5, 6, 3, 10, 7, 6, 22, 16, 3, 18, 24, 8, 25, 1, 1, 23, 20, 0, 23, 1, 1, 8, 2, 16, 22, 13, 4, 23, 17, 8, 4, 2, 1, 4, 8, 22, 24, 12, 9, 21, 5, 24, 11, 19, 16, 12, 13, 24, 4, 16, 15, 11, 21, 17, 14, 21, 12, 18, 23, 10, 13, 22, 16, 8, 17, 20, 5, 19, 6, 11, 14, 1, 7, 24, 20, 8, 18, 25, 14, 6, 2, 14, 9, 24, 11, 4, 11, 10, 22, 23, 14, 1, 5, 2, 11, 22, 7, 1, 7, 11, 12, 7, 14, 4, 12, 23, 1, 6, 10, 6, 5, 8, 10, 8, 15, 15, 24, 0, 13, 21, 19, 13, 15, 14, 19, 21, 11, 2, 5, 14, 17, 19, 15, 16, 6, 22, 13, 0, 22, 13, 25, 20, 11, 14, 7, 9, 11, 17, 3, 6, 9, 11, 9, 4, 9, 5, 11, 18, 8, 7, 1, 25, 6, 2, 3, 24, 21, 22, 22, 23, 13, 24, 1, 14, 23, 24, 6, 6, 1, 23, 15, 12, 16, 7, 17, 22, 15, 8, 0, 25, 2, 21, 9, 14, 25, 5, 11, 6, 3, 0, 14, 2, 4, 21, 6, 21, 21, 12, 24, 9, 4, 2, 19, 16, 0, 3, 10, 9, 10, 15, 21, 17, 10, 13, 9, 5, 15, 22, 0, 12, 15, 6, 23, 2, 20, 21, 3, 24, 7, 9, 23, 2, 25, 12, 4, 1, 8, 14, 5, 14, 5, 7, 5, 6, 9, 5, 5, 17, 3, 19, </a:t>
-            </a:r>
-          </a:p>
-          <a:p>
-            <a:r>
-              <a:rPr lang="de-DE" sz="600" dirty="0"/>
-              <a:t>3, 25, 18, 22, 3, 24, 0, 11, 2, 0, 2, 8, 2, 3, 23, 24, 21, 15, 13, 20, 24, 15, 11, 19, 25, 24, 4, 17, 24, 7, 22, 10, 3, 12, 25, 18, 9, 5, 17, 14, 15, 4, 25, 23, 3, 3, 14, 11, 8, 0, 16, 1, 2, 14, 0, 0, 5, 22, 1, 12, 6, 14, 15, 5, 18, 1, 1, 11, 5, 0, 5, 18, 24, 13, 16, 1, 24, 2, 11, 9, 3, 19, 10, 12, 21, 10, 20, 9, 17, 18, 16, 3, 5, 0, 1, 6, 5, 22, 7, 22, 11, 5, 21, 4, 25, 12, 14, 16, 19, 21, 6, 8, 0, 19, 1, 22, 0, 7, 6, 5, 7, 2, 24, 17, 6, 5, 4, 24, 7, 0, 23, 23, 8, 1, 10, 16, 11, 15, 17, 3, 9, 22, 12, 12, 21, 13, 24, 19, 11, 21, 24, 15, 13, 8, 8, 1, 6, 7, 20, 23, 18, 1, 16, 23, 13, 16, 22, 9, 15, 7, 16, 12, 15, 22, 6, 6, 16, 4, 22, 23, 0, 9, 23, 3, 22, 16, 20, 23, 21, 14, 21, 25, 10, 4, 25, 23, 17, 21, 15, 23, 8, 18, 25, 8, 13, 10, 0, 22, 23, 7, 25, 9, 0, 18, 24, 5, 19, 24, 16, 2, 4, 23, 25, 1, 25, 10, 24, 1, 3, 12, 18, 25, 23, 25, 7, 15, 6, 24, 5, 21, 20, 7, 13, 14, 1, 2, 12, 15, 15, 14, 22, 6, 2, 10, 6, 2, 25, 21, 8, 21, 14, 1, 0, 11, 23, 21, 3, 25, 13, 20, 12, 0, 22, 16, 3, 1, 24, 5, 1, 18, 18, 25, 25, 3, 19, 1, 5, 24, 12, 9, 2, 5, 12, 14, 16, 9, 18, 4, 5, 5, 0, 17, 20, 22, 0, 3, 24, 21, 23, 1, 14, 15, 19, 7, 11, 6, 20, 25, 3, 25, 11, 3, 16, 21, 8, 13, 7, 6, 13, 15, 3, 14, 17, 12, 10, 10, 9, 21, 18, 20, 2, 11, 6, 1, 22, 6, 8, 19, 15, 0, 19, </a:t>
-            </a:r>
-          </a:p>
-          <a:p>
-            <a:r>
-              <a:rPr lang="de-DE" sz="600" dirty="0"/>
-              <a:t>17, 11, 1, 0, 0, 22, 22, 0, 1, 12, 12, 14, 3, 17, 10, 9, 7, 1, 13, 4, 10, 5, 8, 12, 1, 20, 9, 8, 17, 10, 1, 21, 19, 7, 11, 25, 22, 13, 18, 5, 11, 10, 23, 25, 14, 11, 19, 24, 5, 7, 25, 5, 15, 15, 18, 4, 10, 2, 21, 5, 13, 17, 15, 0, 7, 17, 24, 17, 3, 1, 24, 20, 6, 16, 1, 25, 9, 3, 24, 20, 3, 10, 14, 9, 6, 6, 1, 5, 14, 9, 9, 20, 0, 8, 4, 21, 11, 18, 13, 22, 5, 5, 24, 17, 20, 4, 24, 7, 16, 19, 7, 10, 13, 2, 9, 4, 23, 6, 0, 3, 12, 2, 22, 19, 2, 8, 0, 3, 14, 20, 9, 0, 4, 11, 18, 24, 17, 22, 21, 24, 18, 19, 8, 20, 1, 6, 7, 2, 22, 17, 17, 7, 25, 21, 14, 23, 15, 22, 2, 15, 7, 21, 11, 22, 8, 13, 3, 1, 17, 23, 12, 16, 4, 18, 4, 7, 0, 17, 0, 10, 19, 23, 1, 5, 7, 18, 4, 2, 6, 18, 20, 7, 9, 6, 17, 6, 9, 3, 12, 18, 3, 7, 7, 3, 13, 12, 11, 7, 6, 8, 5, 10, 4, 20, 21, 4, 20, 2, 20, 0, 23, 11, 10, 13, 22, 22, 18, 9, 11, 2, 14, 3, 8, 21, 2, 15, 8, 15, 7, 14, 20, 3, 12, 17, 23, 18, 25, 23, 14, 6, 20, 3, 3, 0, 0, 16, 6, 10, 15, 17, 7, 14, 7, 16, 17, 18, 10, 14, 4, 11, 22, 20, 23, 21, 8, 2, 7, 20, 22, 20, 10, 11, 16, 6, 17, 17, 0, 17, 16, 17, 15, 17, 14, 10, 4, 19, 16, 12, 21, 0, 12, 0, 6, 21, 7, 20, 21, 5, 13, 2, 0, 21, 17, 13, 0, 0, 3, 25, 4, 4, 17, 6, 17, 23, 14, 21, 15, 1, 13, 19, 17, 10, 12, 4, 17, 25, 24, 4, 24, 17, 24, 21, 11, 20, 20, 7, 5, 3, 14, 7, 6, 17, 10, 13, 10, 16, 25, 14, 0, 19, 24, 8, 18, 2, 0, 3, 25, 0, 8, 10, 22, 1, 10, 14, 13, 12, 13, 4, 17]</a:t>
-            </a:r>
-          </a:p>
-          <a:p>
-            <a:endParaRPr lang="de-DE" sz="600" dirty="0"/>
-          </a:p>
-        </p:txBody>
-      </p:sp>
-      <p:sp>
-        <p:nvSpPr>
-          <p:cNvPr id="16" name="Titel 1">
-            <a:extLst>
-              <a:ext uri="{FF2B5EF4-FFF2-40B4-BE49-F238E27FC236}">
-                <a16:creationId xmlns:a16="http://schemas.microsoft.com/office/drawing/2014/main" id="{CE3C357C-3A6D-4B2D-919B-468E62ADB4A7}"/>
-              </a:ext>
-            </a:extLst>
-          </p:cNvPr>
-          <p:cNvSpPr>
-            <a:spLocks noGrp="1"/>
-          </p:cNvSpPr>
-          <p:nvPr>
-            <p:ph type="title"/>
-          </p:nvPr>
-        </p:nvSpPr>
-        <p:spPr>
-          <a:xfrm>
-            <a:off x="415636" y="317623"/>
-            <a:ext cx="10515600" cy="1325563"/>
-          </a:xfrm>
-        </p:spPr>
-        <p:txBody>
-          <a:bodyPr/>
-          <a:lstStyle/>
-          <a:p>
-            <a:r>
-              <a:rPr lang="de-DE" dirty="0"/>
-              <a:t>ResNet50 on </a:t>
-            </a:r>
-            <a:r>
-              <a:rPr lang="de-DE" dirty="0" err="1"/>
-              <a:t>new</a:t>
-            </a:r>
-            <a:r>
-              <a:rPr lang="de-DE" dirty="0"/>
-              <a:t> Dataset - Labels</a:t>
-            </a:r>
-          </a:p>
-        </p:txBody>
-      </p:sp>
-    </p:spTree>
-    <p:extLst>
-      <p:ext uri="{BB962C8B-B14F-4D97-AF65-F5344CB8AC3E}">
-        <p14:creationId xmlns:p14="http://schemas.microsoft.com/office/powerpoint/2010/main" val="1256784810"/>
-      </p:ext>
-    </p:extLst>
-  </p:cSld>
-  <p:clrMapOvr>
-    <a:masterClrMapping/>
-  </p:clrMapOvr>
-</p:sld>
-</file>
-
-<file path=ppt/slides/slide21.xml><?xml version="1.0" encoding="utf-8"?>
 <p:sld xmlns:a="http://schemas.openxmlformats.org/drawingml/2006/main" xmlns:r="http://schemas.openxmlformats.org/officeDocument/2006/relationships" xmlns:p="http://schemas.openxmlformats.org/presentationml/2006/main">
   <p:cSld>
     <p:spTree>
@@ -5681,7 +5710,7 @@
 </p:sld>
 </file>
 
-<file path=ppt/slides/slide22.xml><?xml version="1.0" encoding="utf-8"?>
+<file path=ppt/slides/slide21.xml><?xml version="1.0" encoding="utf-8"?>
 <p:sld xmlns:a="http://schemas.openxmlformats.org/drawingml/2006/main" xmlns:r="http://schemas.openxmlformats.org/officeDocument/2006/relationships" xmlns:p="http://schemas.openxmlformats.org/presentationml/2006/main">
   <p:cSld>
     <p:spTree>
@@ -5769,6 +5798,106 @@
     <p:extLst>
       <p:ext uri="{BB962C8B-B14F-4D97-AF65-F5344CB8AC3E}">
         <p14:creationId xmlns:p14="http://schemas.microsoft.com/office/powerpoint/2010/main" val="40669009"/>
+      </p:ext>
+    </p:extLst>
+  </p:cSld>
+  <p:clrMapOvr>
+    <a:masterClrMapping/>
+  </p:clrMapOvr>
+</p:sld>
+</file>
+
+<file path=ppt/slides/slide22.xml><?xml version="1.0" encoding="utf-8"?>
+<p:sld xmlns:a="http://schemas.openxmlformats.org/drawingml/2006/main" xmlns:r="http://schemas.openxmlformats.org/officeDocument/2006/relationships" xmlns:p="http://schemas.openxmlformats.org/presentationml/2006/main">
+  <p:cSld>
+    <p:spTree>
+      <p:nvGrpSpPr>
+        <p:cNvPr id="1" name=""/>
+        <p:cNvGrpSpPr/>
+        <p:nvPr/>
+      </p:nvGrpSpPr>
+      <p:grpSpPr>
+        <a:xfrm>
+          <a:off x="0" y="0"/>
+          <a:ext cx="0" cy="0"/>
+          <a:chOff x="0" y="0"/>
+          <a:chExt cx="0" cy="0"/>
+        </a:xfrm>
+      </p:grpSpPr>
+      <p:sp>
+        <p:nvSpPr>
+          <p:cNvPr id="3" name="Titel 1">
+            <a:extLst>
+              <a:ext uri="{FF2B5EF4-FFF2-40B4-BE49-F238E27FC236}">
+                <a16:creationId xmlns:a16="http://schemas.microsoft.com/office/drawing/2014/main" id="{33062B24-559F-41F6-8766-1B8B53C3E0C1}"/>
+              </a:ext>
+            </a:extLst>
+          </p:cNvPr>
+          <p:cNvSpPr txBox="1">
+            <a:spLocks/>
+          </p:cNvSpPr>
+          <p:nvPr/>
+        </p:nvSpPr>
+        <p:spPr>
+          <a:xfrm>
+            <a:off x="415636" y="317623"/>
+            <a:ext cx="11014364" cy="1325563"/>
+          </a:xfrm>
+          <a:prstGeom prst="rect">
+            <a:avLst/>
+          </a:prstGeom>
+        </p:spPr>
+        <p:txBody>
+          <a:bodyPr vert="horz" lIns="91440" tIns="45720" rIns="91440" bIns="45720" rtlCol="0" anchor="ctr">
+            <a:normAutofit/>
+          </a:bodyPr>
+          <a:lstStyle>
+            <a:lvl1pPr algn="l" defTabSz="914400" rtl="0" eaLnBrk="1" latinLnBrk="0" hangingPunct="1">
+              <a:lnSpc>
+                <a:spcPct val="90000"/>
+              </a:lnSpc>
+              <a:spcBef>
+                <a:spcPct val="0"/>
+              </a:spcBef>
+              <a:buNone/>
+              <a:defRPr sz="4400" kern="1200">
+                <a:solidFill>
+                  <a:schemeClr val="tx1"/>
+                </a:solidFill>
+                <a:latin typeface="+mj-lt"/>
+                <a:ea typeface="+mj-ea"/>
+                <a:cs typeface="+mj-cs"/>
+              </a:defRPr>
+            </a:lvl1pPr>
+          </a:lstStyle>
+          <a:p>
+            <a:r>
+              <a:rPr lang="de-DE" dirty="0"/>
+              <a:t>ResNet50 on </a:t>
+            </a:r>
+            <a:r>
+              <a:rPr lang="de-DE" dirty="0" err="1"/>
+              <a:t>new</a:t>
+            </a:r>
+            <a:r>
+              <a:rPr lang="de-DE" dirty="0"/>
+              <a:t> Dataset – </a:t>
+            </a:r>
+            <a:r>
+              <a:rPr lang="de-DE" dirty="0" err="1"/>
+              <a:t>Saliency</a:t>
+            </a:r>
+            <a:r>
+              <a:rPr lang="de-DE" dirty="0"/>
+              <a:t> Maps</a:t>
+            </a:r>
+          </a:p>
+        </p:txBody>
+      </p:sp>
+    </p:spTree>
+    <p:extLst>
+      <p:ext uri="{BB962C8B-B14F-4D97-AF65-F5344CB8AC3E}">
+        <p14:creationId xmlns:p14="http://schemas.microsoft.com/office/powerpoint/2010/main" val="3587953171"/>
       </p:ext>
     </p:extLst>
   </p:cSld>
@@ -5797,54 +5926,28 @@
       </p:grpSpPr>
       <p:sp>
         <p:nvSpPr>
-          <p:cNvPr id="3" name="Titel 1">
-            <a:extLst>
-              <a:ext uri="{FF2B5EF4-FFF2-40B4-BE49-F238E27FC236}">
-                <a16:creationId xmlns:a16="http://schemas.microsoft.com/office/drawing/2014/main" id="{33062B24-559F-41F6-8766-1B8B53C3E0C1}"/>
-              </a:ext>
-            </a:extLst>
-          </p:cNvPr>
-          <p:cNvSpPr txBox="1">
-            <a:spLocks/>
-          </p:cNvSpPr>
-          <p:nvPr/>
-        </p:nvSpPr>
-        <p:spPr>
-          <a:xfrm>
-            <a:off x="415636" y="317623"/>
-            <a:ext cx="11014364" cy="1325563"/>
-          </a:xfrm>
-          <a:prstGeom prst="rect">
-            <a:avLst/>
-          </a:prstGeom>
-        </p:spPr>
-        <p:txBody>
-          <a:bodyPr vert="horz" lIns="91440" tIns="45720" rIns="91440" bIns="45720" rtlCol="0" anchor="ctr">
-            <a:normAutofit/>
-          </a:bodyPr>
-          <a:lstStyle>
-            <a:lvl1pPr algn="l" defTabSz="914400" rtl="0" eaLnBrk="1" latinLnBrk="0" hangingPunct="1">
-              <a:lnSpc>
-                <a:spcPct val="90000"/>
-              </a:lnSpc>
-              <a:spcBef>
-                <a:spcPct val="0"/>
-              </a:spcBef>
-              <a:buNone/>
-              <a:defRPr sz="4400" kern="1200">
-                <a:solidFill>
-                  <a:schemeClr val="tx1"/>
-                </a:solidFill>
-                <a:latin typeface="+mj-lt"/>
-                <a:ea typeface="+mj-ea"/>
-                <a:cs typeface="+mj-cs"/>
-              </a:defRPr>
-            </a:lvl1pPr>
-          </a:lstStyle>
-          <a:p>
-            <a:r>
-              <a:rPr lang="de-DE" dirty="0"/>
-              <a:t>ResNet50 on </a:t>
+          <p:cNvPr id="2" name="Titel 1">
+            <a:extLst>
+              <a:ext uri="{FF2B5EF4-FFF2-40B4-BE49-F238E27FC236}">
+                <a16:creationId xmlns:a16="http://schemas.microsoft.com/office/drawing/2014/main" id="{FA0E998A-8B92-4AB3-A9A8-1DE5D112DC24}"/>
+              </a:ext>
+            </a:extLst>
+          </p:cNvPr>
+          <p:cNvSpPr>
+            <a:spLocks noGrp="1"/>
+          </p:cNvSpPr>
+          <p:nvPr>
+            <p:ph type="title"/>
+          </p:nvPr>
+        </p:nvSpPr>
+        <p:spPr/>
+        <p:txBody>
+          <a:bodyPr/>
+          <a:lstStyle/>
+          <a:p>
+            <a:r>
+              <a:rPr lang="de-DE" dirty="0"/>
+              <a:t>Vision Transformer on </a:t>
             </a:r>
             <a:r>
               <a:rPr lang="de-DE" dirty="0" err="1"/>
@@ -5852,15 +5955,63 @@
             </a:r>
             <a:r>
               <a:rPr lang="de-DE" dirty="0"/>
-              <a:t> Dataset – </a:t>
-            </a:r>
-            <a:r>
-              <a:rPr lang="de-DE" dirty="0" err="1"/>
-              <a:t>Saliency</a:t>
-            </a:r>
-            <a:r>
-              <a:rPr lang="de-DE" dirty="0"/>
-              <a:t> Maps</a:t>
+              <a:t> Dataset</a:t>
+            </a:r>
+          </a:p>
+        </p:txBody>
+      </p:sp>
+      <p:sp>
+        <p:nvSpPr>
+          <p:cNvPr id="3" name="Inhaltsplatzhalter 2">
+            <a:extLst>
+              <a:ext uri="{FF2B5EF4-FFF2-40B4-BE49-F238E27FC236}">
+                <a16:creationId xmlns:a16="http://schemas.microsoft.com/office/drawing/2014/main" id="{03FCA3D9-EE93-495D-BB38-42608EA49BF0}"/>
+              </a:ext>
+            </a:extLst>
+          </p:cNvPr>
+          <p:cNvSpPr>
+            <a:spLocks noGrp="1"/>
+          </p:cNvSpPr>
+          <p:nvPr>
+            <p:ph idx="1"/>
+          </p:nvPr>
+        </p:nvSpPr>
+        <p:spPr/>
+        <p:txBody>
+          <a:bodyPr/>
+          <a:lstStyle/>
+          <a:p>
+            <a:r>
+              <a:rPr lang="de-DE" dirty="0" err="1"/>
+              <a:t>Augmentierung</a:t>
+            </a:r>
+            <a:r>
+              <a:rPr lang="de-DE" dirty="0"/>
+              <a:t>: Spiegeln, </a:t>
+            </a:r>
+            <a:r>
+              <a:rPr lang="de-DE" dirty="0" err="1"/>
+              <a:t>Crop</a:t>
+            </a:r>
+            <a:r>
+              <a:rPr lang="de-DE" dirty="0"/>
+              <a:t> </a:t>
+            </a:r>
+            <a:r>
+              <a:rPr lang="de-DE" dirty="0" err="1"/>
+              <a:t>with</a:t>
+            </a:r>
+            <a:r>
+              <a:rPr lang="de-DE" dirty="0"/>
+              <a:t> </a:t>
+            </a:r>
+            <a:r>
+              <a:rPr lang="de-DE" dirty="0" err="1"/>
+              <a:t>padding</a:t>
+            </a:r>
+            <a:r>
+              <a:rPr lang="de-DE" dirty="0"/>
+              <a:t> n = 4</a:t>
             </a:r>
           </a:p>
         </p:txBody>
@@ -5868,7 +6019,7 @@
     </p:spTree>
     <p:extLst>
       <p:ext uri="{BB962C8B-B14F-4D97-AF65-F5344CB8AC3E}">
-        <p14:creationId xmlns:p14="http://schemas.microsoft.com/office/powerpoint/2010/main" val="3587953171"/>
+        <p14:creationId xmlns:p14="http://schemas.microsoft.com/office/powerpoint/2010/main" val="4081882343"/>
       </p:ext>
     </p:extLst>
   </p:cSld>
@@ -5949,20 +6100,21 @@
         </p:nvSpPr>
         <p:spPr/>
         <p:txBody>
-          <a:bodyPr/>
+          <a:bodyPr>
+            <a:normAutofit fontScale="47500" lnSpcReduction="20000"/>
+          </a:bodyPr>
           <a:lstStyle/>
           <a:p>
-            <a:r>
-              <a:rPr lang="de-DE" dirty="0" err="1"/>
-              <a:t>Augmentierung</a:t>
-            </a:r>
-            <a:r>
-              <a:rPr lang="de-DE" dirty="0"/>
-              <a:t>: Spiegeln, </a:t>
-            </a:r>
-            <a:r>
-              <a:rPr lang="de-DE" dirty="0" err="1"/>
-              <a:t>Crop</a:t>
+            <a:pPr marL="0" indent="0">
+              <a:buNone/>
+            </a:pPr>
+            <a:r>
+              <a:rPr lang="de-DE" dirty="0"/>
+              <a:t>Trial 0 </a:t>
+            </a:r>
+            <a:r>
+              <a:rPr lang="de-DE" dirty="0" err="1"/>
+              <a:t>finished</a:t>
             </a:r>
             <a:r>
               <a:rPr lang="de-DE" dirty="0"/>
@@ -5978,11 +6130,350 @@
             </a:r>
             <a:r>
               <a:rPr lang="de-DE" dirty="0" err="1"/>
-              <a:t>padding</a:t>
-            </a:r>
-            <a:r>
-              <a:rPr lang="de-DE" dirty="0"/>
-              <a:t> n = 4</a:t>
+              <a:t>value</a:t>
+            </a:r>
+            <a:r>
+              <a:rPr lang="de-DE" dirty="0"/>
+              <a:t>: 0.8842917251051893 and </a:t>
+            </a:r>
+            <a:r>
+              <a:rPr lang="de-DE" dirty="0" err="1"/>
+              <a:t>parameters</a:t>
+            </a:r>
+            <a:r>
+              <a:rPr lang="de-DE" dirty="0"/>
+              <a:t>: {'</a:t>
+            </a:r>
+            <a:r>
+              <a:rPr lang="de-DE" dirty="0" err="1"/>
+              <a:t>learning_rate</a:t>
+            </a:r>
+            <a:r>
+              <a:rPr lang="de-DE" dirty="0"/>
+              <a:t>': 0.004285920769950295, '</a:t>
+            </a:r>
+            <a:r>
+              <a:rPr lang="de-DE" dirty="0" err="1"/>
+              <a:t>batch_size</a:t>
+            </a:r>
+            <a:r>
+              <a:rPr lang="de-DE" dirty="0"/>
+              <a:t>': 64, '</a:t>
+            </a:r>
+            <a:r>
+              <a:rPr lang="de-DE" dirty="0" err="1"/>
+              <a:t>num_epochs</a:t>
+            </a:r>
+            <a:r>
+              <a:rPr lang="de-DE" dirty="0"/>
+              <a:t>': 10}. Best </a:t>
+            </a:r>
+            <a:r>
+              <a:rPr lang="de-DE" dirty="0" err="1"/>
+              <a:t>is</a:t>
+            </a:r>
+            <a:r>
+              <a:rPr lang="de-DE" dirty="0"/>
+              <a:t> </a:t>
+            </a:r>
+            <a:r>
+              <a:rPr lang="de-DE" dirty="0" err="1"/>
+              <a:t>trial</a:t>
+            </a:r>
+            <a:r>
+              <a:rPr lang="de-DE" dirty="0"/>
+              <a:t> 0 </a:t>
+            </a:r>
+            <a:r>
+              <a:rPr lang="de-DE" dirty="0" err="1"/>
+              <a:t>with</a:t>
+            </a:r>
+            <a:r>
+              <a:rPr lang="de-DE" dirty="0"/>
+              <a:t> </a:t>
+            </a:r>
+            <a:r>
+              <a:rPr lang="de-DE" dirty="0" err="1"/>
+              <a:t>value</a:t>
+            </a:r>
+            <a:r>
+              <a:rPr lang="de-DE" dirty="0"/>
+              <a:t>: 0.8842917251051893.</a:t>
+            </a:r>
+          </a:p>
+          <a:p>
+            <a:pPr marL="0" indent="0">
+              <a:buNone/>
+            </a:pPr>
+            <a:endParaRPr lang="de-DE" dirty="0"/>
+          </a:p>
+          <a:p>
+            <a:pPr marL="0" indent="0">
+              <a:buNone/>
+            </a:pPr>
+            <a:r>
+              <a:rPr lang="de-DE" dirty="0"/>
+              <a:t>Beste Hyperparameter: {'</a:t>
+            </a:r>
+            <a:r>
+              <a:rPr lang="de-DE" dirty="0" err="1"/>
+              <a:t>learning_rate</a:t>
+            </a:r>
+            <a:r>
+              <a:rPr lang="de-DE" dirty="0"/>
+              <a:t>': 0.004285920769950295, '</a:t>
+            </a:r>
+            <a:r>
+              <a:rPr lang="de-DE" dirty="0" err="1"/>
+              <a:t>batch_size</a:t>
+            </a:r>
+            <a:r>
+              <a:rPr lang="de-DE" dirty="0"/>
+              <a:t>': 64, '</a:t>
+            </a:r>
+            <a:r>
+              <a:rPr lang="de-DE" dirty="0" err="1"/>
+              <a:t>num_epochs</a:t>
+            </a:r>
+            <a:r>
+              <a:rPr lang="de-DE" dirty="0"/>
+              <a:t>': 10}</a:t>
+            </a:r>
+          </a:p>
+          <a:p>
+            <a:pPr marL="0" indent="0">
+              <a:buNone/>
+            </a:pPr>
+            <a:r>
+              <a:rPr lang="de-DE" dirty="0"/>
+              <a:t>Bester Validierungsverlust: 0.8842917251051893</a:t>
+            </a:r>
+          </a:p>
+          <a:p>
+            <a:pPr marL="0" indent="0">
+              <a:buNone/>
+            </a:pPr>
+            <a:r>
+              <a:rPr lang="de-DE" dirty="0" err="1"/>
+              <a:t>Epoch</a:t>
+            </a:r>
+            <a:r>
+              <a:rPr lang="de-DE" dirty="0"/>
+              <a:t> 1/10, Loss: 1.0807, </a:t>
+            </a:r>
+            <a:r>
+              <a:rPr lang="de-DE" dirty="0" err="1"/>
+              <a:t>Accuracy</a:t>
+            </a:r>
+            <a:r>
+              <a:rPr lang="de-DE" dirty="0"/>
+              <a:t>: 0.7005</a:t>
+            </a:r>
+          </a:p>
+          <a:p>
+            <a:pPr marL="0" indent="0">
+              <a:buNone/>
+            </a:pPr>
+            <a:r>
+              <a:rPr lang="de-DE" dirty="0" err="1"/>
+              <a:t>Epoch</a:t>
+            </a:r>
+            <a:r>
+              <a:rPr lang="de-DE" dirty="0"/>
+              <a:t> 2/10, Loss: 0.4877, </a:t>
+            </a:r>
+            <a:r>
+              <a:rPr lang="de-DE" dirty="0" err="1"/>
+              <a:t>Accuracy</a:t>
+            </a:r>
+            <a:r>
+              <a:rPr lang="de-DE" dirty="0"/>
+              <a:t>: 0.8651</a:t>
+            </a:r>
+          </a:p>
+          <a:p>
+            <a:pPr marL="0" indent="0">
+              <a:buNone/>
+            </a:pPr>
+            <a:r>
+              <a:rPr lang="de-DE" dirty="0" err="1"/>
+              <a:t>Epoch</a:t>
+            </a:r>
+            <a:r>
+              <a:rPr lang="de-DE" dirty="0"/>
+              <a:t> 3/10, Loss: 0.3679, </a:t>
+            </a:r>
+            <a:r>
+              <a:rPr lang="de-DE" dirty="0" err="1"/>
+              <a:t>Accuracy</a:t>
+            </a:r>
+            <a:r>
+              <a:rPr lang="de-DE" dirty="0"/>
+              <a:t>: 0.8959</a:t>
+            </a:r>
+          </a:p>
+          <a:p>
+            <a:pPr marL="0" indent="0">
+              <a:buNone/>
+            </a:pPr>
+            <a:r>
+              <a:rPr lang="de-DE" dirty="0" err="1"/>
+              <a:t>Epoch</a:t>
+            </a:r>
+            <a:r>
+              <a:rPr lang="de-DE" dirty="0"/>
+              <a:t> 4/10, Loss: 0.3177, </a:t>
+            </a:r>
+            <a:r>
+              <a:rPr lang="de-DE" dirty="0" err="1"/>
+              <a:t>Accuracy</a:t>
+            </a:r>
+            <a:r>
+              <a:rPr lang="de-DE" dirty="0"/>
+              <a:t>: 0.9037</a:t>
+            </a:r>
+          </a:p>
+          <a:p>
+            <a:pPr marL="0" indent="0">
+              <a:buNone/>
+            </a:pPr>
+            <a:r>
+              <a:rPr lang="de-DE" dirty="0" err="1"/>
+              <a:t>Epoch</a:t>
+            </a:r>
+            <a:r>
+              <a:rPr lang="de-DE" dirty="0"/>
+              <a:t> 5/10, Loss: 0.2599, </a:t>
+            </a:r>
+            <a:r>
+              <a:rPr lang="de-DE" dirty="0" err="1"/>
+              <a:t>Accuracy</a:t>
+            </a:r>
+            <a:r>
+              <a:rPr lang="de-DE" dirty="0"/>
+              <a:t>: 0.9241</a:t>
+            </a:r>
+          </a:p>
+          <a:p>
+            <a:pPr marL="0" indent="0">
+              <a:buNone/>
+            </a:pPr>
+            <a:r>
+              <a:rPr lang="de-DE" dirty="0" err="1"/>
+              <a:t>Epoch</a:t>
+            </a:r>
+            <a:r>
+              <a:rPr lang="de-DE" dirty="0"/>
+              <a:t> 6/10, Loss: 0.2318, </a:t>
+            </a:r>
+            <a:r>
+              <a:rPr lang="de-DE" dirty="0" err="1"/>
+              <a:t>Accuracy</a:t>
+            </a:r>
+            <a:r>
+              <a:rPr lang="de-DE" dirty="0"/>
+              <a:t>: 0.9322</a:t>
+            </a:r>
+          </a:p>
+          <a:p>
+            <a:pPr marL="0" indent="0">
+              <a:buNone/>
+            </a:pPr>
+            <a:r>
+              <a:rPr lang="de-DE" dirty="0" err="1"/>
+              <a:t>Epoch</a:t>
+            </a:r>
+            <a:r>
+              <a:rPr lang="de-DE" dirty="0"/>
+              <a:t> 7/10, Loss: 0.2091, </a:t>
+            </a:r>
+            <a:r>
+              <a:rPr lang="de-DE" dirty="0" err="1"/>
+              <a:t>Accuracy</a:t>
+            </a:r>
+            <a:r>
+              <a:rPr lang="de-DE" dirty="0"/>
+              <a:t>: 0.9394</a:t>
+            </a:r>
+          </a:p>
+          <a:p>
+            <a:pPr marL="0" indent="0">
+              <a:buNone/>
+            </a:pPr>
+            <a:r>
+              <a:rPr lang="de-DE" dirty="0" err="1"/>
+              <a:t>Epoch</a:t>
+            </a:r>
+            <a:r>
+              <a:rPr lang="de-DE" dirty="0"/>
+              <a:t> 8/10, Loss: 0.1951, </a:t>
+            </a:r>
+            <a:r>
+              <a:rPr lang="de-DE" dirty="0" err="1"/>
+              <a:t>Accuracy</a:t>
+            </a:r>
+            <a:r>
+              <a:rPr lang="de-DE" dirty="0"/>
+              <a:t>: 0.9430</a:t>
+            </a:r>
+          </a:p>
+          <a:p>
+            <a:pPr marL="0" indent="0">
+              <a:buNone/>
+            </a:pPr>
+            <a:r>
+              <a:rPr lang="de-DE" dirty="0" err="1"/>
+              <a:t>Epoch</a:t>
+            </a:r>
+            <a:r>
+              <a:rPr lang="de-DE" dirty="0"/>
+              <a:t> 9/10, Loss: 0.1852, </a:t>
+            </a:r>
+            <a:r>
+              <a:rPr lang="de-DE" dirty="0" err="1"/>
+              <a:t>Accuracy</a:t>
+            </a:r>
+            <a:r>
+              <a:rPr lang="de-DE" dirty="0"/>
+              <a:t>: 0.9455</a:t>
+            </a:r>
+          </a:p>
+          <a:p>
+            <a:pPr marL="0" indent="0">
+              <a:buNone/>
+            </a:pPr>
+            <a:r>
+              <a:rPr lang="de-DE" dirty="0" err="1"/>
+              <a:t>Epoch</a:t>
+            </a:r>
+            <a:r>
+              <a:rPr lang="de-DE" dirty="0"/>
+              <a:t> 10/10, Loss: 0.1602, </a:t>
+            </a:r>
+            <a:r>
+              <a:rPr lang="de-DE" dirty="0" err="1"/>
+              <a:t>Accuracy</a:t>
+            </a:r>
+            <a:r>
+              <a:rPr lang="de-DE" dirty="0"/>
+              <a:t>: 0.9512</a:t>
+            </a:r>
+          </a:p>
+          <a:p>
+            <a:pPr marL="0" indent="0">
+              <a:buNone/>
+            </a:pPr>
+            <a:r>
+              <a:rPr lang="de-DE" dirty="0"/>
+              <a:t>Final Validation Loss: 0.4258, Final Validation </a:t>
+            </a:r>
+            <a:r>
+              <a:rPr lang="de-DE" dirty="0" err="1"/>
+              <a:t>Accuracy</a:t>
+            </a:r>
+            <a:r>
+              <a:rPr lang="de-DE" dirty="0"/>
+              <a:t>: 0.8773</a:t>
             </a:r>
           </a:p>
         </p:txBody>
@@ -5990,7 +6481,7 @@
     </p:spTree>
     <p:extLst>
       <p:ext uri="{BB962C8B-B14F-4D97-AF65-F5344CB8AC3E}">
-        <p14:creationId xmlns:p14="http://schemas.microsoft.com/office/powerpoint/2010/main" val="4081882343"/>
+        <p14:creationId xmlns:p14="http://schemas.microsoft.com/office/powerpoint/2010/main" val="558545656"/>
       </p:ext>
     </p:extLst>
   </p:cSld>
@@ -6019,468 +6510,6 @@
       </p:grpSpPr>
       <p:sp>
         <p:nvSpPr>
-          <p:cNvPr id="2" name="Titel 1">
-            <a:extLst>
-              <a:ext uri="{FF2B5EF4-FFF2-40B4-BE49-F238E27FC236}">
-                <a16:creationId xmlns:a16="http://schemas.microsoft.com/office/drawing/2014/main" id="{FA0E998A-8B92-4AB3-A9A8-1DE5D112DC24}"/>
-              </a:ext>
-            </a:extLst>
-          </p:cNvPr>
-          <p:cNvSpPr>
-            <a:spLocks noGrp="1"/>
-          </p:cNvSpPr>
-          <p:nvPr>
-            <p:ph type="title"/>
-          </p:nvPr>
-        </p:nvSpPr>
-        <p:spPr/>
-        <p:txBody>
-          <a:bodyPr/>
-          <a:lstStyle/>
-          <a:p>
-            <a:r>
-              <a:rPr lang="de-DE" dirty="0"/>
-              <a:t>Vision Transformer on </a:t>
-            </a:r>
-            <a:r>
-              <a:rPr lang="de-DE" dirty="0" err="1"/>
-              <a:t>new</a:t>
-            </a:r>
-            <a:r>
-              <a:rPr lang="de-DE" dirty="0"/>
-              <a:t> Dataset</a:t>
-            </a:r>
-          </a:p>
-        </p:txBody>
-      </p:sp>
-      <p:sp>
-        <p:nvSpPr>
-          <p:cNvPr id="3" name="Inhaltsplatzhalter 2">
-            <a:extLst>
-              <a:ext uri="{FF2B5EF4-FFF2-40B4-BE49-F238E27FC236}">
-                <a16:creationId xmlns:a16="http://schemas.microsoft.com/office/drawing/2014/main" id="{03FCA3D9-EE93-495D-BB38-42608EA49BF0}"/>
-              </a:ext>
-            </a:extLst>
-          </p:cNvPr>
-          <p:cNvSpPr>
-            <a:spLocks noGrp="1"/>
-          </p:cNvSpPr>
-          <p:nvPr>
-            <p:ph idx="1"/>
-          </p:nvPr>
-        </p:nvSpPr>
-        <p:spPr/>
-        <p:txBody>
-          <a:bodyPr>
-            <a:normAutofit fontScale="47500" lnSpcReduction="20000"/>
-          </a:bodyPr>
-          <a:lstStyle/>
-          <a:p>
-            <a:pPr marL="0" indent="0">
-              <a:buNone/>
-            </a:pPr>
-            <a:r>
-              <a:rPr lang="de-DE" dirty="0"/>
-              <a:t>Trial 0 </a:t>
-            </a:r>
-            <a:r>
-              <a:rPr lang="de-DE" dirty="0" err="1"/>
-              <a:t>finished</a:t>
-            </a:r>
-            <a:r>
-              <a:rPr lang="de-DE" dirty="0"/>
-              <a:t> </a:t>
-            </a:r>
-            <a:r>
-              <a:rPr lang="de-DE" dirty="0" err="1"/>
-              <a:t>with</a:t>
-            </a:r>
-            <a:r>
-              <a:rPr lang="de-DE" dirty="0"/>
-              <a:t> </a:t>
-            </a:r>
-            <a:r>
-              <a:rPr lang="de-DE" dirty="0" err="1"/>
-              <a:t>value</a:t>
-            </a:r>
-            <a:r>
-              <a:rPr lang="de-DE" dirty="0"/>
-              <a:t>: 0.8842917251051893 and </a:t>
-            </a:r>
-            <a:r>
-              <a:rPr lang="de-DE" dirty="0" err="1"/>
-              <a:t>parameters</a:t>
-            </a:r>
-            <a:r>
-              <a:rPr lang="de-DE" dirty="0"/>
-              <a:t>: {'</a:t>
-            </a:r>
-            <a:r>
-              <a:rPr lang="de-DE" dirty="0" err="1"/>
-              <a:t>learning_rate</a:t>
-            </a:r>
-            <a:r>
-              <a:rPr lang="de-DE" dirty="0"/>
-              <a:t>': 0.004285920769950295, '</a:t>
-            </a:r>
-            <a:r>
-              <a:rPr lang="de-DE" dirty="0" err="1"/>
-              <a:t>batch_size</a:t>
-            </a:r>
-            <a:r>
-              <a:rPr lang="de-DE" dirty="0"/>
-              <a:t>': 64, '</a:t>
-            </a:r>
-            <a:r>
-              <a:rPr lang="de-DE" dirty="0" err="1"/>
-              <a:t>num_epochs</a:t>
-            </a:r>
-            <a:r>
-              <a:rPr lang="de-DE" dirty="0"/>
-              <a:t>': 10}. Best </a:t>
-            </a:r>
-            <a:r>
-              <a:rPr lang="de-DE" dirty="0" err="1"/>
-              <a:t>is</a:t>
-            </a:r>
-            <a:r>
-              <a:rPr lang="de-DE" dirty="0"/>
-              <a:t> </a:t>
-            </a:r>
-            <a:r>
-              <a:rPr lang="de-DE" dirty="0" err="1"/>
-              <a:t>trial</a:t>
-            </a:r>
-            <a:r>
-              <a:rPr lang="de-DE" dirty="0"/>
-              <a:t> 0 </a:t>
-            </a:r>
-            <a:r>
-              <a:rPr lang="de-DE" dirty="0" err="1"/>
-              <a:t>with</a:t>
-            </a:r>
-            <a:r>
-              <a:rPr lang="de-DE" dirty="0"/>
-              <a:t> </a:t>
-            </a:r>
-            <a:r>
-              <a:rPr lang="de-DE" dirty="0" err="1"/>
-              <a:t>value</a:t>
-            </a:r>
-            <a:r>
-              <a:rPr lang="de-DE" dirty="0"/>
-              <a:t>: 0.8842917251051893.</a:t>
-            </a:r>
-          </a:p>
-          <a:p>
-            <a:pPr marL="0" indent="0">
-              <a:buNone/>
-            </a:pPr>
-            <a:endParaRPr lang="de-DE" dirty="0"/>
-          </a:p>
-          <a:p>
-            <a:pPr marL="0" indent="0">
-              <a:buNone/>
-            </a:pPr>
-            <a:r>
-              <a:rPr lang="de-DE" dirty="0"/>
-              <a:t>Beste Hyperparameter: {'</a:t>
-            </a:r>
-            <a:r>
-              <a:rPr lang="de-DE" dirty="0" err="1"/>
-              <a:t>learning_rate</a:t>
-            </a:r>
-            <a:r>
-              <a:rPr lang="de-DE" dirty="0"/>
-              <a:t>': 0.004285920769950295, '</a:t>
-            </a:r>
-            <a:r>
-              <a:rPr lang="de-DE" dirty="0" err="1"/>
-              <a:t>batch_size</a:t>
-            </a:r>
-            <a:r>
-              <a:rPr lang="de-DE" dirty="0"/>
-              <a:t>': 64, '</a:t>
-            </a:r>
-            <a:r>
-              <a:rPr lang="de-DE" dirty="0" err="1"/>
-              <a:t>num_epochs</a:t>
-            </a:r>
-            <a:r>
-              <a:rPr lang="de-DE" dirty="0"/>
-              <a:t>': 10}</a:t>
-            </a:r>
-          </a:p>
-          <a:p>
-            <a:pPr marL="0" indent="0">
-              <a:buNone/>
-            </a:pPr>
-            <a:r>
-              <a:rPr lang="de-DE" dirty="0"/>
-              <a:t>Bester Validierungsverlust: 0.8842917251051893</a:t>
-            </a:r>
-          </a:p>
-          <a:p>
-            <a:pPr marL="0" indent="0">
-              <a:buNone/>
-            </a:pPr>
-            <a:r>
-              <a:rPr lang="de-DE" dirty="0" err="1"/>
-              <a:t>Epoch</a:t>
-            </a:r>
-            <a:r>
-              <a:rPr lang="de-DE" dirty="0"/>
-              <a:t> 1/10, Loss: 1.0807, </a:t>
-            </a:r>
-            <a:r>
-              <a:rPr lang="de-DE" dirty="0" err="1"/>
-              <a:t>Accuracy</a:t>
-            </a:r>
-            <a:r>
-              <a:rPr lang="de-DE" dirty="0"/>
-              <a:t>: 0.7005</a:t>
-            </a:r>
-          </a:p>
-          <a:p>
-            <a:pPr marL="0" indent="0">
-              <a:buNone/>
-            </a:pPr>
-            <a:r>
-              <a:rPr lang="de-DE" dirty="0" err="1"/>
-              <a:t>Epoch</a:t>
-            </a:r>
-            <a:r>
-              <a:rPr lang="de-DE" dirty="0"/>
-              <a:t> 2/10, Loss: 0.4877, </a:t>
-            </a:r>
-            <a:r>
-              <a:rPr lang="de-DE" dirty="0" err="1"/>
-              <a:t>Accuracy</a:t>
-            </a:r>
-            <a:r>
-              <a:rPr lang="de-DE" dirty="0"/>
-              <a:t>: 0.8651</a:t>
-            </a:r>
-          </a:p>
-          <a:p>
-            <a:pPr marL="0" indent="0">
-              <a:buNone/>
-            </a:pPr>
-            <a:r>
-              <a:rPr lang="de-DE" dirty="0" err="1"/>
-              <a:t>Epoch</a:t>
-            </a:r>
-            <a:r>
-              <a:rPr lang="de-DE" dirty="0"/>
-              <a:t> 3/10, Loss: 0.3679, </a:t>
-            </a:r>
-            <a:r>
-              <a:rPr lang="de-DE" dirty="0" err="1"/>
-              <a:t>Accuracy</a:t>
-            </a:r>
-            <a:r>
-              <a:rPr lang="de-DE" dirty="0"/>
-              <a:t>: 0.8959</a:t>
-            </a:r>
-          </a:p>
-          <a:p>
-            <a:pPr marL="0" indent="0">
-              <a:buNone/>
-            </a:pPr>
-            <a:r>
-              <a:rPr lang="de-DE" dirty="0" err="1"/>
-              <a:t>Epoch</a:t>
-            </a:r>
-            <a:r>
-              <a:rPr lang="de-DE" dirty="0"/>
-              <a:t> 4/10, Loss: 0.3177, </a:t>
-            </a:r>
-            <a:r>
-              <a:rPr lang="de-DE" dirty="0" err="1"/>
-              <a:t>Accuracy</a:t>
-            </a:r>
-            <a:r>
-              <a:rPr lang="de-DE" dirty="0"/>
-              <a:t>: 0.9037</a:t>
-            </a:r>
-          </a:p>
-          <a:p>
-            <a:pPr marL="0" indent="0">
-              <a:buNone/>
-            </a:pPr>
-            <a:r>
-              <a:rPr lang="de-DE" dirty="0" err="1"/>
-              <a:t>Epoch</a:t>
-            </a:r>
-            <a:r>
-              <a:rPr lang="de-DE" dirty="0"/>
-              <a:t> 5/10, Loss: 0.2599, </a:t>
-            </a:r>
-            <a:r>
-              <a:rPr lang="de-DE" dirty="0" err="1"/>
-              <a:t>Accuracy</a:t>
-            </a:r>
-            <a:r>
-              <a:rPr lang="de-DE" dirty="0"/>
-              <a:t>: 0.9241</a:t>
-            </a:r>
-          </a:p>
-          <a:p>
-            <a:pPr marL="0" indent="0">
-              <a:buNone/>
-            </a:pPr>
-            <a:r>
-              <a:rPr lang="de-DE" dirty="0" err="1"/>
-              <a:t>Epoch</a:t>
-            </a:r>
-            <a:r>
-              <a:rPr lang="de-DE" dirty="0"/>
-              <a:t> 6/10, Loss: 0.2318, </a:t>
-            </a:r>
-            <a:r>
-              <a:rPr lang="de-DE" dirty="0" err="1"/>
-              <a:t>Accuracy</a:t>
-            </a:r>
-            <a:r>
-              <a:rPr lang="de-DE" dirty="0"/>
-              <a:t>: 0.9322</a:t>
-            </a:r>
-          </a:p>
-          <a:p>
-            <a:pPr marL="0" indent="0">
-              <a:buNone/>
-            </a:pPr>
-            <a:r>
-              <a:rPr lang="de-DE" dirty="0" err="1"/>
-              <a:t>Epoch</a:t>
-            </a:r>
-            <a:r>
-              <a:rPr lang="de-DE" dirty="0"/>
-              <a:t> 7/10, Loss: 0.2091, </a:t>
-            </a:r>
-            <a:r>
-              <a:rPr lang="de-DE" dirty="0" err="1"/>
-              <a:t>Accuracy</a:t>
-            </a:r>
-            <a:r>
-              <a:rPr lang="de-DE" dirty="0"/>
-              <a:t>: 0.9394</a:t>
-            </a:r>
-          </a:p>
-          <a:p>
-            <a:pPr marL="0" indent="0">
-              <a:buNone/>
-            </a:pPr>
-            <a:r>
-              <a:rPr lang="de-DE" dirty="0" err="1"/>
-              <a:t>Epoch</a:t>
-            </a:r>
-            <a:r>
-              <a:rPr lang="de-DE" dirty="0"/>
-              <a:t> 8/10, Loss: 0.1951, </a:t>
-            </a:r>
-            <a:r>
-              <a:rPr lang="de-DE" dirty="0" err="1"/>
-              <a:t>Accuracy</a:t>
-            </a:r>
-            <a:r>
-              <a:rPr lang="de-DE" dirty="0"/>
-              <a:t>: 0.9430</a:t>
-            </a:r>
-          </a:p>
-          <a:p>
-            <a:pPr marL="0" indent="0">
-              <a:buNone/>
-            </a:pPr>
-            <a:r>
-              <a:rPr lang="de-DE" dirty="0" err="1"/>
-              <a:t>Epoch</a:t>
-            </a:r>
-            <a:r>
-              <a:rPr lang="de-DE" dirty="0"/>
-              <a:t> 9/10, Loss: 0.1852, </a:t>
-            </a:r>
-            <a:r>
-              <a:rPr lang="de-DE" dirty="0" err="1"/>
-              <a:t>Accuracy</a:t>
-            </a:r>
-            <a:r>
-              <a:rPr lang="de-DE" dirty="0"/>
-              <a:t>: 0.9455</a:t>
-            </a:r>
-          </a:p>
-          <a:p>
-            <a:pPr marL="0" indent="0">
-              <a:buNone/>
-            </a:pPr>
-            <a:r>
-              <a:rPr lang="de-DE" dirty="0" err="1"/>
-              <a:t>Epoch</a:t>
-            </a:r>
-            <a:r>
-              <a:rPr lang="de-DE" dirty="0"/>
-              <a:t> 10/10, Loss: 0.1602, </a:t>
-            </a:r>
-            <a:r>
-              <a:rPr lang="de-DE" dirty="0" err="1"/>
-              <a:t>Accuracy</a:t>
-            </a:r>
-            <a:r>
-              <a:rPr lang="de-DE" dirty="0"/>
-              <a:t>: 0.9512</a:t>
-            </a:r>
-          </a:p>
-          <a:p>
-            <a:pPr marL="0" indent="0">
-              <a:buNone/>
-            </a:pPr>
-            <a:r>
-              <a:rPr lang="de-DE" dirty="0"/>
-              <a:t>Final Validation Loss: 0.4258, Final Validation </a:t>
-            </a:r>
-            <a:r>
-              <a:rPr lang="de-DE" dirty="0" err="1"/>
-              <a:t>Accuracy</a:t>
-            </a:r>
-            <a:r>
-              <a:rPr lang="de-DE" dirty="0"/>
-              <a:t>: 0.8773</a:t>
-            </a:r>
-          </a:p>
-        </p:txBody>
-      </p:sp>
-    </p:spTree>
-    <p:extLst>
-      <p:ext uri="{BB962C8B-B14F-4D97-AF65-F5344CB8AC3E}">
-        <p14:creationId xmlns:p14="http://schemas.microsoft.com/office/powerpoint/2010/main" val="558545656"/>
-      </p:ext>
-    </p:extLst>
-  </p:cSld>
-  <p:clrMapOvr>
-    <a:masterClrMapping/>
-  </p:clrMapOvr>
-</p:sld>
-</file>
-
-<file path=ppt/slides/slide26.xml><?xml version="1.0" encoding="utf-8"?>
-<p:sld xmlns:a="http://schemas.openxmlformats.org/drawingml/2006/main" xmlns:r="http://schemas.openxmlformats.org/officeDocument/2006/relationships" xmlns:p="http://schemas.openxmlformats.org/presentationml/2006/main">
-  <p:cSld>
-    <p:spTree>
-      <p:nvGrpSpPr>
-        <p:cNvPr id="1" name=""/>
-        <p:cNvGrpSpPr/>
-        <p:nvPr/>
-      </p:nvGrpSpPr>
-      <p:grpSpPr>
-        <a:xfrm>
-          <a:off x="0" y="0"/>
-          <a:ext cx="0" cy="0"/>
-          <a:chOff x="0" y="0"/>
-          <a:chExt cx="0" cy="0"/>
-        </a:xfrm>
-      </p:grpSpPr>
-      <p:sp>
-        <p:nvSpPr>
           <p:cNvPr id="11" name="Textfeld 10">
             <a:extLst>
               <a:ext uri="{FF2B5EF4-FFF2-40B4-BE49-F238E27FC236}">
@@ -6649,7 +6678,7 @@
 </p:sld>
 </file>
 
-<file path=ppt/slides/slide27.xml><?xml version="1.0" encoding="utf-8"?>
+<file path=ppt/slides/slide26.xml><?xml version="1.0" encoding="utf-8"?>
 <p:sld xmlns:a="http://schemas.openxmlformats.org/drawingml/2006/main" xmlns:r="http://schemas.openxmlformats.org/officeDocument/2006/relationships" xmlns:p="http://schemas.openxmlformats.org/presentationml/2006/main">
   <p:cSld>
     <p:spTree>
@@ -6779,7 +6808,7 @@
 </p:sld>
 </file>
 
-<file path=ppt/slides/slide28.xml><?xml version="1.0" encoding="utf-8"?>
+<file path=ppt/slides/slide27.xml><?xml version="1.0" encoding="utf-8"?>
 <p:sld xmlns:a="http://schemas.openxmlformats.org/drawingml/2006/main" xmlns:r="http://schemas.openxmlformats.org/officeDocument/2006/relationships" xmlns:p="http://schemas.openxmlformats.org/presentationml/2006/main">
   <p:cSld>
     <p:spTree>
@@ -6876,7 +6905,7 @@
 </p:sld>
 </file>
 
-<file path=ppt/slides/slide29.xml><?xml version="1.0" encoding="utf-8"?>
+<file path=ppt/slides/slide28.xml><?xml version="1.0" encoding="utf-8"?>
 <p:sld xmlns:a="http://schemas.openxmlformats.org/drawingml/2006/main" xmlns:r="http://schemas.openxmlformats.org/officeDocument/2006/relationships" xmlns:p="http://schemas.openxmlformats.org/presentationml/2006/main">
   <p:cSld>
     <p:spTree>
@@ -6977,140 +7006,6 @@
 </file>
 
 <file path=ppt/slides/slide3.xml><?xml version="1.0" encoding="utf-8"?>
-<p:sld xmlns:a="http://schemas.openxmlformats.org/drawingml/2006/main" xmlns:r="http://schemas.openxmlformats.org/officeDocument/2006/relationships" xmlns:p="http://schemas.openxmlformats.org/presentationml/2006/main">
-  <p:cSld>
-    <p:spTree>
-      <p:nvGrpSpPr>
-        <p:cNvPr id="1" name=""/>
-        <p:cNvGrpSpPr/>
-        <p:nvPr/>
-      </p:nvGrpSpPr>
-      <p:grpSpPr>
-        <a:xfrm>
-          <a:off x="0" y="0"/>
-          <a:ext cx="0" cy="0"/>
-          <a:chOff x="0" y="0"/>
-          <a:chExt cx="0" cy="0"/>
-        </a:xfrm>
-      </p:grpSpPr>
-      <p:sp>
-        <p:nvSpPr>
-          <p:cNvPr id="2" name="Titel 1">
-            <a:extLst>
-              <a:ext uri="{FF2B5EF4-FFF2-40B4-BE49-F238E27FC236}">
-                <a16:creationId xmlns:a16="http://schemas.microsoft.com/office/drawing/2014/main" id="{FA0E998A-8B92-4AB3-A9A8-1DE5D112DC24}"/>
-              </a:ext>
-            </a:extLst>
-          </p:cNvPr>
-          <p:cNvSpPr>
-            <a:spLocks noGrp="1"/>
-          </p:cNvSpPr>
-          <p:nvPr>
-            <p:ph type="title"/>
-          </p:nvPr>
-        </p:nvSpPr>
-        <p:spPr/>
-        <p:txBody>
-          <a:bodyPr/>
-          <a:lstStyle/>
-          <a:p>
-            <a:r>
-              <a:rPr lang="de-DE" dirty="0" err="1"/>
-              <a:t>Vison</a:t>
-            </a:r>
-            <a:r>
-              <a:rPr lang="de-DE" dirty="0"/>
-              <a:t> Transformer (</a:t>
-            </a:r>
-            <a:r>
-              <a:rPr lang="de-DE" dirty="0" err="1"/>
-              <a:t>without</a:t>
-            </a:r>
-            <a:r>
-              <a:rPr lang="de-DE" dirty="0"/>
-              <a:t> Data </a:t>
-            </a:r>
-            <a:r>
-              <a:rPr lang="de-DE" dirty="0" err="1"/>
-              <a:t>augmentation</a:t>
-            </a:r>
-            <a:r>
-              <a:rPr lang="de-DE" dirty="0"/>
-              <a:t>)(no.1)</a:t>
-            </a:r>
-          </a:p>
-        </p:txBody>
-      </p:sp>
-      <p:sp>
-        <p:nvSpPr>
-          <p:cNvPr id="3" name="Inhaltsplatzhalter 2">
-            <a:extLst>
-              <a:ext uri="{FF2B5EF4-FFF2-40B4-BE49-F238E27FC236}">
-                <a16:creationId xmlns:a16="http://schemas.microsoft.com/office/drawing/2014/main" id="{03FCA3D9-EE93-495D-BB38-42608EA49BF0}"/>
-              </a:ext>
-            </a:extLst>
-          </p:cNvPr>
-          <p:cNvSpPr>
-            <a:spLocks noGrp="1"/>
-          </p:cNvSpPr>
-          <p:nvPr>
-            <p:ph idx="1"/>
-          </p:nvPr>
-        </p:nvSpPr>
-        <p:spPr/>
-        <p:txBody>
-          <a:bodyPr/>
-          <a:lstStyle/>
-          <a:p>
-            <a:r>
-              <a:rPr lang="de-DE" dirty="0" err="1"/>
-              <a:t>Augmentierung</a:t>
-            </a:r>
-            <a:r>
-              <a:rPr lang="de-DE" dirty="0"/>
-              <a:t>: Spiegeln, </a:t>
-            </a:r>
-            <a:r>
-              <a:rPr lang="de-DE" dirty="0" err="1"/>
-              <a:t>Crop</a:t>
-            </a:r>
-            <a:r>
-              <a:rPr lang="de-DE" dirty="0"/>
-              <a:t> </a:t>
-            </a:r>
-            <a:r>
-              <a:rPr lang="de-DE" dirty="0" err="1"/>
-              <a:t>with</a:t>
-            </a:r>
-            <a:r>
-              <a:rPr lang="de-DE" dirty="0"/>
-              <a:t> </a:t>
-            </a:r>
-            <a:r>
-              <a:rPr lang="de-DE" dirty="0" err="1"/>
-              <a:t>padding</a:t>
-            </a:r>
-            <a:r>
-              <a:rPr lang="de-DE" dirty="0"/>
-              <a:t> n = 4</a:t>
-            </a:r>
-          </a:p>
-        </p:txBody>
-      </p:sp>
-    </p:spTree>
-    <p:extLst>
-      <p:ext uri="{BB962C8B-B14F-4D97-AF65-F5344CB8AC3E}">
-        <p14:creationId xmlns:p14="http://schemas.microsoft.com/office/powerpoint/2010/main" val="952229307"/>
-      </p:ext>
-    </p:extLst>
-  </p:cSld>
-  <p:clrMapOvr>
-    <a:masterClrMapping/>
-  </p:clrMapOvr>
-</p:sld>
-</file>
-
-<file path=ppt/slides/slide4.xml><?xml version="1.0" encoding="utf-8"?>
 <p:sld xmlns:a="http://schemas.openxmlformats.org/drawingml/2006/main" xmlns:r="http://schemas.openxmlformats.org/officeDocument/2006/relationships" xmlns:p="http://schemas.openxmlformats.org/presentationml/2006/main">
   <p:cSld>
     <p:spTree>
@@ -7206,7 +7101,7 @@
 </p:sld>
 </file>
 
-<file path=ppt/slides/slide5.xml><?xml version="1.0" encoding="utf-8"?>
+<file path=ppt/slides/slide4.xml><?xml version="1.0" encoding="utf-8"?>
 <p:sld xmlns:a="http://schemas.openxmlformats.org/drawingml/2006/main" xmlns:r="http://schemas.openxmlformats.org/officeDocument/2006/relationships" xmlns:p="http://schemas.openxmlformats.org/presentationml/2006/main">
   <p:cSld>
     <p:spTree>
@@ -7382,7 +7277,7 @@
 </p:sld>
 </file>
 
-<file path=ppt/slides/slide6.xml><?xml version="1.0" encoding="utf-8"?>
+<file path=ppt/slides/slide5.xml><?xml version="1.0" encoding="utf-8"?>
 <p:sld xmlns:a="http://schemas.openxmlformats.org/drawingml/2006/main" xmlns:r="http://schemas.openxmlformats.org/officeDocument/2006/relationships" xmlns:p="http://schemas.openxmlformats.org/presentationml/2006/main">
   <p:cSld>
     <p:spTree>
@@ -7481,7 +7376,7 @@
 </p:sld>
 </file>
 
-<file path=ppt/slides/slide7.xml><?xml version="1.0" encoding="utf-8"?>
+<file path=ppt/slides/slide6.xml><?xml version="1.0" encoding="utf-8"?>
 <p:sld xmlns:a="http://schemas.openxmlformats.org/drawingml/2006/main" xmlns:r="http://schemas.openxmlformats.org/officeDocument/2006/relationships" xmlns:p="http://schemas.openxmlformats.org/presentationml/2006/main">
   <p:cSld>
     <p:spTree>
@@ -7817,7 +7712,7 @@
 </p:sld>
 </file>
 
-<file path=ppt/slides/slide8.xml><?xml version="1.0" encoding="utf-8"?>
+<file path=ppt/slides/slide7.xml><?xml version="1.0" encoding="utf-8"?>
 <p:sld xmlns:a="http://schemas.openxmlformats.org/drawingml/2006/main" xmlns:r="http://schemas.openxmlformats.org/officeDocument/2006/relationships" xmlns:p="http://schemas.openxmlformats.org/presentationml/2006/main">
   <p:cSld>
     <p:spTree>
@@ -8073,7 +7968,7 @@
 </p:sld>
 </file>
 
-<file path=ppt/slides/slide9.xml><?xml version="1.0" encoding="utf-8"?>
+<file path=ppt/slides/slide8.xml><?xml version="1.0" encoding="utf-8"?>
 <p:sld xmlns:a="http://schemas.openxmlformats.org/drawingml/2006/main" xmlns:r="http://schemas.openxmlformats.org/officeDocument/2006/relationships" xmlns:p="http://schemas.openxmlformats.org/presentationml/2006/main">
   <p:cSld>
     <p:spTree>
@@ -8160,6 +8055,156 @@
     <p:extLst>
       <p:ext uri="{BB962C8B-B14F-4D97-AF65-F5344CB8AC3E}">
         <p14:creationId xmlns:p14="http://schemas.microsoft.com/office/powerpoint/2010/main" val="3553548198"/>
+      </p:ext>
+    </p:extLst>
+  </p:cSld>
+  <p:clrMapOvr>
+    <a:masterClrMapping/>
+  </p:clrMapOvr>
+</p:sld>
+</file>
+
+<file path=ppt/slides/slide9.xml><?xml version="1.0" encoding="utf-8"?>
+<p:sld xmlns:a="http://schemas.openxmlformats.org/drawingml/2006/main" xmlns:r="http://schemas.openxmlformats.org/officeDocument/2006/relationships" xmlns:p="http://schemas.openxmlformats.org/presentationml/2006/main">
+  <p:cSld>
+    <p:spTree>
+      <p:nvGrpSpPr>
+        <p:cNvPr id="1" name=""/>
+        <p:cNvGrpSpPr/>
+        <p:nvPr/>
+      </p:nvGrpSpPr>
+      <p:grpSpPr>
+        <a:xfrm>
+          <a:off x="0" y="0"/>
+          <a:ext cx="0" cy="0"/>
+          <a:chOff x="0" y="0"/>
+          <a:chExt cx="0" cy="0"/>
+        </a:xfrm>
+      </p:grpSpPr>
+      <p:sp>
+        <p:nvSpPr>
+          <p:cNvPr id="2" name="Titel 1">
+            <a:extLst>
+              <a:ext uri="{FF2B5EF4-FFF2-40B4-BE49-F238E27FC236}">
+                <a16:creationId xmlns:a16="http://schemas.microsoft.com/office/drawing/2014/main" id="{1F20CAF2-C127-4F0A-B316-19CC56055294}"/>
+              </a:ext>
+            </a:extLst>
+          </p:cNvPr>
+          <p:cNvSpPr>
+            <a:spLocks noGrp="1"/>
+          </p:cNvSpPr>
+          <p:nvPr>
+            <p:ph type="title"/>
+          </p:nvPr>
+        </p:nvSpPr>
+        <p:spPr/>
+        <p:txBody>
+          <a:bodyPr/>
+          <a:lstStyle/>
+          <a:p>
+            <a:r>
+              <a:rPr lang="de-DE" dirty="0"/>
+              <a:t>ResNet50 (no.1) – Labels</a:t>
+            </a:r>
+          </a:p>
+        </p:txBody>
+      </p:sp>
+      <p:sp>
+        <p:nvSpPr>
+          <p:cNvPr id="4" name="Textfeld 3">
+            <a:extLst>
+              <a:ext uri="{FF2B5EF4-FFF2-40B4-BE49-F238E27FC236}">
+                <a16:creationId xmlns:a16="http://schemas.microsoft.com/office/drawing/2014/main" id="{A8C06F69-4BBE-4E8B-9564-6E5737B41EB9}"/>
+              </a:ext>
+            </a:extLst>
+          </p:cNvPr>
+          <p:cNvSpPr txBox="1"/>
+          <p:nvPr/>
+        </p:nvSpPr>
+        <p:spPr>
+          <a:xfrm>
+            <a:off x="326572" y="1517032"/>
+            <a:ext cx="11703131" cy="1938992"/>
+          </a:xfrm>
+          <a:prstGeom prst="rect">
+            <a:avLst/>
+          </a:prstGeom>
+          <a:noFill/>
+        </p:spPr>
+        <p:txBody>
+          <a:bodyPr wrap="square">
+            <a:spAutoFit/>
+          </a:bodyPr>
+          <a:lstStyle/>
+          <a:p>
+            <a:r>
+              <a:rPr lang="de-DE" sz="600" b="1" u="sng" dirty="0"/>
+              <a:t>Labels Testdaten: </a:t>
+            </a:r>
+          </a:p>
+          <a:p>
+            <a:r>
+              <a:rPr lang="de-DE" sz="600" dirty="0"/>
+              <a:t>[1, 7, 16, 21, 3, 22, 0, 25, 17, 19, 8, 4, 25, 2, 0, 16, 10, 9, 20, 21, 24, 18, 16, 15, 23, 8, 13, 1, 19, 3, 4, 10, 3, 17, 9, 8, 25, 24, 0, 20, 18, 21, 14, 3, 14, 16, 12, 9, 0, 2, 20, 14, 4, 25, 12, 13, 22, 0, 7, 11, 13, 22, 12, 19, 6, 18, 22, 5, 11, 14, 23, 3, 14, 22, 1, 25, 10, 12, 9, 24, 22, 3, 8, 25, 21, 11, 13, 5, 3, 23, 14, 6, 7, 21, 15, 4, 13, 10, 25, 20, 19, 19, 16, 1, 2, 11, 5, 5, 24, 25, 15, 20, 18, 20, 9, 6, 5, 20, 21, 7, 6, 7, 0, 17, 12, 11, 15, 2, 18, 6, </a:t>
+            </a:r>
+          </a:p>
+          <a:p>
+            <a:r>
+              <a:rPr lang="de-DE" sz="600" dirty="0"/>
+              <a:t>6, 22, 9, 24, 25, 9, 15, 13, 16, 4, 10, 7, 17, 11, 4, 16, 23, 18, 5, 14, 24, 7, 10, 11, 20, 1, 19, 19, 8, 10, 8, 20, 5, 19, 10, 18, 18, 15, 5, 8, 10, 15, 8, 2, 11, 8, 9, 18, 10, 3, 6, 3, 24, 2, 12, 22, 15, 11, 15, 2, 21, 0, 25, 18, 16, 1, 19, 11, 12, 7, 24, 16, 1, 17, 11, 6, 4, 2, 20, 20, 13, 6, 4, 4, 2, 3, 13, 20, 19, 25, 15, 5, 8, 11, 8, 18, 18, 1, 12, 2, 15, 0, 10, 11, 1, 13, 13, 13, 18, 2, 4, 22, 15, 17, 16, 24, 17, 12, 18, 24, 9, 1, 9, 14, 25, 25, 15, 19, 5, 25, 21, 4, 13, 22, 16, 1, 0, 13, 7, 0, 5, 25, 18, 2, 23, 7, 25, 21, 6, 3, 21, 3, 3, 0, 6, 10, 24, 16, 18, 17, 14, 20, 14, 0, 1, 9, 23, 21, 22, 17, 25, 14, 16, 25, 10, 10, 3, 23, 4, 18, 19, 24, 4, 7, 20, 12, 4, 9, 6, 10, 22, 23, 17, 5, 24, 8, 15, 6, 21, 15, 21, 19, 23, 5, 15, 23, 23, 12, 6, 1, 20, 14, 22, 3, 16, 8, 25, 23, 7, 9, 3, 16, 7, 1, 10, 2, 8, 12, 18, 4, 9, 22, 6, 2, 5, 14, 10, 12, 17, 7, 4, 22, 14, 13, 18, 12, 4, 2, 11, 10, 7, 21, 15, 22, 8, 25, 6, 16, 23, 20, 24, 7, 3, 1, 1, 10, 19, 19, 23, 11, 17, 21, 14, 13, 1, 17, 22, 2, 7, 22, 17, 20, 20, 5, 0, 15, 12, 24, 12, 2, 17, 20, 14, 20, 4, 19, 3, 17, 22, 8, 1, 7, 5, 17, 14, 21, 6, 8, 11, 0, 2, 21, 10, 12, 10, 13, 5, 18, 24, 22, 9, 0, 21, 3, 10, 17, 12, 20, 13, 7, 17, 16, 9, 17, 20, 6, 21, 7, </a:t>
+            </a:r>
+          </a:p>
+          <a:p>
+            <a:r>
+              <a:rPr lang="de-DE" sz="600" dirty="0"/>
+              <a:t>11, 18, 17, 18, 14, 19, 24, 3, 19, 23, 4, 5, 5, 10, 24, 23, 5, 6, 22, 14, 9, 19, 10, 23, 8, 19, 25, 18, 17, 18, 6, 22, 21, 9, 21, 6, 1, 1, 23, 8, 0, 14, 23, 23, 21, 25, 24, 8, 16, 17, 12, 11, 5, 16, 11, 22, 12, 7, 3, 0, 25, 1, 10, 8, 11, 24, 19, 20, 7, 3, 19, 0, 17, 9, 15, 22, 0, 9, 3, 16, 17, 4, 0, 15, 5, 0, 13, 18, 9, 1, 5, 5, 16, 4, 16, 18, 9, 24, 17, 13, 0, 22, 1, 10, 21, 25, 0, 16, 6, 25, 4, 19, 22, 3, 17, 10, 18, 8, 24, 8, 1, 13, 21, 23, 9, 8, 4, 6, 1, 7, 5, 19, 20, 11, 6, 8, 7, </a:t>
+            </a:r>
+          </a:p>
+          <a:p>
+            <a:r>
+              <a:rPr lang="de-DE" sz="600" dirty="0"/>
+              <a:t>4, 14, 12, 24, 6, 1, 2, 14, 0, 25, 19, 12, 15, 20, 9, 23, 22, 15, 0, 9, 2, 0, 15, 15, 24, 15, 1, 15, 11, 14, 13, 19, 12, 22, 14, 12, 16, 18, 7, 20, 17, 3, 0, 9, 14, 3, 14, 15, 7, 1, 14, 12, 13, 23, 5, 11, 21, 8, 24, 2, 13, 21, 2, 2, 16, 22, 25, </a:t>
+            </a:r>
+          </a:p>
+          <a:p>
+            <a:r>
+              <a:rPr lang="de-DE" sz="600" dirty="0"/>
+              <a:t>14, 20, 3, 17, 18, 10, 11, 18, 17, 9, 2, 6, 13, 21, 24, 16, 4, 4, 4, 11, 12, 14, 16, 11, 15, 13, 13, 24, 13, 19, 4, 24, 8, 11, 19, 21, 23, 23, 3, 1, 7, 5, 7, 3, 23, 4, 11, 9, 10, 6, 8, 1, 23, 16, 5, 0, 21, 23, 8, 2, 9, 13, 2, 7, 2, 25, 25, 2, 19, 15, 5, 9, 12, 6, 11, 11, 0, 12, 13, 14, 15, 6, 20, 16, 22, 2, 8, 10, 24, 3, 24, 7, 23, 5, 13, 12, 12, 21, 25, 16, 20, 2, 0, 6, 23, 19, 4, 20]</a:t>
+            </a:r>
+          </a:p>
+          <a:p>
+            <a:endParaRPr lang="de-DE" sz="600" b="1" u="sng" dirty="0"/>
+          </a:p>
+          <a:p>
+            <a:r>
+              <a:rPr lang="de-DE" sz="600" b="1" u="sng" dirty="0"/>
+              <a:t>vorhergesagte Testdaten:</a:t>
+            </a:r>
+          </a:p>
+          <a:p>
+            <a:r>
+              <a:rPr lang="de-DE" sz="600" dirty="0"/>
+              <a:t> [1, 7, 15, 21, 3, 22, 4, 25, 17, 19, 8, 4, 8, 2, 0, 16, 10, 6, 20, 21, 24, 24, 16, 15, 23, 1, 13, 1, 19, 3, 4, 10, 3, 17, 6, 21, 23, 24, 0, 20, 4, 21, 14, 3, 14, 16, 12, 9, 0, 2, 20, 14, 4, 25, 12, 13, 22, 0, 2, 11, 13, </a:t>
+            </a:r>
+          </a:p>
+          <a:p>
+            <a:r>
+              <a:rPr lang="de-DE" sz="600" dirty="0"/>
+              <a:t>22, 12, 19, 7, 4, 22, 21, 11, 14, 4, 3, 14, 22, 1, 20, 10, 12, 9, 24, 22, 3, 21, 25, 21, 11, 13, 5, 8, 23, 14, 2, 7, 22, 15, 4, 13, 10, 2, 17, 19, 19, 16, 1, 2, 11, 5, 5, 11, 25, 15, 20, 23, 20, 16, 2, 5, 20, 21, 7, 6, 7, 0, 11, 12, 11, 15, 2, 4, 6, 7, 21, 25, 24, 21, 6, 15, 4, 16, 4, 10, 7, 17, 11, 4, 16, 18, 12, 5, 14, 24, 7, 10, 11, 17, 10, 19, 0, 6, 10, 8, 20, 22, 19, 10, 18, 18, 15, 5, 8, 10, 15, 25, 2, 11, 8, 9, 0, 10, 3, 6, 3, 24, 2, 12, 22, 15, 24, 15, 2, 21, 12, 25, 2, 16, 1, </a:t>
+            </a:r>
+          </a:p>
+          <a:p>
+            <a:r>
+              <a:rPr lang="de-DE" sz="600" dirty="0"/>
+              <a:t>19, 11, 12, 7, 24, 16, 1, 17, 11, 6, 4, 2, 21, 17, 12, 6, 4, 0, 3, 3, 13, 21, 19, 25, 15, 5, 8, 11, 8, 12, 18, 1, 12, 2, 6, 0, 10, 11, 1, 13, 13, 13, 18, 2, 4, 22, 15, 17, 16, 24, 17, 12, 18, 0, 9, 10, 9, 14, 25, 25, 15, 19, 5, 25, 21, 4, 13, 22, 16, 1, 19, 13, 7, 0, 5, 25, 12, 2, 23, 7, 25, 21, 6, 3, 23, 3, 3, 22, 6, 21, 24, 16, 18, 20, 14, 10, 14, 0, 1, 9, 23, 21, 21, 17, 25, 14, 16, 25, 10, 10, 3, 23, 4, 18, 13, 19, 4, 7, 17, 13, 4, 9, 6, 10, 22, 17, 17, 5, 24, 8, 15, 2, 21, 15, 21, 19, 6, 5, 15, 23, 23, 12, 6, 1, 20, 14, 22, 3, 16, 1, 25, 23, 7, 9, 3, 15, 7, 1, 10, 2, 0, 18, 14, 4, 9, 22, 1, 2, 5, 14, 21, 3, 17, 7, 25, 22, 14, 13, 18, 4, 4, 2, 11, 21, 1, 21, 15, 21, 1, 25, 6, 16, 23, 1, 24, 10, 1, 1, 1, 10, 19, 19, 23, 24, 23, 21, 14, 13, 1, 17, 22, 2, 23, 21, 17, 20, 20, 5, 0, 15, 18, 24, 12, 2, 3, 20, 14, 20, 4, 24, 3, 21, 22, 8, 1, 7, 5, 17, 14, 21, 6, 8, 11, 0, 2, 21, 21, 13, 10, 4, 22, 0, 24, 21, 9, 0, 23, 25, 10, 17, 12, 20, 12, 7, 17, 16, 9, 17, 20, 6, 21, 7, 3, 23, 3, 18, 14, 19, 24, 3, 19, 23, 0, 5, 5, 21, 24, 23, 5, 6, 22, 14, 8, 19, 25, 23, 8, 19, 4, 0, 17, 18, 16, 21, 21, 9, 21, 6, 1, 1, 23, 4, 21, 14, 8, 8, 21, 23, 24, 8, 16, 17, 12, 11, 5, 16, 11, 22, 12, 7, 3, 0, 25, 1, 10, 8, 11, 24, 23, 24, 21, 3, 24, 0, 17, 9, 15, 22, 0, 6, 3, 16, 18, 4, 0, 15, 5, 18, 13, 21, 9, 1, 5, 5, 16, 4, 16, 18, 9, 10, 17, 13, 0, 21, 1, 21, 22, 12, 18, 16, 6, 25, 4, 19, 22, 3, 17, 19, 4, 5, 24, 8, 1, 13, 22, 13, 9, 8, 4, 21, 1, 2, 3, 19, 20, 11, 6, 8, 7, 1, 14, 12, 24, 6, 1, 3, 14, 0, 25, 21, 12, 15, 14, 9, 23, 21, 15, 0, 9, 2, 0, 15, 19, 24, 15, 1, 15, 11, 2, 13, 24, 12, 21, 14, 12, 16, 18, 7, 20, 17, 3, 0, 9, 14, 5, 14, 15, 7, 1, 14, 12, 13, 17, 5, 11, 10, 8, 5, 2, 13, 21, 2, 2, 16, 22, 25, 14, 24, 3, 17, 18, 10, 11, 18, 17, 9, 2, 6, 13, 21, 24, 16, 9, 1, 4, 11, 12, 14, 16, 11, 15, 13, 13, 24, 13, 19, 4, 24, 5, 11, 19, 21, 23, 23, 3, 1, 7, 5, 7, 3, 23, 4, 11, 9, 10, 6, 8, 1, 19, 13, 1, 1, 21, 23, 8, 2, 2, 13, 2, 0, 2, 25, 25, 15, 21, 15, 5, 9, 12, 6, 11, 11, 0, 12, 13, 14, 15, 7, 20, 7, 22, 2, 8, 10, 24, 3, 24, 7, 17, 5, 13, 12, 12, 21, 25, 16, 20, 2, 0, 6, 23, 19, 4, 0]</a:t>
+            </a:r>
+          </a:p>
+        </p:txBody>
+      </p:sp>
+    </p:spTree>
+    <p:extLst>
+      <p:ext uri="{BB962C8B-B14F-4D97-AF65-F5344CB8AC3E}">
+        <p14:creationId xmlns:p14="http://schemas.microsoft.com/office/powerpoint/2010/main" val="2088907051"/>
       </p:ext>
     </p:extLst>
   </p:cSld>

</xml_diff>

<commit_message>
Changes in main and webcam images
</commit_message>
<xml_diff>
--- a/Präsentation1 (3).pptx
+++ b/Präsentation1 (3).pptx
@@ -287,7 +287,7 @@
           <a:p>
             <a:fld id="{1966D34C-B499-4F71-9036-7E9E71527025}" type="datetimeFigureOut">
               <a:rPr lang="de-DE" smtClean="0"/>
-              <a:t>17.12.2024</a:t>
+              <a:t>18.12.2024</a:t>
             </a:fld>
             <a:endParaRPr lang="de-DE"/>
           </a:p>
@@ -485,7 +485,7 @@
           <a:p>
             <a:fld id="{1966D34C-B499-4F71-9036-7E9E71527025}" type="datetimeFigureOut">
               <a:rPr lang="de-DE" smtClean="0"/>
-              <a:t>17.12.2024</a:t>
+              <a:t>18.12.2024</a:t>
             </a:fld>
             <a:endParaRPr lang="de-DE"/>
           </a:p>
@@ -693,7 +693,7 @@
           <a:p>
             <a:fld id="{1966D34C-B499-4F71-9036-7E9E71527025}" type="datetimeFigureOut">
               <a:rPr lang="de-DE" smtClean="0"/>
-              <a:t>17.12.2024</a:t>
+              <a:t>18.12.2024</a:t>
             </a:fld>
             <a:endParaRPr lang="de-DE"/>
           </a:p>
@@ -891,7 +891,7 @@
           <a:p>
             <a:fld id="{1966D34C-B499-4F71-9036-7E9E71527025}" type="datetimeFigureOut">
               <a:rPr lang="de-DE" smtClean="0"/>
-              <a:t>17.12.2024</a:t>
+              <a:t>18.12.2024</a:t>
             </a:fld>
             <a:endParaRPr lang="de-DE"/>
           </a:p>
@@ -1166,7 +1166,7 @@
           <a:p>
             <a:fld id="{1966D34C-B499-4F71-9036-7E9E71527025}" type="datetimeFigureOut">
               <a:rPr lang="de-DE" smtClean="0"/>
-              <a:t>17.12.2024</a:t>
+              <a:t>18.12.2024</a:t>
             </a:fld>
             <a:endParaRPr lang="de-DE"/>
           </a:p>
@@ -1431,7 +1431,7 @@
           <a:p>
             <a:fld id="{1966D34C-B499-4F71-9036-7E9E71527025}" type="datetimeFigureOut">
               <a:rPr lang="de-DE" smtClean="0"/>
-              <a:t>17.12.2024</a:t>
+              <a:t>18.12.2024</a:t>
             </a:fld>
             <a:endParaRPr lang="de-DE"/>
           </a:p>
@@ -1843,7 +1843,7 @@
           <a:p>
             <a:fld id="{1966D34C-B499-4F71-9036-7E9E71527025}" type="datetimeFigureOut">
               <a:rPr lang="de-DE" smtClean="0"/>
-              <a:t>17.12.2024</a:t>
+              <a:t>18.12.2024</a:t>
             </a:fld>
             <a:endParaRPr lang="de-DE"/>
           </a:p>
@@ -1984,7 +1984,7 @@
           <a:p>
             <a:fld id="{1966D34C-B499-4F71-9036-7E9E71527025}" type="datetimeFigureOut">
               <a:rPr lang="de-DE" smtClean="0"/>
-              <a:t>17.12.2024</a:t>
+              <a:t>18.12.2024</a:t>
             </a:fld>
             <a:endParaRPr lang="de-DE"/>
           </a:p>
@@ -2097,7 +2097,7 @@
           <a:p>
             <a:fld id="{1966D34C-B499-4F71-9036-7E9E71527025}" type="datetimeFigureOut">
               <a:rPr lang="de-DE" smtClean="0"/>
-              <a:t>17.12.2024</a:t>
+              <a:t>18.12.2024</a:t>
             </a:fld>
             <a:endParaRPr lang="de-DE"/>
           </a:p>
@@ -2408,7 +2408,7 @@
           <a:p>
             <a:fld id="{1966D34C-B499-4F71-9036-7E9E71527025}" type="datetimeFigureOut">
               <a:rPr lang="de-DE" smtClean="0"/>
-              <a:t>17.12.2024</a:t>
+              <a:t>18.12.2024</a:t>
             </a:fld>
             <a:endParaRPr lang="de-DE"/>
           </a:p>
@@ -2696,7 +2696,7 @@
           <a:p>
             <a:fld id="{1966D34C-B499-4F71-9036-7E9E71527025}" type="datetimeFigureOut">
               <a:rPr lang="de-DE" smtClean="0"/>
-              <a:t>17.12.2024</a:t>
+              <a:t>18.12.2024</a:t>
             </a:fld>
             <a:endParaRPr lang="de-DE"/>
           </a:p>
@@ -2937,7 +2937,7 @@
           <a:p>
             <a:fld id="{1966D34C-B499-4F71-9036-7E9E71527025}" type="datetimeFigureOut">
               <a:rPr lang="de-DE" smtClean="0"/>
-              <a:t>17.12.2024</a:t>
+              <a:t>18.12.2024</a:t>
             </a:fld>
             <a:endParaRPr lang="de-DE"/>
           </a:p>

</xml_diff>

<commit_message>
New dataset with more images per class
</commit_message>
<xml_diff>
--- a/Präsentation1 (3).pptx
+++ b/Präsentation1 (3).pptx
@@ -38,6 +38,7 @@
     <p:sldId id="290" r:id="rId32"/>
     <p:sldId id="288" r:id="rId33"/>
     <p:sldId id="289" r:id="rId34"/>
+    <p:sldId id="291" r:id="rId35"/>
   </p:sldIdLst>
   <p:sldSz cx="12192000" cy="6858000"/>
   <p:notesSz cx="6858000" cy="9144000"/>
@@ -166,7 +167,7 @@
           <p:cNvPr id="2" name="Titel 1">
             <a:extLst>
               <a:ext uri="{FF2B5EF4-FFF2-40B4-BE49-F238E27FC236}">
-                <a16:creationId xmlns:a16="http://schemas.microsoft.com/office/drawing/2014/main" id="{942B8611-3801-48D0-8431-394DEEB11423}"/>
+                <a16:creationId xmlns:a16="http://schemas.microsoft.com/office/drawing/2014/main" xmlns="" id="{942B8611-3801-48D0-8431-394DEEB11423}"/>
               </a:ext>
             </a:extLst>
           </p:cNvPr>
@@ -203,7 +204,7 @@
           <p:cNvPr id="3" name="Untertitel 2">
             <a:extLst>
               <a:ext uri="{FF2B5EF4-FFF2-40B4-BE49-F238E27FC236}">
-                <a16:creationId xmlns:a16="http://schemas.microsoft.com/office/drawing/2014/main" id="{C9350902-D38C-4216-B4AC-6571FF72811F}"/>
+                <a16:creationId xmlns:a16="http://schemas.microsoft.com/office/drawing/2014/main" xmlns="" id="{C9350902-D38C-4216-B4AC-6571FF72811F}"/>
               </a:ext>
             </a:extLst>
           </p:cNvPr>
@@ -273,7 +274,7 @@
           <p:cNvPr id="4" name="Datumsplatzhalter 3">
             <a:extLst>
               <a:ext uri="{FF2B5EF4-FFF2-40B4-BE49-F238E27FC236}">
-                <a16:creationId xmlns:a16="http://schemas.microsoft.com/office/drawing/2014/main" id="{89187501-D588-43D4-AC39-353DB100B20E}"/>
+                <a16:creationId xmlns:a16="http://schemas.microsoft.com/office/drawing/2014/main" xmlns="" id="{89187501-D588-43D4-AC39-353DB100B20E}"/>
               </a:ext>
             </a:extLst>
           </p:cNvPr>
@@ -291,7 +292,7 @@
           <a:p>
             <a:fld id="{1966D34C-B499-4F71-9036-7E9E71527025}" type="datetimeFigureOut">
               <a:rPr lang="de-DE" smtClean="0"/>
-              <a:t>19.12.2024</a:t>
+              <a:t>29.12.2024</a:t>
             </a:fld>
             <a:endParaRPr lang="de-DE"/>
           </a:p>
@@ -302,7 +303,7 @@
           <p:cNvPr id="5" name="Fußzeilenplatzhalter 4">
             <a:extLst>
               <a:ext uri="{FF2B5EF4-FFF2-40B4-BE49-F238E27FC236}">
-                <a16:creationId xmlns:a16="http://schemas.microsoft.com/office/drawing/2014/main" id="{8EF81E42-93F7-4610-A201-0CCDEFEEBD22}"/>
+                <a16:creationId xmlns:a16="http://schemas.microsoft.com/office/drawing/2014/main" xmlns="" id="{8EF81E42-93F7-4610-A201-0CCDEFEEBD22}"/>
               </a:ext>
             </a:extLst>
           </p:cNvPr>
@@ -327,7 +328,7 @@
           <p:cNvPr id="6" name="Foliennummernplatzhalter 5">
             <a:extLst>
               <a:ext uri="{FF2B5EF4-FFF2-40B4-BE49-F238E27FC236}">
-                <a16:creationId xmlns:a16="http://schemas.microsoft.com/office/drawing/2014/main" id="{0658F116-05D5-44DC-A432-C3ED68337AF8}"/>
+                <a16:creationId xmlns:a16="http://schemas.microsoft.com/office/drawing/2014/main" xmlns="" id="{0658F116-05D5-44DC-A432-C3ED68337AF8}"/>
               </a:ext>
             </a:extLst>
           </p:cNvPr>
@@ -386,7 +387,7 @@
           <p:cNvPr id="2" name="Titel 1">
             <a:extLst>
               <a:ext uri="{FF2B5EF4-FFF2-40B4-BE49-F238E27FC236}">
-                <a16:creationId xmlns:a16="http://schemas.microsoft.com/office/drawing/2014/main" id="{E8A760C8-6FE6-4598-9D23-857B7CF91C4F}"/>
+                <a16:creationId xmlns:a16="http://schemas.microsoft.com/office/drawing/2014/main" xmlns="" id="{E8A760C8-6FE6-4598-9D23-857B7CF91C4F}"/>
               </a:ext>
             </a:extLst>
           </p:cNvPr>
@@ -414,7 +415,7 @@
           <p:cNvPr id="3" name="Vertikaler Textplatzhalter 2">
             <a:extLst>
               <a:ext uri="{FF2B5EF4-FFF2-40B4-BE49-F238E27FC236}">
-                <a16:creationId xmlns:a16="http://schemas.microsoft.com/office/drawing/2014/main" id="{6C00B4A6-C515-41F4-8A81-E4E893E725E2}"/>
+                <a16:creationId xmlns:a16="http://schemas.microsoft.com/office/drawing/2014/main" xmlns="" id="{6C00B4A6-C515-41F4-8A81-E4E893E725E2}"/>
               </a:ext>
             </a:extLst>
           </p:cNvPr>
@@ -471,7 +472,7 @@
           <p:cNvPr id="4" name="Datumsplatzhalter 3">
             <a:extLst>
               <a:ext uri="{FF2B5EF4-FFF2-40B4-BE49-F238E27FC236}">
-                <a16:creationId xmlns:a16="http://schemas.microsoft.com/office/drawing/2014/main" id="{98E82CBA-353B-4651-BE7E-C2A9A81748C0}"/>
+                <a16:creationId xmlns:a16="http://schemas.microsoft.com/office/drawing/2014/main" xmlns="" id="{98E82CBA-353B-4651-BE7E-C2A9A81748C0}"/>
               </a:ext>
             </a:extLst>
           </p:cNvPr>
@@ -489,7 +490,7 @@
           <a:p>
             <a:fld id="{1966D34C-B499-4F71-9036-7E9E71527025}" type="datetimeFigureOut">
               <a:rPr lang="de-DE" smtClean="0"/>
-              <a:t>19.12.2024</a:t>
+              <a:t>29.12.2024</a:t>
             </a:fld>
             <a:endParaRPr lang="de-DE"/>
           </a:p>
@@ -500,7 +501,7 @@
           <p:cNvPr id="5" name="Fußzeilenplatzhalter 4">
             <a:extLst>
               <a:ext uri="{FF2B5EF4-FFF2-40B4-BE49-F238E27FC236}">
-                <a16:creationId xmlns:a16="http://schemas.microsoft.com/office/drawing/2014/main" id="{6F0CEA61-B0FB-4D32-838E-422543E0C2E6}"/>
+                <a16:creationId xmlns:a16="http://schemas.microsoft.com/office/drawing/2014/main" xmlns="" id="{6F0CEA61-B0FB-4D32-838E-422543E0C2E6}"/>
               </a:ext>
             </a:extLst>
           </p:cNvPr>
@@ -525,7 +526,7 @@
           <p:cNvPr id="6" name="Foliennummernplatzhalter 5">
             <a:extLst>
               <a:ext uri="{FF2B5EF4-FFF2-40B4-BE49-F238E27FC236}">
-                <a16:creationId xmlns:a16="http://schemas.microsoft.com/office/drawing/2014/main" id="{E31E0085-9A30-42AB-9591-34DEAF2C6F30}"/>
+                <a16:creationId xmlns:a16="http://schemas.microsoft.com/office/drawing/2014/main" xmlns="" id="{E31E0085-9A30-42AB-9591-34DEAF2C6F30}"/>
               </a:ext>
             </a:extLst>
           </p:cNvPr>
@@ -584,7 +585,7 @@
           <p:cNvPr id="2" name="Vertikaler Titel 1">
             <a:extLst>
               <a:ext uri="{FF2B5EF4-FFF2-40B4-BE49-F238E27FC236}">
-                <a16:creationId xmlns:a16="http://schemas.microsoft.com/office/drawing/2014/main" id="{1CB43BBC-F05C-4A18-AEA0-761CC37DE783}"/>
+                <a16:creationId xmlns:a16="http://schemas.microsoft.com/office/drawing/2014/main" xmlns="" id="{1CB43BBC-F05C-4A18-AEA0-761CC37DE783}"/>
               </a:ext>
             </a:extLst>
           </p:cNvPr>
@@ -617,7 +618,7 @@
           <p:cNvPr id="3" name="Vertikaler Textplatzhalter 2">
             <a:extLst>
               <a:ext uri="{FF2B5EF4-FFF2-40B4-BE49-F238E27FC236}">
-                <a16:creationId xmlns:a16="http://schemas.microsoft.com/office/drawing/2014/main" id="{802C4948-4338-44E8-9C16-50BD9F30756B}"/>
+                <a16:creationId xmlns:a16="http://schemas.microsoft.com/office/drawing/2014/main" xmlns="" id="{802C4948-4338-44E8-9C16-50BD9F30756B}"/>
               </a:ext>
             </a:extLst>
           </p:cNvPr>
@@ -679,7 +680,7 @@
           <p:cNvPr id="4" name="Datumsplatzhalter 3">
             <a:extLst>
               <a:ext uri="{FF2B5EF4-FFF2-40B4-BE49-F238E27FC236}">
-                <a16:creationId xmlns:a16="http://schemas.microsoft.com/office/drawing/2014/main" id="{768D878E-1E0D-4E5E-A72C-EE1D97CCA363}"/>
+                <a16:creationId xmlns:a16="http://schemas.microsoft.com/office/drawing/2014/main" xmlns="" id="{768D878E-1E0D-4E5E-A72C-EE1D97CCA363}"/>
               </a:ext>
             </a:extLst>
           </p:cNvPr>
@@ -697,7 +698,7 @@
           <a:p>
             <a:fld id="{1966D34C-B499-4F71-9036-7E9E71527025}" type="datetimeFigureOut">
               <a:rPr lang="de-DE" smtClean="0"/>
-              <a:t>19.12.2024</a:t>
+              <a:t>29.12.2024</a:t>
             </a:fld>
             <a:endParaRPr lang="de-DE"/>
           </a:p>
@@ -708,7 +709,7 @@
           <p:cNvPr id="5" name="Fußzeilenplatzhalter 4">
             <a:extLst>
               <a:ext uri="{FF2B5EF4-FFF2-40B4-BE49-F238E27FC236}">
-                <a16:creationId xmlns:a16="http://schemas.microsoft.com/office/drawing/2014/main" id="{5951442F-09E0-472E-813A-9401C4EF374E}"/>
+                <a16:creationId xmlns:a16="http://schemas.microsoft.com/office/drawing/2014/main" xmlns="" id="{5951442F-09E0-472E-813A-9401C4EF374E}"/>
               </a:ext>
             </a:extLst>
           </p:cNvPr>
@@ -733,7 +734,7 @@
           <p:cNvPr id="6" name="Foliennummernplatzhalter 5">
             <a:extLst>
               <a:ext uri="{FF2B5EF4-FFF2-40B4-BE49-F238E27FC236}">
-                <a16:creationId xmlns:a16="http://schemas.microsoft.com/office/drawing/2014/main" id="{3A89B36C-AFD0-4FA3-A271-4599F5EAD210}"/>
+                <a16:creationId xmlns:a16="http://schemas.microsoft.com/office/drawing/2014/main" xmlns="" id="{3A89B36C-AFD0-4FA3-A271-4599F5EAD210}"/>
               </a:ext>
             </a:extLst>
           </p:cNvPr>
@@ -792,7 +793,7 @@
           <p:cNvPr id="2" name="Titel 1">
             <a:extLst>
               <a:ext uri="{FF2B5EF4-FFF2-40B4-BE49-F238E27FC236}">
-                <a16:creationId xmlns:a16="http://schemas.microsoft.com/office/drawing/2014/main" id="{7A9100B0-C2F4-48F4-A376-F4BE369A2847}"/>
+                <a16:creationId xmlns:a16="http://schemas.microsoft.com/office/drawing/2014/main" xmlns="" id="{7A9100B0-C2F4-48F4-A376-F4BE369A2847}"/>
               </a:ext>
             </a:extLst>
           </p:cNvPr>
@@ -820,7 +821,7 @@
           <p:cNvPr id="3" name="Inhaltsplatzhalter 2">
             <a:extLst>
               <a:ext uri="{FF2B5EF4-FFF2-40B4-BE49-F238E27FC236}">
-                <a16:creationId xmlns:a16="http://schemas.microsoft.com/office/drawing/2014/main" id="{68E6F6CB-88AB-4507-8412-28160033ADE1}"/>
+                <a16:creationId xmlns:a16="http://schemas.microsoft.com/office/drawing/2014/main" xmlns="" id="{68E6F6CB-88AB-4507-8412-28160033ADE1}"/>
               </a:ext>
             </a:extLst>
           </p:cNvPr>
@@ -877,7 +878,7 @@
           <p:cNvPr id="4" name="Datumsplatzhalter 3">
             <a:extLst>
               <a:ext uri="{FF2B5EF4-FFF2-40B4-BE49-F238E27FC236}">
-                <a16:creationId xmlns:a16="http://schemas.microsoft.com/office/drawing/2014/main" id="{CC6E9D85-1773-4CC1-AE55-C562FE227D1E}"/>
+                <a16:creationId xmlns:a16="http://schemas.microsoft.com/office/drawing/2014/main" xmlns="" id="{CC6E9D85-1773-4CC1-AE55-C562FE227D1E}"/>
               </a:ext>
             </a:extLst>
           </p:cNvPr>
@@ -895,7 +896,7 @@
           <a:p>
             <a:fld id="{1966D34C-B499-4F71-9036-7E9E71527025}" type="datetimeFigureOut">
               <a:rPr lang="de-DE" smtClean="0"/>
-              <a:t>19.12.2024</a:t>
+              <a:t>29.12.2024</a:t>
             </a:fld>
             <a:endParaRPr lang="de-DE"/>
           </a:p>
@@ -906,7 +907,7 @@
           <p:cNvPr id="5" name="Fußzeilenplatzhalter 4">
             <a:extLst>
               <a:ext uri="{FF2B5EF4-FFF2-40B4-BE49-F238E27FC236}">
-                <a16:creationId xmlns:a16="http://schemas.microsoft.com/office/drawing/2014/main" id="{BE553531-079B-4CCE-8F15-D985D12DC6E1}"/>
+                <a16:creationId xmlns:a16="http://schemas.microsoft.com/office/drawing/2014/main" xmlns="" id="{BE553531-079B-4CCE-8F15-D985D12DC6E1}"/>
               </a:ext>
             </a:extLst>
           </p:cNvPr>
@@ -931,7 +932,7 @@
           <p:cNvPr id="6" name="Foliennummernplatzhalter 5">
             <a:extLst>
               <a:ext uri="{FF2B5EF4-FFF2-40B4-BE49-F238E27FC236}">
-                <a16:creationId xmlns:a16="http://schemas.microsoft.com/office/drawing/2014/main" id="{ED376F7B-1D08-41C8-991F-7ED6097A59BD}"/>
+                <a16:creationId xmlns:a16="http://schemas.microsoft.com/office/drawing/2014/main" xmlns="" id="{ED376F7B-1D08-41C8-991F-7ED6097A59BD}"/>
               </a:ext>
             </a:extLst>
           </p:cNvPr>
@@ -990,7 +991,7 @@
           <p:cNvPr id="2" name="Titel 1">
             <a:extLst>
               <a:ext uri="{FF2B5EF4-FFF2-40B4-BE49-F238E27FC236}">
-                <a16:creationId xmlns:a16="http://schemas.microsoft.com/office/drawing/2014/main" id="{A0A9801A-278B-494B-B60C-BB2133B32995}"/>
+                <a16:creationId xmlns:a16="http://schemas.microsoft.com/office/drawing/2014/main" xmlns="" id="{A0A9801A-278B-494B-B60C-BB2133B32995}"/>
               </a:ext>
             </a:extLst>
           </p:cNvPr>
@@ -1027,7 +1028,7 @@
           <p:cNvPr id="3" name="Textplatzhalter 2">
             <a:extLst>
               <a:ext uri="{FF2B5EF4-FFF2-40B4-BE49-F238E27FC236}">
-                <a16:creationId xmlns:a16="http://schemas.microsoft.com/office/drawing/2014/main" id="{9717471E-0AB4-4009-9D2A-5D6863302B16}"/>
+                <a16:creationId xmlns:a16="http://schemas.microsoft.com/office/drawing/2014/main" xmlns="" id="{9717471E-0AB4-4009-9D2A-5D6863302B16}"/>
               </a:ext>
             </a:extLst>
           </p:cNvPr>
@@ -1152,7 +1153,7 @@
           <p:cNvPr id="4" name="Datumsplatzhalter 3">
             <a:extLst>
               <a:ext uri="{FF2B5EF4-FFF2-40B4-BE49-F238E27FC236}">
-                <a16:creationId xmlns:a16="http://schemas.microsoft.com/office/drawing/2014/main" id="{7C463F00-B142-4A4A-98EB-4F33172601CC}"/>
+                <a16:creationId xmlns:a16="http://schemas.microsoft.com/office/drawing/2014/main" xmlns="" id="{7C463F00-B142-4A4A-98EB-4F33172601CC}"/>
               </a:ext>
             </a:extLst>
           </p:cNvPr>
@@ -1170,7 +1171,7 @@
           <a:p>
             <a:fld id="{1966D34C-B499-4F71-9036-7E9E71527025}" type="datetimeFigureOut">
               <a:rPr lang="de-DE" smtClean="0"/>
-              <a:t>19.12.2024</a:t>
+              <a:t>29.12.2024</a:t>
             </a:fld>
             <a:endParaRPr lang="de-DE"/>
           </a:p>
@@ -1181,7 +1182,7 @@
           <p:cNvPr id="5" name="Fußzeilenplatzhalter 4">
             <a:extLst>
               <a:ext uri="{FF2B5EF4-FFF2-40B4-BE49-F238E27FC236}">
-                <a16:creationId xmlns:a16="http://schemas.microsoft.com/office/drawing/2014/main" id="{7D88A73C-AAE8-4C17-82DF-B76FC58AE174}"/>
+                <a16:creationId xmlns:a16="http://schemas.microsoft.com/office/drawing/2014/main" xmlns="" id="{7D88A73C-AAE8-4C17-82DF-B76FC58AE174}"/>
               </a:ext>
             </a:extLst>
           </p:cNvPr>
@@ -1206,7 +1207,7 @@
           <p:cNvPr id="6" name="Foliennummernplatzhalter 5">
             <a:extLst>
               <a:ext uri="{FF2B5EF4-FFF2-40B4-BE49-F238E27FC236}">
-                <a16:creationId xmlns:a16="http://schemas.microsoft.com/office/drawing/2014/main" id="{10401940-5BF1-460F-89AA-8DCCE2F778EF}"/>
+                <a16:creationId xmlns:a16="http://schemas.microsoft.com/office/drawing/2014/main" xmlns="" id="{10401940-5BF1-460F-89AA-8DCCE2F778EF}"/>
               </a:ext>
             </a:extLst>
           </p:cNvPr>
@@ -1265,7 +1266,7 @@
           <p:cNvPr id="2" name="Titel 1">
             <a:extLst>
               <a:ext uri="{FF2B5EF4-FFF2-40B4-BE49-F238E27FC236}">
-                <a16:creationId xmlns:a16="http://schemas.microsoft.com/office/drawing/2014/main" id="{33BE81C7-9434-488E-A7D1-2311872FBB2D}"/>
+                <a16:creationId xmlns:a16="http://schemas.microsoft.com/office/drawing/2014/main" xmlns="" id="{33BE81C7-9434-488E-A7D1-2311872FBB2D}"/>
               </a:ext>
             </a:extLst>
           </p:cNvPr>
@@ -1293,7 +1294,7 @@
           <p:cNvPr id="3" name="Inhaltsplatzhalter 2">
             <a:extLst>
               <a:ext uri="{FF2B5EF4-FFF2-40B4-BE49-F238E27FC236}">
-                <a16:creationId xmlns:a16="http://schemas.microsoft.com/office/drawing/2014/main" id="{F202816A-E434-48B5-9142-EFE88BCADA73}"/>
+                <a16:creationId xmlns:a16="http://schemas.microsoft.com/office/drawing/2014/main" xmlns="" id="{F202816A-E434-48B5-9142-EFE88BCADA73}"/>
               </a:ext>
             </a:extLst>
           </p:cNvPr>
@@ -1355,7 +1356,7 @@
           <p:cNvPr id="4" name="Inhaltsplatzhalter 3">
             <a:extLst>
               <a:ext uri="{FF2B5EF4-FFF2-40B4-BE49-F238E27FC236}">
-                <a16:creationId xmlns:a16="http://schemas.microsoft.com/office/drawing/2014/main" id="{65EBCF17-28DF-49E5-8ED4-CDB30DCF881D}"/>
+                <a16:creationId xmlns:a16="http://schemas.microsoft.com/office/drawing/2014/main" xmlns="" id="{65EBCF17-28DF-49E5-8ED4-CDB30DCF881D}"/>
               </a:ext>
             </a:extLst>
           </p:cNvPr>
@@ -1417,7 +1418,7 @@
           <p:cNvPr id="5" name="Datumsplatzhalter 4">
             <a:extLst>
               <a:ext uri="{FF2B5EF4-FFF2-40B4-BE49-F238E27FC236}">
-                <a16:creationId xmlns:a16="http://schemas.microsoft.com/office/drawing/2014/main" id="{B2EDD2D6-67BC-460E-8CDF-8FDF75CFACB6}"/>
+                <a16:creationId xmlns:a16="http://schemas.microsoft.com/office/drawing/2014/main" xmlns="" id="{B2EDD2D6-67BC-460E-8CDF-8FDF75CFACB6}"/>
               </a:ext>
             </a:extLst>
           </p:cNvPr>
@@ -1435,7 +1436,7 @@
           <a:p>
             <a:fld id="{1966D34C-B499-4F71-9036-7E9E71527025}" type="datetimeFigureOut">
               <a:rPr lang="de-DE" smtClean="0"/>
-              <a:t>19.12.2024</a:t>
+              <a:t>29.12.2024</a:t>
             </a:fld>
             <a:endParaRPr lang="de-DE"/>
           </a:p>
@@ -1446,7 +1447,7 @@
           <p:cNvPr id="6" name="Fußzeilenplatzhalter 5">
             <a:extLst>
               <a:ext uri="{FF2B5EF4-FFF2-40B4-BE49-F238E27FC236}">
-                <a16:creationId xmlns:a16="http://schemas.microsoft.com/office/drawing/2014/main" id="{90D8E9BF-79AC-4CD3-9A68-7B51E256D8B2}"/>
+                <a16:creationId xmlns:a16="http://schemas.microsoft.com/office/drawing/2014/main" xmlns="" id="{90D8E9BF-79AC-4CD3-9A68-7B51E256D8B2}"/>
               </a:ext>
             </a:extLst>
           </p:cNvPr>
@@ -1471,7 +1472,7 @@
           <p:cNvPr id="7" name="Foliennummernplatzhalter 6">
             <a:extLst>
               <a:ext uri="{FF2B5EF4-FFF2-40B4-BE49-F238E27FC236}">
-                <a16:creationId xmlns:a16="http://schemas.microsoft.com/office/drawing/2014/main" id="{485B7F93-2931-4531-B9E8-58D231D358A8}"/>
+                <a16:creationId xmlns:a16="http://schemas.microsoft.com/office/drawing/2014/main" xmlns="" id="{485B7F93-2931-4531-B9E8-58D231D358A8}"/>
               </a:ext>
             </a:extLst>
           </p:cNvPr>
@@ -1530,7 +1531,7 @@
           <p:cNvPr id="2" name="Titel 1">
             <a:extLst>
               <a:ext uri="{FF2B5EF4-FFF2-40B4-BE49-F238E27FC236}">
-                <a16:creationId xmlns:a16="http://schemas.microsoft.com/office/drawing/2014/main" id="{3D46B07A-A2D7-4D73-979A-D2413AD00737}"/>
+                <a16:creationId xmlns:a16="http://schemas.microsoft.com/office/drawing/2014/main" xmlns="" id="{3D46B07A-A2D7-4D73-979A-D2413AD00737}"/>
               </a:ext>
             </a:extLst>
           </p:cNvPr>
@@ -1563,7 +1564,7 @@
           <p:cNvPr id="3" name="Textplatzhalter 2">
             <a:extLst>
               <a:ext uri="{FF2B5EF4-FFF2-40B4-BE49-F238E27FC236}">
-                <a16:creationId xmlns:a16="http://schemas.microsoft.com/office/drawing/2014/main" id="{FCA61B03-9C49-495C-81DE-2FFDEE8F682A}"/>
+                <a16:creationId xmlns:a16="http://schemas.microsoft.com/office/drawing/2014/main" xmlns="" id="{FCA61B03-9C49-495C-81DE-2FFDEE8F682A}"/>
               </a:ext>
             </a:extLst>
           </p:cNvPr>
@@ -1634,7 +1635,7 @@
           <p:cNvPr id="4" name="Inhaltsplatzhalter 3">
             <a:extLst>
               <a:ext uri="{FF2B5EF4-FFF2-40B4-BE49-F238E27FC236}">
-                <a16:creationId xmlns:a16="http://schemas.microsoft.com/office/drawing/2014/main" id="{DBCA1775-97C7-46B3-BD29-07B554A4A9A6}"/>
+                <a16:creationId xmlns:a16="http://schemas.microsoft.com/office/drawing/2014/main" xmlns="" id="{DBCA1775-97C7-46B3-BD29-07B554A4A9A6}"/>
               </a:ext>
             </a:extLst>
           </p:cNvPr>
@@ -1696,7 +1697,7 @@
           <p:cNvPr id="5" name="Textplatzhalter 4">
             <a:extLst>
               <a:ext uri="{FF2B5EF4-FFF2-40B4-BE49-F238E27FC236}">
-                <a16:creationId xmlns:a16="http://schemas.microsoft.com/office/drawing/2014/main" id="{B7D1F09A-4B99-440A-9B38-58AC2C7E1DB8}"/>
+                <a16:creationId xmlns:a16="http://schemas.microsoft.com/office/drawing/2014/main" xmlns="" id="{B7D1F09A-4B99-440A-9B38-58AC2C7E1DB8}"/>
               </a:ext>
             </a:extLst>
           </p:cNvPr>
@@ -1767,7 +1768,7 @@
           <p:cNvPr id="6" name="Inhaltsplatzhalter 5">
             <a:extLst>
               <a:ext uri="{FF2B5EF4-FFF2-40B4-BE49-F238E27FC236}">
-                <a16:creationId xmlns:a16="http://schemas.microsoft.com/office/drawing/2014/main" id="{48DC35C7-616B-4ED5-8FE0-49BFB8433A13}"/>
+                <a16:creationId xmlns:a16="http://schemas.microsoft.com/office/drawing/2014/main" xmlns="" id="{48DC35C7-616B-4ED5-8FE0-49BFB8433A13}"/>
               </a:ext>
             </a:extLst>
           </p:cNvPr>
@@ -1829,7 +1830,7 @@
           <p:cNvPr id="7" name="Datumsplatzhalter 6">
             <a:extLst>
               <a:ext uri="{FF2B5EF4-FFF2-40B4-BE49-F238E27FC236}">
-                <a16:creationId xmlns:a16="http://schemas.microsoft.com/office/drawing/2014/main" id="{7C09774F-FE5E-4D56-BAA2-74E0175EE930}"/>
+                <a16:creationId xmlns:a16="http://schemas.microsoft.com/office/drawing/2014/main" xmlns="" id="{7C09774F-FE5E-4D56-BAA2-74E0175EE930}"/>
               </a:ext>
             </a:extLst>
           </p:cNvPr>
@@ -1847,7 +1848,7 @@
           <a:p>
             <a:fld id="{1966D34C-B499-4F71-9036-7E9E71527025}" type="datetimeFigureOut">
               <a:rPr lang="de-DE" smtClean="0"/>
-              <a:t>19.12.2024</a:t>
+              <a:t>29.12.2024</a:t>
             </a:fld>
             <a:endParaRPr lang="de-DE"/>
           </a:p>
@@ -1858,7 +1859,7 @@
           <p:cNvPr id="8" name="Fußzeilenplatzhalter 7">
             <a:extLst>
               <a:ext uri="{FF2B5EF4-FFF2-40B4-BE49-F238E27FC236}">
-                <a16:creationId xmlns:a16="http://schemas.microsoft.com/office/drawing/2014/main" id="{7180F28F-6BEA-4DB0-AC42-CB0270F755A6}"/>
+                <a16:creationId xmlns:a16="http://schemas.microsoft.com/office/drawing/2014/main" xmlns="" id="{7180F28F-6BEA-4DB0-AC42-CB0270F755A6}"/>
               </a:ext>
             </a:extLst>
           </p:cNvPr>
@@ -1883,7 +1884,7 @@
           <p:cNvPr id="9" name="Foliennummernplatzhalter 8">
             <a:extLst>
               <a:ext uri="{FF2B5EF4-FFF2-40B4-BE49-F238E27FC236}">
-                <a16:creationId xmlns:a16="http://schemas.microsoft.com/office/drawing/2014/main" id="{E6237190-7EDA-4023-A4FF-53EE97FDD5BE}"/>
+                <a16:creationId xmlns:a16="http://schemas.microsoft.com/office/drawing/2014/main" xmlns="" id="{E6237190-7EDA-4023-A4FF-53EE97FDD5BE}"/>
               </a:ext>
             </a:extLst>
           </p:cNvPr>
@@ -1942,7 +1943,7 @@
           <p:cNvPr id="2" name="Titel 1">
             <a:extLst>
               <a:ext uri="{FF2B5EF4-FFF2-40B4-BE49-F238E27FC236}">
-                <a16:creationId xmlns:a16="http://schemas.microsoft.com/office/drawing/2014/main" id="{6ED1B45A-5C77-4516-A90B-EC7777A730EC}"/>
+                <a16:creationId xmlns:a16="http://schemas.microsoft.com/office/drawing/2014/main" xmlns="" id="{6ED1B45A-5C77-4516-A90B-EC7777A730EC}"/>
               </a:ext>
             </a:extLst>
           </p:cNvPr>
@@ -1970,7 +1971,7 @@
           <p:cNvPr id="3" name="Datumsplatzhalter 2">
             <a:extLst>
               <a:ext uri="{FF2B5EF4-FFF2-40B4-BE49-F238E27FC236}">
-                <a16:creationId xmlns:a16="http://schemas.microsoft.com/office/drawing/2014/main" id="{47C2DDE4-1523-44CD-AB8E-958A3577ADA6}"/>
+                <a16:creationId xmlns:a16="http://schemas.microsoft.com/office/drawing/2014/main" xmlns="" id="{47C2DDE4-1523-44CD-AB8E-958A3577ADA6}"/>
               </a:ext>
             </a:extLst>
           </p:cNvPr>
@@ -1988,7 +1989,7 @@
           <a:p>
             <a:fld id="{1966D34C-B499-4F71-9036-7E9E71527025}" type="datetimeFigureOut">
               <a:rPr lang="de-DE" smtClean="0"/>
-              <a:t>19.12.2024</a:t>
+              <a:t>29.12.2024</a:t>
             </a:fld>
             <a:endParaRPr lang="de-DE"/>
           </a:p>
@@ -1999,7 +2000,7 @@
           <p:cNvPr id="4" name="Fußzeilenplatzhalter 3">
             <a:extLst>
               <a:ext uri="{FF2B5EF4-FFF2-40B4-BE49-F238E27FC236}">
-                <a16:creationId xmlns:a16="http://schemas.microsoft.com/office/drawing/2014/main" id="{9CD76EA9-2BCA-49B6-BF94-14FB51A59F6A}"/>
+                <a16:creationId xmlns:a16="http://schemas.microsoft.com/office/drawing/2014/main" xmlns="" id="{9CD76EA9-2BCA-49B6-BF94-14FB51A59F6A}"/>
               </a:ext>
             </a:extLst>
           </p:cNvPr>
@@ -2024,7 +2025,7 @@
           <p:cNvPr id="5" name="Foliennummernplatzhalter 4">
             <a:extLst>
               <a:ext uri="{FF2B5EF4-FFF2-40B4-BE49-F238E27FC236}">
-                <a16:creationId xmlns:a16="http://schemas.microsoft.com/office/drawing/2014/main" id="{334D001A-E7FB-40C7-8DF6-0D285709B545}"/>
+                <a16:creationId xmlns:a16="http://schemas.microsoft.com/office/drawing/2014/main" xmlns="" id="{334D001A-E7FB-40C7-8DF6-0D285709B545}"/>
               </a:ext>
             </a:extLst>
           </p:cNvPr>
@@ -2083,7 +2084,7 @@
           <p:cNvPr id="2" name="Datumsplatzhalter 1">
             <a:extLst>
               <a:ext uri="{FF2B5EF4-FFF2-40B4-BE49-F238E27FC236}">
-                <a16:creationId xmlns:a16="http://schemas.microsoft.com/office/drawing/2014/main" id="{F5E42BE2-3BE3-4D39-954A-54EB2EA825A3}"/>
+                <a16:creationId xmlns:a16="http://schemas.microsoft.com/office/drawing/2014/main" xmlns="" id="{F5E42BE2-3BE3-4D39-954A-54EB2EA825A3}"/>
               </a:ext>
             </a:extLst>
           </p:cNvPr>
@@ -2101,7 +2102,7 @@
           <a:p>
             <a:fld id="{1966D34C-B499-4F71-9036-7E9E71527025}" type="datetimeFigureOut">
               <a:rPr lang="de-DE" smtClean="0"/>
-              <a:t>19.12.2024</a:t>
+              <a:t>29.12.2024</a:t>
             </a:fld>
             <a:endParaRPr lang="de-DE"/>
           </a:p>
@@ -2112,7 +2113,7 @@
           <p:cNvPr id="3" name="Fußzeilenplatzhalter 2">
             <a:extLst>
               <a:ext uri="{FF2B5EF4-FFF2-40B4-BE49-F238E27FC236}">
-                <a16:creationId xmlns:a16="http://schemas.microsoft.com/office/drawing/2014/main" id="{E3354D42-7A99-433D-9EF4-C70287BB0F0A}"/>
+                <a16:creationId xmlns:a16="http://schemas.microsoft.com/office/drawing/2014/main" xmlns="" id="{E3354D42-7A99-433D-9EF4-C70287BB0F0A}"/>
               </a:ext>
             </a:extLst>
           </p:cNvPr>
@@ -2137,7 +2138,7 @@
           <p:cNvPr id="4" name="Foliennummernplatzhalter 3">
             <a:extLst>
               <a:ext uri="{FF2B5EF4-FFF2-40B4-BE49-F238E27FC236}">
-                <a16:creationId xmlns:a16="http://schemas.microsoft.com/office/drawing/2014/main" id="{21551C44-919D-4F61-A7B1-7A9B52E986F8}"/>
+                <a16:creationId xmlns:a16="http://schemas.microsoft.com/office/drawing/2014/main" xmlns="" id="{21551C44-919D-4F61-A7B1-7A9B52E986F8}"/>
               </a:ext>
             </a:extLst>
           </p:cNvPr>
@@ -2196,7 +2197,7 @@
           <p:cNvPr id="2" name="Titel 1">
             <a:extLst>
               <a:ext uri="{FF2B5EF4-FFF2-40B4-BE49-F238E27FC236}">
-                <a16:creationId xmlns:a16="http://schemas.microsoft.com/office/drawing/2014/main" id="{3768DE4E-E7DC-4947-913B-606D2CF2FF87}"/>
+                <a16:creationId xmlns:a16="http://schemas.microsoft.com/office/drawing/2014/main" xmlns="" id="{3768DE4E-E7DC-4947-913B-606D2CF2FF87}"/>
               </a:ext>
             </a:extLst>
           </p:cNvPr>
@@ -2233,7 +2234,7 @@
           <p:cNvPr id="3" name="Inhaltsplatzhalter 2">
             <a:extLst>
               <a:ext uri="{FF2B5EF4-FFF2-40B4-BE49-F238E27FC236}">
-                <a16:creationId xmlns:a16="http://schemas.microsoft.com/office/drawing/2014/main" id="{3DE6B879-527E-4377-98AC-23D1C6148BCE}"/>
+                <a16:creationId xmlns:a16="http://schemas.microsoft.com/office/drawing/2014/main" xmlns="" id="{3DE6B879-527E-4377-98AC-23D1C6148BCE}"/>
               </a:ext>
             </a:extLst>
           </p:cNvPr>
@@ -2323,7 +2324,7 @@
           <p:cNvPr id="4" name="Textplatzhalter 3">
             <a:extLst>
               <a:ext uri="{FF2B5EF4-FFF2-40B4-BE49-F238E27FC236}">
-                <a16:creationId xmlns:a16="http://schemas.microsoft.com/office/drawing/2014/main" id="{1E55FCED-4CC2-4D7F-B142-2CE5FAAC8153}"/>
+                <a16:creationId xmlns:a16="http://schemas.microsoft.com/office/drawing/2014/main" xmlns="" id="{1E55FCED-4CC2-4D7F-B142-2CE5FAAC8153}"/>
               </a:ext>
             </a:extLst>
           </p:cNvPr>
@@ -2394,7 +2395,7 @@
           <p:cNvPr id="5" name="Datumsplatzhalter 4">
             <a:extLst>
               <a:ext uri="{FF2B5EF4-FFF2-40B4-BE49-F238E27FC236}">
-                <a16:creationId xmlns:a16="http://schemas.microsoft.com/office/drawing/2014/main" id="{052EDD12-1C59-40C8-A398-1303A8E3523B}"/>
+                <a16:creationId xmlns:a16="http://schemas.microsoft.com/office/drawing/2014/main" xmlns="" id="{052EDD12-1C59-40C8-A398-1303A8E3523B}"/>
               </a:ext>
             </a:extLst>
           </p:cNvPr>
@@ -2412,7 +2413,7 @@
           <a:p>
             <a:fld id="{1966D34C-B499-4F71-9036-7E9E71527025}" type="datetimeFigureOut">
               <a:rPr lang="de-DE" smtClean="0"/>
-              <a:t>19.12.2024</a:t>
+              <a:t>29.12.2024</a:t>
             </a:fld>
             <a:endParaRPr lang="de-DE"/>
           </a:p>
@@ -2423,7 +2424,7 @@
           <p:cNvPr id="6" name="Fußzeilenplatzhalter 5">
             <a:extLst>
               <a:ext uri="{FF2B5EF4-FFF2-40B4-BE49-F238E27FC236}">
-                <a16:creationId xmlns:a16="http://schemas.microsoft.com/office/drawing/2014/main" id="{27D1CAB7-37C5-4D18-ADC8-BAF57E694F8D}"/>
+                <a16:creationId xmlns:a16="http://schemas.microsoft.com/office/drawing/2014/main" xmlns="" id="{27D1CAB7-37C5-4D18-ADC8-BAF57E694F8D}"/>
               </a:ext>
             </a:extLst>
           </p:cNvPr>
@@ -2448,7 +2449,7 @@
           <p:cNvPr id="7" name="Foliennummernplatzhalter 6">
             <a:extLst>
               <a:ext uri="{FF2B5EF4-FFF2-40B4-BE49-F238E27FC236}">
-                <a16:creationId xmlns:a16="http://schemas.microsoft.com/office/drawing/2014/main" id="{67C02470-7513-4A76-91B0-86F32ECF57D6}"/>
+                <a16:creationId xmlns:a16="http://schemas.microsoft.com/office/drawing/2014/main" xmlns="" id="{67C02470-7513-4A76-91B0-86F32ECF57D6}"/>
               </a:ext>
             </a:extLst>
           </p:cNvPr>
@@ -2507,7 +2508,7 @@
           <p:cNvPr id="2" name="Titel 1">
             <a:extLst>
               <a:ext uri="{FF2B5EF4-FFF2-40B4-BE49-F238E27FC236}">
-                <a16:creationId xmlns:a16="http://schemas.microsoft.com/office/drawing/2014/main" id="{F978E131-6FC2-4DFB-92D8-542C7463482E}"/>
+                <a16:creationId xmlns:a16="http://schemas.microsoft.com/office/drawing/2014/main" xmlns="" id="{F978E131-6FC2-4DFB-92D8-542C7463482E}"/>
               </a:ext>
             </a:extLst>
           </p:cNvPr>
@@ -2544,7 +2545,7 @@
           <p:cNvPr id="3" name="Bildplatzhalter 2">
             <a:extLst>
               <a:ext uri="{FF2B5EF4-FFF2-40B4-BE49-F238E27FC236}">
-                <a16:creationId xmlns:a16="http://schemas.microsoft.com/office/drawing/2014/main" id="{93447B4F-7245-4AE4-813C-6AF63911EDCE}"/>
+                <a16:creationId xmlns:a16="http://schemas.microsoft.com/office/drawing/2014/main" xmlns="" id="{93447B4F-7245-4AE4-813C-6AF63911EDCE}"/>
               </a:ext>
             </a:extLst>
           </p:cNvPr>
@@ -2611,7 +2612,7 @@
           <p:cNvPr id="4" name="Textplatzhalter 3">
             <a:extLst>
               <a:ext uri="{FF2B5EF4-FFF2-40B4-BE49-F238E27FC236}">
-                <a16:creationId xmlns:a16="http://schemas.microsoft.com/office/drawing/2014/main" id="{5F5B48A0-0BAD-476F-8E6D-64E5D28BD1E4}"/>
+                <a16:creationId xmlns:a16="http://schemas.microsoft.com/office/drawing/2014/main" xmlns="" id="{5F5B48A0-0BAD-476F-8E6D-64E5D28BD1E4}"/>
               </a:ext>
             </a:extLst>
           </p:cNvPr>
@@ -2682,7 +2683,7 @@
           <p:cNvPr id="5" name="Datumsplatzhalter 4">
             <a:extLst>
               <a:ext uri="{FF2B5EF4-FFF2-40B4-BE49-F238E27FC236}">
-                <a16:creationId xmlns:a16="http://schemas.microsoft.com/office/drawing/2014/main" id="{44A7C88A-EEBB-4682-959B-A2F4E0512D45}"/>
+                <a16:creationId xmlns:a16="http://schemas.microsoft.com/office/drawing/2014/main" xmlns="" id="{44A7C88A-EEBB-4682-959B-A2F4E0512D45}"/>
               </a:ext>
             </a:extLst>
           </p:cNvPr>
@@ -2700,7 +2701,7 @@
           <a:p>
             <a:fld id="{1966D34C-B499-4F71-9036-7E9E71527025}" type="datetimeFigureOut">
               <a:rPr lang="de-DE" smtClean="0"/>
-              <a:t>19.12.2024</a:t>
+              <a:t>29.12.2024</a:t>
             </a:fld>
             <a:endParaRPr lang="de-DE"/>
           </a:p>
@@ -2711,7 +2712,7 @@
           <p:cNvPr id="6" name="Fußzeilenplatzhalter 5">
             <a:extLst>
               <a:ext uri="{FF2B5EF4-FFF2-40B4-BE49-F238E27FC236}">
-                <a16:creationId xmlns:a16="http://schemas.microsoft.com/office/drawing/2014/main" id="{846BE28B-E4B1-4B5B-B463-06C01FC5721E}"/>
+                <a16:creationId xmlns:a16="http://schemas.microsoft.com/office/drawing/2014/main" xmlns="" id="{846BE28B-E4B1-4B5B-B463-06C01FC5721E}"/>
               </a:ext>
             </a:extLst>
           </p:cNvPr>
@@ -2736,7 +2737,7 @@
           <p:cNvPr id="7" name="Foliennummernplatzhalter 6">
             <a:extLst>
               <a:ext uri="{FF2B5EF4-FFF2-40B4-BE49-F238E27FC236}">
-                <a16:creationId xmlns:a16="http://schemas.microsoft.com/office/drawing/2014/main" id="{982DE88C-2143-4EC4-8441-FC9DFB8ED7AD}"/>
+                <a16:creationId xmlns:a16="http://schemas.microsoft.com/office/drawing/2014/main" xmlns="" id="{982DE88C-2143-4EC4-8441-FC9DFB8ED7AD}"/>
               </a:ext>
             </a:extLst>
           </p:cNvPr>
@@ -2800,7 +2801,7 @@
           <p:cNvPr id="2" name="Titelplatzhalter 1">
             <a:extLst>
               <a:ext uri="{FF2B5EF4-FFF2-40B4-BE49-F238E27FC236}">
-                <a16:creationId xmlns:a16="http://schemas.microsoft.com/office/drawing/2014/main" id="{B32A2DC8-D616-4826-8B1C-6E47B63D7776}"/>
+                <a16:creationId xmlns:a16="http://schemas.microsoft.com/office/drawing/2014/main" xmlns="" id="{B32A2DC8-D616-4826-8B1C-6E47B63D7776}"/>
               </a:ext>
             </a:extLst>
           </p:cNvPr>
@@ -2838,7 +2839,7 @@
           <p:cNvPr id="3" name="Textplatzhalter 2">
             <a:extLst>
               <a:ext uri="{FF2B5EF4-FFF2-40B4-BE49-F238E27FC236}">
-                <a16:creationId xmlns:a16="http://schemas.microsoft.com/office/drawing/2014/main" id="{8167E41F-5A6E-461D-9BDF-E3835F2D5016}"/>
+                <a16:creationId xmlns:a16="http://schemas.microsoft.com/office/drawing/2014/main" xmlns="" id="{8167E41F-5A6E-461D-9BDF-E3835F2D5016}"/>
               </a:ext>
             </a:extLst>
           </p:cNvPr>
@@ -2905,7 +2906,7 @@
           <p:cNvPr id="4" name="Datumsplatzhalter 3">
             <a:extLst>
               <a:ext uri="{FF2B5EF4-FFF2-40B4-BE49-F238E27FC236}">
-                <a16:creationId xmlns:a16="http://schemas.microsoft.com/office/drawing/2014/main" id="{4D9A80F2-BECC-4334-818A-3EE8CC350515}"/>
+                <a16:creationId xmlns:a16="http://schemas.microsoft.com/office/drawing/2014/main" xmlns="" id="{4D9A80F2-BECC-4334-818A-3EE8CC350515}"/>
               </a:ext>
             </a:extLst>
           </p:cNvPr>
@@ -2941,7 +2942,7 @@
           <a:p>
             <a:fld id="{1966D34C-B499-4F71-9036-7E9E71527025}" type="datetimeFigureOut">
               <a:rPr lang="de-DE" smtClean="0"/>
-              <a:t>19.12.2024</a:t>
+              <a:t>29.12.2024</a:t>
             </a:fld>
             <a:endParaRPr lang="de-DE"/>
           </a:p>
@@ -2952,7 +2953,7 @@
           <p:cNvPr id="5" name="Fußzeilenplatzhalter 4">
             <a:extLst>
               <a:ext uri="{FF2B5EF4-FFF2-40B4-BE49-F238E27FC236}">
-                <a16:creationId xmlns:a16="http://schemas.microsoft.com/office/drawing/2014/main" id="{1DD45AEF-0AFD-4E6B-9937-D26D5A87B34B}"/>
+                <a16:creationId xmlns:a16="http://schemas.microsoft.com/office/drawing/2014/main" xmlns="" id="{1DD45AEF-0AFD-4E6B-9937-D26D5A87B34B}"/>
               </a:ext>
             </a:extLst>
           </p:cNvPr>
@@ -2995,7 +2996,7 @@
           <p:cNvPr id="6" name="Foliennummernplatzhalter 5">
             <a:extLst>
               <a:ext uri="{FF2B5EF4-FFF2-40B4-BE49-F238E27FC236}">
-                <a16:creationId xmlns:a16="http://schemas.microsoft.com/office/drawing/2014/main" id="{8BE46D85-7D56-43B8-B265-A178B1E3935A}"/>
+                <a16:creationId xmlns:a16="http://schemas.microsoft.com/office/drawing/2014/main" xmlns="" id="{8BE46D85-7D56-43B8-B265-A178B1E3935A}"/>
               </a:ext>
             </a:extLst>
           </p:cNvPr>
@@ -3363,7 +3364,7 @@
           <p:cNvPr id="2" name="Titel 1">
             <a:extLst>
               <a:ext uri="{FF2B5EF4-FFF2-40B4-BE49-F238E27FC236}">
-                <a16:creationId xmlns:a16="http://schemas.microsoft.com/office/drawing/2014/main" id="{35895132-DE23-4A00-8E1E-E054001DF0F0}"/>
+                <a16:creationId xmlns:a16="http://schemas.microsoft.com/office/drawing/2014/main" xmlns="" id="{35895132-DE23-4A00-8E1E-E054001DF0F0}"/>
               </a:ext>
             </a:extLst>
           </p:cNvPr>
@@ -3388,7 +3389,7 @@
           <p:cNvPr id="3" name="Untertitel 2">
             <a:extLst>
               <a:ext uri="{FF2B5EF4-FFF2-40B4-BE49-F238E27FC236}">
-                <a16:creationId xmlns:a16="http://schemas.microsoft.com/office/drawing/2014/main" id="{2BFB556B-F266-43C2-9F0F-498A82864EBB}"/>
+                <a16:creationId xmlns:a16="http://schemas.microsoft.com/office/drawing/2014/main" xmlns="" id="{2BFB556B-F266-43C2-9F0F-498A82864EBB}"/>
               </a:ext>
             </a:extLst>
           </p:cNvPr>
@@ -3443,7 +3444,7 @@
           <p:cNvPr id="2" name="Titel 1">
             <a:extLst>
               <a:ext uri="{FF2B5EF4-FFF2-40B4-BE49-F238E27FC236}">
-                <a16:creationId xmlns:a16="http://schemas.microsoft.com/office/drawing/2014/main" id="{1F20CAF2-C127-4F0A-B316-19CC56055294}"/>
+                <a16:creationId xmlns:a16="http://schemas.microsoft.com/office/drawing/2014/main" xmlns="" id="{1F20CAF2-C127-4F0A-B316-19CC56055294}"/>
               </a:ext>
             </a:extLst>
           </p:cNvPr>
@@ -3471,7 +3472,7 @@
           <p:cNvPr id="4" name="Textfeld 3">
             <a:extLst>
               <a:ext uri="{FF2B5EF4-FFF2-40B4-BE49-F238E27FC236}">
-                <a16:creationId xmlns:a16="http://schemas.microsoft.com/office/drawing/2014/main" id="{A8C06F69-4BBE-4E8B-9564-6E5737B41EB9}"/>
+                <a16:creationId xmlns:a16="http://schemas.microsoft.com/office/drawing/2014/main" xmlns="" id="{A8C06F69-4BBE-4E8B-9564-6E5737B41EB9}"/>
               </a:ext>
             </a:extLst>
           </p:cNvPr>
@@ -3593,7 +3594,7 @@
           <p:cNvPr id="2" name="Titel 1">
             <a:extLst>
               <a:ext uri="{FF2B5EF4-FFF2-40B4-BE49-F238E27FC236}">
-                <a16:creationId xmlns:a16="http://schemas.microsoft.com/office/drawing/2014/main" id="{9EE6259C-8E17-43C1-815C-EC58FCDFCE07}"/>
+                <a16:creationId xmlns:a16="http://schemas.microsoft.com/office/drawing/2014/main" xmlns="" id="{9EE6259C-8E17-43C1-815C-EC58FCDFCE07}"/>
               </a:ext>
             </a:extLst>
           </p:cNvPr>
@@ -3626,7 +3627,7 @@
           <p:cNvPr id="3" name="Grafik 2">
             <a:extLst>
               <a:ext uri="{FF2B5EF4-FFF2-40B4-BE49-F238E27FC236}">
-                <a16:creationId xmlns:a16="http://schemas.microsoft.com/office/drawing/2014/main" id="{7447C229-39C6-4773-943C-F2A4300AAB34}"/>
+                <a16:creationId xmlns:a16="http://schemas.microsoft.com/office/drawing/2014/main" xmlns="" id="{7447C229-39C6-4773-943C-F2A4300AAB34}"/>
               </a:ext>
             </a:extLst>
           </p:cNvPr>
@@ -3686,7 +3687,7 @@
           <p:cNvPr id="2" name="Titel 1">
             <a:extLst>
               <a:ext uri="{FF2B5EF4-FFF2-40B4-BE49-F238E27FC236}">
-                <a16:creationId xmlns:a16="http://schemas.microsoft.com/office/drawing/2014/main" id="{9EE6259C-8E17-43C1-815C-EC58FCDFCE07}"/>
+                <a16:creationId xmlns:a16="http://schemas.microsoft.com/office/drawing/2014/main" xmlns="" id="{9EE6259C-8E17-43C1-815C-EC58FCDFCE07}"/>
               </a:ext>
             </a:extLst>
           </p:cNvPr>
@@ -3722,7 +3723,7 @@
           <p:cNvPr id="3" name="Grafik 2">
             <a:extLst>
               <a:ext uri="{FF2B5EF4-FFF2-40B4-BE49-F238E27FC236}">
-                <a16:creationId xmlns:a16="http://schemas.microsoft.com/office/drawing/2014/main" id="{169A3B40-082B-4B32-9393-3852359890FB}"/>
+                <a16:creationId xmlns:a16="http://schemas.microsoft.com/office/drawing/2014/main" xmlns="" id="{169A3B40-082B-4B32-9393-3852359890FB}"/>
               </a:ext>
             </a:extLst>
           </p:cNvPr>
@@ -3752,7 +3753,7 @@
           <p:cNvPr id="5" name="Grafik 4">
             <a:extLst>
               <a:ext uri="{FF2B5EF4-FFF2-40B4-BE49-F238E27FC236}">
-                <a16:creationId xmlns:a16="http://schemas.microsoft.com/office/drawing/2014/main" id="{31DFF791-4537-4BEC-AA27-24A93D9871A1}"/>
+                <a16:creationId xmlns:a16="http://schemas.microsoft.com/office/drawing/2014/main" xmlns="" id="{31DFF791-4537-4BEC-AA27-24A93D9871A1}"/>
               </a:ext>
             </a:extLst>
           </p:cNvPr>
@@ -3788,7 +3789,7 @@
           <p:cNvPr id="7" name="Grafik 6">
             <a:extLst>
               <a:ext uri="{FF2B5EF4-FFF2-40B4-BE49-F238E27FC236}">
-                <a16:creationId xmlns:a16="http://schemas.microsoft.com/office/drawing/2014/main" id="{F99E93FB-E819-457C-B4E9-C9415778AD84}"/>
+                <a16:creationId xmlns:a16="http://schemas.microsoft.com/office/drawing/2014/main" xmlns="" id="{F99E93FB-E819-457C-B4E9-C9415778AD84}"/>
               </a:ext>
             </a:extLst>
           </p:cNvPr>
@@ -3824,7 +3825,7 @@
           <p:cNvPr id="9" name="Grafik 8">
             <a:extLst>
               <a:ext uri="{FF2B5EF4-FFF2-40B4-BE49-F238E27FC236}">
-                <a16:creationId xmlns:a16="http://schemas.microsoft.com/office/drawing/2014/main" id="{F83F5F9E-F558-4F36-8641-8554C0647776}"/>
+                <a16:creationId xmlns:a16="http://schemas.microsoft.com/office/drawing/2014/main" xmlns="" id="{F83F5F9E-F558-4F36-8641-8554C0647776}"/>
               </a:ext>
             </a:extLst>
           </p:cNvPr>
@@ -3860,7 +3861,7 @@
           <p:cNvPr id="11" name="Grafik 10">
             <a:extLst>
               <a:ext uri="{FF2B5EF4-FFF2-40B4-BE49-F238E27FC236}">
-                <a16:creationId xmlns:a16="http://schemas.microsoft.com/office/drawing/2014/main" id="{CCE0293C-8429-4206-B338-D91F94DFD77F}"/>
+                <a16:creationId xmlns:a16="http://schemas.microsoft.com/office/drawing/2014/main" xmlns="" id="{CCE0293C-8429-4206-B338-D91F94DFD77F}"/>
               </a:ext>
             </a:extLst>
           </p:cNvPr>
@@ -3896,7 +3897,7 @@
           <p:cNvPr id="13" name="Grafik 12">
             <a:extLst>
               <a:ext uri="{FF2B5EF4-FFF2-40B4-BE49-F238E27FC236}">
-                <a16:creationId xmlns:a16="http://schemas.microsoft.com/office/drawing/2014/main" id="{C02EB894-088B-4405-AEFB-A27CF32E7E59}"/>
+                <a16:creationId xmlns:a16="http://schemas.microsoft.com/office/drawing/2014/main" xmlns="" id="{C02EB894-088B-4405-AEFB-A27CF32E7E59}"/>
               </a:ext>
             </a:extLst>
           </p:cNvPr>
@@ -3932,7 +3933,7 @@
           <p:cNvPr id="15" name="Grafik 14">
             <a:extLst>
               <a:ext uri="{FF2B5EF4-FFF2-40B4-BE49-F238E27FC236}">
-                <a16:creationId xmlns:a16="http://schemas.microsoft.com/office/drawing/2014/main" id="{B82DDFC0-D94C-4623-BA97-035AC1DD7C06}"/>
+                <a16:creationId xmlns:a16="http://schemas.microsoft.com/office/drawing/2014/main" xmlns="" id="{B82DDFC0-D94C-4623-BA97-035AC1DD7C06}"/>
               </a:ext>
             </a:extLst>
           </p:cNvPr>
@@ -3968,7 +3969,7 @@
           <p:cNvPr id="17" name="Grafik 16">
             <a:extLst>
               <a:ext uri="{FF2B5EF4-FFF2-40B4-BE49-F238E27FC236}">
-                <a16:creationId xmlns:a16="http://schemas.microsoft.com/office/drawing/2014/main" id="{C4D52B24-049C-445C-A756-2F40706C423E}"/>
+                <a16:creationId xmlns:a16="http://schemas.microsoft.com/office/drawing/2014/main" xmlns="" id="{C4D52B24-049C-445C-A756-2F40706C423E}"/>
               </a:ext>
             </a:extLst>
           </p:cNvPr>
@@ -4034,7 +4035,7 @@
           <p:cNvPr id="16" name="Titel 1">
             <a:extLst>
               <a:ext uri="{FF2B5EF4-FFF2-40B4-BE49-F238E27FC236}">
-                <a16:creationId xmlns:a16="http://schemas.microsoft.com/office/drawing/2014/main" id="{CE3C357C-3A6D-4B2D-919B-468E62ADB4A7}"/>
+                <a16:creationId xmlns:a16="http://schemas.microsoft.com/office/drawing/2014/main" xmlns="" id="{CE3C357C-3A6D-4B2D-919B-468E62ADB4A7}"/>
               </a:ext>
             </a:extLst>
           </p:cNvPr>
@@ -4079,7 +4080,7 @@
           <p:cNvPr id="3" name="Grafik 2">
             <a:extLst>
               <a:ext uri="{FF2B5EF4-FFF2-40B4-BE49-F238E27FC236}">
-                <a16:creationId xmlns:a16="http://schemas.microsoft.com/office/drawing/2014/main" id="{F32513A5-1A7C-4658-B371-DA5869B1D017}"/>
+                <a16:creationId xmlns:a16="http://schemas.microsoft.com/office/drawing/2014/main" xmlns="" id="{F32513A5-1A7C-4658-B371-DA5869B1D017}"/>
               </a:ext>
             </a:extLst>
           </p:cNvPr>
@@ -4139,7 +4140,7 @@
           <p:cNvPr id="16" name="Titel 1">
             <a:extLst>
               <a:ext uri="{FF2B5EF4-FFF2-40B4-BE49-F238E27FC236}">
-                <a16:creationId xmlns:a16="http://schemas.microsoft.com/office/drawing/2014/main" id="{CE3C357C-3A6D-4B2D-919B-468E62ADB4A7}"/>
+                <a16:creationId xmlns:a16="http://schemas.microsoft.com/office/drawing/2014/main" xmlns="" id="{CE3C357C-3A6D-4B2D-919B-468E62ADB4A7}"/>
               </a:ext>
             </a:extLst>
           </p:cNvPr>
@@ -4176,7 +4177,7 @@
           <p:cNvPr id="5" name="Textfeld 4">
             <a:extLst>
               <a:ext uri="{FF2B5EF4-FFF2-40B4-BE49-F238E27FC236}">
-                <a16:creationId xmlns:a16="http://schemas.microsoft.com/office/drawing/2014/main" id="{D064DB0F-8769-48E6-A427-FE9967D8F4B4}"/>
+                <a16:creationId xmlns:a16="http://schemas.microsoft.com/office/drawing/2014/main" xmlns="" id="{D064DB0F-8769-48E6-A427-FE9967D8F4B4}"/>
               </a:ext>
             </a:extLst>
           </p:cNvPr>
@@ -4329,7 +4330,7 @@
           <p:cNvPr id="2" name="Titel 1">
             <a:extLst>
               <a:ext uri="{FF2B5EF4-FFF2-40B4-BE49-F238E27FC236}">
-                <a16:creationId xmlns:a16="http://schemas.microsoft.com/office/drawing/2014/main" id="{9672587A-9876-4331-AC51-AA638EA60F83}"/>
+                <a16:creationId xmlns:a16="http://schemas.microsoft.com/office/drawing/2014/main" xmlns="" id="{9672587A-9876-4331-AC51-AA638EA60F83}"/>
               </a:ext>
             </a:extLst>
           </p:cNvPr>
@@ -4366,7 +4367,7 @@
           <p:cNvPr id="6" name="Grafik 5">
             <a:extLst>
               <a:ext uri="{FF2B5EF4-FFF2-40B4-BE49-F238E27FC236}">
-                <a16:creationId xmlns:a16="http://schemas.microsoft.com/office/drawing/2014/main" id="{BCA779CB-39BD-4D78-99DA-D05FB82932A6}"/>
+                <a16:creationId xmlns:a16="http://schemas.microsoft.com/office/drawing/2014/main" xmlns="" id="{BCA779CB-39BD-4D78-99DA-D05FB82932A6}"/>
               </a:ext>
             </a:extLst>
           </p:cNvPr>
@@ -4426,7 +4427,7 @@
           <p:cNvPr id="2" name="Titel 1">
             <a:extLst>
               <a:ext uri="{FF2B5EF4-FFF2-40B4-BE49-F238E27FC236}">
-                <a16:creationId xmlns:a16="http://schemas.microsoft.com/office/drawing/2014/main" id="{9672587A-9876-4331-AC51-AA638EA60F83}"/>
+                <a16:creationId xmlns:a16="http://schemas.microsoft.com/office/drawing/2014/main" xmlns="" id="{9672587A-9876-4331-AC51-AA638EA60F83}"/>
               </a:ext>
             </a:extLst>
           </p:cNvPr>
@@ -4466,7 +4467,7 @@
           <p:cNvPr id="4" name="Grafik 3">
             <a:extLst>
               <a:ext uri="{FF2B5EF4-FFF2-40B4-BE49-F238E27FC236}">
-                <a16:creationId xmlns:a16="http://schemas.microsoft.com/office/drawing/2014/main" id="{816B13E9-5249-4CA4-A35C-5986BA9BE4D0}"/>
+                <a16:creationId xmlns:a16="http://schemas.microsoft.com/office/drawing/2014/main" xmlns="" id="{816B13E9-5249-4CA4-A35C-5986BA9BE4D0}"/>
               </a:ext>
             </a:extLst>
           </p:cNvPr>
@@ -4496,7 +4497,7 @@
           <p:cNvPr id="7" name="Grafik 6">
             <a:extLst>
               <a:ext uri="{FF2B5EF4-FFF2-40B4-BE49-F238E27FC236}">
-                <a16:creationId xmlns:a16="http://schemas.microsoft.com/office/drawing/2014/main" id="{06299A92-39CC-407C-9E6D-FD10FB52FD53}"/>
+                <a16:creationId xmlns:a16="http://schemas.microsoft.com/office/drawing/2014/main" xmlns="" id="{06299A92-39CC-407C-9E6D-FD10FB52FD53}"/>
               </a:ext>
             </a:extLst>
           </p:cNvPr>
@@ -4526,7 +4527,7 @@
           <p:cNvPr id="9" name="Grafik 8">
             <a:extLst>
               <a:ext uri="{FF2B5EF4-FFF2-40B4-BE49-F238E27FC236}">
-                <a16:creationId xmlns:a16="http://schemas.microsoft.com/office/drawing/2014/main" id="{B3D05ACD-4BA4-4ED1-8118-57BAE2BFDC77}"/>
+                <a16:creationId xmlns:a16="http://schemas.microsoft.com/office/drawing/2014/main" xmlns="" id="{B3D05ACD-4BA4-4ED1-8118-57BAE2BFDC77}"/>
               </a:ext>
             </a:extLst>
           </p:cNvPr>
@@ -4556,7 +4557,7 @@
           <p:cNvPr id="11" name="Grafik 10">
             <a:extLst>
               <a:ext uri="{FF2B5EF4-FFF2-40B4-BE49-F238E27FC236}">
-                <a16:creationId xmlns:a16="http://schemas.microsoft.com/office/drawing/2014/main" id="{8F3F2480-A696-41BE-BB9D-CE16ECF8109F}"/>
+                <a16:creationId xmlns:a16="http://schemas.microsoft.com/office/drawing/2014/main" xmlns="" id="{8F3F2480-A696-41BE-BB9D-CE16ECF8109F}"/>
               </a:ext>
             </a:extLst>
           </p:cNvPr>
@@ -4586,7 +4587,7 @@
           <p:cNvPr id="13" name="Grafik 12">
             <a:extLst>
               <a:ext uri="{FF2B5EF4-FFF2-40B4-BE49-F238E27FC236}">
-                <a16:creationId xmlns:a16="http://schemas.microsoft.com/office/drawing/2014/main" id="{99F321E4-6331-4E11-83E0-2F96235275AD}"/>
+                <a16:creationId xmlns:a16="http://schemas.microsoft.com/office/drawing/2014/main" xmlns="" id="{99F321E4-6331-4E11-83E0-2F96235275AD}"/>
               </a:ext>
             </a:extLst>
           </p:cNvPr>
@@ -4616,7 +4617,7 @@
           <p:cNvPr id="15" name="Grafik 14">
             <a:extLst>
               <a:ext uri="{FF2B5EF4-FFF2-40B4-BE49-F238E27FC236}">
-                <a16:creationId xmlns:a16="http://schemas.microsoft.com/office/drawing/2014/main" id="{B1275EFF-ED71-49FA-94FE-2CE08AD215C1}"/>
+                <a16:creationId xmlns:a16="http://schemas.microsoft.com/office/drawing/2014/main" xmlns="" id="{B1275EFF-ED71-49FA-94FE-2CE08AD215C1}"/>
               </a:ext>
             </a:extLst>
           </p:cNvPr>
@@ -4646,7 +4647,7 @@
           <p:cNvPr id="17" name="Grafik 16">
             <a:extLst>
               <a:ext uri="{FF2B5EF4-FFF2-40B4-BE49-F238E27FC236}">
-                <a16:creationId xmlns:a16="http://schemas.microsoft.com/office/drawing/2014/main" id="{5678B9CE-3CD7-467D-9B10-379F15D1A62F}"/>
+                <a16:creationId xmlns:a16="http://schemas.microsoft.com/office/drawing/2014/main" xmlns="" id="{5678B9CE-3CD7-467D-9B10-379F15D1A62F}"/>
               </a:ext>
             </a:extLst>
           </p:cNvPr>
@@ -4676,7 +4677,7 @@
           <p:cNvPr id="19" name="Grafik 18">
             <a:extLst>
               <a:ext uri="{FF2B5EF4-FFF2-40B4-BE49-F238E27FC236}">
-                <a16:creationId xmlns:a16="http://schemas.microsoft.com/office/drawing/2014/main" id="{DD39D264-4BC7-485D-862A-ECF9A3A6CEB1}"/>
+                <a16:creationId xmlns:a16="http://schemas.microsoft.com/office/drawing/2014/main" xmlns="" id="{DD39D264-4BC7-485D-862A-ECF9A3A6CEB1}"/>
               </a:ext>
             </a:extLst>
           </p:cNvPr>
@@ -4736,7 +4737,7 @@
           <p:cNvPr id="3" name="Grafik 2">
             <a:extLst>
               <a:ext uri="{FF2B5EF4-FFF2-40B4-BE49-F238E27FC236}">
-                <a16:creationId xmlns:a16="http://schemas.microsoft.com/office/drawing/2014/main" id="{A456BD08-1E6D-4A73-8DF6-19DC0743F759}"/>
+                <a16:creationId xmlns:a16="http://schemas.microsoft.com/office/drawing/2014/main" xmlns="" id="{A456BD08-1E6D-4A73-8DF6-19DC0743F759}"/>
               </a:ext>
             </a:extLst>
           </p:cNvPr>
@@ -4796,7 +4797,7 @@
           <p:cNvPr id="2" name="Titel 1">
             <a:extLst>
               <a:ext uri="{FF2B5EF4-FFF2-40B4-BE49-F238E27FC236}">
-                <a16:creationId xmlns:a16="http://schemas.microsoft.com/office/drawing/2014/main" id="{FA0E998A-8B92-4AB3-A9A8-1DE5D112DC24}"/>
+                <a16:creationId xmlns:a16="http://schemas.microsoft.com/office/drawing/2014/main" xmlns="" id="{FA0E998A-8B92-4AB3-A9A8-1DE5D112DC24}"/>
               </a:ext>
             </a:extLst>
           </p:cNvPr>
@@ -4832,7 +4833,7 @@
           <p:cNvPr id="3" name="Inhaltsplatzhalter 2">
             <a:extLst>
               <a:ext uri="{FF2B5EF4-FFF2-40B4-BE49-F238E27FC236}">
-                <a16:creationId xmlns:a16="http://schemas.microsoft.com/office/drawing/2014/main" id="{03FCA3D9-EE93-495D-BB38-42608EA49BF0}"/>
+                <a16:creationId xmlns:a16="http://schemas.microsoft.com/office/drawing/2014/main" xmlns="" id="{03FCA3D9-EE93-495D-BB38-42608EA49BF0}"/>
               </a:ext>
             </a:extLst>
           </p:cNvPr>
@@ -4918,7 +4919,7 @@
           <p:cNvPr id="10" name="Textfeld 9">
             <a:extLst>
               <a:ext uri="{FF2B5EF4-FFF2-40B4-BE49-F238E27FC236}">
-                <a16:creationId xmlns:a16="http://schemas.microsoft.com/office/drawing/2014/main" id="{8214A440-4372-42B2-95FA-FB333F1ACF7C}"/>
+                <a16:creationId xmlns:a16="http://schemas.microsoft.com/office/drawing/2014/main" xmlns="" id="{8214A440-4372-42B2-95FA-FB333F1ACF7C}"/>
               </a:ext>
             </a:extLst>
           </p:cNvPr>
@@ -5356,7 +5357,7 @@
           <p:cNvPr id="2" name="Titel 1">
             <a:extLst>
               <a:ext uri="{FF2B5EF4-FFF2-40B4-BE49-F238E27FC236}">
-                <a16:creationId xmlns:a16="http://schemas.microsoft.com/office/drawing/2014/main" id="{F460CF33-D61D-45E6-A010-57D8D85767E5}"/>
+                <a16:creationId xmlns:a16="http://schemas.microsoft.com/office/drawing/2014/main" xmlns="" id="{F460CF33-D61D-45E6-A010-57D8D85767E5}"/>
               </a:ext>
             </a:extLst>
           </p:cNvPr>
@@ -5411,7 +5412,7 @@
           <p:cNvPr id="11" name="Textfeld 10">
             <a:extLst>
               <a:ext uri="{FF2B5EF4-FFF2-40B4-BE49-F238E27FC236}">
-                <a16:creationId xmlns:a16="http://schemas.microsoft.com/office/drawing/2014/main" id="{4E05C3E3-6957-4521-AEFD-236E914B26E5}"/>
+                <a16:creationId xmlns:a16="http://schemas.microsoft.com/office/drawing/2014/main" xmlns="" id="{4E05C3E3-6957-4521-AEFD-236E914B26E5}"/>
               </a:ext>
             </a:extLst>
           </p:cNvPr>
@@ -5506,7 +5507,7 @@
           <p:cNvPr id="16" name="Titel 1">
             <a:extLst>
               <a:ext uri="{FF2B5EF4-FFF2-40B4-BE49-F238E27FC236}">
-                <a16:creationId xmlns:a16="http://schemas.microsoft.com/office/drawing/2014/main" id="{CE3C357C-3A6D-4B2D-919B-468E62ADB4A7}"/>
+                <a16:creationId xmlns:a16="http://schemas.microsoft.com/office/drawing/2014/main" xmlns="" id="{CE3C357C-3A6D-4B2D-919B-468E62ADB4A7}"/>
               </a:ext>
             </a:extLst>
           </p:cNvPr>
@@ -5577,7 +5578,7 @@
           <p:cNvPr id="3" name="Titel 1">
             <a:extLst>
               <a:ext uri="{FF2B5EF4-FFF2-40B4-BE49-F238E27FC236}">
-                <a16:creationId xmlns:a16="http://schemas.microsoft.com/office/drawing/2014/main" id="{33062B24-559F-41F6-8766-1B8B53C3E0C1}"/>
+                <a16:creationId xmlns:a16="http://schemas.microsoft.com/office/drawing/2014/main" xmlns="" id="{33062B24-559F-41F6-8766-1B8B53C3E0C1}"/>
               </a:ext>
             </a:extLst>
           </p:cNvPr>
@@ -5647,7 +5648,7 @@
           <p:cNvPr id="5" name="Grafik 4">
             <a:extLst>
               <a:ext uri="{FF2B5EF4-FFF2-40B4-BE49-F238E27FC236}">
-                <a16:creationId xmlns:a16="http://schemas.microsoft.com/office/drawing/2014/main" id="{9A764CB7-DDFC-4155-9F78-766DD038F9B7}"/>
+                <a16:creationId xmlns:a16="http://schemas.microsoft.com/office/drawing/2014/main" xmlns="" id="{9A764CB7-DDFC-4155-9F78-766DD038F9B7}"/>
               </a:ext>
             </a:extLst>
           </p:cNvPr>
@@ -5707,7 +5708,7 @@
           <p:cNvPr id="3" name="Titel 1">
             <a:extLst>
               <a:ext uri="{FF2B5EF4-FFF2-40B4-BE49-F238E27FC236}">
-                <a16:creationId xmlns:a16="http://schemas.microsoft.com/office/drawing/2014/main" id="{33062B24-559F-41F6-8766-1B8B53C3E0C1}"/>
+                <a16:creationId xmlns:a16="http://schemas.microsoft.com/office/drawing/2014/main" xmlns="" id="{33062B24-559F-41F6-8766-1B8B53C3E0C1}"/>
               </a:ext>
             </a:extLst>
           </p:cNvPr>
@@ -5804,7 +5805,7 @@
           <p:cNvPr id="3" name="Titel 1">
             <a:extLst>
               <a:ext uri="{FF2B5EF4-FFF2-40B4-BE49-F238E27FC236}">
-                <a16:creationId xmlns:a16="http://schemas.microsoft.com/office/drawing/2014/main" id="{33062B24-559F-41F6-8766-1B8B53C3E0C1}"/>
+                <a16:creationId xmlns:a16="http://schemas.microsoft.com/office/drawing/2014/main" xmlns="" id="{33062B24-559F-41F6-8766-1B8B53C3E0C1}"/>
               </a:ext>
             </a:extLst>
           </p:cNvPr>
@@ -5904,7 +5905,7 @@
           <p:cNvPr id="2" name="Titel 1">
             <a:extLst>
               <a:ext uri="{FF2B5EF4-FFF2-40B4-BE49-F238E27FC236}">
-                <a16:creationId xmlns:a16="http://schemas.microsoft.com/office/drawing/2014/main" id="{FA0E998A-8B92-4AB3-A9A8-1DE5D112DC24}"/>
+                <a16:creationId xmlns:a16="http://schemas.microsoft.com/office/drawing/2014/main" xmlns="" id="{FA0E998A-8B92-4AB3-A9A8-1DE5D112DC24}"/>
               </a:ext>
             </a:extLst>
           </p:cNvPr>
@@ -5940,7 +5941,7 @@
           <p:cNvPr id="3" name="Inhaltsplatzhalter 2">
             <a:extLst>
               <a:ext uri="{FF2B5EF4-FFF2-40B4-BE49-F238E27FC236}">
-                <a16:creationId xmlns:a16="http://schemas.microsoft.com/office/drawing/2014/main" id="{03FCA3D9-EE93-495D-BB38-42608EA49BF0}"/>
+                <a16:creationId xmlns:a16="http://schemas.microsoft.com/office/drawing/2014/main" xmlns="" id="{03FCA3D9-EE93-495D-BB38-42608EA49BF0}"/>
               </a:ext>
             </a:extLst>
           </p:cNvPr>
@@ -6026,7 +6027,7 @@
           <p:cNvPr id="2" name="Titel 1">
             <a:extLst>
               <a:ext uri="{FF2B5EF4-FFF2-40B4-BE49-F238E27FC236}">
-                <a16:creationId xmlns:a16="http://schemas.microsoft.com/office/drawing/2014/main" id="{FA0E998A-8B92-4AB3-A9A8-1DE5D112DC24}"/>
+                <a16:creationId xmlns:a16="http://schemas.microsoft.com/office/drawing/2014/main" xmlns="" id="{FA0E998A-8B92-4AB3-A9A8-1DE5D112DC24}"/>
               </a:ext>
             </a:extLst>
           </p:cNvPr>
@@ -6062,7 +6063,7 @@
           <p:cNvPr id="3" name="Inhaltsplatzhalter 2">
             <a:extLst>
               <a:ext uri="{FF2B5EF4-FFF2-40B4-BE49-F238E27FC236}">
-                <a16:creationId xmlns:a16="http://schemas.microsoft.com/office/drawing/2014/main" id="{03FCA3D9-EE93-495D-BB38-42608EA49BF0}"/>
+                <a16:creationId xmlns:a16="http://schemas.microsoft.com/office/drawing/2014/main" xmlns="" id="{03FCA3D9-EE93-495D-BB38-42608EA49BF0}"/>
               </a:ext>
             </a:extLst>
           </p:cNvPr>
@@ -6488,7 +6489,7 @@
           <p:cNvPr id="11" name="Textfeld 10">
             <a:extLst>
               <a:ext uri="{FF2B5EF4-FFF2-40B4-BE49-F238E27FC236}">
-                <a16:creationId xmlns:a16="http://schemas.microsoft.com/office/drawing/2014/main" id="{4E05C3E3-6957-4521-AEFD-236E914B26E5}"/>
+                <a16:creationId xmlns:a16="http://schemas.microsoft.com/office/drawing/2014/main" xmlns="" id="{4E05C3E3-6957-4521-AEFD-236E914B26E5}"/>
               </a:ext>
             </a:extLst>
           </p:cNvPr>
@@ -6604,7 +6605,7 @@
           <p:cNvPr id="16" name="Titel 1">
             <a:extLst>
               <a:ext uri="{FF2B5EF4-FFF2-40B4-BE49-F238E27FC236}">
-                <a16:creationId xmlns:a16="http://schemas.microsoft.com/office/drawing/2014/main" id="{CE3C357C-3A6D-4B2D-919B-468E62ADB4A7}"/>
+                <a16:creationId xmlns:a16="http://schemas.microsoft.com/office/drawing/2014/main" xmlns="" id="{CE3C357C-3A6D-4B2D-919B-468E62ADB4A7}"/>
               </a:ext>
             </a:extLst>
           </p:cNvPr>
@@ -6675,7 +6676,7 @@
           <p:cNvPr id="3" name="Titel 1">
             <a:extLst>
               <a:ext uri="{FF2B5EF4-FFF2-40B4-BE49-F238E27FC236}">
-                <a16:creationId xmlns:a16="http://schemas.microsoft.com/office/drawing/2014/main" id="{33062B24-559F-41F6-8766-1B8B53C3E0C1}"/>
+                <a16:creationId xmlns:a16="http://schemas.microsoft.com/office/drawing/2014/main" xmlns="" id="{33062B24-559F-41F6-8766-1B8B53C3E0C1}"/>
               </a:ext>
             </a:extLst>
           </p:cNvPr>
@@ -6745,7 +6746,7 @@
           <p:cNvPr id="4" name="Grafik 3">
             <a:extLst>
               <a:ext uri="{FF2B5EF4-FFF2-40B4-BE49-F238E27FC236}">
-                <a16:creationId xmlns:a16="http://schemas.microsoft.com/office/drawing/2014/main" id="{2616159D-801A-486E-8E16-59B9A5AED34F}"/>
+                <a16:creationId xmlns:a16="http://schemas.microsoft.com/office/drawing/2014/main" xmlns="" id="{2616159D-801A-486E-8E16-59B9A5AED34F}"/>
               </a:ext>
             </a:extLst>
           </p:cNvPr>
@@ -6805,7 +6806,7 @@
           <p:cNvPr id="3" name="Titel 1">
             <a:extLst>
               <a:ext uri="{FF2B5EF4-FFF2-40B4-BE49-F238E27FC236}">
-                <a16:creationId xmlns:a16="http://schemas.microsoft.com/office/drawing/2014/main" id="{33062B24-559F-41F6-8766-1B8B53C3E0C1}"/>
+                <a16:creationId xmlns:a16="http://schemas.microsoft.com/office/drawing/2014/main" xmlns="" id="{33062B24-559F-41F6-8766-1B8B53C3E0C1}"/>
               </a:ext>
             </a:extLst>
           </p:cNvPr>
@@ -6902,7 +6903,7 @@
           <p:cNvPr id="3" name="Titel 1">
             <a:extLst>
               <a:ext uri="{FF2B5EF4-FFF2-40B4-BE49-F238E27FC236}">
-                <a16:creationId xmlns:a16="http://schemas.microsoft.com/office/drawing/2014/main" id="{33062B24-559F-41F6-8766-1B8B53C3E0C1}"/>
+                <a16:creationId xmlns:a16="http://schemas.microsoft.com/office/drawing/2014/main" xmlns="" id="{33062B24-559F-41F6-8766-1B8B53C3E0C1}"/>
               </a:ext>
             </a:extLst>
           </p:cNvPr>
@@ -7002,7 +7003,7 @@
           <p:cNvPr id="2" name="Titel 1">
             <a:extLst>
               <a:ext uri="{FF2B5EF4-FFF2-40B4-BE49-F238E27FC236}">
-                <a16:creationId xmlns:a16="http://schemas.microsoft.com/office/drawing/2014/main" id="{FA0E998A-8B92-4AB3-A9A8-1DE5D112DC24}"/>
+                <a16:creationId xmlns:a16="http://schemas.microsoft.com/office/drawing/2014/main" xmlns="" id="{FA0E998A-8B92-4AB3-A9A8-1DE5D112DC24}"/>
               </a:ext>
             </a:extLst>
           </p:cNvPr>
@@ -7050,7 +7051,7 @@
           <p:cNvPr id="3" name="Inhaltsplatzhalter 2">
             <a:extLst>
               <a:ext uri="{FF2B5EF4-FFF2-40B4-BE49-F238E27FC236}">
-                <a16:creationId xmlns:a16="http://schemas.microsoft.com/office/drawing/2014/main" id="{03FCA3D9-EE93-495D-BB38-42608EA49BF0}"/>
+                <a16:creationId xmlns:a16="http://schemas.microsoft.com/office/drawing/2014/main" xmlns="" id="{03FCA3D9-EE93-495D-BB38-42608EA49BF0}"/>
               </a:ext>
             </a:extLst>
           </p:cNvPr>
@@ -7136,7 +7137,7 @@
           <p:cNvPr id="2" name="Titel 1">
             <a:extLst>
               <a:ext uri="{FF2B5EF4-FFF2-40B4-BE49-F238E27FC236}">
-                <a16:creationId xmlns:a16="http://schemas.microsoft.com/office/drawing/2014/main" id="{7C8BA7A4-3887-BBC2-DB11-C3E410781B8F}"/>
+                <a16:creationId xmlns:a16="http://schemas.microsoft.com/office/drawing/2014/main" xmlns="" id="{7C8BA7A4-3887-BBC2-DB11-C3E410781B8F}"/>
               </a:ext>
             </a:extLst>
           </p:cNvPr>
@@ -7168,7 +7169,7 @@
           <p:cNvPr id="5" name="Textfeld 4">
             <a:extLst>
               <a:ext uri="{FF2B5EF4-FFF2-40B4-BE49-F238E27FC236}">
-                <a16:creationId xmlns:a16="http://schemas.microsoft.com/office/drawing/2014/main" id="{7E9BB3B3-C33E-E6D4-B884-B0E81F04763D}"/>
+                <a16:creationId xmlns:a16="http://schemas.microsoft.com/office/drawing/2014/main" xmlns="" id="{7E9BB3B3-C33E-E6D4-B884-B0E81F04763D}"/>
               </a:ext>
             </a:extLst>
           </p:cNvPr>
@@ -7275,7 +7276,7 @@
         <p:cNvPr id="1" name="">
           <a:extLst>
             <a:ext uri="{FF2B5EF4-FFF2-40B4-BE49-F238E27FC236}">
-              <a16:creationId xmlns:a16="http://schemas.microsoft.com/office/drawing/2014/main" id="{09813FCD-FFC4-7218-580C-E973F9446FF5}"/>
+              <a16:creationId xmlns:a16="http://schemas.microsoft.com/office/drawing/2014/main" xmlns="" id="{09813FCD-FFC4-7218-580C-E973F9446FF5}"/>
             </a:ext>
           </a:extLst>
         </p:cNvPr>
@@ -7295,7 +7296,7 @@
           <p:cNvPr id="2" name="Titel 1">
             <a:extLst>
               <a:ext uri="{FF2B5EF4-FFF2-40B4-BE49-F238E27FC236}">
-                <a16:creationId xmlns:a16="http://schemas.microsoft.com/office/drawing/2014/main" id="{66725232-2EC4-A6B4-8555-37412C044780}"/>
+                <a16:creationId xmlns:a16="http://schemas.microsoft.com/office/drawing/2014/main" xmlns="" id="{66725232-2EC4-A6B4-8555-37412C044780}"/>
               </a:ext>
             </a:extLst>
           </p:cNvPr>
@@ -7327,7 +7328,7 @@
           <p:cNvPr id="3" name="Grafik 2">
             <a:extLst>
               <a:ext uri="{FF2B5EF4-FFF2-40B4-BE49-F238E27FC236}">
-                <a16:creationId xmlns:a16="http://schemas.microsoft.com/office/drawing/2014/main" id="{7CAB953F-546C-1177-FD3E-EB14CBE2ECA4}"/>
+                <a16:creationId xmlns:a16="http://schemas.microsoft.com/office/drawing/2014/main" xmlns="" id="{7CAB953F-546C-1177-FD3E-EB14CBE2ECA4}"/>
               </a:ext>
             </a:extLst>
           </p:cNvPr>
@@ -7387,7 +7388,7 @@
           <p:cNvPr id="2" name="Titel 1">
             <a:extLst>
               <a:ext uri="{FF2B5EF4-FFF2-40B4-BE49-F238E27FC236}">
-                <a16:creationId xmlns:a16="http://schemas.microsoft.com/office/drawing/2014/main" id="{1590B5F2-09FC-A6DD-AB13-BC89F20C2A45}"/>
+                <a16:creationId xmlns:a16="http://schemas.microsoft.com/office/drawing/2014/main" xmlns="" id="{1590B5F2-09FC-A6DD-AB13-BC89F20C2A45}"/>
               </a:ext>
             </a:extLst>
           </p:cNvPr>
@@ -7419,7 +7420,7 @@
           <p:cNvPr id="4" name="Grafik 3">
             <a:extLst>
               <a:ext uri="{FF2B5EF4-FFF2-40B4-BE49-F238E27FC236}">
-                <a16:creationId xmlns:a16="http://schemas.microsoft.com/office/drawing/2014/main" id="{0C8F9394-0313-AE1A-0F49-D6D81164276E}"/>
+                <a16:creationId xmlns:a16="http://schemas.microsoft.com/office/drawing/2014/main" xmlns="" id="{0C8F9394-0313-AE1A-0F49-D6D81164276E}"/>
               </a:ext>
             </a:extLst>
           </p:cNvPr>
@@ -7479,7 +7480,7 @@
           <p:cNvPr id="2" name="Titel 1">
             <a:extLst>
               <a:ext uri="{FF2B5EF4-FFF2-40B4-BE49-F238E27FC236}">
-                <a16:creationId xmlns:a16="http://schemas.microsoft.com/office/drawing/2014/main" id="{465F36B2-EA5D-F35D-FD31-C535063D727A}"/>
+                <a16:creationId xmlns:a16="http://schemas.microsoft.com/office/drawing/2014/main" xmlns="" id="{465F36B2-EA5D-F35D-FD31-C535063D727A}"/>
               </a:ext>
             </a:extLst>
           </p:cNvPr>
@@ -7495,14 +7496,213 @@
           <a:bodyPr/>
           <a:lstStyle/>
           <a:p>
-            <a:endParaRPr lang="en-US"/>
-          </a:p>
-        </p:txBody>
-      </p:sp>
+            <a:r>
+              <a:rPr lang="en-US" dirty="0" err="1" smtClean="0"/>
+              <a:t>ViT</a:t>
+            </a:r>
+            <a:r>
+              <a:rPr lang="en-US" dirty="0" smtClean="0"/>
+              <a:t> dataset 2 model 7</a:t>
+            </a:r>
+            <a:endParaRPr lang="en-US" dirty="0"/>
+          </a:p>
+        </p:txBody>
+      </p:sp>
+      <p:pic>
+        <p:nvPicPr>
+          <p:cNvPr id="3" name="Grafik 2"/>
+          <p:cNvPicPr>
+            <a:picLocks noChangeAspect="1"/>
+          </p:cNvPicPr>
+          <p:nvPr/>
+        </p:nvPicPr>
+        <p:blipFill>
+          <a:blip r:embed="rId2"/>
+          <a:stretch>
+            <a:fillRect/>
+          </a:stretch>
+        </p:blipFill>
+        <p:spPr>
+          <a:xfrm>
+            <a:off x="838200" y="1690688"/>
+            <a:ext cx="9152238" cy="4647621"/>
+          </a:xfrm>
+          <a:prstGeom prst="rect">
+            <a:avLst/>
+          </a:prstGeom>
+        </p:spPr>
+      </p:pic>
     </p:spTree>
     <p:extLst>
       <p:ext uri="{BB962C8B-B14F-4D97-AF65-F5344CB8AC3E}">
         <p14:creationId xmlns:p14="http://schemas.microsoft.com/office/powerpoint/2010/main" val="362952766"/>
+      </p:ext>
+    </p:extLst>
+  </p:cSld>
+  <p:clrMapOvr>
+    <a:masterClrMapping/>
+  </p:clrMapOvr>
+</p:sld>
+</file>
+
+<file path=ppt/slides/slide34.xml><?xml version="1.0" encoding="utf-8"?>
+<p:sld xmlns:a="http://schemas.openxmlformats.org/drawingml/2006/main" xmlns:r="http://schemas.openxmlformats.org/officeDocument/2006/relationships" xmlns:p="http://schemas.openxmlformats.org/presentationml/2006/main">
+  <p:cSld>
+    <p:spTree>
+      <p:nvGrpSpPr>
+        <p:cNvPr id="1" name=""/>
+        <p:cNvGrpSpPr/>
+        <p:nvPr/>
+      </p:nvGrpSpPr>
+      <p:grpSpPr>
+        <a:xfrm>
+          <a:off x="0" y="0"/>
+          <a:ext cx="0" cy="0"/>
+          <a:chOff x="0" y="0"/>
+          <a:chExt cx="0" cy="0"/>
+        </a:xfrm>
+      </p:grpSpPr>
+      <p:sp>
+        <p:nvSpPr>
+          <p:cNvPr id="2" name="Titel 1"/>
+          <p:cNvSpPr>
+            <a:spLocks noGrp="1"/>
+          </p:cNvSpPr>
+          <p:nvPr>
+            <p:ph type="title"/>
+          </p:nvPr>
+        </p:nvSpPr>
+        <p:spPr/>
+        <p:txBody>
+          <a:bodyPr/>
+          <a:lstStyle/>
+          <a:p>
+            <a:endParaRPr lang="de-DE"/>
+          </a:p>
+        </p:txBody>
+      </p:sp>
+      <p:pic>
+        <p:nvPicPr>
+          <p:cNvPr id="3" name="Grafik 2"/>
+          <p:cNvPicPr>
+            <a:picLocks noChangeAspect="1"/>
+          </p:cNvPicPr>
+          <p:nvPr/>
+        </p:nvPicPr>
+        <p:blipFill>
+          <a:blip r:embed="rId2"/>
+          <a:stretch>
+            <a:fillRect/>
+          </a:stretch>
+        </p:blipFill>
+        <p:spPr>
+          <a:xfrm>
+            <a:off x="2783230" y="2830083"/>
+            <a:ext cx="6296025" cy="2828925"/>
+          </a:xfrm>
+          <a:prstGeom prst="rect">
+            <a:avLst/>
+          </a:prstGeom>
+        </p:spPr>
+      </p:pic>
+      <p:sp>
+        <p:nvSpPr>
+          <p:cNvPr id="4" name="Textfeld 3"/>
+          <p:cNvSpPr txBox="1"/>
+          <p:nvPr/>
+        </p:nvSpPr>
+        <p:spPr>
+          <a:xfrm>
+            <a:off x="2875005" y="2438400"/>
+            <a:ext cx="6204250" cy="369332"/>
+          </a:xfrm>
+          <a:prstGeom prst="rect">
+            <a:avLst/>
+          </a:prstGeom>
+          <a:noFill/>
+        </p:spPr>
+        <p:txBody>
+          <a:bodyPr wrap="square" rtlCol="0">
+            <a:spAutoFit/>
+          </a:bodyPr>
+          <a:lstStyle/>
+          <a:p>
+            <a:r>
+              <a:rPr lang="de-DE" dirty="0" smtClean="0"/>
+              <a:t>0             1           2           3           4           5           6            7          8</a:t>
+            </a:r>
+            <a:endParaRPr lang="de-DE" dirty="0"/>
+          </a:p>
+        </p:txBody>
+      </p:sp>
+      <p:sp>
+        <p:nvSpPr>
+          <p:cNvPr id="5" name="Textfeld 4"/>
+          <p:cNvSpPr txBox="1"/>
+          <p:nvPr/>
+        </p:nvSpPr>
+        <p:spPr>
+          <a:xfrm>
+            <a:off x="2875005" y="3694671"/>
+            <a:ext cx="6204250" cy="369332"/>
+          </a:xfrm>
+          <a:prstGeom prst="rect">
+            <a:avLst/>
+          </a:prstGeom>
+          <a:noFill/>
+        </p:spPr>
+        <p:txBody>
+          <a:bodyPr wrap="square" rtlCol="0">
+            <a:spAutoFit/>
+          </a:bodyPr>
+          <a:lstStyle/>
+          <a:p>
+            <a:r>
+              <a:rPr lang="de-DE" dirty="0"/>
+              <a:t>9</a:t>
+            </a:r>
+            <a:r>
+              <a:rPr lang="de-DE" dirty="0" smtClean="0"/>
+              <a:t>             10           11         12        13         14        15         16          17</a:t>
+            </a:r>
+            <a:endParaRPr lang="de-DE" dirty="0"/>
+          </a:p>
+        </p:txBody>
+      </p:sp>
+      <p:sp>
+        <p:nvSpPr>
+          <p:cNvPr id="6" name="Textfeld 5"/>
+          <p:cNvSpPr txBox="1"/>
+          <p:nvPr/>
+        </p:nvSpPr>
+        <p:spPr>
+          <a:xfrm>
+            <a:off x="3282778" y="4676839"/>
+            <a:ext cx="6204250" cy="369332"/>
+          </a:xfrm>
+          <a:prstGeom prst="rect">
+            <a:avLst/>
+          </a:prstGeom>
+          <a:noFill/>
+        </p:spPr>
+        <p:txBody>
+          <a:bodyPr wrap="square" rtlCol="0">
+            <a:spAutoFit/>
+          </a:bodyPr>
+          <a:lstStyle/>
+          <a:p>
+            <a:r>
+              <a:rPr lang="de-DE" dirty="0" smtClean="0"/>
+              <a:t>18           19           20         21        22         23        24        25</a:t>
+            </a:r>
+            <a:endParaRPr lang="de-DE" dirty="0"/>
+          </a:p>
+        </p:txBody>
+      </p:sp>
+    </p:spTree>
+    <p:extLst>
+      <p:ext uri="{BB962C8B-B14F-4D97-AF65-F5344CB8AC3E}">
+        <p14:creationId xmlns:p14="http://schemas.microsoft.com/office/powerpoint/2010/main" val="1565038649"/>
       </p:ext>
     </p:extLst>
   </p:cSld>
@@ -7534,7 +7734,7 @@
           <p:cNvPr id="2" name="Titel 1">
             <a:extLst>
               <a:ext uri="{FF2B5EF4-FFF2-40B4-BE49-F238E27FC236}">
-                <a16:creationId xmlns:a16="http://schemas.microsoft.com/office/drawing/2014/main" id="{9EE6259C-8E17-43C1-815C-EC58FCDFCE07}"/>
+                <a16:creationId xmlns:a16="http://schemas.microsoft.com/office/drawing/2014/main" xmlns="" id="{9EE6259C-8E17-43C1-815C-EC58FCDFCE07}"/>
               </a:ext>
             </a:extLst>
           </p:cNvPr>
@@ -7570,7 +7770,7 @@
           <p:cNvPr id="3" name="Grafik 2">
             <a:extLst>
               <a:ext uri="{FF2B5EF4-FFF2-40B4-BE49-F238E27FC236}">
-                <a16:creationId xmlns:a16="http://schemas.microsoft.com/office/drawing/2014/main" id="{5F9C2164-257F-4FBE-811F-AF875CACCA96}"/>
+                <a16:creationId xmlns:a16="http://schemas.microsoft.com/office/drawing/2014/main" xmlns="" id="{5F9C2164-257F-4FBE-811F-AF875CACCA96}"/>
               </a:ext>
             </a:extLst>
           </p:cNvPr>
@@ -7630,7 +7830,7 @@
           <p:cNvPr id="4" name="Textfeld 3">
             <a:extLst>
               <a:ext uri="{FF2B5EF4-FFF2-40B4-BE49-F238E27FC236}">
-                <a16:creationId xmlns:a16="http://schemas.microsoft.com/office/drawing/2014/main" id="{B6EA9917-7A82-410D-9CE7-B05AB59C6930}"/>
+                <a16:creationId xmlns:a16="http://schemas.microsoft.com/office/drawing/2014/main" xmlns="" id="{B6EA9917-7A82-410D-9CE7-B05AB59C6930}"/>
               </a:ext>
             </a:extLst>
           </p:cNvPr>
@@ -7722,7 +7922,7 @@
           <p:cNvPr id="5" name="Titel 1">
             <a:extLst>
               <a:ext uri="{FF2B5EF4-FFF2-40B4-BE49-F238E27FC236}">
-                <a16:creationId xmlns:a16="http://schemas.microsoft.com/office/drawing/2014/main" id="{B714DE99-8892-4254-AD52-8AF8324C50CA}"/>
+                <a16:creationId xmlns:a16="http://schemas.microsoft.com/office/drawing/2014/main" xmlns="" id="{B714DE99-8892-4254-AD52-8AF8324C50CA}"/>
               </a:ext>
             </a:extLst>
           </p:cNvPr>
@@ -7806,7 +8006,7 @@
           <p:cNvPr id="2" name="Titel 1">
             <a:extLst>
               <a:ext uri="{FF2B5EF4-FFF2-40B4-BE49-F238E27FC236}">
-                <a16:creationId xmlns:a16="http://schemas.microsoft.com/office/drawing/2014/main" id="{9EE6259C-8E17-43C1-815C-EC58FCDFCE07}"/>
+                <a16:creationId xmlns:a16="http://schemas.microsoft.com/office/drawing/2014/main" xmlns="" id="{9EE6259C-8E17-43C1-815C-EC58FCDFCE07}"/>
               </a:ext>
             </a:extLst>
           </p:cNvPr>
@@ -7839,7 +8039,7 @@
           <p:cNvPr id="7" name="Grafik 6">
             <a:extLst>
               <a:ext uri="{FF2B5EF4-FFF2-40B4-BE49-F238E27FC236}">
-                <a16:creationId xmlns:a16="http://schemas.microsoft.com/office/drawing/2014/main" id="{CF5D92CE-ABCF-491C-AD20-65205CAC2BC8}"/>
+                <a16:creationId xmlns:a16="http://schemas.microsoft.com/office/drawing/2014/main" xmlns="" id="{CF5D92CE-ABCF-491C-AD20-65205CAC2BC8}"/>
               </a:ext>
             </a:extLst>
           </p:cNvPr>
@@ -7905,7 +8105,7 @@
           <p:cNvPr id="2" name="Titel 1">
             <a:extLst>
               <a:ext uri="{FF2B5EF4-FFF2-40B4-BE49-F238E27FC236}">
-                <a16:creationId xmlns:a16="http://schemas.microsoft.com/office/drawing/2014/main" id="{9EE6259C-8E17-43C1-815C-EC58FCDFCE07}"/>
+                <a16:creationId xmlns:a16="http://schemas.microsoft.com/office/drawing/2014/main" xmlns="" id="{9EE6259C-8E17-43C1-815C-EC58FCDFCE07}"/>
               </a:ext>
             </a:extLst>
           </p:cNvPr>
@@ -7941,7 +8141,7 @@
           <p:cNvPr id="18" name="Grafik 17">
             <a:extLst>
               <a:ext uri="{FF2B5EF4-FFF2-40B4-BE49-F238E27FC236}">
-                <a16:creationId xmlns:a16="http://schemas.microsoft.com/office/drawing/2014/main" id="{50E7E37D-C9D6-497C-9462-1847C520EF17}"/>
+                <a16:creationId xmlns:a16="http://schemas.microsoft.com/office/drawing/2014/main" xmlns="" id="{50E7E37D-C9D6-497C-9462-1847C520EF17}"/>
               </a:ext>
             </a:extLst>
           </p:cNvPr>
@@ -7977,7 +8177,7 @@
           <p:cNvPr id="20" name="Grafik 19">
             <a:extLst>
               <a:ext uri="{FF2B5EF4-FFF2-40B4-BE49-F238E27FC236}">
-                <a16:creationId xmlns:a16="http://schemas.microsoft.com/office/drawing/2014/main" id="{B65397EF-5233-4329-A2BC-B9FD0E3D4552}"/>
+                <a16:creationId xmlns:a16="http://schemas.microsoft.com/office/drawing/2014/main" xmlns="" id="{B65397EF-5233-4329-A2BC-B9FD0E3D4552}"/>
               </a:ext>
             </a:extLst>
           </p:cNvPr>
@@ -8013,7 +8213,7 @@
           <p:cNvPr id="21" name="Grafik 20">
             <a:extLst>
               <a:ext uri="{FF2B5EF4-FFF2-40B4-BE49-F238E27FC236}">
-                <a16:creationId xmlns:a16="http://schemas.microsoft.com/office/drawing/2014/main" id="{A1DC1406-976B-4DCD-BED7-7DEC6E9D8CBB}"/>
+                <a16:creationId xmlns:a16="http://schemas.microsoft.com/office/drawing/2014/main" xmlns="" id="{A1DC1406-976B-4DCD-BED7-7DEC6E9D8CBB}"/>
               </a:ext>
             </a:extLst>
           </p:cNvPr>
@@ -8043,7 +8243,7 @@
           <p:cNvPr id="23" name="Grafik 22">
             <a:extLst>
               <a:ext uri="{FF2B5EF4-FFF2-40B4-BE49-F238E27FC236}">
-                <a16:creationId xmlns:a16="http://schemas.microsoft.com/office/drawing/2014/main" id="{8E0954D3-4692-42A3-AEF6-5F5F1DD717DF}"/>
+                <a16:creationId xmlns:a16="http://schemas.microsoft.com/office/drawing/2014/main" xmlns="" id="{8E0954D3-4692-42A3-AEF6-5F5F1DD717DF}"/>
               </a:ext>
             </a:extLst>
           </p:cNvPr>
@@ -8079,7 +8279,7 @@
           <p:cNvPr id="24" name="Grafik 23">
             <a:extLst>
               <a:ext uri="{FF2B5EF4-FFF2-40B4-BE49-F238E27FC236}">
-                <a16:creationId xmlns:a16="http://schemas.microsoft.com/office/drawing/2014/main" id="{B3C25451-2B01-4511-B3D3-446047570DE5}"/>
+                <a16:creationId xmlns:a16="http://schemas.microsoft.com/office/drawing/2014/main" xmlns="" id="{B3C25451-2B01-4511-B3D3-446047570DE5}"/>
               </a:ext>
             </a:extLst>
           </p:cNvPr>
@@ -8109,7 +8309,7 @@
           <p:cNvPr id="26" name="Grafik 25">
             <a:extLst>
               <a:ext uri="{FF2B5EF4-FFF2-40B4-BE49-F238E27FC236}">
-                <a16:creationId xmlns:a16="http://schemas.microsoft.com/office/drawing/2014/main" id="{1367260E-8C66-4449-B88B-A196FD0908A7}"/>
+                <a16:creationId xmlns:a16="http://schemas.microsoft.com/office/drawing/2014/main" xmlns="" id="{1367260E-8C66-4449-B88B-A196FD0908A7}"/>
               </a:ext>
             </a:extLst>
           </p:cNvPr>
@@ -8145,7 +8345,7 @@
           <p:cNvPr id="28" name="Grafik 27">
             <a:extLst>
               <a:ext uri="{FF2B5EF4-FFF2-40B4-BE49-F238E27FC236}">
-                <a16:creationId xmlns:a16="http://schemas.microsoft.com/office/drawing/2014/main" id="{3385D22C-EE8A-4485-AE09-C19130CBE8C3}"/>
+                <a16:creationId xmlns:a16="http://schemas.microsoft.com/office/drawing/2014/main" xmlns="" id="{3385D22C-EE8A-4485-AE09-C19130CBE8C3}"/>
               </a:ext>
             </a:extLst>
           </p:cNvPr>
@@ -8181,7 +8381,7 @@
           <p:cNvPr id="29" name="Grafik 28">
             <a:extLst>
               <a:ext uri="{FF2B5EF4-FFF2-40B4-BE49-F238E27FC236}">
-                <a16:creationId xmlns:a16="http://schemas.microsoft.com/office/drawing/2014/main" id="{467B77FF-95C2-44EA-AC51-9E575824E2C5}"/>
+                <a16:creationId xmlns:a16="http://schemas.microsoft.com/office/drawing/2014/main" xmlns="" id="{467B77FF-95C2-44EA-AC51-9E575824E2C5}"/>
               </a:ext>
             </a:extLst>
           </p:cNvPr>
@@ -8241,7 +8441,7 @@
           <p:cNvPr id="2" name="Titel 1">
             <a:extLst>
               <a:ext uri="{FF2B5EF4-FFF2-40B4-BE49-F238E27FC236}">
-                <a16:creationId xmlns:a16="http://schemas.microsoft.com/office/drawing/2014/main" id="{1F20CAF2-C127-4F0A-B316-19CC56055294}"/>
+                <a16:creationId xmlns:a16="http://schemas.microsoft.com/office/drawing/2014/main" xmlns="" id="{1F20CAF2-C127-4F0A-B316-19CC56055294}"/>
               </a:ext>
             </a:extLst>
           </p:cNvPr>
@@ -8269,7 +8469,7 @@
           <p:cNvPr id="5" name="Inhaltsplatzhalter 2">
             <a:extLst>
               <a:ext uri="{FF2B5EF4-FFF2-40B4-BE49-F238E27FC236}">
-                <a16:creationId xmlns:a16="http://schemas.microsoft.com/office/drawing/2014/main" id="{64590773-EBBD-4338-B137-C3DAAB80D082}"/>
+                <a16:creationId xmlns:a16="http://schemas.microsoft.com/office/drawing/2014/main" xmlns="" id="{64590773-EBBD-4338-B137-C3DAAB80D082}"/>
               </a:ext>
             </a:extLst>
           </p:cNvPr>
@@ -8497,7 +8697,7 @@
           <p:cNvPr id="2" name="Titel 1">
             <a:extLst>
               <a:ext uri="{FF2B5EF4-FFF2-40B4-BE49-F238E27FC236}">
-                <a16:creationId xmlns:a16="http://schemas.microsoft.com/office/drawing/2014/main" id="{9EE6259C-8E17-43C1-815C-EC58FCDFCE07}"/>
+                <a16:creationId xmlns:a16="http://schemas.microsoft.com/office/drawing/2014/main" xmlns="" id="{9EE6259C-8E17-43C1-815C-EC58FCDFCE07}"/>
               </a:ext>
             </a:extLst>
           </p:cNvPr>
@@ -8533,7 +8733,7 @@
           <p:cNvPr id="6" name="Grafik 5">
             <a:extLst>
               <a:ext uri="{FF2B5EF4-FFF2-40B4-BE49-F238E27FC236}">
-                <a16:creationId xmlns:a16="http://schemas.microsoft.com/office/drawing/2014/main" id="{14932DAF-0E81-4E95-8560-F9C199BFDDCF}"/>
+                <a16:creationId xmlns:a16="http://schemas.microsoft.com/office/drawing/2014/main" xmlns="" id="{14932DAF-0E81-4E95-8560-F9C199BFDDCF}"/>
               </a:ext>
             </a:extLst>
           </p:cNvPr>

</xml_diff>

<commit_message>
Mediapipe extension ohn new dataset
</commit_message>
<xml_diff>
--- a/Präsentation1 (3).pptx
+++ b/Präsentation1 (3).pptx
@@ -38,7 +38,8 @@
     <p:sldId id="290" r:id="rId32"/>
     <p:sldId id="288" r:id="rId33"/>
     <p:sldId id="289" r:id="rId34"/>
-    <p:sldId id="291" r:id="rId35"/>
+    <p:sldId id="292" r:id="rId35"/>
+    <p:sldId id="291" r:id="rId36"/>
   </p:sldIdLst>
   <p:sldSz cx="12192000" cy="6858000"/>
   <p:notesSz cx="6858000" cy="9144000"/>
@@ -167,7 +168,7 @@
           <p:cNvPr id="2" name="Titel 1">
             <a:extLst>
               <a:ext uri="{FF2B5EF4-FFF2-40B4-BE49-F238E27FC236}">
-                <a16:creationId xmlns:a16="http://schemas.microsoft.com/office/drawing/2014/main" xmlns="" id="{942B8611-3801-48D0-8431-394DEEB11423}"/>
+                <a16:creationId xmlns="" xmlns:a16="http://schemas.microsoft.com/office/drawing/2014/main" id="{942B8611-3801-48D0-8431-394DEEB11423}"/>
               </a:ext>
             </a:extLst>
           </p:cNvPr>
@@ -204,7 +205,7 @@
           <p:cNvPr id="3" name="Untertitel 2">
             <a:extLst>
               <a:ext uri="{FF2B5EF4-FFF2-40B4-BE49-F238E27FC236}">
-                <a16:creationId xmlns:a16="http://schemas.microsoft.com/office/drawing/2014/main" xmlns="" id="{C9350902-D38C-4216-B4AC-6571FF72811F}"/>
+                <a16:creationId xmlns="" xmlns:a16="http://schemas.microsoft.com/office/drawing/2014/main" id="{C9350902-D38C-4216-B4AC-6571FF72811F}"/>
               </a:ext>
             </a:extLst>
           </p:cNvPr>
@@ -274,7 +275,7 @@
           <p:cNvPr id="4" name="Datumsplatzhalter 3">
             <a:extLst>
               <a:ext uri="{FF2B5EF4-FFF2-40B4-BE49-F238E27FC236}">
-                <a16:creationId xmlns:a16="http://schemas.microsoft.com/office/drawing/2014/main" xmlns="" id="{89187501-D588-43D4-AC39-353DB100B20E}"/>
+                <a16:creationId xmlns="" xmlns:a16="http://schemas.microsoft.com/office/drawing/2014/main" id="{89187501-D588-43D4-AC39-353DB100B20E}"/>
               </a:ext>
             </a:extLst>
           </p:cNvPr>
@@ -303,7 +304,7 @@
           <p:cNvPr id="5" name="Fußzeilenplatzhalter 4">
             <a:extLst>
               <a:ext uri="{FF2B5EF4-FFF2-40B4-BE49-F238E27FC236}">
-                <a16:creationId xmlns:a16="http://schemas.microsoft.com/office/drawing/2014/main" xmlns="" id="{8EF81E42-93F7-4610-A201-0CCDEFEEBD22}"/>
+                <a16:creationId xmlns="" xmlns:a16="http://schemas.microsoft.com/office/drawing/2014/main" id="{8EF81E42-93F7-4610-A201-0CCDEFEEBD22}"/>
               </a:ext>
             </a:extLst>
           </p:cNvPr>
@@ -328,7 +329,7 @@
           <p:cNvPr id="6" name="Foliennummernplatzhalter 5">
             <a:extLst>
               <a:ext uri="{FF2B5EF4-FFF2-40B4-BE49-F238E27FC236}">
-                <a16:creationId xmlns:a16="http://schemas.microsoft.com/office/drawing/2014/main" xmlns="" id="{0658F116-05D5-44DC-A432-C3ED68337AF8}"/>
+                <a16:creationId xmlns="" xmlns:a16="http://schemas.microsoft.com/office/drawing/2014/main" id="{0658F116-05D5-44DC-A432-C3ED68337AF8}"/>
               </a:ext>
             </a:extLst>
           </p:cNvPr>
@@ -387,7 +388,7 @@
           <p:cNvPr id="2" name="Titel 1">
             <a:extLst>
               <a:ext uri="{FF2B5EF4-FFF2-40B4-BE49-F238E27FC236}">
-                <a16:creationId xmlns:a16="http://schemas.microsoft.com/office/drawing/2014/main" xmlns="" id="{E8A760C8-6FE6-4598-9D23-857B7CF91C4F}"/>
+                <a16:creationId xmlns="" xmlns:a16="http://schemas.microsoft.com/office/drawing/2014/main" id="{E8A760C8-6FE6-4598-9D23-857B7CF91C4F}"/>
               </a:ext>
             </a:extLst>
           </p:cNvPr>
@@ -415,7 +416,7 @@
           <p:cNvPr id="3" name="Vertikaler Textplatzhalter 2">
             <a:extLst>
               <a:ext uri="{FF2B5EF4-FFF2-40B4-BE49-F238E27FC236}">
-                <a16:creationId xmlns:a16="http://schemas.microsoft.com/office/drawing/2014/main" xmlns="" id="{6C00B4A6-C515-41F4-8A81-E4E893E725E2}"/>
+                <a16:creationId xmlns="" xmlns:a16="http://schemas.microsoft.com/office/drawing/2014/main" id="{6C00B4A6-C515-41F4-8A81-E4E893E725E2}"/>
               </a:ext>
             </a:extLst>
           </p:cNvPr>
@@ -472,7 +473,7 @@
           <p:cNvPr id="4" name="Datumsplatzhalter 3">
             <a:extLst>
               <a:ext uri="{FF2B5EF4-FFF2-40B4-BE49-F238E27FC236}">
-                <a16:creationId xmlns:a16="http://schemas.microsoft.com/office/drawing/2014/main" xmlns="" id="{98E82CBA-353B-4651-BE7E-C2A9A81748C0}"/>
+                <a16:creationId xmlns="" xmlns:a16="http://schemas.microsoft.com/office/drawing/2014/main" id="{98E82CBA-353B-4651-BE7E-C2A9A81748C0}"/>
               </a:ext>
             </a:extLst>
           </p:cNvPr>
@@ -501,7 +502,7 @@
           <p:cNvPr id="5" name="Fußzeilenplatzhalter 4">
             <a:extLst>
               <a:ext uri="{FF2B5EF4-FFF2-40B4-BE49-F238E27FC236}">
-                <a16:creationId xmlns:a16="http://schemas.microsoft.com/office/drawing/2014/main" xmlns="" id="{6F0CEA61-B0FB-4D32-838E-422543E0C2E6}"/>
+                <a16:creationId xmlns="" xmlns:a16="http://schemas.microsoft.com/office/drawing/2014/main" id="{6F0CEA61-B0FB-4D32-838E-422543E0C2E6}"/>
               </a:ext>
             </a:extLst>
           </p:cNvPr>
@@ -526,7 +527,7 @@
           <p:cNvPr id="6" name="Foliennummernplatzhalter 5">
             <a:extLst>
               <a:ext uri="{FF2B5EF4-FFF2-40B4-BE49-F238E27FC236}">
-                <a16:creationId xmlns:a16="http://schemas.microsoft.com/office/drawing/2014/main" xmlns="" id="{E31E0085-9A30-42AB-9591-34DEAF2C6F30}"/>
+                <a16:creationId xmlns="" xmlns:a16="http://schemas.microsoft.com/office/drawing/2014/main" id="{E31E0085-9A30-42AB-9591-34DEAF2C6F30}"/>
               </a:ext>
             </a:extLst>
           </p:cNvPr>
@@ -585,7 +586,7 @@
           <p:cNvPr id="2" name="Vertikaler Titel 1">
             <a:extLst>
               <a:ext uri="{FF2B5EF4-FFF2-40B4-BE49-F238E27FC236}">
-                <a16:creationId xmlns:a16="http://schemas.microsoft.com/office/drawing/2014/main" xmlns="" id="{1CB43BBC-F05C-4A18-AEA0-761CC37DE783}"/>
+                <a16:creationId xmlns="" xmlns:a16="http://schemas.microsoft.com/office/drawing/2014/main" id="{1CB43BBC-F05C-4A18-AEA0-761CC37DE783}"/>
               </a:ext>
             </a:extLst>
           </p:cNvPr>
@@ -618,7 +619,7 @@
           <p:cNvPr id="3" name="Vertikaler Textplatzhalter 2">
             <a:extLst>
               <a:ext uri="{FF2B5EF4-FFF2-40B4-BE49-F238E27FC236}">
-                <a16:creationId xmlns:a16="http://schemas.microsoft.com/office/drawing/2014/main" xmlns="" id="{802C4948-4338-44E8-9C16-50BD9F30756B}"/>
+                <a16:creationId xmlns="" xmlns:a16="http://schemas.microsoft.com/office/drawing/2014/main" id="{802C4948-4338-44E8-9C16-50BD9F30756B}"/>
               </a:ext>
             </a:extLst>
           </p:cNvPr>
@@ -680,7 +681,7 @@
           <p:cNvPr id="4" name="Datumsplatzhalter 3">
             <a:extLst>
               <a:ext uri="{FF2B5EF4-FFF2-40B4-BE49-F238E27FC236}">
-                <a16:creationId xmlns:a16="http://schemas.microsoft.com/office/drawing/2014/main" xmlns="" id="{768D878E-1E0D-4E5E-A72C-EE1D97CCA363}"/>
+                <a16:creationId xmlns="" xmlns:a16="http://schemas.microsoft.com/office/drawing/2014/main" id="{768D878E-1E0D-4E5E-A72C-EE1D97CCA363}"/>
               </a:ext>
             </a:extLst>
           </p:cNvPr>
@@ -709,7 +710,7 @@
           <p:cNvPr id="5" name="Fußzeilenplatzhalter 4">
             <a:extLst>
               <a:ext uri="{FF2B5EF4-FFF2-40B4-BE49-F238E27FC236}">
-                <a16:creationId xmlns:a16="http://schemas.microsoft.com/office/drawing/2014/main" xmlns="" id="{5951442F-09E0-472E-813A-9401C4EF374E}"/>
+                <a16:creationId xmlns="" xmlns:a16="http://schemas.microsoft.com/office/drawing/2014/main" id="{5951442F-09E0-472E-813A-9401C4EF374E}"/>
               </a:ext>
             </a:extLst>
           </p:cNvPr>
@@ -734,7 +735,7 @@
           <p:cNvPr id="6" name="Foliennummernplatzhalter 5">
             <a:extLst>
               <a:ext uri="{FF2B5EF4-FFF2-40B4-BE49-F238E27FC236}">
-                <a16:creationId xmlns:a16="http://schemas.microsoft.com/office/drawing/2014/main" xmlns="" id="{3A89B36C-AFD0-4FA3-A271-4599F5EAD210}"/>
+                <a16:creationId xmlns="" xmlns:a16="http://schemas.microsoft.com/office/drawing/2014/main" id="{3A89B36C-AFD0-4FA3-A271-4599F5EAD210}"/>
               </a:ext>
             </a:extLst>
           </p:cNvPr>
@@ -793,7 +794,7 @@
           <p:cNvPr id="2" name="Titel 1">
             <a:extLst>
               <a:ext uri="{FF2B5EF4-FFF2-40B4-BE49-F238E27FC236}">
-                <a16:creationId xmlns:a16="http://schemas.microsoft.com/office/drawing/2014/main" xmlns="" id="{7A9100B0-C2F4-48F4-A376-F4BE369A2847}"/>
+                <a16:creationId xmlns="" xmlns:a16="http://schemas.microsoft.com/office/drawing/2014/main" id="{7A9100B0-C2F4-48F4-A376-F4BE369A2847}"/>
               </a:ext>
             </a:extLst>
           </p:cNvPr>
@@ -821,7 +822,7 @@
           <p:cNvPr id="3" name="Inhaltsplatzhalter 2">
             <a:extLst>
               <a:ext uri="{FF2B5EF4-FFF2-40B4-BE49-F238E27FC236}">
-                <a16:creationId xmlns:a16="http://schemas.microsoft.com/office/drawing/2014/main" xmlns="" id="{68E6F6CB-88AB-4507-8412-28160033ADE1}"/>
+                <a16:creationId xmlns="" xmlns:a16="http://schemas.microsoft.com/office/drawing/2014/main" id="{68E6F6CB-88AB-4507-8412-28160033ADE1}"/>
               </a:ext>
             </a:extLst>
           </p:cNvPr>
@@ -878,7 +879,7 @@
           <p:cNvPr id="4" name="Datumsplatzhalter 3">
             <a:extLst>
               <a:ext uri="{FF2B5EF4-FFF2-40B4-BE49-F238E27FC236}">
-                <a16:creationId xmlns:a16="http://schemas.microsoft.com/office/drawing/2014/main" xmlns="" id="{CC6E9D85-1773-4CC1-AE55-C562FE227D1E}"/>
+                <a16:creationId xmlns="" xmlns:a16="http://schemas.microsoft.com/office/drawing/2014/main" id="{CC6E9D85-1773-4CC1-AE55-C562FE227D1E}"/>
               </a:ext>
             </a:extLst>
           </p:cNvPr>
@@ -907,7 +908,7 @@
           <p:cNvPr id="5" name="Fußzeilenplatzhalter 4">
             <a:extLst>
               <a:ext uri="{FF2B5EF4-FFF2-40B4-BE49-F238E27FC236}">
-                <a16:creationId xmlns:a16="http://schemas.microsoft.com/office/drawing/2014/main" xmlns="" id="{BE553531-079B-4CCE-8F15-D985D12DC6E1}"/>
+                <a16:creationId xmlns="" xmlns:a16="http://schemas.microsoft.com/office/drawing/2014/main" id="{BE553531-079B-4CCE-8F15-D985D12DC6E1}"/>
               </a:ext>
             </a:extLst>
           </p:cNvPr>
@@ -932,7 +933,7 @@
           <p:cNvPr id="6" name="Foliennummernplatzhalter 5">
             <a:extLst>
               <a:ext uri="{FF2B5EF4-FFF2-40B4-BE49-F238E27FC236}">
-                <a16:creationId xmlns:a16="http://schemas.microsoft.com/office/drawing/2014/main" xmlns="" id="{ED376F7B-1D08-41C8-991F-7ED6097A59BD}"/>
+                <a16:creationId xmlns="" xmlns:a16="http://schemas.microsoft.com/office/drawing/2014/main" id="{ED376F7B-1D08-41C8-991F-7ED6097A59BD}"/>
               </a:ext>
             </a:extLst>
           </p:cNvPr>
@@ -991,7 +992,7 @@
           <p:cNvPr id="2" name="Titel 1">
             <a:extLst>
               <a:ext uri="{FF2B5EF4-FFF2-40B4-BE49-F238E27FC236}">
-                <a16:creationId xmlns:a16="http://schemas.microsoft.com/office/drawing/2014/main" xmlns="" id="{A0A9801A-278B-494B-B60C-BB2133B32995}"/>
+                <a16:creationId xmlns="" xmlns:a16="http://schemas.microsoft.com/office/drawing/2014/main" id="{A0A9801A-278B-494B-B60C-BB2133B32995}"/>
               </a:ext>
             </a:extLst>
           </p:cNvPr>
@@ -1028,7 +1029,7 @@
           <p:cNvPr id="3" name="Textplatzhalter 2">
             <a:extLst>
               <a:ext uri="{FF2B5EF4-FFF2-40B4-BE49-F238E27FC236}">
-                <a16:creationId xmlns:a16="http://schemas.microsoft.com/office/drawing/2014/main" xmlns="" id="{9717471E-0AB4-4009-9D2A-5D6863302B16}"/>
+                <a16:creationId xmlns="" xmlns:a16="http://schemas.microsoft.com/office/drawing/2014/main" id="{9717471E-0AB4-4009-9D2A-5D6863302B16}"/>
               </a:ext>
             </a:extLst>
           </p:cNvPr>
@@ -1153,7 +1154,7 @@
           <p:cNvPr id="4" name="Datumsplatzhalter 3">
             <a:extLst>
               <a:ext uri="{FF2B5EF4-FFF2-40B4-BE49-F238E27FC236}">
-                <a16:creationId xmlns:a16="http://schemas.microsoft.com/office/drawing/2014/main" xmlns="" id="{7C463F00-B142-4A4A-98EB-4F33172601CC}"/>
+                <a16:creationId xmlns="" xmlns:a16="http://schemas.microsoft.com/office/drawing/2014/main" id="{7C463F00-B142-4A4A-98EB-4F33172601CC}"/>
               </a:ext>
             </a:extLst>
           </p:cNvPr>
@@ -1182,7 +1183,7 @@
           <p:cNvPr id="5" name="Fußzeilenplatzhalter 4">
             <a:extLst>
               <a:ext uri="{FF2B5EF4-FFF2-40B4-BE49-F238E27FC236}">
-                <a16:creationId xmlns:a16="http://schemas.microsoft.com/office/drawing/2014/main" xmlns="" id="{7D88A73C-AAE8-4C17-82DF-B76FC58AE174}"/>
+                <a16:creationId xmlns="" xmlns:a16="http://schemas.microsoft.com/office/drawing/2014/main" id="{7D88A73C-AAE8-4C17-82DF-B76FC58AE174}"/>
               </a:ext>
             </a:extLst>
           </p:cNvPr>
@@ -1207,7 +1208,7 @@
           <p:cNvPr id="6" name="Foliennummernplatzhalter 5">
             <a:extLst>
               <a:ext uri="{FF2B5EF4-FFF2-40B4-BE49-F238E27FC236}">
-                <a16:creationId xmlns:a16="http://schemas.microsoft.com/office/drawing/2014/main" xmlns="" id="{10401940-5BF1-460F-89AA-8DCCE2F778EF}"/>
+                <a16:creationId xmlns="" xmlns:a16="http://schemas.microsoft.com/office/drawing/2014/main" id="{10401940-5BF1-460F-89AA-8DCCE2F778EF}"/>
               </a:ext>
             </a:extLst>
           </p:cNvPr>
@@ -1266,7 +1267,7 @@
           <p:cNvPr id="2" name="Titel 1">
             <a:extLst>
               <a:ext uri="{FF2B5EF4-FFF2-40B4-BE49-F238E27FC236}">
-                <a16:creationId xmlns:a16="http://schemas.microsoft.com/office/drawing/2014/main" xmlns="" id="{33BE81C7-9434-488E-A7D1-2311872FBB2D}"/>
+                <a16:creationId xmlns="" xmlns:a16="http://schemas.microsoft.com/office/drawing/2014/main" id="{33BE81C7-9434-488E-A7D1-2311872FBB2D}"/>
               </a:ext>
             </a:extLst>
           </p:cNvPr>
@@ -1294,7 +1295,7 @@
           <p:cNvPr id="3" name="Inhaltsplatzhalter 2">
             <a:extLst>
               <a:ext uri="{FF2B5EF4-FFF2-40B4-BE49-F238E27FC236}">
-                <a16:creationId xmlns:a16="http://schemas.microsoft.com/office/drawing/2014/main" xmlns="" id="{F202816A-E434-48B5-9142-EFE88BCADA73}"/>
+                <a16:creationId xmlns="" xmlns:a16="http://schemas.microsoft.com/office/drawing/2014/main" id="{F202816A-E434-48B5-9142-EFE88BCADA73}"/>
               </a:ext>
             </a:extLst>
           </p:cNvPr>
@@ -1356,7 +1357,7 @@
           <p:cNvPr id="4" name="Inhaltsplatzhalter 3">
             <a:extLst>
               <a:ext uri="{FF2B5EF4-FFF2-40B4-BE49-F238E27FC236}">
-                <a16:creationId xmlns:a16="http://schemas.microsoft.com/office/drawing/2014/main" xmlns="" id="{65EBCF17-28DF-49E5-8ED4-CDB30DCF881D}"/>
+                <a16:creationId xmlns="" xmlns:a16="http://schemas.microsoft.com/office/drawing/2014/main" id="{65EBCF17-28DF-49E5-8ED4-CDB30DCF881D}"/>
               </a:ext>
             </a:extLst>
           </p:cNvPr>
@@ -1418,7 +1419,7 @@
           <p:cNvPr id="5" name="Datumsplatzhalter 4">
             <a:extLst>
               <a:ext uri="{FF2B5EF4-FFF2-40B4-BE49-F238E27FC236}">
-                <a16:creationId xmlns:a16="http://schemas.microsoft.com/office/drawing/2014/main" xmlns="" id="{B2EDD2D6-67BC-460E-8CDF-8FDF75CFACB6}"/>
+                <a16:creationId xmlns="" xmlns:a16="http://schemas.microsoft.com/office/drawing/2014/main" id="{B2EDD2D6-67BC-460E-8CDF-8FDF75CFACB6}"/>
               </a:ext>
             </a:extLst>
           </p:cNvPr>
@@ -1447,7 +1448,7 @@
           <p:cNvPr id="6" name="Fußzeilenplatzhalter 5">
             <a:extLst>
               <a:ext uri="{FF2B5EF4-FFF2-40B4-BE49-F238E27FC236}">
-                <a16:creationId xmlns:a16="http://schemas.microsoft.com/office/drawing/2014/main" xmlns="" id="{90D8E9BF-79AC-4CD3-9A68-7B51E256D8B2}"/>
+                <a16:creationId xmlns="" xmlns:a16="http://schemas.microsoft.com/office/drawing/2014/main" id="{90D8E9BF-79AC-4CD3-9A68-7B51E256D8B2}"/>
               </a:ext>
             </a:extLst>
           </p:cNvPr>
@@ -1472,7 +1473,7 @@
           <p:cNvPr id="7" name="Foliennummernplatzhalter 6">
             <a:extLst>
               <a:ext uri="{FF2B5EF4-FFF2-40B4-BE49-F238E27FC236}">
-                <a16:creationId xmlns:a16="http://schemas.microsoft.com/office/drawing/2014/main" xmlns="" id="{485B7F93-2931-4531-B9E8-58D231D358A8}"/>
+                <a16:creationId xmlns="" xmlns:a16="http://schemas.microsoft.com/office/drawing/2014/main" id="{485B7F93-2931-4531-B9E8-58D231D358A8}"/>
               </a:ext>
             </a:extLst>
           </p:cNvPr>
@@ -1531,7 +1532,7 @@
           <p:cNvPr id="2" name="Titel 1">
             <a:extLst>
               <a:ext uri="{FF2B5EF4-FFF2-40B4-BE49-F238E27FC236}">
-                <a16:creationId xmlns:a16="http://schemas.microsoft.com/office/drawing/2014/main" xmlns="" id="{3D46B07A-A2D7-4D73-979A-D2413AD00737}"/>
+                <a16:creationId xmlns="" xmlns:a16="http://schemas.microsoft.com/office/drawing/2014/main" id="{3D46B07A-A2D7-4D73-979A-D2413AD00737}"/>
               </a:ext>
             </a:extLst>
           </p:cNvPr>
@@ -1564,7 +1565,7 @@
           <p:cNvPr id="3" name="Textplatzhalter 2">
             <a:extLst>
               <a:ext uri="{FF2B5EF4-FFF2-40B4-BE49-F238E27FC236}">
-                <a16:creationId xmlns:a16="http://schemas.microsoft.com/office/drawing/2014/main" xmlns="" id="{FCA61B03-9C49-495C-81DE-2FFDEE8F682A}"/>
+                <a16:creationId xmlns="" xmlns:a16="http://schemas.microsoft.com/office/drawing/2014/main" id="{FCA61B03-9C49-495C-81DE-2FFDEE8F682A}"/>
               </a:ext>
             </a:extLst>
           </p:cNvPr>
@@ -1635,7 +1636,7 @@
           <p:cNvPr id="4" name="Inhaltsplatzhalter 3">
             <a:extLst>
               <a:ext uri="{FF2B5EF4-FFF2-40B4-BE49-F238E27FC236}">
-                <a16:creationId xmlns:a16="http://schemas.microsoft.com/office/drawing/2014/main" xmlns="" id="{DBCA1775-97C7-46B3-BD29-07B554A4A9A6}"/>
+                <a16:creationId xmlns="" xmlns:a16="http://schemas.microsoft.com/office/drawing/2014/main" id="{DBCA1775-97C7-46B3-BD29-07B554A4A9A6}"/>
               </a:ext>
             </a:extLst>
           </p:cNvPr>
@@ -1697,7 +1698,7 @@
           <p:cNvPr id="5" name="Textplatzhalter 4">
             <a:extLst>
               <a:ext uri="{FF2B5EF4-FFF2-40B4-BE49-F238E27FC236}">
-                <a16:creationId xmlns:a16="http://schemas.microsoft.com/office/drawing/2014/main" xmlns="" id="{B7D1F09A-4B99-440A-9B38-58AC2C7E1DB8}"/>
+                <a16:creationId xmlns="" xmlns:a16="http://schemas.microsoft.com/office/drawing/2014/main" id="{B7D1F09A-4B99-440A-9B38-58AC2C7E1DB8}"/>
               </a:ext>
             </a:extLst>
           </p:cNvPr>
@@ -1768,7 +1769,7 @@
           <p:cNvPr id="6" name="Inhaltsplatzhalter 5">
             <a:extLst>
               <a:ext uri="{FF2B5EF4-FFF2-40B4-BE49-F238E27FC236}">
-                <a16:creationId xmlns:a16="http://schemas.microsoft.com/office/drawing/2014/main" xmlns="" id="{48DC35C7-616B-4ED5-8FE0-49BFB8433A13}"/>
+                <a16:creationId xmlns="" xmlns:a16="http://schemas.microsoft.com/office/drawing/2014/main" id="{48DC35C7-616B-4ED5-8FE0-49BFB8433A13}"/>
               </a:ext>
             </a:extLst>
           </p:cNvPr>
@@ -1830,7 +1831,7 @@
           <p:cNvPr id="7" name="Datumsplatzhalter 6">
             <a:extLst>
               <a:ext uri="{FF2B5EF4-FFF2-40B4-BE49-F238E27FC236}">
-                <a16:creationId xmlns:a16="http://schemas.microsoft.com/office/drawing/2014/main" xmlns="" id="{7C09774F-FE5E-4D56-BAA2-74E0175EE930}"/>
+                <a16:creationId xmlns="" xmlns:a16="http://schemas.microsoft.com/office/drawing/2014/main" id="{7C09774F-FE5E-4D56-BAA2-74E0175EE930}"/>
               </a:ext>
             </a:extLst>
           </p:cNvPr>
@@ -1859,7 +1860,7 @@
           <p:cNvPr id="8" name="Fußzeilenplatzhalter 7">
             <a:extLst>
               <a:ext uri="{FF2B5EF4-FFF2-40B4-BE49-F238E27FC236}">
-                <a16:creationId xmlns:a16="http://schemas.microsoft.com/office/drawing/2014/main" xmlns="" id="{7180F28F-6BEA-4DB0-AC42-CB0270F755A6}"/>
+                <a16:creationId xmlns="" xmlns:a16="http://schemas.microsoft.com/office/drawing/2014/main" id="{7180F28F-6BEA-4DB0-AC42-CB0270F755A6}"/>
               </a:ext>
             </a:extLst>
           </p:cNvPr>
@@ -1884,7 +1885,7 @@
           <p:cNvPr id="9" name="Foliennummernplatzhalter 8">
             <a:extLst>
               <a:ext uri="{FF2B5EF4-FFF2-40B4-BE49-F238E27FC236}">
-                <a16:creationId xmlns:a16="http://schemas.microsoft.com/office/drawing/2014/main" xmlns="" id="{E6237190-7EDA-4023-A4FF-53EE97FDD5BE}"/>
+                <a16:creationId xmlns="" xmlns:a16="http://schemas.microsoft.com/office/drawing/2014/main" id="{E6237190-7EDA-4023-A4FF-53EE97FDD5BE}"/>
               </a:ext>
             </a:extLst>
           </p:cNvPr>
@@ -1943,7 +1944,7 @@
           <p:cNvPr id="2" name="Titel 1">
             <a:extLst>
               <a:ext uri="{FF2B5EF4-FFF2-40B4-BE49-F238E27FC236}">
-                <a16:creationId xmlns:a16="http://schemas.microsoft.com/office/drawing/2014/main" xmlns="" id="{6ED1B45A-5C77-4516-A90B-EC7777A730EC}"/>
+                <a16:creationId xmlns="" xmlns:a16="http://schemas.microsoft.com/office/drawing/2014/main" id="{6ED1B45A-5C77-4516-A90B-EC7777A730EC}"/>
               </a:ext>
             </a:extLst>
           </p:cNvPr>
@@ -1971,7 +1972,7 @@
           <p:cNvPr id="3" name="Datumsplatzhalter 2">
             <a:extLst>
               <a:ext uri="{FF2B5EF4-FFF2-40B4-BE49-F238E27FC236}">
-                <a16:creationId xmlns:a16="http://schemas.microsoft.com/office/drawing/2014/main" xmlns="" id="{47C2DDE4-1523-44CD-AB8E-958A3577ADA6}"/>
+                <a16:creationId xmlns="" xmlns:a16="http://schemas.microsoft.com/office/drawing/2014/main" id="{47C2DDE4-1523-44CD-AB8E-958A3577ADA6}"/>
               </a:ext>
             </a:extLst>
           </p:cNvPr>
@@ -2000,7 +2001,7 @@
           <p:cNvPr id="4" name="Fußzeilenplatzhalter 3">
             <a:extLst>
               <a:ext uri="{FF2B5EF4-FFF2-40B4-BE49-F238E27FC236}">
-                <a16:creationId xmlns:a16="http://schemas.microsoft.com/office/drawing/2014/main" xmlns="" id="{9CD76EA9-2BCA-49B6-BF94-14FB51A59F6A}"/>
+                <a16:creationId xmlns="" xmlns:a16="http://schemas.microsoft.com/office/drawing/2014/main" id="{9CD76EA9-2BCA-49B6-BF94-14FB51A59F6A}"/>
               </a:ext>
             </a:extLst>
           </p:cNvPr>
@@ -2025,7 +2026,7 @@
           <p:cNvPr id="5" name="Foliennummernplatzhalter 4">
             <a:extLst>
               <a:ext uri="{FF2B5EF4-FFF2-40B4-BE49-F238E27FC236}">
-                <a16:creationId xmlns:a16="http://schemas.microsoft.com/office/drawing/2014/main" xmlns="" id="{334D001A-E7FB-40C7-8DF6-0D285709B545}"/>
+                <a16:creationId xmlns="" xmlns:a16="http://schemas.microsoft.com/office/drawing/2014/main" id="{334D001A-E7FB-40C7-8DF6-0D285709B545}"/>
               </a:ext>
             </a:extLst>
           </p:cNvPr>
@@ -2084,7 +2085,7 @@
           <p:cNvPr id="2" name="Datumsplatzhalter 1">
             <a:extLst>
               <a:ext uri="{FF2B5EF4-FFF2-40B4-BE49-F238E27FC236}">
-                <a16:creationId xmlns:a16="http://schemas.microsoft.com/office/drawing/2014/main" xmlns="" id="{F5E42BE2-3BE3-4D39-954A-54EB2EA825A3}"/>
+                <a16:creationId xmlns="" xmlns:a16="http://schemas.microsoft.com/office/drawing/2014/main" id="{F5E42BE2-3BE3-4D39-954A-54EB2EA825A3}"/>
               </a:ext>
             </a:extLst>
           </p:cNvPr>
@@ -2113,7 +2114,7 @@
           <p:cNvPr id="3" name="Fußzeilenplatzhalter 2">
             <a:extLst>
               <a:ext uri="{FF2B5EF4-FFF2-40B4-BE49-F238E27FC236}">
-                <a16:creationId xmlns:a16="http://schemas.microsoft.com/office/drawing/2014/main" xmlns="" id="{E3354D42-7A99-433D-9EF4-C70287BB0F0A}"/>
+                <a16:creationId xmlns="" xmlns:a16="http://schemas.microsoft.com/office/drawing/2014/main" id="{E3354D42-7A99-433D-9EF4-C70287BB0F0A}"/>
               </a:ext>
             </a:extLst>
           </p:cNvPr>
@@ -2138,7 +2139,7 @@
           <p:cNvPr id="4" name="Foliennummernplatzhalter 3">
             <a:extLst>
               <a:ext uri="{FF2B5EF4-FFF2-40B4-BE49-F238E27FC236}">
-                <a16:creationId xmlns:a16="http://schemas.microsoft.com/office/drawing/2014/main" xmlns="" id="{21551C44-919D-4F61-A7B1-7A9B52E986F8}"/>
+                <a16:creationId xmlns="" xmlns:a16="http://schemas.microsoft.com/office/drawing/2014/main" id="{21551C44-919D-4F61-A7B1-7A9B52E986F8}"/>
               </a:ext>
             </a:extLst>
           </p:cNvPr>
@@ -2197,7 +2198,7 @@
           <p:cNvPr id="2" name="Titel 1">
             <a:extLst>
               <a:ext uri="{FF2B5EF4-FFF2-40B4-BE49-F238E27FC236}">
-                <a16:creationId xmlns:a16="http://schemas.microsoft.com/office/drawing/2014/main" xmlns="" id="{3768DE4E-E7DC-4947-913B-606D2CF2FF87}"/>
+                <a16:creationId xmlns="" xmlns:a16="http://schemas.microsoft.com/office/drawing/2014/main" id="{3768DE4E-E7DC-4947-913B-606D2CF2FF87}"/>
               </a:ext>
             </a:extLst>
           </p:cNvPr>
@@ -2234,7 +2235,7 @@
           <p:cNvPr id="3" name="Inhaltsplatzhalter 2">
             <a:extLst>
               <a:ext uri="{FF2B5EF4-FFF2-40B4-BE49-F238E27FC236}">
-                <a16:creationId xmlns:a16="http://schemas.microsoft.com/office/drawing/2014/main" xmlns="" id="{3DE6B879-527E-4377-98AC-23D1C6148BCE}"/>
+                <a16:creationId xmlns="" xmlns:a16="http://schemas.microsoft.com/office/drawing/2014/main" id="{3DE6B879-527E-4377-98AC-23D1C6148BCE}"/>
               </a:ext>
             </a:extLst>
           </p:cNvPr>
@@ -2324,7 +2325,7 @@
           <p:cNvPr id="4" name="Textplatzhalter 3">
             <a:extLst>
               <a:ext uri="{FF2B5EF4-FFF2-40B4-BE49-F238E27FC236}">
-                <a16:creationId xmlns:a16="http://schemas.microsoft.com/office/drawing/2014/main" xmlns="" id="{1E55FCED-4CC2-4D7F-B142-2CE5FAAC8153}"/>
+                <a16:creationId xmlns="" xmlns:a16="http://schemas.microsoft.com/office/drawing/2014/main" id="{1E55FCED-4CC2-4D7F-B142-2CE5FAAC8153}"/>
               </a:ext>
             </a:extLst>
           </p:cNvPr>
@@ -2395,7 +2396,7 @@
           <p:cNvPr id="5" name="Datumsplatzhalter 4">
             <a:extLst>
               <a:ext uri="{FF2B5EF4-FFF2-40B4-BE49-F238E27FC236}">
-                <a16:creationId xmlns:a16="http://schemas.microsoft.com/office/drawing/2014/main" xmlns="" id="{052EDD12-1C59-40C8-A398-1303A8E3523B}"/>
+                <a16:creationId xmlns="" xmlns:a16="http://schemas.microsoft.com/office/drawing/2014/main" id="{052EDD12-1C59-40C8-A398-1303A8E3523B}"/>
               </a:ext>
             </a:extLst>
           </p:cNvPr>
@@ -2424,7 +2425,7 @@
           <p:cNvPr id="6" name="Fußzeilenplatzhalter 5">
             <a:extLst>
               <a:ext uri="{FF2B5EF4-FFF2-40B4-BE49-F238E27FC236}">
-                <a16:creationId xmlns:a16="http://schemas.microsoft.com/office/drawing/2014/main" xmlns="" id="{27D1CAB7-37C5-4D18-ADC8-BAF57E694F8D}"/>
+                <a16:creationId xmlns="" xmlns:a16="http://schemas.microsoft.com/office/drawing/2014/main" id="{27D1CAB7-37C5-4D18-ADC8-BAF57E694F8D}"/>
               </a:ext>
             </a:extLst>
           </p:cNvPr>
@@ -2449,7 +2450,7 @@
           <p:cNvPr id="7" name="Foliennummernplatzhalter 6">
             <a:extLst>
               <a:ext uri="{FF2B5EF4-FFF2-40B4-BE49-F238E27FC236}">
-                <a16:creationId xmlns:a16="http://schemas.microsoft.com/office/drawing/2014/main" xmlns="" id="{67C02470-7513-4A76-91B0-86F32ECF57D6}"/>
+                <a16:creationId xmlns="" xmlns:a16="http://schemas.microsoft.com/office/drawing/2014/main" id="{67C02470-7513-4A76-91B0-86F32ECF57D6}"/>
               </a:ext>
             </a:extLst>
           </p:cNvPr>
@@ -2508,7 +2509,7 @@
           <p:cNvPr id="2" name="Titel 1">
             <a:extLst>
               <a:ext uri="{FF2B5EF4-FFF2-40B4-BE49-F238E27FC236}">
-                <a16:creationId xmlns:a16="http://schemas.microsoft.com/office/drawing/2014/main" xmlns="" id="{F978E131-6FC2-4DFB-92D8-542C7463482E}"/>
+                <a16:creationId xmlns="" xmlns:a16="http://schemas.microsoft.com/office/drawing/2014/main" id="{F978E131-6FC2-4DFB-92D8-542C7463482E}"/>
               </a:ext>
             </a:extLst>
           </p:cNvPr>
@@ -2545,7 +2546,7 @@
           <p:cNvPr id="3" name="Bildplatzhalter 2">
             <a:extLst>
               <a:ext uri="{FF2B5EF4-FFF2-40B4-BE49-F238E27FC236}">
-                <a16:creationId xmlns:a16="http://schemas.microsoft.com/office/drawing/2014/main" xmlns="" id="{93447B4F-7245-4AE4-813C-6AF63911EDCE}"/>
+                <a16:creationId xmlns="" xmlns:a16="http://schemas.microsoft.com/office/drawing/2014/main" id="{93447B4F-7245-4AE4-813C-6AF63911EDCE}"/>
               </a:ext>
             </a:extLst>
           </p:cNvPr>
@@ -2612,7 +2613,7 @@
           <p:cNvPr id="4" name="Textplatzhalter 3">
             <a:extLst>
               <a:ext uri="{FF2B5EF4-FFF2-40B4-BE49-F238E27FC236}">
-                <a16:creationId xmlns:a16="http://schemas.microsoft.com/office/drawing/2014/main" xmlns="" id="{5F5B48A0-0BAD-476F-8E6D-64E5D28BD1E4}"/>
+                <a16:creationId xmlns="" xmlns:a16="http://schemas.microsoft.com/office/drawing/2014/main" id="{5F5B48A0-0BAD-476F-8E6D-64E5D28BD1E4}"/>
               </a:ext>
             </a:extLst>
           </p:cNvPr>
@@ -2683,7 +2684,7 @@
           <p:cNvPr id="5" name="Datumsplatzhalter 4">
             <a:extLst>
               <a:ext uri="{FF2B5EF4-FFF2-40B4-BE49-F238E27FC236}">
-                <a16:creationId xmlns:a16="http://schemas.microsoft.com/office/drawing/2014/main" xmlns="" id="{44A7C88A-EEBB-4682-959B-A2F4E0512D45}"/>
+                <a16:creationId xmlns="" xmlns:a16="http://schemas.microsoft.com/office/drawing/2014/main" id="{44A7C88A-EEBB-4682-959B-A2F4E0512D45}"/>
               </a:ext>
             </a:extLst>
           </p:cNvPr>
@@ -2712,7 +2713,7 @@
           <p:cNvPr id="6" name="Fußzeilenplatzhalter 5">
             <a:extLst>
               <a:ext uri="{FF2B5EF4-FFF2-40B4-BE49-F238E27FC236}">
-                <a16:creationId xmlns:a16="http://schemas.microsoft.com/office/drawing/2014/main" xmlns="" id="{846BE28B-E4B1-4B5B-B463-06C01FC5721E}"/>
+                <a16:creationId xmlns="" xmlns:a16="http://schemas.microsoft.com/office/drawing/2014/main" id="{846BE28B-E4B1-4B5B-B463-06C01FC5721E}"/>
               </a:ext>
             </a:extLst>
           </p:cNvPr>
@@ -2737,7 +2738,7 @@
           <p:cNvPr id="7" name="Foliennummernplatzhalter 6">
             <a:extLst>
               <a:ext uri="{FF2B5EF4-FFF2-40B4-BE49-F238E27FC236}">
-                <a16:creationId xmlns:a16="http://schemas.microsoft.com/office/drawing/2014/main" xmlns="" id="{982DE88C-2143-4EC4-8441-FC9DFB8ED7AD}"/>
+                <a16:creationId xmlns="" xmlns:a16="http://schemas.microsoft.com/office/drawing/2014/main" id="{982DE88C-2143-4EC4-8441-FC9DFB8ED7AD}"/>
               </a:ext>
             </a:extLst>
           </p:cNvPr>
@@ -2801,7 +2802,7 @@
           <p:cNvPr id="2" name="Titelplatzhalter 1">
             <a:extLst>
               <a:ext uri="{FF2B5EF4-FFF2-40B4-BE49-F238E27FC236}">
-                <a16:creationId xmlns:a16="http://schemas.microsoft.com/office/drawing/2014/main" xmlns="" id="{B32A2DC8-D616-4826-8B1C-6E47B63D7776}"/>
+                <a16:creationId xmlns="" xmlns:a16="http://schemas.microsoft.com/office/drawing/2014/main" id="{B32A2DC8-D616-4826-8B1C-6E47B63D7776}"/>
               </a:ext>
             </a:extLst>
           </p:cNvPr>
@@ -2839,7 +2840,7 @@
           <p:cNvPr id="3" name="Textplatzhalter 2">
             <a:extLst>
               <a:ext uri="{FF2B5EF4-FFF2-40B4-BE49-F238E27FC236}">
-                <a16:creationId xmlns:a16="http://schemas.microsoft.com/office/drawing/2014/main" xmlns="" id="{8167E41F-5A6E-461D-9BDF-E3835F2D5016}"/>
+                <a16:creationId xmlns="" xmlns:a16="http://schemas.microsoft.com/office/drawing/2014/main" id="{8167E41F-5A6E-461D-9BDF-E3835F2D5016}"/>
               </a:ext>
             </a:extLst>
           </p:cNvPr>
@@ -2906,7 +2907,7 @@
           <p:cNvPr id="4" name="Datumsplatzhalter 3">
             <a:extLst>
               <a:ext uri="{FF2B5EF4-FFF2-40B4-BE49-F238E27FC236}">
-                <a16:creationId xmlns:a16="http://schemas.microsoft.com/office/drawing/2014/main" xmlns="" id="{4D9A80F2-BECC-4334-818A-3EE8CC350515}"/>
+                <a16:creationId xmlns="" xmlns:a16="http://schemas.microsoft.com/office/drawing/2014/main" id="{4D9A80F2-BECC-4334-818A-3EE8CC350515}"/>
               </a:ext>
             </a:extLst>
           </p:cNvPr>
@@ -2953,7 +2954,7 @@
           <p:cNvPr id="5" name="Fußzeilenplatzhalter 4">
             <a:extLst>
               <a:ext uri="{FF2B5EF4-FFF2-40B4-BE49-F238E27FC236}">
-                <a16:creationId xmlns:a16="http://schemas.microsoft.com/office/drawing/2014/main" xmlns="" id="{1DD45AEF-0AFD-4E6B-9937-D26D5A87B34B}"/>
+                <a16:creationId xmlns="" xmlns:a16="http://schemas.microsoft.com/office/drawing/2014/main" id="{1DD45AEF-0AFD-4E6B-9937-D26D5A87B34B}"/>
               </a:ext>
             </a:extLst>
           </p:cNvPr>
@@ -2996,7 +2997,7 @@
           <p:cNvPr id="6" name="Foliennummernplatzhalter 5">
             <a:extLst>
               <a:ext uri="{FF2B5EF4-FFF2-40B4-BE49-F238E27FC236}">
-                <a16:creationId xmlns:a16="http://schemas.microsoft.com/office/drawing/2014/main" xmlns="" id="{8BE46D85-7D56-43B8-B265-A178B1E3935A}"/>
+                <a16:creationId xmlns="" xmlns:a16="http://schemas.microsoft.com/office/drawing/2014/main" id="{8BE46D85-7D56-43B8-B265-A178B1E3935A}"/>
               </a:ext>
             </a:extLst>
           </p:cNvPr>
@@ -3364,7 +3365,7 @@
           <p:cNvPr id="2" name="Titel 1">
             <a:extLst>
               <a:ext uri="{FF2B5EF4-FFF2-40B4-BE49-F238E27FC236}">
-                <a16:creationId xmlns:a16="http://schemas.microsoft.com/office/drawing/2014/main" xmlns="" id="{35895132-DE23-4A00-8E1E-E054001DF0F0}"/>
+                <a16:creationId xmlns="" xmlns:a16="http://schemas.microsoft.com/office/drawing/2014/main" id="{35895132-DE23-4A00-8E1E-E054001DF0F0}"/>
               </a:ext>
             </a:extLst>
           </p:cNvPr>
@@ -3389,7 +3390,7 @@
           <p:cNvPr id="3" name="Untertitel 2">
             <a:extLst>
               <a:ext uri="{FF2B5EF4-FFF2-40B4-BE49-F238E27FC236}">
-                <a16:creationId xmlns:a16="http://schemas.microsoft.com/office/drawing/2014/main" xmlns="" id="{2BFB556B-F266-43C2-9F0F-498A82864EBB}"/>
+                <a16:creationId xmlns="" xmlns:a16="http://schemas.microsoft.com/office/drawing/2014/main" id="{2BFB556B-F266-43C2-9F0F-498A82864EBB}"/>
               </a:ext>
             </a:extLst>
           </p:cNvPr>
@@ -3444,7 +3445,7 @@
           <p:cNvPr id="2" name="Titel 1">
             <a:extLst>
               <a:ext uri="{FF2B5EF4-FFF2-40B4-BE49-F238E27FC236}">
-                <a16:creationId xmlns:a16="http://schemas.microsoft.com/office/drawing/2014/main" xmlns="" id="{1F20CAF2-C127-4F0A-B316-19CC56055294}"/>
+                <a16:creationId xmlns="" xmlns:a16="http://schemas.microsoft.com/office/drawing/2014/main" id="{1F20CAF2-C127-4F0A-B316-19CC56055294}"/>
               </a:ext>
             </a:extLst>
           </p:cNvPr>
@@ -3472,7 +3473,7 @@
           <p:cNvPr id="4" name="Textfeld 3">
             <a:extLst>
               <a:ext uri="{FF2B5EF4-FFF2-40B4-BE49-F238E27FC236}">
-                <a16:creationId xmlns:a16="http://schemas.microsoft.com/office/drawing/2014/main" xmlns="" id="{A8C06F69-4BBE-4E8B-9564-6E5737B41EB9}"/>
+                <a16:creationId xmlns="" xmlns:a16="http://schemas.microsoft.com/office/drawing/2014/main" id="{A8C06F69-4BBE-4E8B-9564-6E5737B41EB9}"/>
               </a:ext>
             </a:extLst>
           </p:cNvPr>
@@ -3594,7 +3595,7 @@
           <p:cNvPr id="2" name="Titel 1">
             <a:extLst>
               <a:ext uri="{FF2B5EF4-FFF2-40B4-BE49-F238E27FC236}">
-                <a16:creationId xmlns:a16="http://schemas.microsoft.com/office/drawing/2014/main" xmlns="" id="{9EE6259C-8E17-43C1-815C-EC58FCDFCE07}"/>
+                <a16:creationId xmlns="" xmlns:a16="http://schemas.microsoft.com/office/drawing/2014/main" id="{9EE6259C-8E17-43C1-815C-EC58FCDFCE07}"/>
               </a:ext>
             </a:extLst>
           </p:cNvPr>
@@ -3627,7 +3628,7 @@
           <p:cNvPr id="3" name="Grafik 2">
             <a:extLst>
               <a:ext uri="{FF2B5EF4-FFF2-40B4-BE49-F238E27FC236}">
-                <a16:creationId xmlns:a16="http://schemas.microsoft.com/office/drawing/2014/main" xmlns="" id="{7447C229-39C6-4773-943C-F2A4300AAB34}"/>
+                <a16:creationId xmlns="" xmlns:a16="http://schemas.microsoft.com/office/drawing/2014/main" id="{7447C229-39C6-4773-943C-F2A4300AAB34}"/>
               </a:ext>
             </a:extLst>
           </p:cNvPr>
@@ -3687,7 +3688,7 @@
           <p:cNvPr id="2" name="Titel 1">
             <a:extLst>
               <a:ext uri="{FF2B5EF4-FFF2-40B4-BE49-F238E27FC236}">
-                <a16:creationId xmlns:a16="http://schemas.microsoft.com/office/drawing/2014/main" xmlns="" id="{9EE6259C-8E17-43C1-815C-EC58FCDFCE07}"/>
+                <a16:creationId xmlns="" xmlns:a16="http://schemas.microsoft.com/office/drawing/2014/main" id="{9EE6259C-8E17-43C1-815C-EC58FCDFCE07}"/>
               </a:ext>
             </a:extLst>
           </p:cNvPr>
@@ -3723,7 +3724,7 @@
           <p:cNvPr id="3" name="Grafik 2">
             <a:extLst>
               <a:ext uri="{FF2B5EF4-FFF2-40B4-BE49-F238E27FC236}">
-                <a16:creationId xmlns:a16="http://schemas.microsoft.com/office/drawing/2014/main" xmlns="" id="{169A3B40-082B-4B32-9393-3852359890FB}"/>
+                <a16:creationId xmlns="" xmlns:a16="http://schemas.microsoft.com/office/drawing/2014/main" id="{169A3B40-082B-4B32-9393-3852359890FB}"/>
               </a:ext>
             </a:extLst>
           </p:cNvPr>
@@ -3753,7 +3754,7 @@
           <p:cNvPr id="5" name="Grafik 4">
             <a:extLst>
               <a:ext uri="{FF2B5EF4-FFF2-40B4-BE49-F238E27FC236}">
-                <a16:creationId xmlns:a16="http://schemas.microsoft.com/office/drawing/2014/main" xmlns="" id="{31DFF791-4537-4BEC-AA27-24A93D9871A1}"/>
+                <a16:creationId xmlns="" xmlns:a16="http://schemas.microsoft.com/office/drawing/2014/main" id="{31DFF791-4537-4BEC-AA27-24A93D9871A1}"/>
               </a:ext>
             </a:extLst>
           </p:cNvPr>
@@ -3789,7 +3790,7 @@
           <p:cNvPr id="7" name="Grafik 6">
             <a:extLst>
               <a:ext uri="{FF2B5EF4-FFF2-40B4-BE49-F238E27FC236}">
-                <a16:creationId xmlns:a16="http://schemas.microsoft.com/office/drawing/2014/main" xmlns="" id="{F99E93FB-E819-457C-B4E9-C9415778AD84}"/>
+                <a16:creationId xmlns="" xmlns:a16="http://schemas.microsoft.com/office/drawing/2014/main" id="{F99E93FB-E819-457C-B4E9-C9415778AD84}"/>
               </a:ext>
             </a:extLst>
           </p:cNvPr>
@@ -3825,7 +3826,7 @@
           <p:cNvPr id="9" name="Grafik 8">
             <a:extLst>
               <a:ext uri="{FF2B5EF4-FFF2-40B4-BE49-F238E27FC236}">
-                <a16:creationId xmlns:a16="http://schemas.microsoft.com/office/drawing/2014/main" xmlns="" id="{F83F5F9E-F558-4F36-8641-8554C0647776}"/>
+                <a16:creationId xmlns="" xmlns:a16="http://schemas.microsoft.com/office/drawing/2014/main" id="{F83F5F9E-F558-4F36-8641-8554C0647776}"/>
               </a:ext>
             </a:extLst>
           </p:cNvPr>
@@ -3861,7 +3862,7 @@
           <p:cNvPr id="11" name="Grafik 10">
             <a:extLst>
               <a:ext uri="{FF2B5EF4-FFF2-40B4-BE49-F238E27FC236}">
-                <a16:creationId xmlns:a16="http://schemas.microsoft.com/office/drawing/2014/main" xmlns="" id="{CCE0293C-8429-4206-B338-D91F94DFD77F}"/>
+                <a16:creationId xmlns="" xmlns:a16="http://schemas.microsoft.com/office/drawing/2014/main" id="{CCE0293C-8429-4206-B338-D91F94DFD77F}"/>
               </a:ext>
             </a:extLst>
           </p:cNvPr>
@@ -3897,7 +3898,7 @@
           <p:cNvPr id="13" name="Grafik 12">
             <a:extLst>
               <a:ext uri="{FF2B5EF4-FFF2-40B4-BE49-F238E27FC236}">
-                <a16:creationId xmlns:a16="http://schemas.microsoft.com/office/drawing/2014/main" xmlns="" id="{C02EB894-088B-4405-AEFB-A27CF32E7E59}"/>
+                <a16:creationId xmlns="" xmlns:a16="http://schemas.microsoft.com/office/drawing/2014/main" id="{C02EB894-088B-4405-AEFB-A27CF32E7E59}"/>
               </a:ext>
             </a:extLst>
           </p:cNvPr>
@@ -3933,7 +3934,7 @@
           <p:cNvPr id="15" name="Grafik 14">
             <a:extLst>
               <a:ext uri="{FF2B5EF4-FFF2-40B4-BE49-F238E27FC236}">
-                <a16:creationId xmlns:a16="http://schemas.microsoft.com/office/drawing/2014/main" xmlns="" id="{B82DDFC0-D94C-4623-BA97-035AC1DD7C06}"/>
+                <a16:creationId xmlns="" xmlns:a16="http://schemas.microsoft.com/office/drawing/2014/main" id="{B82DDFC0-D94C-4623-BA97-035AC1DD7C06}"/>
               </a:ext>
             </a:extLst>
           </p:cNvPr>
@@ -3969,7 +3970,7 @@
           <p:cNvPr id="17" name="Grafik 16">
             <a:extLst>
               <a:ext uri="{FF2B5EF4-FFF2-40B4-BE49-F238E27FC236}">
-                <a16:creationId xmlns:a16="http://schemas.microsoft.com/office/drawing/2014/main" xmlns="" id="{C4D52B24-049C-445C-A756-2F40706C423E}"/>
+                <a16:creationId xmlns="" xmlns:a16="http://schemas.microsoft.com/office/drawing/2014/main" id="{C4D52B24-049C-445C-A756-2F40706C423E}"/>
               </a:ext>
             </a:extLst>
           </p:cNvPr>
@@ -4035,7 +4036,7 @@
           <p:cNvPr id="16" name="Titel 1">
             <a:extLst>
               <a:ext uri="{FF2B5EF4-FFF2-40B4-BE49-F238E27FC236}">
-                <a16:creationId xmlns:a16="http://schemas.microsoft.com/office/drawing/2014/main" xmlns="" id="{CE3C357C-3A6D-4B2D-919B-468E62ADB4A7}"/>
+                <a16:creationId xmlns="" xmlns:a16="http://schemas.microsoft.com/office/drawing/2014/main" id="{CE3C357C-3A6D-4B2D-919B-468E62ADB4A7}"/>
               </a:ext>
             </a:extLst>
           </p:cNvPr>
@@ -4080,7 +4081,7 @@
           <p:cNvPr id="3" name="Grafik 2">
             <a:extLst>
               <a:ext uri="{FF2B5EF4-FFF2-40B4-BE49-F238E27FC236}">
-                <a16:creationId xmlns:a16="http://schemas.microsoft.com/office/drawing/2014/main" xmlns="" id="{F32513A5-1A7C-4658-B371-DA5869B1D017}"/>
+                <a16:creationId xmlns="" xmlns:a16="http://schemas.microsoft.com/office/drawing/2014/main" id="{F32513A5-1A7C-4658-B371-DA5869B1D017}"/>
               </a:ext>
             </a:extLst>
           </p:cNvPr>
@@ -4140,7 +4141,7 @@
           <p:cNvPr id="16" name="Titel 1">
             <a:extLst>
               <a:ext uri="{FF2B5EF4-FFF2-40B4-BE49-F238E27FC236}">
-                <a16:creationId xmlns:a16="http://schemas.microsoft.com/office/drawing/2014/main" xmlns="" id="{CE3C357C-3A6D-4B2D-919B-468E62ADB4A7}"/>
+                <a16:creationId xmlns="" xmlns:a16="http://schemas.microsoft.com/office/drawing/2014/main" id="{CE3C357C-3A6D-4B2D-919B-468E62ADB4A7}"/>
               </a:ext>
             </a:extLst>
           </p:cNvPr>
@@ -4177,7 +4178,7 @@
           <p:cNvPr id="5" name="Textfeld 4">
             <a:extLst>
               <a:ext uri="{FF2B5EF4-FFF2-40B4-BE49-F238E27FC236}">
-                <a16:creationId xmlns:a16="http://schemas.microsoft.com/office/drawing/2014/main" xmlns="" id="{D064DB0F-8769-48E6-A427-FE9967D8F4B4}"/>
+                <a16:creationId xmlns="" xmlns:a16="http://schemas.microsoft.com/office/drawing/2014/main" id="{D064DB0F-8769-48E6-A427-FE9967D8F4B4}"/>
               </a:ext>
             </a:extLst>
           </p:cNvPr>
@@ -4330,7 +4331,7 @@
           <p:cNvPr id="2" name="Titel 1">
             <a:extLst>
               <a:ext uri="{FF2B5EF4-FFF2-40B4-BE49-F238E27FC236}">
-                <a16:creationId xmlns:a16="http://schemas.microsoft.com/office/drawing/2014/main" xmlns="" id="{9672587A-9876-4331-AC51-AA638EA60F83}"/>
+                <a16:creationId xmlns="" xmlns:a16="http://schemas.microsoft.com/office/drawing/2014/main" id="{9672587A-9876-4331-AC51-AA638EA60F83}"/>
               </a:ext>
             </a:extLst>
           </p:cNvPr>
@@ -4367,7 +4368,7 @@
           <p:cNvPr id="6" name="Grafik 5">
             <a:extLst>
               <a:ext uri="{FF2B5EF4-FFF2-40B4-BE49-F238E27FC236}">
-                <a16:creationId xmlns:a16="http://schemas.microsoft.com/office/drawing/2014/main" xmlns="" id="{BCA779CB-39BD-4D78-99DA-D05FB82932A6}"/>
+                <a16:creationId xmlns="" xmlns:a16="http://schemas.microsoft.com/office/drawing/2014/main" id="{BCA779CB-39BD-4D78-99DA-D05FB82932A6}"/>
               </a:ext>
             </a:extLst>
           </p:cNvPr>
@@ -4427,7 +4428,7 @@
           <p:cNvPr id="2" name="Titel 1">
             <a:extLst>
               <a:ext uri="{FF2B5EF4-FFF2-40B4-BE49-F238E27FC236}">
-                <a16:creationId xmlns:a16="http://schemas.microsoft.com/office/drawing/2014/main" xmlns="" id="{9672587A-9876-4331-AC51-AA638EA60F83}"/>
+                <a16:creationId xmlns="" xmlns:a16="http://schemas.microsoft.com/office/drawing/2014/main" id="{9672587A-9876-4331-AC51-AA638EA60F83}"/>
               </a:ext>
             </a:extLst>
           </p:cNvPr>
@@ -4467,7 +4468,7 @@
           <p:cNvPr id="4" name="Grafik 3">
             <a:extLst>
               <a:ext uri="{FF2B5EF4-FFF2-40B4-BE49-F238E27FC236}">
-                <a16:creationId xmlns:a16="http://schemas.microsoft.com/office/drawing/2014/main" xmlns="" id="{816B13E9-5249-4CA4-A35C-5986BA9BE4D0}"/>
+                <a16:creationId xmlns="" xmlns:a16="http://schemas.microsoft.com/office/drawing/2014/main" id="{816B13E9-5249-4CA4-A35C-5986BA9BE4D0}"/>
               </a:ext>
             </a:extLst>
           </p:cNvPr>
@@ -4497,7 +4498,7 @@
           <p:cNvPr id="7" name="Grafik 6">
             <a:extLst>
               <a:ext uri="{FF2B5EF4-FFF2-40B4-BE49-F238E27FC236}">
-                <a16:creationId xmlns:a16="http://schemas.microsoft.com/office/drawing/2014/main" xmlns="" id="{06299A92-39CC-407C-9E6D-FD10FB52FD53}"/>
+                <a16:creationId xmlns="" xmlns:a16="http://schemas.microsoft.com/office/drawing/2014/main" id="{06299A92-39CC-407C-9E6D-FD10FB52FD53}"/>
               </a:ext>
             </a:extLst>
           </p:cNvPr>
@@ -4527,7 +4528,7 @@
           <p:cNvPr id="9" name="Grafik 8">
             <a:extLst>
               <a:ext uri="{FF2B5EF4-FFF2-40B4-BE49-F238E27FC236}">
-                <a16:creationId xmlns:a16="http://schemas.microsoft.com/office/drawing/2014/main" xmlns="" id="{B3D05ACD-4BA4-4ED1-8118-57BAE2BFDC77}"/>
+                <a16:creationId xmlns="" xmlns:a16="http://schemas.microsoft.com/office/drawing/2014/main" id="{B3D05ACD-4BA4-4ED1-8118-57BAE2BFDC77}"/>
               </a:ext>
             </a:extLst>
           </p:cNvPr>
@@ -4557,7 +4558,7 @@
           <p:cNvPr id="11" name="Grafik 10">
             <a:extLst>
               <a:ext uri="{FF2B5EF4-FFF2-40B4-BE49-F238E27FC236}">
-                <a16:creationId xmlns:a16="http://schemas.microsoft.com/office/drawing/2014/main" xmlns="" id="{8F3F2480-A696-41BE-BB9D-CE16ECF8109F}"/>
+                <a16:creationId xmlns="" xmlns:a16="http://schemas.microsoft.com/office/drawing/2014/main" id="{8F3F2480-A696-41BE-BB9D-CE16ECF8109F}"/>
               </a:ext>
             </a:extLst>
           </p:cNvPr>
@@ -4587,7 +4588,7 @@
           <p:cNvPr id="13" name="Grafik 12">
             <a:extLst>
               <a:ext uri="{FF2B5EF4-FFF2-40B4-BE49-F238E27FC236}">
-                <a16:creationId xmlns:a16="http://schemas.microsoft.com/office/drawing/2014/main" xmlns="" id="{99F321E4-6331-4E11-83E0-2F96235275AD}"/>
+                <a16:creationId xmlns="" xmlns:a16="http://schemas.microsoft.com/office/drawing/2014/main" id="{99F321E4-6331-4E11-83E0-2F96235275AD}"/>
               </a:ext>
             </a:extLst>
           </p:cNvPr>
@@ -4617,7 +4618,7 @@
           <p:cNvPr id="15" name="Grafik 14">
             <a:extLst>
               <a:ext uri="{FF2B5EF4-FFF2-40B4-BE49-F238E27FC236}">
-                <a16:creationId xmlns:a16="http://schemas.microsoft.com/office/drawing/2014/main" xmlns="" id="{B1275EFF-ED71-49FA-94FE-2CE08AD215C1}"/>
+                <a16:creationId xmlns="" xmlns:a16="http://schemas.microsoft.com/office/drawing/2014/main" id="{B1275EFF-ED71-49FA-94FE-2CE08AD215C1}"/>
               </a:ext>
             </a:extLst>
           </p:cNvPr>
@@ -4647,7 +4648,7 @@
           <p:cNvPr id="17" name="Grafik 16">
             <a:extLst>
               <a:ext uri="{FF2B5EF4-FFF2-40B4-BE49-F238E27FC236}">
-                <a16:creationId xmlns:a16="http://schemas.microsoft.com/office/drawing/2014/main" xmlns="" id="{5678B9CE-3CD7-467D-9B10-379F15D1A62F}"/>
+                <a16:creationId xmlns="" xmlns:a16="http://schemas.microsoft.com/office/drawing/2014/main" id="{5678B9CE-3CD7-467D-9B10-379F15D1A62F}"/>
               </a:ext>
             </a:extLst>
           </p:cNvPr>
@@ -4677,7 +4678,7 @@
           <p:cNvPr id="19" name="Grafik 18">
             <a:extLst>
               <a:ext uri="{FF2B5EF4-FFF2-40B4-BE49-F238E27FC236}">
-                <a16:creationId xmlns:a16="http://schemas.microsoft.com/office/drawing/2014/main" xmlns="" id="{DD39D264-4BC7-485D-862A-ECF9A3A6CEB1}"/>
+                <a16:creationId xmlns="" xmlns:a16="http://schemas.microsoft.com/office/drawing/2014/main" id="{DD39D264-4BC7-485D-862A-ECF9A3A6CEB1}"/>
               </a:ext>
             </a:extLst>
           </p:cNvPr>
@@ -4737,7 +4738,7 @@
           <p:cNvPr id="3" name="Grafik 2">
             <a:extLst>
               <a:ext uri="{FF2B5EF4-FFF2-40B4-BE49-F238E27FC236}">
-                <a16:creationId xmlns:a16="http://schemas.microsoft.com/office/drawing/2014/main" xmlns="" id="{A456BD08-1E6D-4A73-8DF6-19DC0743F759}"/>
+                <a16:creationId xmlns="" xmlns:a16="http://schemas.microsoft.com/office/drawing/2014/main" id="{A456BD08-1E6D-4A73-8DF6-19DC0743F759}"/>
               </a:ext>
             </a:extLst>
           </p:cNvPr>
@@ -4797,7 +4798,7 @@
           <p:cNvPr id="2" name="Titel 1">
             <a:extLst>
               <a:ext uri="{FF2B5EF4-FFF2-40B4-BE49-F238E27FC236}">
-                <a16:creationId xmlns:a16="http://schemas.microsoft.com/office/drawing/2014/main" xmlns="" id="{FA0E998A-8B92-4AB3-A9A8-1DE5D112DC24}"/>
+                <a16:creationId xmlns="" xmlns:a16="http://schemas.microsoft.com/office/drawing/2014/main" id="{FA0E998A-8B92-4AB3-A9A8-1DE5D112DC24}"/>
               </a:ext>
             </a:extLst>
           </p:cNvPr>
@@ -4833,7 +4834,7 @@
           <p:cNvPr id="3" name="Inhaltsplatzhalter 2">
             <a:extLst>
               <a:ext uri="{FF2B5EF4-FFF2-40B4-BE49-F238E27FC236}">
-                <a16:creationId xmlns:a16="http://schemas.microsoft.com/office/drawing/2014/main" xmlns="" id="{03FCA3D9-EE93-495D-BB38-42608EA49BF0}"/>
+                <a16:creationId xmlns="" xmlns:a16="http://schemas.microsoft.com/office/drawing/2014/main" id="{03FCA3D9-EE93-495D-BB38-42608EA49BF0}"/>
               </a:ext>
             </a:extLst>
           </p:cNvPr>
@@ -4919,7 +4920,7 @@
           <p:cNvPr id="10" name="Textfeld 9">
             <a:extLst>
               <a:ext uri="{FF2B5EF4-FFF2-40B4-BE49-F238E27FC236}">
-                <a16:creationId xmlns:a16="http://schemas.microsoft.com/office/drawing/2014/main" xmlns="" id="{8214A440-4372-42B2-95FA-FB333F1ACF7C}"/>
+                <a16:creationId xmlns="" xmlns:a16="http://schemas.microsoft.com/office/drawing/2014/main" id="{8214A440-4372-42B2-95FA-FB333F1ACF7C}"/>
               </a:ext>
             </a:extLst>
           </p:cNvPr>
@@ -5357,7 +5358,7 @@
           <p:cNvPr id="2" name="Titel 1">
             <a:extLst>
               <a:ext uri="{FF2B5EF4-FFF2-40B4-BE49-F238E27FC236}">
-                <a16:creationId xmlns:a16="http://schemas.microsoft.com/office/drawing/2014/main" xmlns="" id="{F460CF33-D61D-45E6-A010-57D8D85767E5}"/>
+                <a16:creationId xmlns="" xmlns:a16="http://schemas.microsoft.com/office/drawing/2014/main" id="{F460CF33-D61D-45E6-A010-57D8D85767E5}"/>
               </a:ext>
             </a:extLst>
           </p:cNvPr>
@@ -5412,7 +5413,7 @@
           <p:cNvPr id="11" name="Textfeld 10">
             <a:extLst>
               <a:ext uri="{FF2B5EF4-FFF2-40B4-BE49-F238E27FC236}">
-                <a16:creationId xmlns:a16="http://schemas.microsoft.com/office/drawing/2014/main" xmlns="" id="{4E05C3E3-6957-4521-AEFD-236E914B26E5}"/>
+                <a16:creationId xmlns="" xmlns:a16="http://schemas.microsoft.com/office/drawing/2014/main" id="{4E05C3E3-6957-4521-AEFD-236E914B26E5}"/>
               </a:ext>
             </a:extLst>
           </p:cNvPr>
@@ -5507,7 +5508,7 @@
           <p:cNvPr id="16" name="Titel 1">
             <a:extLst>
               <a:ext uri="{FF2B5EF4-FFF2-40B4-BE49-F238E27FC236}">
-                <a16:creationId xmlns:a16="http://schemas.microsoft.com/office/drawing/2014/main" xmlns="" id="{CE3C357C-3A6D-4B2D-919B-468E62ADB4A7}"/>
+                <a16:creationId xmlns="" xmlns:a16="http://schemas.microsoft.com/office/drawing/2014/main" id="{CE3C357C-3A6D-4B2D-919B-468E62ADB4A7}"/>
               </a:ext>
             </a:extLst>
           </p:cNvPr>
@@ -5578,7 +5579,7 @@
           <p:cNvPr id="3" name="Titel 1">
             <a:extLst>
               <a:ext uri="{FF2B5EF4-FFF2-40B4-BE49-F238E27FC236}">
-                <a16:creationId xmlns:a16="http://schemas.microsoft.com/office/drawing/2014/main" xmlns="" id="{33062B24-559F-41F6-8766-1B8B53C3E0C1}"/>
+                <a16:creationId xmlns="" xmlns:a16="http://schemas.microsoft.com/office/drawing/2014/main" id="{33062B24-559F-41F6-8766-1B8B53C3E0C1}"/>
               </a:ext>
             </a:extLst>
           </p:cNvPr>
@@ -5648,7 +5649,7 @@
           <p:cNvPr id="5" name="Grafik 4">
             <a:extLst>
               <a:ext uri="{FF2B5EF4-FFF2-40B4-BE49-F238E27FC236}">
-                <a16:creationId xmlns:a16="http://schemas.microsoft.com/office/drawing/2014/main" xmlns="" id="{9A764CB7-DDFC-4155-9F78-766DD038F9B7}"/>
+                <a16:creationId xmlns="" xmlns:a16="http://schemas.microsoft.com/office/drawing/2014/main" id="{9A764CB7-DDFC-4155-9F78-766DD038F9B7}"/>
               </a:ext>
             </a:extLst>
           </p:cNvPr>
@@ -5708,7 +5709,7 @@
           <p:cNvPr id="3" name="Titel 1">
             <a:extLst>
               <a:ext uri="{FF2B5EF4-FFF2-40B4-BE49-F238E27FC236}">
-                <a16:creationId xmlns:a16="http://schemas.microsoft.com/office/drawing/2014/main" xmlns="" id="{33062B24-559F-41F6-8766-1B8B53C3E0C1}"/>
+                <a16:creationId xmlns="" xmlns:a16="http://schemas.microsoft.com/office/drawing/2014/main" id="{33062B24-559F-41F6-8766-1B8B53C3E0C1}"/>
               </a:ext>
             </a:extLst>
           </p:cNvPr>
@@ -5805,7 +5806,7 @@
           <p:cNvPr id="3" name="Titel 1">
             <a:extLst>
               <a:ext uri="{FF2B5EF4-FFF2-40B4-BE49-F238E27FC236}">
-                <a16:creationId xmlns:a16="http://schemas.microsoft.com/office/drawing/2014/main" xmlns="" id="{33062B24-559F-41F6-8766-1B8B53C3E0C1}"/>
+                <a16:creationId xmlns="" xmlns:a16="http://schemas.microsoft.com/office/drawing/2014/main" id="{33062B24-559F-41F6-8766-1B8B53C3E0C1}"/>
               </a:ext>
             </a:extLst>
           </p:cNvPr>
@@ -5905,7 +5906,7 @@
           <p:cNvPr id="2" name="Titel 1">
             <a:extLst>
               <a:ext uri="{FF2B5EF4-FFF2-40B4-BE49-F238E27FC236}">
-                <a16:creationId xmlns:a16="http://schemas.microsoft.com/office/drawing/2014/main" xmlns="" id="{FA0E998A-8B92-4AB3-A9A8-1DE5D112DC24}"/>
+                <a16:creationId xmlns="" xmlns:a16="http://schemas.microsoft.com/office/drawing/2014/main" id="{FA0E998A-8B92-4AB3-A9A8-1DE5D112DC24}"/>
               </a:ext>
             </a:extLst>
           </p:cNvPr>
@@ -5941,7 +5942,7 @@
           <p:cNvPr id="3" name="Inhaltsplatzhalter 2">
             <a:extLst>
               <a:ext uri="{FF2B5EF4-FFF2-40B4-BE49-F238E27FC236}">
-                <a16:creationId xmlns:a16="http://schemas.microsoft.com/office/drawing/2014/main" xmlns="" id="{03FCA3D9-EE93-495D-BB38-42608EA49BF0}"/>
+                <a16:creationId xmlns="" xmlns:a16="http://schemas.microsoft.com/office/drawing/2014/main" id="{03FCA3D9-EE93-495D-BB38-42608EA49BF0}"/>
               </a:ext>
             </a:extLst>
           </p:cNvPr>
@@ -6027,7 +6028,7 @@
           <p:cNvPr id="2" name="Titel 1">
             <a:extLst>
               <a:ext uri="{FF2B5EF4-FFF2-40B4-BE49-F238E27FC236}">
-                <a16:creationId xmlns:a16="http://schemas.microsoft.com/office/drawing/2014/main" xmlns="" id="{FA0E998A-8B92-4AB3-A9A8-1DE5D112DC24}"/>
+                <a16:creationId xmlns="" xmlns:a16="http://schemas.microsoft.com/office/drawing/2014/main" id="{FA0E998A-8B92-4AB3-A9A8-1DE5D112DC24}"/>
               </a:ext>
             </a:extLst>
           </p:cNvPr>
@@ -6063,7 +6064,7 @@
           <p:cNvPr id="3" name="Inhaltsplatzhalter 2">
             <a:extLst>
               <a:ext uri="{FF2B5EF4-FFF2-40B4-BE49-F238E27FC236}">
-                <a16:creationId xmlns:a16="http://schemas.microsoft.com/office/drawing/2014/main" xmlns="" id="{03FCA3D9-EE93-495D-BB38-42608EA49BF0}"/>
+                <a16:creationId xmlns="" xmlns:a16="http://schemas.microsoft.com/office/drawing/2014/main" id="{03FCA3D9-EE93-495D-BB38-42608EA49BF0}"/>
               </a:ext>
             </a:extLst>
           </p:cNvPr>
@@ -6489,7 +6490,7 @@
           <p:cNvPr id="11" name="Textfeld 10">
             <a:extLst>
               <a:ext uri="{FF2B5EF4-FFF2-40B4-BE49-F238E27FC236}">
-                <a16:creationId xmlns:a16="http://schemas.microsoft.com/office/drawing/2014/main" xmlns="" id="{4E05C3E3-6957-4521-AEFD-236E914B26E5}"/>
+                <a16:creationId xmlns="" xmlns:a16="http://schemas.microsoft.com/office/drawing/2014/main" id="{4E05C3E3-6957-4521-AEFD-236E914B26E5}"/>
               </a:ext>
             </a:extLst>
           </p:cNvPr>
@@ -6605,7 +6606,7 @@
           <p:cNvPr id="16" name="Titel 1">
             <a:extLst>
               <a:ext uri="{FF2B5EF4-FFF2-40B4-BE49-F238E27FC236}">
-                <a16:creationId xmlns:a16="http://schemas.microsoft.com/office/drawing/2014/main" xmlns="" id="{CE3C357C-3A6D-4B2D-919B-468E62ADB4A7}"/>
+                <a16:creationId xmlns="" xmlns:a16="http://schemas.microsoft.com/office/drawing/2014/main" id="{CE3C357C-3A6D-4B2D-919B-468E62ADB4A7}"/>
               </a:ext>
             </a:extLst>
           </p:cNvPr>
@@ -6676,7 +6677,7 @@
           <p:cNvPr id="3" name="Titel 1">
             <a:extLst>
               <a:ext uri="{FF2B5EF4-FFF2-40B4-BE49-F238E27FC236}">
-                <a16:creationId xmlns:a16="http://schemas.microsoft.com/office/drawing/2014/main" xmlns="" id="{33062B24-559F-41F6-8766-1B8B53C3E0C1}"/>
+                <a16:creationId xmlns="" xmlns:a16="http://schemas.microsoft.com/office/drawing/2014/main" id="{33062B24-559F-41F6-8766-1B8B53C3E0C1}"/>
               </a:ext>
             </a:extLst>
           </p:cNvPr>
@@ -6746,7 +6747,7 @@
           <p:cNvPr id="4" name="Grafik 3">
             <a:extLst>
               <a:ext uri="{FF2B5EF4-FFF2-40B4-BE49-F238E27FC236}">
-                <a16:creationId xmlns:a16="http://schemas.microsoft.com/office/drawing/2014/main" xmlns="" id="{2616159D-801A-486E-8E16-59B9A5AED34F}"/>
+                <a16:creationId xmlns="" xmlns:a16="http://schemas.microsoft.com/office/drawing/2014/main" id="{2616159D-801A-486E-8E16-59B9A5AED34F}"/>
               </a:ext>
             </a:extLst>
           </p:cNvPr>
@@ -6806,7 +6807,7 @@
           <p:cNvPr id="3" name="Titel 1">
             <a:extLst>
               <a:ext uri="{FF2B5EF4-FFF2-40B4-BE49-F238E27FC236}">
-                <a16:creationId xmlns:a16="http://schemas.microsoft.com/office/drawing/2014/main" xmlns="" id="{33062B24-559F-41F6-8766-1B8B53C3E0C1}"/>
+                <a16:creationId xmlns="" xmlns:a16="http://schemas.microsoft.com/office/drawing/2014/main" id="{33062B24-559F-41F6-8766-1B8B53C3E0C1}"/>
               </a:ext>
             </a:extLst>
           </p:cNvPr>
@@ -6903,7 +6904,7 @@
           <p:cNvPr id="3" name="Titel 1">
             <a:extLst>
               <a:ext uri="{FF2B5EF4-FFF2-40B4-BE49-F238E27FC236}">
-                <a16:creationId xmlns:a16="http://schemas.microsoft.com/office/drawing/2014/main" xmlns="" id="{33062B24-559F-41F6-8766-1B8B53C3E0C1}"/>
+                <a16:creationId xmlns="" xmlns:a16="http://schemas.microsoft.com/office/drawing/2014/main" id="{33062B24-559F-41F6-8766-1B8B53C3E0C1}"/>
               </a:ext>
             </a:extLst>
           </p:cNvPr>
@@ -7003,7 +7004,7 @@
           <p:cNvPr id="2" name="Titel 1">
             <a:extLst>
               <a:ext uri="{FF2B5EF4-FFF2-40B4-BE49-F238E27FC236}">
-                <a16:creationId xmlns:a16="http://schemas.microsoft.com/office/drawing/2014/main" xmlns="" id="{FA0E998A-8B92-4AB3-A9A8-1DE5D112DC24}"/>
+                <a16:creationId xmlns="" xmlns:a16="http://schemas.microsoft.com/office/drawing/2014/main" id="{FA0E998A-8B92-4AB3-A9A8-1DE5D112DC24}"/>
               </a:ext>
             </a:extLst>
           </p:cNvPr>
@@ -7051,7 +7052,7 @@
           <p:cNvPr id="3" name="Inhaltsplatzhalter 2">
             <a:extLst>
               <a:ext uri="{FF2B5EF4-FFF2-40B4-BE49-F238E27FC236}">
-                <a16:creationId xmlns:a16="http://schemas.microsoft.com/office/drawing/2014/main" xmlns="" id="{03FCA3D9-EE93-495D-BB38-42608EA49BF0}"/>
+                <a16:creationId xmlns="" xmlns:a16="http://schemas.microsoft.com/office/drawing/2014/main" id="{03FCA3D9-EE93-495D-BB38-42608EA49BF0}"/>
               </a:ext>
             </a:extLst>
           </p:cNvPr>
@@ -7137,7 +7138,7 @@
           <p:cNvPr id="2" name="Titel 1">
             <a:extLst>
               <a:ext uri="{FF2B5EF4-FFF2-40B4-BE49-F238E27FC236}">
-                <a16:creationId xmlns:a16="http://schemas.microsoft.com/office/drawing/2014/main" xmlns="" id="{7C8BA7A4-3887-BBC2-DB11-C3E410781B8F}"/>
+                <a16:creationId xmlns="" xmlns:a16="http://schemas.microsoft.com/office/drawing/2014/main" id="{7C8BA7A4-3887-BBC2-DB11-C3E410781B8F}"/>
               </a:ext>
             </a:extLst>
           </p:cNvPr>
@@ -7169,7 +7170,7 @@
           <p:cNvPr id="5" name="Textfeld 4">
             <a:extLst>
               <a:ext uri="{FF2B5EF4-FFF2-40B4-BE49-F238E27FC236}">
-                <a16:creationId xmlns:a16="http://schemas.microsoft.com/office/drawing/2014/main" xmlns="" id="{7E9BB3B3-C33E-E6D4-B884-B0E81F04763D}"/>
+                <a16:creationId xmlns="" xmlns:a16="http://schemas.microsoft.com/office/drawing/2014/main" id="{7E9BB3B3-C33E-E6D4-B884-B0E81F04763D}"/>
               </a:ext>
             </a:extLst>
           </p:cNvPr>
@@ -7276,7 +7277,7 @@
         <p:cNvPr id="1" name="">
           <a:extLst>
             <a:ext uri="{FF2B5EF4-FFF2-40B4-BE49-F238E27FC236}">
-              <a16:creationId xmlns:a16="http://schemas.microsoft.com/office/drawing/2014/main" xmlns="" id="{09813FCD-FFC4-7218-580C-E973F9446FF5}"/>
+              <a16:creationId xmlns="" xmlns:a16="http://schemas.microsoft.com/office/drawing/2014/main" id="{09813FCD-FFC4-7218-580C-E973F9446FF5}"/>
             </a:ext>
           </a:extLst>
         </p:cNvPr>
@@ -7296,7 +7297,7 @@
           <p:cNvPr id="2" name="Titel 1">
             <a:extLst>
               <a:ext uri="{FF2B5EF4-FFF2-40B4-BE49-F238E27FC236}">
-                <a16:creationId xmlns:a16="http://schemas.microsoft.com/office/drawing/2014/main" xmlns="" id="{66725232-2EC4-A6B4-8555-37412C044780}"/>
+                <a16:creationId xmlns="" xmlns:a16="http://schemas.microsoft.com/office/drawing/2014/main" id="{66725232-2EC4-A6B4-8555-37412C044780}"/>
               </a:ext>
             </a:extLst>
           </p:cNvPr>
@@ -7328,7 +7329,7 @@
           <p:cNvPr id="3" name="Grafik 2">
             <a:extLst>
               <a:ext uri="{FF2B5EF4-FFF2-40B4-BE49-F238E27FC236}">
-                <a16:creationId xmlns:a16="http://schemas.microsoft.com/office/drawing/2014/main" xmlns="" id="{7CAB953F-546C-1177-FD3E-EB14CBE2ECA4}"/>
+                <a16:creationId xmlns="" xmlns:a16="http://schemas.microsoft.com/office/drawing/2014/main" id="{7CAB953F-546C-1177-FD3E-EB14CBE2ECA4}"/>
               </a:ext>
             </a:extLst>
           </p:cNvPr>
@@ -7388,7 +7389,7 @@
           <p:cNvPr id="2" name="Titel 1">
             <a:extLst>
               <a:ext uri="{FF2B5EF4-FFF2-40B4-BE49-F238E27FC236}">
-                <a16:creationId xmlns:a16="http://schemas.microsoft.com/office/drawing/2014/main" xmlns="" id="{1590B5F2-09FC-A6DD-AB13-BC89F20C2A45}"/>
+                <a16:creationId xmlns="" xmlns:a16="http://schemas.microsoft.com/office/drawing/2014/main" id="{1590B5F2-09FC-A6DD-AB13-BC89F20C2A45}"/>
               </a:ext>
             </a:extLst>
           </p:cNvPr>
@@ -7420,7 +7421,7 @@
           <p:cNvPr id="4" name="Grafik 3">
             <a:extLst>
               <a:ext uri="{FF2B5EF4-FFF2-40B4-BE49-F238E27FC236}">
-                <a16:creationId xmlns:a16="http://schemas.microsoft.com/office/drawing/2014/main" xmlns="" id="{0C8F9394-0313-AE1A-0F49-D6D81164276E}"/>
+                <a16:creationId xmlns="" xmlns:a16="http://schemas.microsoft.com/office/drawing/2014/main" id="{0C8F9394-0313-AE1A-0F49-D6D81164276E}"/>
               </a:ext>
             </a:extLst>
           </p:cNvPr>
@@ -7480,7 +7481,7 @@
           <p:cNvPr id="2" name="Titel 1">
             <a:extLst>
               <a:ext uri="{FF2B5EF4-FFF2-40B4-BE49-F238E27FC236}">
-                <a16:creationId xmlns:a16="http://schemas.microsoft.com/office/drawing/2014/main" xmlns="" id="{465F36B2-EA5D-F35D-FD31-C535063D727A}"/>
+                <a16:creationId xmlns="" xmlns:a16="http://schemas.microsoft.com/office/drawing/2014/main" id="{465F36B2-EA5D-F35D-FD31-C535063D727A}"/>
               </a:ext>
             </a:extLst>
           </p:cNvPr>
@@ -7577,6 +7578,114 @@
           <a:bodyPr/>
           <a:lstStyle/>
           <a:p>
+            <a:r>
+              <a:rPr lang="de-DE" dirty="0" smtClean="0"/>
+              <a:t>Neue Überlegung</a:t>
+            </a:r>
+            <a:endParaRPr lang="de-DE" dirty="0"/>
+          </a:p>
+        </p:txBody>
+      </p:sp>
+      <p:sp>
+        <p:nvSpPr>
+          <p:cNvPr id="3" name="Inhaltsplatzhalter 2"/>
+          <p:cNvSpPr>
+            <a:spLocks noGrp="1"/>
+          </p:cNvSpPr>
+          <p:nvPr>
+            <p:ph idx="1"/>
+          </p:nvPr>
+        </p:nvSpPr>
+        <p:spPr/>
+        <p:txBody>
+          <a:bodyPr/>
+          <a:lstStyle/>
+          <a:p>
+            <a:r>
+              <a:rPr lang="de-DE" dirty="0" smtClean="0"/>
+              <a:t>Vision Transformer ist ein Modell, dass Bilddaten 1000+ pro Klasse erwartet</a:t>
+            </a:r>
+          </a:p>
+          <a:p>
+            <a:r>
+              <a:rPr lang="de-DE" dirty="0" smtClean="0"/>
+              <a:t>Die Bilder in unserem Datensatz sind sich sehr ähnlich, deshalb zuvor 400 Bilder pro Klasse</a:t>
+            </a:r>
+          </a:p>
+          <a:p>
+            <a:r>
+              <a:rPr lang="de-DE" dirty="0" smtClean="0"/>
+              <a:t>Nun Test, ob die </a:t>
+            </a:r>
+            <a:r>
+              <a:rPr lang="de-DE" dirty="0" err="1" smtClean="0"/>
+              <a:t>Accuracy</a:t>
+            </a:r>
+            <a:r>
+              <a:rPr lang="de-DE" dirty="0" smtClean="0"/>
+              <a:t> und die Generalisierung der Klassifikation besser wird, wenn 1000 Bilder pro Klasse vorhanden sind: Neuer Datensatz 640 Bilder des </a:t>
+            </a:r>
+            <a:r>
+              <a:rPr lang="de-DE" dirty="0" err="1" smtClean="0"/>
+              <a:t>Kaggle</a:t>
+            </a:r>
+            <a:r>
+              <a:rPr lang="de-DE" dirty="0" smtClean="0"/>
+              <a:t> Datensatz + ca. 500 Bilder aus </a:t>
+            </a:r>
+            <a:r>
+              <a:rPr lang="de-DE" smtClean="0"/>
+              <a:t>mediapipe</a:t>
+            </a:r>
+            <a:endParaRPr lang="de-DE"/>
+          </a:p>
+        </p:txBody>
+      </p:sp>
+    </p:spTree>
+    <p:extLst>
+      <p:ext uri="{BB962C8B-B14F-4D97-AF65-F5344CB8AC3E}">
+        <p14:creationId xmlns:p14="http://schemas.microsoft.com/office/powerpoint/2010/main" val="4241573503"/>
+      </p:ext>
+    </p:extLst>
+  </p:cSld>
+  <p:clrMapOvr>
+    <a:masterClrMapping/>
+  </p:clrMapOvr>
+</p:sld>
+</file>
+
+<file path=ppt/slides/slide35.xml><?xml version="1.0" encoding="utf-8"?>
+<p:sld xmlns:a="http://schemas.openxmlformats.org/drawingml/2006/main" xmlns:r="http://schemas.openxmlformats.org/officeDocument/2006/relationships" xmlns:p="http://schemas.openxmlformats.org/presentationml/2006/main">
+  <p:cSld>
+    <p:spTree>
+      <p:nvGrpSpPr>
+        <p:cNvPr id="1" name=""/>
+        <p:cNvGrpSpPr/>
+        <p:nvPr/>
+      </p:nvGrpSpPr>
+      <p:grpSpPr>
+        <a:xfrm>
+          <a:off x="0" y="0"/>
+          <a:ext cx="0" cy="0"/>
+          <a:chOff x="0" y="0"/>
+          <a:chExt cx="0" cy="0"/>
+        </a:xfrm>
+      </p:grpSpPr>
+      <p:sp>
+        <p:nvSpPr>
+          <p:cNvPr id="2" name="Titel 1"/>
+          <p:cNvSpPr>
+            <a:spLocks noGrp="1"/>
+          </p:cNvSpPr>
+          <p:nvPr>
+            <p:ph type="title"/>
+          </p:nvPr>
+        </p:nvSpPr>
+        <p:spPr/>
+        <p:txBody>
+          <a:bodyPr/>
+          <a:lstStyle/>
+          <a:p>
             <a:endParaRPr lang="de-DE"/>
           </a:p>
         </p:txBody>
@@ -7734,7 +7843,7 @@
           <p:cNvPr id="2" name="Titel 1">
             <a:extLst>
               <a:ext uri="{FF2B5EF4-FFF2-40B4-BE49-F238E27FC236}">
-                <a16:creationId xmlns:a16="http://schemas.microsoft.com/office/drawing/2014/main" xmlns="" id="{9EE6259C-8E17-43C1-815C-EC58FCDFCE07}"/>
+                <a16:creationId xmlns="" xmlns:a16="http://schemas.microsoft.com/office/drawing/2014/main" id="{9EE6259C-8E17-43C1-815C-EC58FCDFCE07}"/>
               </a:ext>
             </a:extLst>
           </p:cNvPr>
@@ -7770,7 +7879,7 @@
           <p:cNvPr id="3" name="Grafik 2">
             <a:extLst>
               <a:ext uri="{FF2B5EF4-FFF2-40B4-BE49-F238E27FC236}">
-                <a16:creationId xmlns:a16="http://schemas.microsoft.com/office/drawing/2014/main" xmlns="" id="{5F9C2164-257F-4FBE-811F-AF875CACCA96}"/>
+                <a16:creationId xmlns="" xmlns:a16="http://schemas.microsoft.com/office/drawing/2014/main" id="{5F9C2164-257F-4FBE-811F-AF875CACCA96}"/>
               </a:ext>
             </a:extLst>
           </p:cNvPr>
@@ -7830,7 +7939,7 @@
           <p:cNvPr id="4" name="Textfeld 3">
             <a:extLst>
               <a:ext uri="{FF2B5EF4-FFF2-40B4-BE49-F238E27FC236}">
-                <a16:creationId xmlns:a16="http://schemas.microsoft.com/office/drawing/2014/main" xmlns="" id="{B6EA9917-7A82-410D-9CE7-B05AB59C6930}"/>
+                <a16:creationId xmlns="" xmlns:a16="http://schemas.microsoft.com/office/drawing/2014/main" id="{B6EA9917-7A82-410D-9CE7-B05AB59C6930}"/>
               </a:ext>
             </a:extLst>
           </p:cNvPr>
@@ -7922,7 +8031,7 @@
           <p:cNvPr id="5" name="Titel 1">
             <a:extLst>
               <a:ext uri="{FF2B5EF4-FFF2-40B4-BE49-F238E27FC236}">
-                <a16:creationId xmlns:a16="http://schemas.microsoft.com/office/drawing/2014/main" xmlns="" id="{B714DE99-8892-4254-AD52-8AF8324C50CA}"/>
+                <a16:creationId xmlns="" xmlns:a16="http://schemas.microsoft.com/office/drawing/2014/main" id="{B714DE99-8892-4254-AD52-8AF8324C50CA}"/>
               </a:ext>
             </a:extLst>
           </p:cNvPr>
@@ -8006,7 +8115,7 @@
           <p:cNvPr id="2" name="Titel 1">
             <a:extLst>
               <a:ext uri="{FF2B5EF4-FFF2-40B4-BE49-F238E27FC236}">
-                <a16:creationId xmlns:a16="http://schemas.microsoft.com/office/drawing/2014/main" xmlns="" id="{9EE6259C-8E17-43C1-815C-EC58FCDFCE07}"/>
+                <a16:creationId xmlns="" xmlns:a16="http://schemas.microsoft.com/office/drawing/2014/main" id="{9EE6259C-8E17-43C1-815C-EC58FCDFCE07}"/>
               </a:ext>
             </a:extLst>
           </p:cNvPr>
@@ -8039,7 +8148,7 @@
           <p:cNvPr id="7" name="Grafik 6">
             <a:extLst>
               <a:ext uri="{FF2B5EF4-FFF2-40B4-BE49-F238E27FC236}">
-                <a16:creationId xmlns:a16="http://schemas.microsoft.com/office/drawing/2014/main" xmlns="" id="{CF5D92CE-ABCF-491C-AD20-65205CAC2BC8}"/>
+                <a16:creationId xmlns="" xmlns:a16="http://schemas.microsoft.com/office/drawing/2014/main" id="{CF5D92CE-ABCF-491C-AD20-65205CAC2BC8}"/>
               </a:ext>
             </a:extLst>
           </p:cNvPr>
@@ -8105,7 +8214,7 @@
           <p:cNvPr id="2" name="Titel 1">
             <a:extLst>
               <a:ext uri="{FF2B5EF4-FFF2-40B4-BE49-F238E27FC236}">
-                <a16:creationId xmlns:a16="http://schemas.microsoft.com/office/drawing/2014/main" xmlns="" id="{9EE6259C-8E17-43C1-815C-EC58FCDFCE07}"/>
+                <a16:creationId xmlns="" xmlns:a16="http://schemas.microsoft.com/office/drawing/2014/main" id="{9EE6259C-8E17-43C1-815C-EC58FCDFCE07}"/>
               </a:ext>
             </a:extLst>
           </p:cNvPr>
@@ -8141,7 +8250,7 @@
           <p:cNvPr id="18" name="Grafik 17">
             <a:extLst>
               <a:ext uri="{FF2B5EF4-FFF2-40B4-BE49-F238E27FC236}">
-                <a16:creationId xmlns:a16="http://schemas.microsoft.com/office/drawing/2014/main" xmlns="" id="{50E7E37D-C9D6-497C-9462-1847C520EF17}"/>
+                <a16:creationId xmlns="" xmlns:a16="http://schemas.microsoft.com/office/drawing/2014/main" id="{50E7E37D-C9D6-497C-9462-1847C520EF17}"/>
               </a:ext>
             </a:extLst>
           </p:cNvPr>
@@ -8177,7 +8286,7 @@
           <p:cNvPr id="20" name="Grafik 19">
             <a:extLst>
               <a:ext uri="{FF2B5EF4-FFF2-40B4-BE49-F238E27FC236}">
-                <a16:creationId xmlns:a16="http://schemas.microsoft.com/office/drawing/2014/main" xmlns="" id="{B65397EF-5233-4329-A2BC-B9FD0E3D4552}"/>
+                <a16:creationId xmlns="" xmlns:a16="http://schemas.microsoft.com/office/drawing/2014/main" id="{B65397EF-5233-4329-A2BC-B9FD0E3D4552}"/>
               </a:ext>
             </a:extLst>
           </p:cNvPr>
@@ -8213,7 +8322,7 @@
           <p:cNvPr id="21" name="Grafik 20">
             <a:extLst>
               <a:ext uri="{FF2B5EF4-FFF2-40B4-BE49-F238E27FC236}">
-                <a16:creationId xmlns:a16="http://schemas.microsoft.com/office/drawing/2014/main" xmlns="" id="{A1DC1406-976B-4DCD-BED7-7DEC6E9D8CBB}"/>
+                <a16:creationId xmlns="" xmlns:a16="http://schemas.microsoft.com/office/drawing/2014/main" id="{A1DC1406-976B-4DCD-BED7-7DEC6E9D8CBB}"/>
               </a:ext>
             </a:extLst>
           </p:cNvPr>
@@ -8243,7 +8352,7 @@
           <p:cNvPr id="23" name="Grafik 22">
             <a:extLst>
               <a:ext uri="{FF2B5EF4-FFF2-40B4-BE49-F238E27FC236}">
-                <a16:creationId xmlns:a16="http://schemas.microsoft.com/office/drawing/2014/main" xmlns="" id="{8E0954D3-4692-42A3-AEF6-5F5F1DD717DF}"/>
+                <a16:creationId xmlns="" xmlns:a16="http://schemas.microsoft.com/office/drawing/2014/main" id="{8E0954D3-4692-42A3-AEF6-5F5F1DD717DF}"/>
               </a:ext>
             </a:extLst>
           </p:cNvPr>
@@ -8279,7 +8388,7 @@
           <p:cNvPr id="24" name="Grafik 23">
             <a:extLst>
               <a:ext uri="{FF2B5EF4-FFF2-40B4-BE49-F238E27FC236}">
-                <a16:creationId xmlns:a16="http://schemas.microsoft.com/office/drawing/2014/main" xmlns="" id="{B3C25451-2B01-4511-B3D3-446047570DE5}"/>
+                <a16:creationId xmlns="" xmlns:a16="http://schemas.microsoft.com/office/drawing/2014/main" id="{B3C25451-2B01-4511-B3D3-446047570DE5}"/>
               </a:ext>
             </a:extLst>
           </p:cNvPr>
@@ -8309,7 +8418,7 @@
           <p:cNvPr id="26" name="Grafik 25">
             <a:extLst>
               <a:ext uri="{FF2B5EF4-FFF2-40B4-BE49-F238E27FC236}">
-                <a16:creationId xmlns:a16="http://schemas.microsoft.com/office/drawing/2014/main" xmlns="" id="{1367260E-8C66-4449-B88B-A196FD0908A7}"/>
+                <a16:creationId xmlns="" xmlns:a16="http://schemas.microsoft.com/office/drawing/2014/main" id="{1367260E-8C66-4449-B88B-A196FD0908A7}"/>
               </a:ext>
             </a:extLst>
           </p:cNvPr>
@@ -8345,7 +8454,7 @@
           <p:cNvPr id="28" name="Grafik 27">
             <a:extLst>
               <a:ext uri="{FF2B5EF4-FFF2-40B4-BE49-F238E27FC236}">
-                <a16:creationId xmlns:a16="http://schemas.microsoft.com/office/drawing/2014/main" xmlns="" id="{3385D22C-EE8A-4485-AE09-C19130CBE8C3}"/>
+                <a16:creationId xmlns="" xmlns:a16="http://schemas.microsoft.com/office/drawing/2014/main" id="{3385D22C-EE8A-4485-AE09-C19130CBE8C3}"/>
               </a:ext>
             </a:extLst>
           </p:cNvPr>
@@ -8381,7 +8490,7 @@
           <p:cNvPr id="29" name="Grafik 28">
             <a:extLst>
               <a:ext uri="{FF2B5EF4-FFF2-40B4-BE49-F238E27FC236}">
-                <a16:creationId xmlns:a16="http://schemas.microsoft.com/office/drawing/2014/main" xmlns="" id="{467B77FF-95C2-44EA-AC51-9E575824E2C5}"/>
+                <a16:creationId xmlns="" xmlns:a16="http://schemas.microsoft.com/office/drawing/2014/main" id="{467B77FF-95C2-44EA-AC51-9E575824E2C5}"/>
               </a:ext>
             </a:extLst>
           </p:cNvPr>
@@ -8441,7 +8550,7 @@
           <p:cNvPr id="2" name="Titel 1">
             <a:extLst>
               <a:ext uri="{FF2B5EF4-FFF2-40B4-BE49-F238E27FC236}">
-                <a16:creationId xmlns:a16="http://schemas.microsoft.com/office/drawing/2014/main" xmlns="" id="{1F20CAF2-C127-4F0A-B316-19CC56055294}"/>
+                <a16:creationId xmlns="" xmlns:a16="http://schemas.microsoft.com/office/drawing/2014/main" id="{1F20CAF2-C127-4F0A-B316-19CC56055294}"/>
               </a:ext>
             </a:extLst>
           </p:cNvPr>
@@ -8469,7 +8578,7 @@
           <p:cNvPr id="5" name="Inhaltsplatzhalter 2">
             <a:extLst>
               <a:ext uri="{FF2B5EF4-FFF2-40B4-BE49-F238E27FC236}">
-                <a16:creationId xmlns:a16="http://schemas.microsoft.com/office/drawing/2014/main" xmlns="" id="{64590773-EBBD-4338-B137-C3DAAB80D082}"/>
+                <a16:creationId xmlns="" xmlns:a16="http://schemas.microsoft.com/office/drawing/2014/main" id="{64590773-EBBD-4338-B137-C3DAAB80D082}"/>
               </a:ext>
             </a:extLst>
           </p:cNvPr>
@@ -8697,7 +8806,7 @@
           <p:cNvPr id="2" name="Titel 1">
             <a:extLst>
               <a:ext uri="{FF2B5EF4-FFF2-40B4-BE49-F238E27FC236}">
-                <a16:creationId xmlns:a16="http://schemas.microsoft.com/office/drawing/2014/main" xmlns="" id="{9EE6259C-8E17-43C1-815C-EC58FCDFCE07}"/>
+                <a16:creationId xmlns="" xmlns:a16="http://schemas.microsoft.com/office/drawing/2014/main" id="{9EE6259C-8E17-43C1-815C-EC58FCDFCE07}"/>
               </a:ext>
             </a:extLst>
           </p:cNvPr>
@@ -8733,7 +8842,7 @@
           <p:cNvPr id="6" name="Grafik 5">
             <a:extLst>
               <a:ext uri="{FF2B5EF4-FFF2-40B4-BE49-F238E27FC236}">
-                <a16:creationId xmlns:a16="http://schemas.microsoft.com/office/drawing/2014/main" xmlns="" id="{14932DAF-0E81-4E95-8560-F9C199BFDDCF}"/>
+                <a16:creationId xmlns="" xmlns:a16="http://schemas.microsoft.com/office/drawing/2014/main" id="{14932DAF-0E81-4E95-8560-F9C199BFDDCF}"/>
               </a:ext>
             </a:extLst>
           </p:cNvPr>

</xml_diff>

<commit_message>
Saliency maps model 8
</commit_message>
<xml_diff>
--- a/Präsentation1 (3).pptx
+++ b/Präsentation1 (3).pptx
@@ -39,7 +39,8 @@
     <p:sldId id="288" r:id="rId33"/>
     <p:sldId id="289" r:id="rId34"/>
     <p:sldId id="292" r:id="rId35"/>
-    <p:sldId id="291" r:id="rId36"/>
+    <p:sldId id="293" r:id="rId36"/>
+    <p:sldId id="291" r:id="rId37"/>
   </p:sldIdLst>
   <p:sldSz cx="12192000" cy="6858000"/>
   <p:notesSz cx="6858000" cy="9144000"/>
@@ -168,7 +169,7 @@
           <p:cNvPr id="2" name="Titel 1">
             <a:extLst>
               <a:ext uri="{FF2B5EF4-FFF2-40B4-BE49-F238E27FC236}">
-                <a16:creationId xmlns="" xmlns:a16="http://schemas.microsoft.com/office/drawing/2014/main" id="{942B8611-3801-48D0-8431-394DEEB11423}"/>
+                <a16:creationId xmlns:a16="http://schemas.microsoft.com/office/drawing/2014/main" id="{942B8611-3801-48D0-8431-394DEEB11423}"/>
               </a:ext>
             </a:extLst>
           </p:cNvPr>
@@ -205,7 +206,7 @@
           <p:cNvPr id="3" name="Untertitel 2">
             <a:extLst>
               <a:ext uri="{FF2B5EF4-FFF2-40B4-BE49-F238E27FC236}">
-                <a16:creationId xmlns="" xmlns:a16="http://schemas.microsoft.com/office/drawing/2014/main" id="{C9350902-D38C-4216-B4AC-6571FF72811F}"/>
+                <a16:creationId xmlns:a16="http://schemas.microsoft.com/office/drawing/2014/main" id="{C9350902-D38C-4216-B4AC-6571FF72811F}"/>
               </a:ext>
             </a:extLst>
           </p:cNvPr>
@@ -275,7 +276,7 @@
           <p:cNvPr id="4" name="Datumsplatzhalter 3">
             <a:extLst>
               <a:ext uri="{FF2B5EF4-FFF2-40B4-BE49-F238E27FC236}">
-                <a16:creationId xmlns="" xmlns:a16="http://schemas.microsoft.com/office/drawing/2014/main" id="{89187501-D588-43D4-AC39-353DB100B20E}"/>
+                <a16:creationId xmlns:a16="http://schemas.microsoft.com/office/drawing/2014/main" id="{89187501-D588-43D4-AC39-353DB100B20E}"/>
               </a:ext>
             </a:extLst>
           </p:cNvPr>
@@ -293,7 +294,7 @@
           <a:p>
             <a:fld id="{1966D34C-B499-4F71-9036-7E9E71527025}" type="datetimeFigureOut">
               <a:rPr lang="de-DE" smtClean="0"/>
-              <a:t>29.12.2024</a:t>
+              <a:t>30.12.2024</a:t>
             </a:fld>
             <a:endParaRPr lang="de-DE"/>
           </a:p>
@@ -304,7 +305,7 @@
           <p:cNvPr id="5" name="Fußzeilenplatzhalter 4">
             <a:extLst>
               <a:ext uri="{FF2B5EF4-FFF2-40B4-BE49-F238E27FC236}">
-                <a16:creationId xmlns="" xmlns:a16="http://schemas.microsoft.com/office/drawing/2014/main" id="{8EF81E42-93F7-4610-A201-0CCDEFEEBD22}"/>
+                <a16:creationId xmlns:a16="http://schemas.microsoft.com/office/drawing/2014/main" id="{8EF81E42-93F7-4610-A201-0CCDEFEEBD22}"/>
               </a:ext>
             </a:extLst>
           </p:cNvPr>
@@ -329,7 +330,7 @@
           <p:cNvPr id="6" name="Foliennummernplatzhalter 5">
             <a:extLst>
               <a:ext uri="{FF2B5EF4-FFF2-40B4-BE49-F238E27FC236}">
-                <a16:creationId xmlns="" xmlns:a16="http://schemas.microsoft.com/office/drawing/2014/main" id="{0658F116-05D5-44DC-A432-C3ED68337AF8}"/>
+                <a16:creationId xmlns:a16="http://schemas.microsoft.com/office/drawing/2014/main" id="{0658F116-05D5-44DC-A432-C3ED68337AF8}"/>
               </a:ext>
             </a:extLst>
           </p:cNvPr>
@@ -388,7 +389,7 @@
           <p:cNvPr id="2" name="Titel 1">
             <a:extLst>
               <a:ext uri="{FF2B5EF4-FFF2-40B4-BE49-F238E27FC236}">
-                <a16:creationId xmlns="" xmlns:a16="http://schemas.microsoft.com/office/drawing/2014/main" id="{E8A760C8-6FE6-4598-9D23-857B7CF91C4F}"/>
+                <a16:creationId xmlns:a16="http://schemas.microsoft.com/office/drawing/2014/main" id="{E8A760C8-6FE6-4598-9D23-857B7CF91C4F}"/>
               </a:ext>
             </a:extLst>
           </p:cNvPr>
@@ -416,7 +417,7 @@
           <p:cNvPr id="3" name="Vertikaler Textplatzhalter 2">
             <a:extLst>
               <a:ext uri="{FF2B5EF4-FFF2-40B4-BE49-F238E27FC236}">
-                <a16:creationId xmlns="" xmlns:a16="http://schemas.microsoft.com/office/drawing/2014/main" id="{6C00B4A6-C515-41F4-8A81-E4E893E725E2}"/>
+                <a16:creationId xmlns:a16="http://schemas.microsoft.com/office/drawing/2014/main" id="{6C00B4A6-C515-41F4-8A81-E4E893E725E2}"/>
               </a:ext>
             </a:extLst>
           </p:cNvPr>
@@ -473,7 +474,7 @@
           <p:cNvPr id="4" name="Datumsplatzhalter 3">
             <a:extLst>
               <a:ext uri="{FF2B5EF4-FFF2-40B4-BE49-F238E27FC236}">
-                <a16:creationId xmlns="" xmlns:a16="http://schemas.microsoft.com/office/drawing/2014/main" id="{98E82CBA-353B-4651-BE7E-C2A9A81748C0}"/>
+                <a16:creationId xmlns:a16="http://schemas.microsoft.com/office/drawing/2014/main" id="{98E82CBA-353B-4651-BE7E-C2A9A81748C0}"/>
               </a:ext>
             </a:extLst>
           </p:cNvPr>
@@ -491,7 +492,7 @@
           <a:p>
             <a:fld id="{1966D34C-B499-4F71-9036-7E9E71527025}" type="datetimeFigureOut">
               <a:rPr lang="de-DE" smtClean="0"/>
-              <a:t>29.12.2024</a:t>
+              <a:t>30.12.2024</a:t>
             </a:fld>
             <a:endParaRPr lang="de-DE"/>
           </a:p>
@@ -502,7 +503,7 @@
           <p:cNvPr id="5" name="Fußzeilenplatzhalter 4">
             <a:extLst>
               <a:ext uri="{FF2B5EF4-FFF2-40B4-BE49-F238E27FC236}">
-                <a16:creationId xmlns="" xmlns:a16="http://schemas.microsoft.com/office/drawing/2014/main" id="{6F0CEA61-B0FB-4D32-838E-422543E0C2E6}"/>
+                <a16:creationId xmlns:a16="http://schemas.microsoft.com/office/drawing/2014/main" id="{6F0CEA61-B0FB-4D32-838E-422543E0C2E6}"/>
               </a:ext>
             </a:extLst>
           </p:cNvPr>
@@ -527,7 +528,7 @@
           <p:cNvPr id="6" name="Foliennummernplatzhalter 5">
             <a:extLst>
               <a:ext uri="{FF2B5EF4-FFF2-40B4-BE49-F238E27FC236}">
-                <a16:creationId xmlns="" xmlns:a16="http://schemas.microsoft.com/office/drawing/2014/main" id="{E31E0085-9A30-42AB-9591-34DEAF2C6F30}"/>
+                <a16:creationId xmlns:a16="http://schemas.microsoft.com/office/drawing/2014/main" id="{E31E0085-9A30-42AB-9591-34DEAF2C6F30}"/>
               </a:ext>
             </a:extLst>
           </p:cNvPr>
@@ -586,7 +587,7 @@
           <p:cNvPr id="2" name="Vertikaler Titel 1">
             <a:extLst>
               <a:ext uri="{FF2B5EF4-FFF2-40B4-BE49-F238E27FC236}">
-                <a16:creationId xmlns="" xmlns:a16="http://schemas.microsoft.com/office/drawing/2014/main" id="{1CB43BBC-F05C-4A18-AEA0-761CC37DE783}"/>
+                <a16:creationId xmlns:a16="http://schemas.microsoft.com/office/drawing/2014/main" id="{1CB43BBC-F05C-4A18-AEA0-761CC37DE783}"/>
               </a:ext>
             </a:extLst>
           </p:cNvPr>
@@ -619,7 +620,7 @@
           <p:cNvPr id="3" name="Vertikaler Textplatzhalter 2">
             <a:extLst>
               <a:ext uri="{FF2B5EF4-FFF2-40B4-BE49-F238E27FC236}">
-                <a16:creationId xmlns="" xmlns:a16="http://schemas.microsoft.com/office/drawing/2014/main" id="{802C4948-4338-44E8-9C16-50BD9F30756B}"/>
+                <a16:creationId xmlns:a16="http://schemas.microsoft.com/office/drawing/2014/main" id="{802C4948-4338-44E8-9C16-50BD9F30756B}"/>
               </a:ext>
             </a:extLst>
           </p:cNvPr>
@@ -681,7 +682,7 @@
           <p:cNvPr id="4" name="Datumsplatzhalter 3">
             <a:extLst>
               <a:ext uri="{FF2B5EF4-FFF2-40B4-BE49-F238E27FC236}">
-                <a16:creationId xmlns="" xmlns:a16="http://schemas.microsoft.com/office/drawing/2014/main" id="{768D878E-1E0D-4E5E-A72C-EE1D97CCA363}"/>
+                <a16:creationId xmlns:a16="http://schemas.microsoft.com/office/drawing/2014/main" id="{768D878E-1E0D-4E5E-A72C-EE1D97CCA363}"/>
               </a:ext>
             </a:extLst>
           </p:cNvPr>
@@ -699,7 +700,7 @@
           <a:p>
             <a:fld id="{1966D34C-B499-4F71-9036-7E9E71527025}" type="datetimeFigureOut">
               <a:rPr lang="de-DE" smtClean="0"/>
-              <a:t>29.12.2024</a:t>
+              <a:t>30.12.2024</a:t>
             </a:fld>
             <a:endParaRPr lang="de-DE"/>
           </a:p>
@@ -710,7 +711,7 @@
           <p:cNvPr id="5" name="Fußzeilenplatzhalter 4">
             <a:extLst>
               <a:ext uri="{FF2B5EF4-FFF2-40B4-BE49-F238E27FC236}">
-                <a16:creationId xmlns="" xmlns:a16="http://schemas.microsoft.com/office/drawing/2014/main" id="{5951442F-09E0-472E-813A-9401C4EF374E}"/>
+                <a16:creationId xmlns:a16="http://schemas.microsoft.com/office/drawing/2014/main" id="{5951442F-09E0-472E-813A-9401C4EF374E}"/>
               </a:ext>
             </a:extLst>
           </p:cNvPr>
@@ -735,7 +736,7 @@
           <p:cNvPr id="6" name="Foliennummernplatzhalter 5">
             <a:extLst>
               <a:ext uri="{FF2B5EF4-FFF2-40B4-BE49-F238E27FC236}">
-                <a16:creationId xmlns="" xmlns:a16="http://schemas.microsoft.com/office/drawing/2014/main" id="{3A89B36C-AFD0-4FA3-A271-4599F5EAD210}"/>
+                <a16:creationId xmlns:a16="http://schemas.microsoft.com/office/drawing/2014/main" id="{3A89B36C-AFD0-4FA3-A271-4599F5EAD210}"/>
               </a:ext>
             </a:extLst>
           </p:cNvPr>
@@ -794,7 +795,7 @@
           <p:cNvPr id="2" name="Titel 1">
             <a:extLst>
               <a:ext uri="{FF2B5EF4-FFF2-40B4-BE49-F238E27FC236}">
-                <a16:creationId xmlns="" xmlns:a16="http://schemas.microsoft.com/office/drawing/2014/main" id="{7A9100B0-C2F4-48F4-A376-F4BE369A2847}"/>
+                <a16:creationId xmlns:a16="http://schemas.microsoft.com/office/drawing/2014/main" id="{7A9100B0-C2F4-48F4-A376-F4BE369A2847}"/>
               </a:ext>
             </a:extLst>
           </p:cNvPr>
@@ -822,7 +823,7 @@
           <p:cNvPr id="3" name="Inhaltsplatzhalter 2">
             <a:extLst>
               <a:ext uri="{FF2B5EF4-FFF2-40B4-BE49-F238E27FC236}">
-                <a16:creationId xmlns="" xmlns:a16="http://schemas.microsoft.com/office/drawing/2014/main" id="{68E6F6CB-88AB-4507-8412-28160033ADE1}"/>
+                <a16:creationId xmlns:a16="http://schemas.microsoft.com/office/drawing/2014/main" id="{68E6F6CB-88AB-4507-8412-28160033ADE1}"/>
               </a:ext>
             </a:extLst>
           </p:cNvPr>
@@ -879,7 +880,7 @@
           <p:cNvPr id="4" name="Datumsplatzhalter 3">
             <a:extLst>
               <a:ext uri="{FF2B5EF4-FFF2-40B4-BE49-F238E27FC236}">
-                <a16:creationId xmlns="" xmlns:a16="http://schemas.microsoft.com/office/drawing/2014/main" id="{CC6E9D85-1773-4CC1-AE55-C562FE227D1E}"/>
+                <a16:creationId xmlns:a16="http://schemas.microsoft.com/office/drawing/2014/main" id="{CC6E9D85-1773-4CC1-AE55-C562FE227D1E}"/>
               </a:ext>
             </a:extLst>
           </p:cNvPr>
@@ -897,7 +898,7 @@
           <a:p>
             <a:fld id="{1966D34C-B499-4F71-9036-7E9E71527025}" type="datetimeFigureOut">
               <a:rPr lang="de-DE" smtClean="0"/>
-              <a:t>29.12.2024</a:t>
+              <a:t>30.12.2024</a:t>
             </a:fld>
             <a:endParaRPr lang="de-DE"/>
           </a:p>
@@ -908,7 +909,7 @@
           <p:cNvPr id="5" name="Fußzeilenplatzhalter 4">
             <a:extLst>
               <a:ext uri="{FF2B5EF4-FFF2-40B4-BE49-F238E27FC236}">
-                <a16:creationId xmlns="" xmlns:a16="http://schemas.microsoft.com/office/drawing/2014/main" id="{BE553531-079B-4CCE-8F15-D985D12DC6E1}"/>
+                <a16:creationId xmlns:a16="http://schemas.microsoft.com/office/drawing/2014/main" id="{BE553531-079B-4CCE-8F15-D985D12DC6E1}"/>
               </a:ext>
             </a:extLst>
           </p:cNvPr>
@@ -933,7 +934,7 @@
           <p:cNvPr id="6" name="Foliennummernplatzhalter 5">
             <a:extLst>
               <a:ext uri="{FF2B5EF4-FFF2-40B4-BE49-F238E27FC236}">
-                <a16:creationId xmlns="" xmlns:a16="http://schemas.microsoft.com/office/drawing/2014/main" id="{ED376F7B-1D08-41C8-991F-7ED6097A59BD}"/>
+                <a16:creationId xmlns:a16="http://schemas.microsoft.com/office/drawing/2014/main" id="{ED376F7B-1D08-41C8-991F-7ED6097A59BD}"/>
               </a:ext>
             </a:extLst>
           </p:cNvPr>
@@ -992,7 +993,7 @@
           <p:cNvPr id="2" name="Titel 1">
             <a:extLst>
               <a:ext uri="{FF2B5EF4-FFF2-40B4-BE49-F238E27FC236}">
-                <a16:creationId xmlns="" xmlns:a16="http://schemas.microsoft.com/office/drawing/2014/main" id="{A0A9801A-278B-494B-B60C-BB2133B32995}"/>
+                <a16:creationId xmlns:a16="http://schemas.microsoft.com/office/drawing/2014/main" id="{A0A9801A-278B-494B-B60C-BB2133B32995}"/>
               </a:ext>
             </a:extLst>
           </p:cNvPr>
@@ -1029,7 +1030,7 @@
           <p:cNvPr id="3" name="Textplatzhalter 2">
             <a:extLst>
               <a:ext uri="{FF2B5EF4-FFF2-40B4-BE49-F238E27FC236}">
-                <a16:creationId xmlns="" xmlns:a16="http://schemas.microsoft.com/office/drawing/2014/main" id="{9717471E-0AB4-4009-9D2A-5D6863302B16}"/>
+                <a16:creationId xmlns:a16="http://schemas.microsoft.com/office/drawing/2014/main" id="{9717471E-0AB4-4009-9D2A-5D6863302B16}"/>
               </a:ext>
             </a:extLst>
           </p:cNvPr>
@@ -1154,7 +1155,7 @@
           <p:cNvPr id="4" name="Datumsplatzhalter 3">
             <a:extLst>
               <a:ext uri="{FF2B5EF4-FFF2-40B4-BE49-F238E27FC236}">
-                <a16:creationId xmlns="" xmlns:a16="http://schemas.microsoft.com/office/drawing/2014/main" id="{7C463F00-B142-4A4A-98EB-4F33172601CC}"/>
+                <a16:creationId xmlns:a16="http://schemas.microsoft.com/office/drawing/2014/main" id="{7C463F00-B142-4A4A-98EB-4F33172601CC}"/>
               </a:ext>
             </a:extLst>
           </p:cNvPr>
@@ -1172,7 +1173,7 @@
           <a:p>
             <a:fld id="{1966D34C-B499-4F71-9036-7E9E71527025}" type="datetimeFigureOut">
               <a:rPr lang="de-DE" smtClean="0"/>
-              <a:t>29.12.2024</a:t>
+              <a:t>30.12.2024</a:t>
             </a:fld>
             <a:endParaRPr lang="de-DE"/>
           </a:p>
@@ -1183,7 +1184,7 @@
           <p:cNvPr id="5" name="Fußzeilenplatzhalter 4">
             <a:extLst>
               <a:ext uri="{FF2B5EF4-FFF2-40B4-BE49-F238E27FC236}">
-                <a16:creationId xmlns="" xmlns:a16="http://schemas.microsoft.com/office/drawing/2014/main" id="{7D88A73C-AAE8-4C17-82DF-B76FC58AE174}"/>
+                <a16:creationId xmlns:a16="http://schemas.microsoft.com/office/drawing/2014/main" id="{7D88A73C-AAE8-4C17-82DF-B76FC58AE174}"/>
               </a:ext>
             </a:extLst>
           </p:cNvPr>
@@ -1208,7 +1209,7 @@
           <p:cNvPr id="6" name="Foliennummernplatzhalter 5">
             <a:extLst>
               <a:ext uri="{FF2B5EF4-FFF2-40B4-BE49-F238E27FC236}">
-                <a16:creationId xmlns="" xmlns:a16="http://schemas.microsoft.com/office/drawing/2014/main" id="{10401940-5BF1-460F-89AA-8DCCE2F778EF}"/>
+                <a16:creationId xmlns:a16="http://schemas.microsoft.com/office/drawing/2014/main" id="{10401940-5BF1-460F-89AA-8DCCE2F778EF}"/>
               </a:ext>
             </a:extLst>
           </p:cNvPr>
@@ -1267,7 +1268,7 @@
           <p:cNvPr id="2" name="Titel 1">
             <a:extLst>
               <a:ext uri="{FF2B5EF4-FFF2-40B4-BE49-F238E27FC236}">
-                <a16:creationId xmlns="" xmlns:a16="http://schemas.microsoft.com/office/drawing/2014/main" id="{33BE81C7-9434-488E-A7D1-2311872FBB2D}"/>
+                <a16:creationId xmlns:a16="http://schemas.microsoft.com/office/drawing/2014/main" id="{33BE81C7-9434-488E-A7D1-2311872FBB2D}"/>
               </a:ext>
             </a:extLst>
           </p:cNvPr>
@@ -1295,7 +1296,7 @@
           <p:cNvPr id="3" name="Inhaltsplatzhalter 2">
             <a:extLst>
               <a:ext uri="{FF2B5EF4-FFF2-40B4-BE49-F238E27FC236}">
-                <a16:creationId xmlns="" xmlns:a16="http://schemas.microsoft.com/office/drawing/2014/main" id="{F202816A-E434-48B5-9142-EFE88BCADA73}"/>
+                <a16:creationId xmlns:a16="http://schemas.microsoft.com/office/drawing/2014/main" id="{F202816A-E434-48B5-9142-EFE88BCADA73}"/>
               </a:ext>
             </a:extLst>
           </p:cNvPr>
@@ -1357,7 +1358,7 @@
           <p:cNvPr id="4" name="Inhaltsplatzhalter 3">
             <a:extLst>
               <a:ext uri="{FF2B5EF4-FFF2-40B4-BE49-F238E27FC236}">
-                <a16:creationId xmlns="" xmlns:a16="http://schemas.microsoft.com/office/drawing/2014/main" id="{65EBCF17-28DF-49E5-8ED4-CDB30DCF881D}"/>
+                <a16:creationId xmlns:a16="http://schemas.microsoft.com/office/drawing/2014/main" id="{65EBCF17-28DF-49E5-8ED4-CDB30DCF881D}"/>
               </a:ext>
             </a:extLst>
           </p:cNvPr>
@@ -1419,7 +1420,7 @@
           <p:cNvPr id="5" name="Datumsplatzhalter 4">
             <a:extLst>
               <a:ext uri="{FF2B5EF4-FFF2-40B4-BE49-F238E27FC236}">
-                <a16:creationId xmlns="" xmlns:a16="http://schemas.microsoft.com/office/drawing/2014/main" id="{B2EDD2D6-67BC-460E-8CDF-8FDF75CFACB6}"/>
+                <a16:creationId xmlns:a16="http://schemas.microsoft.com/office/drawing/2014/main" id="{B2EDD2D6-67BC-460E-8CDF-8FDF75CFACB6}"/>
               </a:ext>
             </a:extLst>
           </p:cNvPr>
@@ -1437,7 +1438,7 @@
           <a:p>
             <a:fld id="{1966D34C-B499-4F71-9036-7E9E71527025}" type="datetimeFigureOut">
               <a:rPr lang="de-DE" smtClean="0"/>
-              <a:t>29.12.2024</a:t>
+              <a:t>30.12.2024</a:t>
             </a:fld>
             <a:endParaRPr lang="de-DE"/>
           </a:p>
@@ -1448,7 +1449,7 @@
           <p:cNvPr id="6" name="Fußzeilenplatzhalter 5">
             <a:extLst>
               <a:ext uri="{FF2B5EF4-FFF2-40B4-BE49-F238E27FC236}">
-                <a16:creationId xmlns="" xmlns:a16="http://schemas.microsoft.com/office/drawing/2014/main" id="{90D8E9BF-79AC-4CD3-9A68-7B51E256D8B2}"/>
+                <a16:creationId xmlns:a16="http://schemas.microsoft.com/office/drawing/2014/main" id="{90D8E9BF-79AC-4CD3-9A68-7B51E256D8B2}"/>
               </a:ext>
             </a:extLst>
           </p:cNvPr>
@@ -1473,7 +1474,7 @@
           <p:cNvPr id="7" name="Foliennummernplatzhalter 6">
             <a:extLst>
               <a:ext uri="{FF2B5EF4-FFF2-40B4-BE49-F238E27FC236}">
-                <a16:creationId xmlns="" xmlns:a16="http://schemas.microsoft.com/office/drawing/2014/main" id="{485B7F93-2931-4531-B9E8-58D231D358A8}"/>
+                <a16:creationId xmlns:a16="http://schemas.microsoft.com/office/drawing/2014/main" id="{485B7F93-2931-4531-B9E8-58D231D358A8}"/>
               </a:ext>
             </a:extLst>
           </p:cNvPr>
@@ -1532,7 +1533,7 @@
           <p:cNvPr id="2" name="Titel 1">
             <a:extLst>
               <a:ext uri="{FF2B5EF4-FFF2-40B4-BE49-F238E27FC236}">
-                <a16:creationId xmlns="" xmlns:a16="http://schemas.microsoft.com/office/drawing/2014/main" id="{3D46B07A-A2D7-4D73-979A-D2413AD00737}"/>
+                <a16:creationId xmlns:a16="http://schemas.microsoft.com/office/drawing/2014/main" id="{3D46B07A-A2D7-4D73-979A-D2413AD00737}"/>
               </a:ext>
             </a:extLst>
           </p:cNvPr>
@@ -1565,7 +1566,7 @@
           <p:cNvPr id="3" name="Textplatzhalter 2">
             <a:extLst>
               <a:ext uri="{FF2B5EF4-FFF2-40B4-BE49-F238E27FC236}">
-                <a16:creationId xmlns="" xmlns:a16="http://schemas.microsoft.com/office/drawing/2014/main" id="{FCA61B03-9C49-495C-81DE-2FFDEE8F682A}"/>
+                <a16:creationId xmlns:a16="http://schemas.microsoft.com/office/drawing/2014/main" id="{FCA61B03-9C49-495C-81DE-2FFDEE8F682A}"/>
               </a:ext>
             </a:extLst>
           </p:cNvPr>
@@ -1636,7 +1637,7 @@
           <p:cNvPr id="4" name="Inhaltsplatzhalter 3">
             <a:extLst>
               <a:ext uri="{FF2B5EF4-FFF2-40B4-BE49-F238E27FC236}">
-                <a16:creationId xmlns="" xmlns:a16="http://schemas.microsoft.com/office/drawing/2014/main" id="{DBCA1775-97C7-46B3-BD29-07B554A4A9A6}"/>
+                <a16:creationId xmlns:a16="http://schemas.microsoft.com/office/drawing/2014/main" id="{DBCA1775-97C7-46B3-BD29-07B554A4A9A6}"/>
               </a:ext>
             </a:extLst>
           </p:cNvPr>
@@ -1698,7 +1699,7 @@
           <p:cNvPr id="5" name="Textplatzhalter 4">
             <a:extLst>
               <a:ext uri="{FF2B5EF4-FFF2-40B4-BE49-F238E27FC236}">
-                <a16:creationId xmlns="" xmlns:a16="http://schemas.microsoft.com/office/drawing/2014/main" id="{B7D1F09A-4B99-440A-9B38-58AC2C7E1DB8}"/>
+                <a16:creationId xmlns:a16="http://schemas.microsoft.com/office/drawing/2014/main" id="{B7D1F09A-4B99-440A-9B38-58AC2C7E1DB8}"/>
               </a:ext>
             </a:extLst>
           </p:cNvPr>
@@ -1769,7 +1770,7 @@
           <p:cNvPr id="6" name="Inhaltsplatzhalter 5">
             <a:extLst>
               <a:ext uri="{FF2B5EF4-FFF2-40B4-BE49-F238E27FC236}">
-                <a16:creationId xmlns="" xmlns:a16="http://schemas.microsoft.com/office/drawing/2014/main" id="{48DC35C7-616B-4ED5-8FE0-49BFB8433A13}"/>
+                <a16:creationId xmlns:a16="http://schemas.microsoft.com/office/drawing/2014/main" id="{48DC35C7-616B-4ED5-8FE0-49BFB8433A13}"/>
               </a:ext>
             </a:extLst>
           </p:cNvPr>
@@ -1831,7 +1832,7 @@
           <p:cNvPr id="7" name="Datumsplatzhalter 6">
             <a:extLst>
               <a:ext uri="{FF2B5EF4-FFF2-40B4-BE49-F238E27FC236}">
-                <a16:creationId xmlns="" xmlns:a16="http://schemas.microsoft.com/office/drawing/2014/main" id="{7C09774F-FE5E-4D56-BAA2-74E0175EE930}"/>
+                <a16:creationId xmlns:a16="http://schemas.microsoft.com/office/drawing/2014/main" id="{7C09774F-FE5E-4D56-BAA2-74E0175EE930}"/>
               </a:ext>
             </a:extLst>
           </p:cNvPr>
@@ -1849,7 +1850,7 @@
           <a:p>
             <a:fld id="{1966D34C-B499-4F71-9036-7E9E71527025}" type="datetimeFigureOut">
               <a:rPr lang="de-DE" smtClean="0"/>
-              <a:t>29.12.2024</a:t>
+              <a:t>30.12.2024</a:t>
             </a:fld>
             <a:endParaRPr lang="de-DE"/>
           </a:p>
@@ -1860,7 +1861,7 @@
           <p:cNvPr id="8" name="Fußzeilenplatzhalter 7">
             <a:extLst>
               <a:ext uri="{FF2B5EF4-FFF2-40B4-BE49-F238E27FC236}">
-                <a16:creationId xmlns="" xmlns:a16="http://schemas.microsoft.com/office/drawing/2014/main" id="{7180F28F-6BEA-4DB0-AC42-CB0270F755A6}"/>
+                <a16:creationId xmlns:a16="http://schemas.microsoft.com/office/drawing/2014/main" id="{7180F28F-6BEA-4DB0-AC42-CB0270F755A6}"/>
               </a:ext>
             </a:extLst>
           </p:cNvPr>
@@ -1885,7 +1886,7 @@
           <p:cNvPr id="9" name="Foliennummernplatzhalter 8">
             <a:extLst>
               <a:ext uri="{FF2B5EF4-FFF2-40B4-BE49-F238E27FC236}">
-                <a16:creationId xmlns="" xmlns:a16="http://schemas.microsoft.com/office/drawing/2014/main" id="{E6237190-7EDA-4023-A4FF-53EE97FDD5BE}"/>
+                <a16:creationId xmlns:a16="http://schemas.microsoft.com/office/drawing/2014/main" id="{E6237190-7EDA-4023-A4FF-53EE97FDD5BE}"/>
               </a:ext>
             </a:extLst>
           </p:cNvPr>
@@ -1944,7 +1945,7 @@
           <p:cNvPr id="2" name="Titel 1">
             <a:extLst>
               <a:ext uri="{FF2B5EF4-FFF2-40B4-BE49-F238E27FC236}">
-                <a16:creationId xmlns="" xmlns:a16="http://schemas.microsoft.com/office/drawing/2014/main" id="{6ED1B45A-5C77-4516-A90B-EC7777A730EC}"/>
+                <a16:creationId xmlns:a16="http://schemas.microsoft.com/office/drawing/2014/main" id="{6ED1B45A-5C77-4516-A90B-EC7777A730EC}"/>
               </a:ext>
             </a:extLst>
           </p:cNvPr>
@@ -1972,7 +1973,7 @@
           <p:cNvPr id="3" name="Datumsplatzhalter 2">
             <a:extLst>
               <a:ext uri="{FF2B5EF4-FFF2-40B4-BE49-F238E27FC236}">
-                <a16:creationId xmlns="" xmlns:a16="http://schemas.microsoft.com/office/drawing/2014/main" id="{47C2DDE4-1523-44CD-AB8E-958A3577ADA6}"/>
+                <a16:creationId xmlns:a16="http://schemas.microsoft.com/office/drawing/2014/main" id="{47C2DDE4-1523-44CD-AB8E-958A3577ADA6}"/>
               </a:ext>
             </a:extLst>
           </p:cNvPr>
@@ -1990,7 +1991,7 @@
           <a:p>
             <a:fld id="{1966D34C-B499-4F71-9036-7E9E71527025}" type="datetimeFigureOut">
               <a:rPr lang="de-DE" smtClean="0"/>
-              <a:t>29.12.2024</a:t>
+              <a:t>30.12.2024</a:t>
             </a:fld>
             <a:endParaRPr lang="de-DE"/>
           </a:p>
@@ -2001,7 +2002,7 @@
           <p:cNvPr id="4" name="Fußzeilenplatzhalter 3">
             <a:extLst>
               <a:ext uri="{FF2B5EF4-FFF2-40B4-BE49-F238E27FC236}">
-                <a16:creationId xmlns="" xmlns:a16="http://schemas.microsoft.com/office/drawing/2014/main" id="{9CD76EA9-2BCA-49B6-BF94-14FB51A59F6A}"/>
+                <a16:creationId xmlns:a16="http://schemas.microsoft.com/office/drawing/2014/main" id="{9CD76EA9-2BCA-49B6-BF94-14FB51A59F6A}"/>
               </a:ext>
             </a:extLst>
           </p:cNvPr>
@@ -2026,7 +2027,7 @@
           <p:cNvPr id="5" name="Foliennummernplatzhalter 4">
             <a:extLst>
               <a:ext uri="{FF2B5EF4-FFF2-40B4-BE49-F238E27FC236}">
-                <a16:creationId xmlns="" xmlns:a16="http://schemas.microsoft.com/office/drawing/2014/main" id="{334D001A-E7FB-40C7-8DF6-0D285709B545}"/>
+                <a16:creationId xmlns:a16="http://schemas.microsoft.com/office/drawing/2014/main" id="{334D001A-E7FB-40C7-8DF6-0D285709B545}"/>
               </a:ext>
             </a:extLst>
           </p:cNvPr>
@@ -2085,7 +2086,7 @@
           <p:cNvPr id="2" name="Datumsplatzhalter 1">
             <a:extLst>
               <a:ext uri="{FF2B5EF4-FFF2-40B4-BE49-F238E27FC236}">
-                <a16:creationId xmlns="" xmlns:a16="http://schemas.microsoft.com/office/drawing/2014/main" id="{F5E42BE2-3BE3-4D39-954A-54EB2EA825A3}"/>
+                <a16:creationId xmlns:a16="http://schemas.microsoft.com/office/drawing/2014/main" id="{F5E42BE2-3BE3-4D39-954A-54EB2EA825A3}"/>
               </a:ext>
             </a:extLst>
           </p:cNvPr>
@@ -2103,7 +2104,7 @@
           <a:p>
             <a:fld id="{1966D34C-B499-4F71-9036-7E9E71527025}" type="datetimeFigureOut">
               <a:rPr lang="de-DE" smtClean="0"/>
-              <a:t>29.12.2024</a:t>
+              <a:t>30.12.2024</a:t>
             </a:fld>
             <a:endParaRPr lang="de-DE"/>
           </a:p>
@@ -2114,7 +2115,7 @@
           <p:cNvPr id="3" name="Fußzeilenplatzhalter 2">
             <a:extLst>
               <a:ext uri="{FF2B5EF4-FFF2-40B4-BE49-F238E27FC236}">
-                <a16:creationId xmlns="" xmlns:a16="http://schemas.microsoft.com/office/drawing/2014/main" id="{E3354D42-7A99-433D-9EF4-C70287BB0F0A}"/>
+                <a16:creationId xmlns:a16="http://schemas.microsoft.com/office/drawing/2014/main" id="{E3354D42-7A99-433D-9EF4-C70287BB0F0A}"/>
               </a:ext>
             </a:extLst>
           </p:cNvPr>
@@ -2139,7 +2140,7 @@
           <p:cNvPr id="4" name="Foliennummernplatzhalter 3">
             <a:extLst>
               <a:ext uri="{FF2B5EF4-FFF2-40B4-BE49-F238E27FC236}">
-                <a16:creationId xmlns="" xmlns:a16="http://schemas.microsoft.com/office/drawing/2014/main" id="{21551C44-919D-4F61-A7B1-7A9B52E986F8}"/>
+                <a16:creationId xmlns:a16="http://schemas.microsoft.com/office/drawing/2014/main" id="{21551C44-919D-4F61-A7B1-7A9B52E986F8}"/>
               </a:ext>
             </a:extLst>
           </p:cNvPr>
@@ -2198,7 +2199,7 @@
           <p:cNvPr id="2" name="Titel 1">
             <a:extLst>
               <a:ext uri="{FF2B5EF4-FFF2-40B4-BE49-F238E27FC236}">
-                <a16:creationId xmlns="" xmlns:a16="http://schemas.microsoft.com/office/drawing/2014/main" id="{3768DE4E-E7DC-4947-913B-606D2CF2FF87}"/>
+                <a16:creationId xmlns:a16="http://schemas.microsoft.com/office/drawing/2014/main" id="{3768DE4E-E7DC-4947-913B-606D2CF2FF87}"/>
               </a:ext>
             </a:extLst>
           </p:cNvPr>
@@ -2235,7 +2236,7 @@
           <p:cNvPr id="3" name="Inhaltsplatzhalter 2">
             <a:extLst>
               <a:ext uri="{FF2B5EF4-FFF2-40B4-BE49-F238E27FC236}">
-                <a16:creationId xmlns="" xmlns:a16="http://schemas.microsoft.com/office/drawing/2014/main" id="{3DE6B879-527E-4377-98AC-23D1C6148BCE}"/>
+                <a16:creationId xmlns:a16="http://schemas.microsoft.com/office/drawing/2014/main" id="{3DE6B879-527E-4377-98AC-23D1C6148BCE}"/>
               </a:ext>
             </a:extLst>
           </p:cNvPr>
@@ -2325,7 +2326,7 @@
           <p:cNvPr id="4" name="Textplatzhalter 3">
             <a:extLst>
               <a:ext uri="{FF2B5EF4-FFF2-40B4-BE49-F238E27FC236}">
-                <a16:creationId xmlns="" xmlns:a16="http://schemas.microsoft.com/office/drawing/2014/main" id="{1E55FCED-4CC2-4D7F-B142-2CE5FAAC8153}"/>
+                <a16:creationId xmlns:a16="http://schemas.microsoft.com/office/drawing/2014/main" id="{1E55FCED-4CC2-4D7F-B142-2CE5FAAC8153}"/>
               </a:ext>
             </a:extLst>
           </p:cNvPr>
@@ -2396,7 +2397,7 @@
           <p:cNvPr id="5" name="Datumsplatzhalter 4">
             <a:extLst>
               <a:ext uri="{FF2B5EF4-FFF2-40B4-BE49-F238E27FC236}">
-                <a16:creationId xmlns="" xmlns:a16="http://schemas.microsoft.com/office/drawing/2014/main" id="{052EDD12-1C59-40C8-A398-1303A8E3523B}"/>
+                <a16:creationId xmlns:a16="http://schemas.microsoft.com/office/drawing/2014/main" id="{052EDD12-1C59-40C8-A398-1303A8E3523B}"/>
               </a:ext>
             </a:extLst>
           </p:cNvPr>
@@ -2414,7 +2415,7 @@
           <a:p>
             <a:fld id="{1966D34C-B499-4F71-9036-7E9E71527025}" type="datetimeFigureOut">
               <a:rPr lang="de-DE" smtClean="0"/>
-              <a:t>29.12.2024</a:t>
+              <a:t>30.12.2024</a:t>
             </a:fld>
             <a:endParaRPr lang="de-DE"/>
           </a:p>
@@ -2425,7 +2426,7 @@
           <p:cNvPr id="6" name="Fußzeilenplatzhalter 5">
             <a:extLst>
               <a:ext uri="{FF2B5EF4-FFF2-40B4-BE49-F238E27FC236}">
-                <a16:creationId xmlns="" xmlns:a16="http://schemas.microsoft.com/office/drawing/2014/main" id="{27D1CAB7-37C5-4D18-ADC8-BAF57E694F8D}"/>
+                <a16:creationId xmlns:a16="http://schemas.microsoft.com/office/drawing/2014/main" id="{27D1CAB7-37C5-4D18-ADC8-BAF57E694F8D}"/>
               </a:ext>
             </a:extLst>
           </p:cNvPr>
@@ -2450,7 +2451,7 @@
           <p:cNvPr id="7" name="Foliennummernplatzhalter 6">
             <a:extLst>
               <a:ext uri="{FF2B5EF4-FFF2-40B4-BE49-F238E27FC236}">
-                <a16:creationId xmlns="" xmlns:a16="http://schemas.microsoft.com/office/drawing/2014/main" id="{67C02470-7513-4A76-91B0-86F32ECF57D6}"/>
+                <a16:creationId xmlns:a16="http://schemas.microsoft.com/office/drawing/2014/main" id="{67C02470-7513-4A76-91B0-86F32ECF57D6}"/>
               </a:ext>
             </a:extLst>
           </p:cNvPr>
@@ -2509,7 +2510,7 @@
           <p:cNvPr id="2" name="Titel 1">
             <a:extLst>
               <a:ext uri="{FF2B5EF4-FFF2-40B4-BE49-F238E27FC236}">
-                <a16:creationId xmlns="" xmlns:a16="http://schemas.microsoft.com/office/drawing/2014/main" id="{F978E131-6FC2-4DFB-92D8-542C7463482E}"/>
+                <a16:creationId xmlns:a16="http://schemas.microsoft.com/office/drawing/2014/main" id="{F978E131-6FC2-4DFB-92D8-542C7463482E}"/>
               </a:ext>
             </a:extLst>
           </p:cNvPr>
@@ -2546,7 +2547,7 @@
           <p:cNvPr id="3" name="Bildplatzhalter 2">
             <a:extLst>
               <a:ext uri="{FF2B5EF4-FFF2-40B4-BE49-F238E27FC236}">
-                <a16:creationId xmlns="" xmlns:a16="http://schemas.microsoft.com/office/drawing/2014/main" id="{93447B4F-7245-4AE4-813C-6AF63911EDCE}"/>
+                <a16:creationId xmlns:a16="http://schemas.microsoft.com/office/drawing/2014/main" id="{93447B4F-7245-4AE4-813C-6AF63911EDCE}"/>
               </a:ext>
             </a:extLst>
           </p:cNvPr>
@@ -2613,7 +2614,7 @@
           <p:cNvPr id="4" name="Textplatzhalter 3">
             <a:extLst>
               <a:ext uri="{FF2B5EF4-FFF2-40B4-BE49-F238E27FC236}">
-                <a16:creationId xmlns="" xmlns:a16="http://schemas.microsoft.com/office/drawing/2014/main" id="{5F5B48A0-0BAD-476F-8E6D-64E5D28BD1E4}"/>
+                <a16:creationId xmlns:a16="http://schemas.microsoft.com/office/drawing/2014/main" id="{5F5B48A0-0BAD-476F-8E6D-64E5D28BD1E4}"/>
               </a:ext>
             </a:extLst>
           </p:cNvPr>
@@ -2684,7 +2685,7 @@
           <p:cNvPr id="5" name="Datumsplatzhalter 4">
             <a:extLst>
               <a:ext uri="{FF2B5EF4-FFF2-40B4-BE49-F238E27FC236}">
-                <a16:creationId xmlns="" xmlns:a16="http://schemas.microsoft.com/office/drawing/2014/main" id="{44A7C88A-EEBB-4682-959B-A2F4E0512D45}"/>
+                <a16:creationId xmlns:a16="http://schemas.microsoft.com/office/drawing/2014/main" id="{44A7C88A-EEBB-4682-959B-A2F4E0512D45}"/>
               </a:ext>
             </a:extLst>
           </p:cNvPr>
@@ -2702,7 +2703,7 @@
           <a:p>
             <a:fld id="{1966D34C-B499-4F71-9036-7E9E71527025}" type="datetimeFigureOut">
               <a:rPr lang="de-DE" smtClean="0"/>
-              <a:t>29.12.2024</a:t>
+              <a:t>30.12.2024</a:t>
             </a:fld>
             <a:endParaRPr lang="de-DE"/>
           </a:p>
@@ -2713,7 +2714,7 @@
           <p:cNvPr id="6" name="Fußzeilenplatzhalter 5">
             <a:extLst>
               <a:ext uri="{FF2B5EF4-FFF2-40B4-BE49-F238E27FC236}">
-                <a16:creationId xmlns="" xmlns:a16="http://schemas.microsoft.com/office/drawing/2014/main" id="{846BE28B-E4B1-4B5B-B463-06C01FC5721E}"/>
+                <a16:creationId xmlns:a16="http://schemas.microsoft.com/office/drawing/2014/main" id="{846BE28B-E4B1-4B5B-B463-06C01FC5721E}"/>
               </a:ext>
             </a:extLst>
           </p:cNvPr>
@@ -2738,7 +2739,7 @@
           <p:cNvPr id="7" name="Foliennummernplatzhalter 6">
             <a:extLst>
               <a:ext uri="{FF2B5EF4-FFF2-40B4-BE49-F238E27FC236}">
-                <a16:creationId xmlns="" xmlns:a16="http://schemas.microsoft.com/office/drawing/2014/main" id="{982DE88C-2143-4EC4-8441-FC9DFB8ED7AD}"/>
+                <a16:creationId xmlns:a16="http://schemas.microsoft.com/office/drawing/2014/main" id="{982DE88C-2143-4EC4-8441-FC9DFB8ED7AD}"/>
               </a:ext>
             </a:extLst>
           </p:cNvPr>
@@ -2802,7 +2803,7 @@
           <p:cNvPr id="2" name="Titelplatzhalter 1">
             <a:extLst>
               <a:ext uri="{FF2B5EF4-FFF2-40B4-BE49-F238E27FC236}">
-                <a16:creationId xmlns="" xmlns:a16="http://schemas.microsoft.com/office/drawing/2014/main" id="{B32A2DC8-D616-4826-8B1C-6E47B63D7776}"/>
+                <a16:creationId xmlns:a16="http://schemas.microsoft.com/office/drawing/2014/main" id="{B32A2DC8-D616-4826-8B1C-6E47B63D7776}"/>
               </a:ext>
             </a:extLst>
           </p:cNvPr>
@@ -2840,7 +2841,7 @@
           <p:cNvPr id="3" name="Textplatzhalter 2">
             <a:extLst>
               <a:ext uri="{FF2B5EF4-FFF2-40B4-BE49-F238E27FC236}">
-                <a16:creationId xmlns="" xmlns:a16="http://schemas.microsoft.com/office/drawing/2014/main" id="{8167E41F-5A6E-461D-9BDF-E3835F2D5016}"/>
+                <a16:creationId xmlns:a16="http://schemas.microsoft.com/office/drawing/2014/main" id="{8167E41F-5A6E-461D-9BDF-E3835F2D5016}"/>
               </a:ext>
             </a:extLst>
           </p:cNvPr>
@@ -2907,7 +2908,7 @@
           <p:cNvPr id="4" name="Datumsplatzhalter 3">
             <a:extLst>
               <a:ext uri="{FF2B5EF4-FFF2-40B4-BE49-F238E27FC236}">
-                <a16:creationId xmlns="" xmlns:a16="http://schemas.microsoft.com/office/drawing/2014/main" id="{4D9A80F2-BECC-4334-818A-3EE8CC350515}"/>
+                <a16:creationId xmlns:a16="http://schemas.microsoft.com/office/drawing/2014/main" id="{4D9A80F2-BECC-4334-818A-3EE8CC350515}"/>
               </a:ext>
             </a:extLst>
           </p:cNvPr>
@@ -2943,7 +2944,7 @@
           <a:p>
             <a:fld id="{1966D34C-B499-4F71-9036-7E9E71527025}" type="datetimeFigureOut">
               <a:rPr lang="de-DE" smtClean="0"/>
-              <a:t>29.12.2024</a:t>
+              <a:t>30.12.2024</a:t>
             </a:fld>
             <a:endParaRPr lang="de-DE"/>
           </a:p>
@@ -2954,7 +2955,7 @@
           <p:cNvPr id="5" name="Fußzeilenplatzhalter 4">
             <a:extLst>
               <a:ext uri="{FF2B5EF4-FFF2-40B4-BE49-F238E27FC236}">
-                <a16:creationId xmlns="" xmlns:a16="http://schemas.microsoft.com/office/drawing/2014/main" id="{1DD45AEF-0AFD-4E6B-9937-D26D5A87B34B}"/>
+                <a16:creationId xmlns:a16="http://schemas.microsoft.com/office/drawing/2014/main" id="{1DD45AEF-0AFD-4E6B-9937-D26D5A87B34B}"/>
               </a:ext>
             </a:extLst>
           </p:cNvPr>
@@ -2997,7 +2998,7 @@
           <p:cNvPr id="6" name="Foliennummernplatzhalter 5">
             <a:extLst>
               <a:ext uri="{FF2B5EF4-FFF2-40B4-BE49-F238E27FC236}">
-                <a16:creationId xmlns="" xmlns:a16="http://schemas.microsoft.com/office/drawing/2014/main" id="{8BE46D85-7D56-43B8-B265-A178B1E3935A}"/>
+                <a16:creationId xmlns:a16="http://schemas.microsoft.com/office/drawing/2014/main" id="{8BE46D85-7D56-43B8-B265-A178B1E3935A}"/>
               </a:ext>
             </a:extLst>
           </p:cNvPr>
@@ -3365,7 +3366,7 @@
           <p:cNvPr id="2" name="Titel 1">
             <a:extLst>
               <a:ext uri="{FF2B5EF4-FFF2-40B4-BE49-F238E27FC236}">
-                <a16:creationId xmlns="" xmlns:a16="http://schemas.microsoft.com/office/drawing/2014/main" id="{35895132-DE23-4A00-8E1E-E054001DF0F0}"/>
+                <a16:creationId xmlns:a16="http://schemas.microsoft.com/office/drawing/2014/main" id="{35895132-DE23-4A00-8E1E-E054001DF0F0}"/>
               </a:ext>
             </a:extLst>
           </p:cNvPr>
@@ -3390,7 +3391,7 @@
           <p:cNvPr id="3" name="Untertitel 2">
             <a:extLst>
               <a:ext uri="{FF2B5EF4-FFF2-40B4-BE49-F238E27FC236}">
-                <a16:creationId xmlns="" xmlns:a16="http://schemas.microsoft.com/office/drawing/2014/main" id="{2BFB556B-F266-43C2-9F0F-498A82864EBB}"/>
+                <a16:creationId xmlns:a16="http://schemas.microsoft.com/office/drawing/2014/main" id="{2BFB556B-F266-43C2-9F0F-498A82864EBB}"/>
               </a:ext>
             </a:extLst>
           </p:cNvPr>
@@ -3445,7 +3446,7 @@
           <p:cNvPr id="2" name="Titel 1">
             <a:extLst>
               <a:ext uri="{FF2B5EF4-FFF2-40B4-BE49-F238E27FC236}">
-                <a16:creationId xmlns="" xmlns:a16="http://schemas.microsoft.com/office/drawing/2014/main" id="{1F20CAF2-C127-4F0A-B316-19CC56055294}"/>
+                <a16:creationId xmlns:a16="http://schemas.microsoft.com/office/drawing/2014/main" id="{1F20CAF2-C127-4F0A-B316-19CC56055294}"/>
               </a:ext>
             </a:extLst>
           </p:cNvPr>
@@ -3473,7 +3474,7 @@
           <p:cNvPr id="4" name="Textfeld 3">
             <a:extLst>
               <a:ext uri="{FF2B5EF4-FFF2-40B4-BE49-F238E27FC236}">
-                <a16:creationId xmlns="" xmlns:a16="http://schemas.microsoft.com/office/drawing/2014/main" id="{A8C06F69-4BBE-4E8B-9564-6E5737B41EB9}"/>
+                <a16:creationId xmlns:a16="http://schemas.microsoft.com/office/drawing/2014/main" id="{A8C06F69-4BBE-4E8B-9564-6E5737B41EB9}"/>
               </a:ext>
             </a:extLst>
           </p:cNvPr>
@@ -3595,7 +3596,7 @@
           <p:cNvPr id="2" name="Titel 1">
             <a:extLst>
               <a:ext uri="{FF2B5EF4-FFF2-40B4-BE49-F238E27FC236}">
-                <a16:creationId xmlns="" xmlns:a16="http://schemas.microsoft.com/office/drawing/2014/main" id="{9EE6259C-8E17-43C1-815C-EC58FCDFCE07}"/>
+                <a16:creationId xmlns:a16="http://schemas.microsoft.com/office/drawing/2014/main" id="{9EE6259C-8E17-43C1-815C-EC58FCDFCE07}"/>
               </a:ext>
             </a:extLst>
           </p:cNvPr>
@@ -3628,7 +3629,7 @@
           <p:cNvPr id="3" name="Grafik 2">
             <a:extLst>
               <a:ext uri="{FF2B5EF4-FFF2-40B4-BE49-F238E27FC236}">
-                <a16:creationId xmlns="" xmlns:a16="http://schemas.microsoft.com/office/drawing/2014/main" id="{7447C229-39C6-4773-943C-F2A4300AAB34}"/>
+                <a16:creationId xmlns:a16="http://schemas.microsoft.com/office/drawing/2014/main" id="{7447C229-39C6-4773-943C-F2A4300AAB34}"/>
               </a:ext>
             </a:extLst>
           </p:cNvPr>
@@ -3688,7 +3689,7 @@
           <p:cNvPr id="2" name="Titel 1">
             <a:extLst>
               <a:ext uri="{FF2B5EF4-FFF2-40B4-BE49-F238E27FC236}">
-                <a16:creationId xmlns="" xmlns:a16="http://schemas.microsoft.com/office/drawing/2014/main" id="{9EE6259C-8E17-43C1-815C-EC58FCDFCE07}"/>
+                <a16:creationId xmlns:a16="http://schemas.microsoft.com/office/drawing/2014/main" id="{9EE6259C-8E17-43C1-815C-EC58FCDFCE07}"/>
               </a:ext>
             </a:extLst>
           </p:cNvPr>
@@ -3724,7 +3725,7 @@
           <p:cNvPr id="3" name="Grafik 2">
             <a:extLst>
               <a:ext uri="{FF2B5EF4-FFF2-40B4-BE49-F238E27FC236}">
-                <a16:creationId xmlns="" xmlns:a16="http://schemas.microsoft.com/office/drawing/2014/main" id="{169A3B40-082B-4B32-9393-3852359890FB}"/>
+                <a16:creationId xmlns:a16="http://schemas.microsoft.com/office/drawing/2014/main" id="{169A3B40-082B-4B32-9393-3852359890FB}"/>
               </a:ext>
             </a:extLst>
           </p:cNvPr>
@@ -3754,7 +3755,7 @@
           <p:cNvPr id="5" name="Grafik 4">
             <a:extLst>
               <a:ext uri="{FF2B5EF4-FFF2-40B4-BE49-F238E27FC236}">
-                <a16:creationId xmlns="" xmlns:a16="http://schemas.microsoft.com/office/drawing/2014/main" id="{31DFF791-4537-4BEC-AA27-24A93D9871A1}"/>
+                <a16:creationId xmlns:a16="http://schemas.microsoft.com/office/drawing/2014/main" id="{31DFF791-4537-4BEC-AA27-24A93D9871A1}"/>
               </a:ext>
             </a:extLst>
           </p:cNvPr>
@@ -3790,7 +3791,7 @@
           <p:cNvPr id="7" name="Grafik 6">
             <a:extLst>
               <a:ext uri="{FF2B5EF4-FFF2-40B4-BE49-F238E27FC236}">
-                <a16:creationId xmlns="" xmlns:a16="http://schemas.microsoft.com/office/drawing/2014/main" id="{F99E93FB-E819-457C-B4E9-C9415778AD84}"/>
+                <a16:creationId xmlns:a16="http://schemas.microsoft.com/office/drawing/2014/main" id="{F99E93FB-E819-457C-B4E9-C9415778AD84}"/>
               </a:ext>
             </a:extLst>
           </p:cNvPr>
@@ -3826,7 +3827,7 @@
           <p:cNvPr id="9" name="Grafik 8">
             <a:extLst>
               <a:ext uri="{FF2B5EF4-FFF2-40B4-BE49-F238E27FC236}">
-                <a16:creationId xmlns="" xmlns:a16="http://schemas.microsoft.com/office/drawing/2014/main" id="{F83F5F9E-F558-4F36-8641-8554C0647776}"/>
+                <a16:creationId xmlns:a16="http://schemas.microsoft.com/office/drawing/2014/main" id="{F83F5F9E-F558-4F36-8641-8554C0647776}"/>
               </a:ext>
             </a:extLst>
           </p:cNvPr>
@@ -3862,7 +3863,7 @@
           <p:cNvPr id="11" name="Grafik 10">
             <a:extLst>
               <a:ext uri="{FF2B5EF4-FFF2-40B4-BE49-F238E27FC236}">
-                <a16:creationId xmlns="" xmlns:a16="http://schemas.microsoft.com/office/drawing/2014/main" id="{CCE0293C-8429-4206-B338-D91F94DFD77F}"/>
+                <a16:creationId xmlns:a16="http://schemas.microsoft.com/office/drawing/2014/main" id="{CCE0293C-8429-4206-B338-D91F94DFD77F}"/>
               </a:ext>
             </a:extLst>
           </p:cNvPr>
@@ -3898,7 +3899,7 @@
           <p:cNvPr id="13" name="Grafik 12">
             <a:extLst>
               <a:ext uri="{FF2B5EF4-FFF2-40B4-BE49-F238E27FC236}">
-                <a16:creationId xmlns="" xmlns:a16="http://schemas.microsoft.com/office/drawing/2014/main" id="{C02EB894-088B-4405-AEFB-A27CF32E7E59}"/>
+                <a16:creationId xmlns:a16="http://schemas.microsoft.com/office/drawing/2014/main" id="{C02EB894-088B-4405-AEFB-A27CF32E7E59}"/>
               </a:ext>
             </a:extLst>
           </p:cNvPr>
@@ -3934,7 +3935,7 @@
           <p:cNvPr id="15" name="Grafik 14">
             <a:extLst>
               <a:ext uri="{FF2B5EF4-FFF2-40B4-BE49-F238E27FC236}">
-                <a16:creationId xmlns="" xmlns:a16="http://schemas.microsoft.com/office/drawing/2014/main" id="{B82DDFC0-D94C-4623-BA97-035AC1DD7C06}"/>
+                <a16:creationId xmlns:a16="http://schemas.microsoft.com/office/drawing/2014/main" id="{B82DDFC0-D94C-4623-BA97-035AC1DD7C06}"/>
               </a:ext>
             </a:extLst>
           </p:cNvPr>
@@ -3970,7 +3971,7 @@
           <p:cNvPr id="17" name="Grafik 16">
             <a:extLst>
               <a:ext uri="{FF2B5EF4-FFF2-40B4-BE49-F238E27FC236}">
-                <a16:creationId xmlns="" xmlns:a16="http://schemas.microsoft.com/office/drawing/2014/main" id="{C4D52B24-049C-445C-A756-2F40706C423E}"/>
+                <a16:creationId xmlns:a16="http://schemas.microsoft.com/office/drawing/2014/main" id="{C4D52B24-049C-445C-A756-2F40706C423E}"/>
               </a:ext>
             </a:extLst>
           </p:cNvPr>
@@ -4036,7 +4037,7 @@
           <p:cNvPr id="16" name="Titel 1">
             <a:extLst>
               <a:ext uri="{FF2B5EF4-FFF2-40B4-BE49-F238E27FC236}">
-                <a16:creationId xmlns="" xmlns:a16="http://schemas.microsoft.com/office/drawing/2014/main" id="{CE3C357C-3A6D-4B2D-919B-468E62ADB4A7}"/>
+                <a16:creationId xmlns:a16="http://schemas.microsoft.com/office/drawing/2014/main" id="{CE3C357C-3A6D-4B2D-919B-468E62ADB4A7}"/>
               </a:ext>
             </a:extLst>
           </p:cNvPr>
@@ -4081,7 +4082,7 @@
           <p:cNvPr id="3" name="Grafik 2">
             <a:extLst>
               <a:ext uri="{FF2B5EF4-FFF2-40B4-BE49-F238E27FC236}">
-                <a16:creationId xmlns="" xmlns:a16="http://schemas.microsoft.com/office/drawing/2014/main" id="{F32513A5-1A7C-4658-B371-DA5869B1D017}"/>
+                <a16:creationId xmlns:a16="http://schemas.microsoft.com/office/drawing/2014/main" id="{F32513A5-1A7C-4658-B371-DA5869B1D017}"/>
               </a:ext>
             </a:extLst>
           </p:cNvPr>
@@ -4141,7 +4142,7 @@
           <p:cNvPr id="16" name="Titel 1">
             <a:extLst>
               <a:ext uri="{FF2B5EF4-FFF2-40B4-BE49-F238E27FC236}">
-                <a16:creationId xmlns="" xmlns:a16="http://schemas.microsoft.com/office/drawing/2014/main" id="{CE3C357C-3A6D-4B2D-919B-468E62ADB4A7}"/>
+                <a16:creationId xmlns:a16="http://schemas.microsoft.com/office/drawing/2014/main" id="{CE3C357C-3A6D-4B2D-919B-468E62ADB4A7}"/>
               </a:ext>
             </a:extLst>
           </p:cNvPr>
@@ -4178,7 +4179,7 @@
           <p:cNvPr id="5" name="Textfeld 4">
             <a:extLst>
               <a:ext uri="{FF2B5EF4-FFF2-40B4-BE49-F238E27FC236}">
-                <a16:creationId xmlns="" xmlns:a16="http://schemas.microsoft.com/office/drawing/2014/main" id="{D064DB0F-8769-48E6-A427-FE9967D8F4B4}"/>
+                <a16:creationId xmlns:a16="http://schemas.microsoft.com/office/drawing/2014/main" id="{D064DB0F-8769-48E6-A427-FE9967D8F4B4}"/>
               </a:ext>
             </a:extLst>
           </p:cNvPr>
@@ -4331,7 +4332,7 @@
           <p:cNvPr id="2" name="Titel 1">
             <a:extLst>
               <a:ext uri="{FF2B5EF4-FFF2-40B4-BE49-F238E27FC236}">
-                <a16:creationId xmlns="" xmlns:a16="http://schemas.microsoft.com/office/drawing/2014/main" id="{9672587A-9876-4331-AC51-AA638EA60F83}"/>
+                <a16:creationId xmlns:a16="http://schemas.microsoft.com/office/drawing/2014/main" id="{9672587A-9876-4331-AC51-AA638EA60F83}"/>
               </a:ext>
             </a:extLst>
           </p:cNvPr>
@@ -4368,7 +4369,7 @@
           <p:cNvPr id="6" name="Grafik 5">
             <a:extLst>
               <a:ext uri="{FF2B5EF4-FFF2-40B4-BE49-F238E27FC236}">
-                <a16:creationId xmlns="" xmlns:a16="http://schemas.microsoft.com/office/drawing/2014/main" id="{BCA779CB-39BD-4D78-99DA-D05FB82932A6}"/>
+                <a16:creationId xmlns:a16="http://schemas.microsoft.com/office/drawing/2014/main" id="{BCA779CB-39BD-4D78-99DA-D05FB82932A6}"/>
               </a:ext>
             </a:extLst>
           </p:cNvPr>
@@ -4428,7 +4429,7 @@
           <p:cNvPr id="2" name="Titel 1">
             <a:extLst>
               <a:ext uri="{FF2B5EF4-FFF2-40B4-BE49-F238E27FC236}">
-                <a16:creationId xmlns="" xmlns:a16="http://schemas.microsoft.com/office/drawing/2014/main" id="{9672587A-9876-4331-AC51-AA638EA60F83}"/>
+                <a16:creationId xmlns:a16="http://schemas.microsoft.com/office/drawing/2014/main" id="{9672587A-9876-4331-AC51-AA638EA60F83}"/>
               </a:ext>
             </a:extLst>
           </p:cNvPr>
@@ -4468,7 +4469,7 @@
           <p:cNvPr id="4" name="Grafik 3">
             <a:extLst>
               <a:ext uri="{FF2B5EF4-FFF2-40B4-BE49-F238E27FC236}">
-                <a16:creationId xmlns="" xmlns:a16="http://schemas.microsoft.com/office/drawing/2014/main" id="{816B13E9-5249-4CA4-A35C-5986BA9BE4D0}"/>
+                <a16:creationId xmlns:a16="http://schemas.microsoft.com/office/drawing/2014/main" id="{816B13E9-5249-4CA4-A35C-5986BA9BE4D0}"/>
               </a:ext>
             </a:extLst>
           </p:cNvPr>
@@ -4498,7 +4499,7 @@
           <p:cNvPr id="7" name="Grafik 6">
             <a:extLst>
               <a:ext uri="{FF2B5EF4-FFF2-40B4-BE49-F238E27FC236}">
-                <a16:creationId xmlns="" xmlns:a16="http://schemas.microsoft.com/office/drawing/2014/main" id="{06299A92-39CC-407C-9E6D-FD10FB52FD53}"/>
+                <a16:creationId xmlns:a16="http://schemas.microsoft.com/office/drawing/2014/main" id="{06299A92-39CC-407C-9E6D-FD10FB52FD53}"/>
               </a:ext>
             </a:extLst>
           </p:cNvPr>
@@ -4528,7 +4529,7 @@
           <p:cNvPr id="9" name="Grafik 8">
             <a:extLst>
               <a:ext uri="{FF2B5EF4-FFF2-40B4-BE49-F238E27FC236}">
-                <a16:creationId xmlns="" xmlns:a16="http://schemas.microsoft.com/office/drawing/2014/main" id="{B3D05ACD-4BA4-4ED1-8118-57BAE2BFDC77}"/>
+                <a16:creationId xmlns:a16="http://schemas.microsoft.com/office/drawing/2014/main" id="{B3D05ACD-4BA4-4ED1-8118-57BAE2BFDC77}"/>
               </a:ext>
             </a:extLst>
           </p:cNvPr>
@@ -4558,7 +4559,7 @@
           <p:cNvPr id="11" name="Grafik 10">
             <a:extLst>
               <a:ext uri="{FF2B5EF4-FFF2-40B4-BE49-F238E27FC236}">
-                <a16:creationId xmlns="" xmlns:a16="http://schemas.microsoft.com/office/drawing/2014/main" id="{8F3F2480-A696-41BE-BB9D-CE16ECF8109F}"/>
+                <a16:creationId xmlns:a16="http://schemas.microsoft.com/office/drawing/2014/main" id="{8F3F2480-A696-41BE-BB9D-CE16ECF8109F}"/>
               </a:ext>
             </a:extLst>
           </p:cNvPr>
@@ -4588,7 +4589,7 @@
           <p:cNvPr id="13" name="Grafik 12">
             <a:extLst>
               <a:ext uri="{FF2B5EF4-FFF2-40B4-BE49-F238E27FC236}">
-                <a16:creationId xmlns="" xmlns:a16="http://schemas.microsoft.com/office/drawing/2014/main" id="{99F321E4-6331-4E11-83E0-2F96235275AD}"/>
+                <a16:creationId xmlns:a16="http://schemas.microsoft.com/office/drawing/2014/main" id="{99F321E4-6331-4E11-83E0-2F96235275AD}"/>
               </a:ext>
             </a:extLst>
           </p:cNvPr>
@@ -4618,7 +4619,7 @@
           <p:cNvPr id="15" name="Grafik 14">
             <a:extLst>
               <a:ext uri="{FF2B5EF4-FFF2-40B4-BE49-F238E27FC236}">
-                <a16:creationId xmlns="" xmlns:a16="http://schemas.microsoft.com/office/drawing/2014/main" id="{B1275EFF-ED71-49FA-94FE-2CE08AD215C1}"/>
+                <a16:creationId xmlns:a16="http://schemas.microsoft.com/office/drawing/2014/main" id="{B1275EFF-ED71-49FA-94FE-2CE08AD215C1}"/>
               </a:ext>
             </a:extLst>
           </p:cNvPr>
@@ -4648,7 +4649,7 @@
           <p:cNvPr id="17" name="Grafik 16">
             <a:extLst>
               <a:ext uri="{FF2B5EF4-FFF2-40B4-BE49-F238E27FC236}">
-                <a16:creationId xmlns="" xmlns:a16="http://schemas.microsoft.com/office/drawing/2014/main" id="{5678B9CE-3CD7-467D-9B10-379F15D1A62F}"/>
+                <a16:creationId xmlns:a16="http://schemas.microsoft.com/office/drawing/2014/main" id="{5678B9CE-3CD7-467D-9B10-379F15D1A62F}"/>
               </a:ext>
             </a:extLst>
           </p:cNvPr>
@@ -4678,7 +4679,7 @@
           <p:cNvPr id="19" name="Grafik 18">
             <a:extLst>
               <a:ext uri="{FF2B5EF4-FFF2-40B4-BE49-F238E27FC236}">
-                <a16:creationId xmlns="" xmlns:a16="http://schemas.microsoft.com/office/drawing/2014/main" id="{DD39D264-4BC7-485D-862A-ECF9A3A6CEB1}"/>
+                <a16:creationId xmlns:a16="http://schemas.microsoft.com/office/drawing/2014/main" id="{DD39D264-4BC7-485D-862A-ECF9A3A6CEB1}"/>
               </a:ext>
             </a:extLst>
           </p:cNvPr>
@@ -4738,7 +4739,7 @@
           <p:cNvPr id="3" name="Grafik 2">
             <a:extLst>
               <a:ext uri="{FF2B5EF4-FFF2-40B4-BE49-F238E27FC236}">
-                <a16:creationId xmlns="" xmlns:a16="http://schemas.microsoft.com/office/drawing/2014/main" id="{A456BD08-1E6D-4A73-8DF6-19DC0743F759}"/>
+                <a16:creationId xmlns:a16="http://schemas.microsoft.com/office/drawing/2014/main" id="{A456BD08-1E6D-4A73-8DF6-19DC0743F759}"/>
               </a:ext>
             </a:extLst>
           </p:cNvPr>
@@ -4798,7 +4799,7 @@
           <p:cNvPr id="2" name="Titel 1">
             <a:extLst>
               <a:ext uri="{FF2B5EF4-FFF2-40B4-BE49-F238E27FC236}">
-                <a16:creationId xmlns="" xmlns:a16="http://schemas.microsoft.com/office/drawing/2014/main" id="{FA0E998A-8B92-4AB3-A9A8-1DE5D112DC24}"/>
+                <a16:creationId xmlns:a16="http://schemas.microsoft.com/office/drawing/2014/main" id="{FA0E998A-8B92-4AB3-A9A8-1DE5D112DC24}"/>
               </a:ext>
             </a:extLst>
           </p:cNvPr>
@@ -4834,7 +4835,7 @@
           <p:cNvPr id="3" name="Inhaltsplatzhalter 2">
             <a:extLst>
               <a:ext uri="{FF2B5EF4-FFF2-40B4-BE49-F238E27FC236}">
-                <a16:creationId xmlns="" xmlns:a16="http://schemas.microsoft.com/office/drawing/2014/main" id="{03FCA3D9-EE93-495D-BB38-42608EA49BF0}"/>
+                <a16:creationId xmlns:a16="http://schemas.microsoft.com/office/drawing/2014/main" id="{03FCA3D9-EE93-495D-BB38-42608EA49BF0}"/>
               </a:ext>
             </a:extLst>
           </p:cNvPr>
@@ -4920,7 +4921,7 @@
           <p:cNvPr id="10" name="Textfeld 9">
             <a:extLst>
               <a:ext uri="{FF2B5EF4-FFF2-40B4-BE49-F238E27FC236}">
-                <a16:creationId xmlns="" xmlns:a16="http://schemas.microsoft.com/office/drawing/2014/main" id="{8214A440-4372-42B2-95FA-FB333F1ACF7C}"/>
+                <a16:creationId xmlns:a16="http://schemas.microsoft.com/office/drawing/2014/main" id="{8214A440-4372-42B2-95FA-FB333F1ACF7C}"/>
               </a:ext>
             </a:extLst>
           </p:cNvPr>
@@ -5358,7 +5359,7 @@
           <p:cNvPr id="2" name="Titel 1">
             <a:extLst>
               <a:ext uri="{FF2B5EF4-FFF2-40B4-BE49-F238E27FC236}">
-                <a16:creationId xmlns="" xmlns:a16="http://schemas.microsoft.com/office/drawing/2014/main" id="{F460CF33-D61D-45E6-A010-57D8D85767E5}"/>
+                <a16:creationId xmlns:a16="http://schemas.microsoft.com/office/drawing/2014/main" id="{F460CF33-D61D-45E6-A010-57D8D85767E5}"/>
               </a:ext>
             </a:extLst>
           </p:cNvPr>
@@ -5413,7 +5414,7 @@
           <p:cNvPr id="11" name="Textfeld 10">
             <a:extLst>
               <a:ext uri="{FF2B5EF4-FFF2-40B4-BE49-F238E27FC236}">
-                <a16:creationId xmlns="" xmlns:a16="http://schemas.microsoft.com/office/drawing/2014/main" id="{4E05C3E3-6957-4521-AEFD-236E914B26E5}"/>
+                <a16:creationId xmlns:a16="http://schemas.microsoft.com/office/drawing/2014/main" id="{4E05C3E3-6957-4521-AEFD-236E914B26E5}"/>
               </a:ext>
             </a:extLst>
           </p:cNvPr>
@@ -5508,7 +5509,7 @@
           <p:cNvPr id="16" name="Titel 1">
             <a:extLst>
               <a:ext uri="{FF2B5EF4-FFF2-40B4-BE49-F238E27FC236}">
-                <a16:creationId xmlns="" xmlns:a16="http://schemas.microsoft.com/office/drawing/2014/main" id="{CE3C357C-3A6D-4B2D-919B-468E62ADB4A7}"/>
+                <a16:creationId xmlns:a16="http://schemas.microsoft.com/office/drawing/2014/main" id="{CE3C357C-3A6D-4B2D-919B-468E62ADB4A7}"/>
               </a:ext>
             </a:extLst>
           </p:cNvPr>
@@ -5579,7 +5580,7 @@
           <p:cNvPr id="3" name="Titel 1">
             <a:extLst>
               <a:ext uri="{FF2B5EF4-FFF2-40B4-BE49-F238E27FC236}">
-                <a16:creationId xmlns="" xmlns:a16="http://schemas.microsoft.com/office/drawing/2014/main" id="{33062B24-559F-41F6-8766-1B8B53C3E0C1}"/>
+                <a16:creationId xmlns:a16="http://schemas.microsoft.com/office/drawing/2014/main" id="{33062B24-559F-41F6-8766-1B8B53C3E0C1}"/>
               </a:ext>
             </a:extLst>
           </p:cNvPr>
@@ -5649,7 +5650,7 @@
           <p:cNvPr id="5" name="Grafik 4">
             <a:extLst>
               <a:ext uri="{FF2B5EF4-FFF2-40B4-BE49-F238E27FC236}">
-                <a16:creationId xmlns="" xmlns:a16="http://schemas.microsoft.com/office/drawing/2014/main" id="{9A764CB7-DDFC-4155-9F78-766DD038F9B7}"/>
+                <a16:creationId xmlns:a16="http://schemas.microsoft.com/office/drawing/2014/main" id="{9A764CB7-DDFC-4155-9F78-766DD038F9B7}"/>
               </a:ext>
             </a:extLst>
           </p:cNvPr>
@@ -5709,7 +5710,7 @@
           <p:cNvPr id="3" name="Titel 1">
             <a:extLst>
               <a:ext uri="{FF2B5EF4-FFF2-40B4-BE49-F238E27FC236}">
-                <a16:creationId xmlns="" xmlns:a16="http://schemas.microsoft.com/office/drawing/2014/main" id="{33062B24-559F-41F6-8766-1B8B53C3E0C1}"/>
+                <a16:creationId xmlns:a16="http://schemas.microsoft.com/office/drawing/2014/main" id="{33062B24-559F-41F6-8766-1B8B53C3E0C1}"/>
               </a:ext>
             </a:extLst>
           </p:cNvPr>
@@ -5806,7 +5807,7 @@
           <p:cNvPr id="3" name="Titel 1">
             <a:extLst>
               <a:ext uri="{FF2B5EF4-FFF2-40B4-BE49-F238E27FC236}">
-                <a16:creationId xmlns="" xmlns:a16="http://schemas.microsoft.com/office/drawing/2014/main" id="{33062B24-559F-41F6-8766-1B8B53C3E0C1}"/>
+                <a16:creationId xmlns:a16="http://schemas.microsoft.com/office/drawing/2014/main" id="{33062B24-559F-41F6-8766-1B8B53C3E0C1}"/>
               </a:ext>
             </a:extLst>
           </p:cNvPr>
@@ -5906,7 +5907,7 @@
           <p:cNvPr id="2" name="Titel 1">
             <a:extLst>
               <a:ext uri="{FF2B5EF4-FFF2-40B4-BE49-F238E27FC236}">
-                <a16:creationId xmlns="" xmlns:a16="http://schemas.microsoft.com/office/drawing/2014/main" id="{FA0E998A-8B92-4AB3-A9A8-1DE5D112DC24}"/>
+                <a16:creationId xmlns:a16="http://schemas.microsoft.com/office/drawing/2014/main" id="{FA0E998A-8B92-4AB3-A9A8-1DE5D112DC24}"/>
               </a:ext>
             </a:extLst>
           </p:cNvPr>
@@ -5942,7 +5943,7 @@
           <p:cNvPr id="3" name="Inhaltsplatzhalter 2">
             <a:extLst>
               <a:ext uri="{FF2B5EF4-FFF2-40B4-BE49-F238E27FC236}">
-                <a16:creationId xmlns="" xmlns:a16="http://schemas.microsoft.com/office/drawing/2014/main" id="{03FCA3D9-EE93-495D-BB38-42608EA49BF0}"/>
+                <a16:creationId xmlns:a16="http://schemas.microsoft.com/office/drawing/2014/main" id="{03FCA3D9-EE93-495D-BB38-42608EA49BF0}"/>
               </a:ext>
             </a:extLst>
           </p:cNvPr>
@@ -6028,7 +6029,7 @@
           <p:cNvPr id="2" name="Titel 1">
             <a:extLst>
               <a:ext uri="{FF2B5EF4-FFF2-40B4-BE49-F238E27FC236}">
-                <a16:creationId xmlns="" xmlns:a16="http://schemas.microsoft.com/office/drawing/2014/main" id="{FA0E998A-8B92-4AB3-A9A8-1DE5D112DC24}"/>
+                <a16:creationId xmlns:a16="http://schemas.microsoft.com/office/drawing/2014/main" id="{FA0E998A-8B92-4AB3-A9A8-1DE5D112DC24}"/>
               </a:ext>
             </a:extLst>
           </p:cNvPr>
@@ -6064,7 +6065,7 @@
           <p:cNvPr id="3" name="Inhaltsplatzhalter 2">
             <a:extLst>
               <a:ext uri="{FF2B5EF4-FFF2-40B4-BE49-F238E27FC236}">
-                <a16:creationId xmlns="" xmlns:a16="http://schemas.microsoft.com/office/drawing/2014/main" id="{03FCA3D9-EE93-495D-BB38-42608EA49BF0}"/>
+                <a16:creationId xmlns:a16="http://schemas.microsoft.com/office/drawing/2014/main" id="{03FCA3D9-EE93-495D-BB38-42608EA49BF0}"/>
               </a:ext>
             </a:extLst>
           </p:cNvPr>
@@ -6490,7 +6491,7 @@
           <p:cNvPr id="11" name="Textfeld 10">
             <a:extLst>
               <a:ext uri="{FF2B5EF4-FFF2-40B4-BE49-F238E27FC236}">
-                <a16:creationId xmlns="" xmlns:a16="http://schemas.microsoft.com/office/drawing/2014/main" id="{4E05C3E3-6957-4521-AEFD-236E914B26E5}"/>
+                <a16:creationId xmlns:a16="http://schemas.microsoft.com/office/drawing/2014/main" id="{4E05C3E3-6957-4521-AEFD-236E914B26E5}"/>
               </a:ext>
             </a:extLst>
           </p:cNvPr>
@@ -6606,7 +6607,7 @@
           <p:cNvPr id="16" name="Titel 1">
             <a:extLst>
               <a:ext uri="{FF2B5EF4-FFF2-40B4-BE49-F238E27FC236}">
-                <a16:creationId xmlns="" xmlns:a16="http://schemas.microsoft.com/office/drawing/2014/main" id="{CE3C357C-3A6D-4B2D-919B-468E62ADB4A7}"/>
+                <a16:creationId xmlns:a16="http://schemas.microsoft.com/office/drawing/2014/main" id="{CE3C357C-3A6D-4B2D-919B-468E62ADB4A7}"/>
               </a:ext>
             </a:extLst>
           </p:cNvPr>
@@ -6677,7 +6678,7 @@
           <p:cNvPr id="3" name="Titel 1">
             <a:extLst>
               <a:ext uri="{FF2B5EF4-FFF2-40B4-BE49-F238E27FC236}">
-                <a16:creationId xmlns="" xmlns:a16="http://schemas.microsoft.com/office/drawing/2014/main" id="{33062B24-559F-41F6-8766-1B8B53C3E0C1}"/>
+                <a16:creationId xmlns:a16="http://schemas.microsoft.com/office/drawing/2014/main" id="{33062B24-559F-41F6-8766-1B8B53C3E0C1}"/>
               </a:ext>
             </a:extLst>
           </p:cNvPr>
@@ -6747,7 +6748,7 @@
           <p:cNvPr id="4" name="Grafik 3">
             <a:extLst>
               <a:ext uri="{FF2B5EF4-FFF2-40B4-BE49-F238E27FC236}">
-                <a16:creationId xmlns="" xmlns:a16="http://schemas.microsoft.com/office/drawing/2014/main" id="{2616159D-801A-486E-8E16-59B9A5AED34F}"/>
+                <a16:creationId xmlns:a16="http://schemas.microsoft.com/office/drawing/2014/main" id="{2616159D-801A-486E-8E16-59B9A5AED34F}"/>
               </a:ext>
             </a:extLst>
           </p:cNvPr>
@@ -6807,7 +6808,7 @@
           <p:cNvPr id="3" name="Titel 1">
             <a:extLst>
               <a:ext uri="{FF2B5EF4-FFF2-40B4-BE49-F238E27FC236}">
-                <a16:creationId xmlns="" xmlns:a16="http://schemas.microsoft.com/office/drawing/2014/main" id="{33062B24-559F-41F6-8766-1B8B53C3E0C1}"/>
+                <a16:creationId xmlns:a16="http://schemas.microsoft.com/office/drawing/2014/main" id="{33062B24-559F-41F6-8766-1B8B53C3E0C1}"/>
               </a:ext>
             </a:extLst>
           </p:cNvPr>
@@ -6904,7 +6905,7 @@
           <p:cNvPr id="3" name="Titel 1">
             <a:extLst>
               <a:ext uri="{FF2B5EF4-FFF2-40B4-BE49-F238E27FC236}">
-                <a16:creationId xmlns="" xmlns:a16="http://schemas.microsoft.com/office/drawing/2014/main" id="{33062B24-559F-41F6-8766-1B8B53C3E0C1}"/>
+                <a16:creationId xmlns:a16="http://schemas.microsoft.com/office/drawing/2014/main" id="{33062B24-559F-41F6-8766-1B8B53C3E0C1}"/>
               </a:ext>
             </a:extLst>
           </p:cNvPr>
@@ -7004,7 +7005,7 @@
           <p:cNvPr id="2" name="Titel 1">
             <a:extLst>
               <a:ext uri="{FF2B5EF4-FFF2-40B4-BE49-F238E27FC236}">
-                <a16:creationId xmlns="" xmlns:a16="http://schemas.microsoft.com/office/drawing/2014/main" id="{FA0E998A-8B92-4AB3-A9A8-1DE5D112DC24}"/>
+                <a16:creationId xmlns:a16="http://schemas.microsoft.com/office/drawing/2014/main" id="{FA0E998A-8B92-4AB3-A9A8-1DE5D112DC24}"/>
               </a:ext>
             </a:extLst>
           </p:cNvPr>
@@ -7052,7 +7053,7 @@
           <p:cNvPr id="3" name="Inhaltsplatzhalter 2">
             <a:extLst>
               <a:ext uri="{FF2B5EF4-FFF2-40B4-BE49-F238E27FC236}">
-                <a16:creationId xmlns="" xmlns:a16="http://schemas.microsoft.com/office/drawing/2014/main" id="{03FCA3D9-EE93-495D-BB38-42608EA49BF0}"/>
+                <a16:creationId xmlns:a16="http://schemas.microsoft.com/office/drawing/2014/main" id="{03FCA3D9-EE93-495D-BB38-42608EA49BF0}"/>
               </a:ext>
             </a:extLst>
           </p:cNvPr>
@@ -7138,7 +7139,7 @@
           <p:cNvPr id="2" name="Titel 1">
             <a:extLst>
               <a:ext uri="{FF2B5EF4-FFF2-40B4-BE49-F238E27FC236}">
-                <a16:creationId xmlns="" xmlns:a16="http://schemas.microsoft.com/office/drawing/2014/main" id="{7C8BA7A4-3887-BBC2-DB11-C3E410781B8F}"/>
+                <a16:creationId xmlns:a16="http://schemas.microsoft.com/office/drawing/2014/main" id="{7C8BA7A4-3887-BBC2-DB11-C3E410781B8F}"/>
               </a:ext>
             </a:extLst>
           </p:cNvPr>
@@ -7170,7 +7171,7 @@
           <p:cNvPr id="5" name="Textfeld 4">
             <a:extLst>
               <a:ext uri="{FF2B5EF4-FFF2-40B4-BE49-F238E27FC236}">
-                <a16:creationId xmlns="" xmlns:a16="http://schemas.microsoft.com/office/drawing/2014/main" id="{7E9BB3B3-C33E-E6D4-B884-B0E81F04763D}"/>
+                <a16:creationId xmlns:a16="http://schemas.microsoft.com/office/drawing/2014/main" id="{7E9BB3B3-C33E-E6D4-B884-B0E81F04763D}"/>
               </a:ext>
             </a:extLst>
           </p:cNvPr>
@@ -7277,7 +7278,7 @@
         <p:cNvPr id="1" name="">
           <a:extLst>
             <a:ext uri="{FF2B5EF4-FFF2-40B4-BE49-F238E27FC236}">
-              <a16:creationId xmlns="" xmlns:a16="http://schemas.microsoft.com/office/drawing/2014/main" id="{09813FCD-FFC4-7218-580C-E973F9446FF5}"/>
+              <a16:creationId xmlns:a16="http://schemas.microsoft.com/office/drawing/2014/main" id="{09813FCD-FFC4-7218-580C-E973F9446FF5}"/>
             </a:ext>
           </a:extLst>
         </p:cNvPr>
@@ -7297,7 +7298,7 @@
           <p:cNvPr id="2" name="Titel 1">
             <a:extLst>
               <a:ext uri="{FF2B5EF4-FFF2-40B4-BE49-F238E27FC236}">
-                <a16:creationId xmlns="" xmlns:a16="http://schemas.microsoft.com/office/drawing/2014/main" id="{66725232-2EC4-A6B4-8555-37412C044780}"/>
+                <a16:creationId xmlns:a16="http://schemas.microsoft.com/office/drawing/2014/main" id="{66725232-2EC4-A6B4-8555-37412C044780}"/>
               </a:ext>
             </a:extLst>
           </p:cNvPr>
@@ -7329,7 +7330,7 @@
           <p:cNvPr id="3" name="Grafik 2">
             <a:extLst>
               <a:ext uri="{FF2B5EF4-FFF2-40B4-BE49-F238E27FC236}">
-                <a16:creationId xmlns="" xmlns:a16="http://schemas.microsoft.com/office/drawing/2014/main" id="{7CAB953F-546C-1177-FD3E-EB14CBE2ECA4}"/>
+                <a16:creationId xmlns:a16="http://schemas.microsoft.com/office/drawing/2014/main" id="{7CAB953F-546C-1177-FD3E-EB14CBE2ECA4}"/>
               </a:ext>
             </a:extLst>
           </p:cNvPr>
@@ -7389,7 +7390,7 @@
           <p:cNvPr id="2" name="Titel 1">
             <a:extLst>
               <a:ext uri="{FF2B5EF4-FFF2-40B4-BE49-F238E27FC236}">
-                <a16:creationId xmlns="" xmlns:a16="http://schemas.microsoft.com/office/drawing/2014/main" id="{1590B5F2-09FC-A6DD-AB13-BC89F20C2A45}"/>
+                <a16:creationId xmlns:a16="http://schemas.microsoft.com/office/drawing/2014/main" id="{1590B5F2-09FC-A6DD-AB13-BC89F20C2A45}"/>
               </a:ext>
             </a:extLst>
           </p:cNvPr>
@@ -7421,7 +7422,7 @@
           <p:cNvPr id="4" name="Grafik 3">
             <a:extLst>
               <a:ext uri="{FF2B5EF4-FFF2-40B4-BE49-F238E27FC236}">
-                <a16:creationId xmlns="" xmlns:a16="http://schemas.microsoft.com/office/drawing/2014/main" id="{0C8F9394-0313-AE1A-0F49-D6D81164276E}"/>
+                <a16:creationId xmlns:a16="http://schemas.microsoft.com/office/drawing/2014/main" id="{0C8F9394-0313-AE1A-0F49-D6D81164276E}"/>
               </a:ext>
             </a:extLst>
           </p:cNvPr>
@@ -7481,7 +7482,7 @@
           <p:cNvPr id="2" name="Titel 1">
             <a:extLst>
               <a:ext uri="{FF2B5EF4-FFF2-40B4-BE49-F238E27FC236}">
-                <a16:creationId xmlns="" xmlns:a16="http://schemas.microsoft.com/office/drawing/2014/main" id="{465F36B2-EA5D-F35D-FD31-C535063D727A}"/>
+                <a16:creationId xmlns:a16="http://schemas.microsoft.com/office/drawing/2014/main" id="{465F36B2-EA5D-F35D-FD31-C535063D727A}"/>
               </a:ext>
             </a:extLst>
           </p:cNvPr>
@@ -7498,14 +7499,13 @@
           <a:lstStyle/>
           <a:p>
             <a:r>
-              <a:rPr lang="en-US" dirty="0" err="1" smtClean="0"/>
+              <a:rPr lang="en-US" dirty="0" err="1"/>
               <a:t>ViT</a:t>
             </a:r>
             <a:r>
-              <a:rPr lang="en-US" dirty="0" smtClean="0"/>
+              <a:rPr lang="en-US" dirty="0"/>
               <a:t> dataset 2 model 7</a:t>
             </a:r>
-            <a:endParaRPr lang="en-US" dirty="0"/>
           </a:p>
         </p:txBody>
       </p:sp>
@@ -7579,10 +7579,9 @@
           <a:lstStyle/>
           <a:p>
             <a:r>
-              <a:rPr lang="de-DE" dirty="0" smtClean="0"/>
+              <a:rPr lang="de-DE" dirty="0"/>
               <a:t>Neue Überlegung</a:t>
             </a:r>
-            <a:endParaRPr lang="de-DE" dirty="0"/>
           </a:p>
         </p:txBody>
       </p:sp>
@@ -7602,42 +7601,41 @@
           <a:lstStyle/>
           <a:p>
             <a:r>
-              <a:rPr lang="de-DE" dirty="0" smtClean="0"/>
+              <a:rPr lang="de-DE" dirty="0"/>
               <a:t>Vision Transformer ist ein Modell, dass Bilddaten 1000+ pro Klasse erwartet</a:t>
             </a:r>
           </a:p>
           <a:p>
             <a:r>
-              <a:rPr lang="de-DE" dirty="0" smtClean="0"/>
+              <a:rPr lang="de-DE" dirty="0"/>
               <a:t>Die Bilder in unserem Datensatz sind sich sehr ähnlich, deshalb zuvor 400 Bilder pro Klasse</a:t>
             </a:r>
           </a:p>
           <a:p>
             <a:r>
-              <a:rPr lang="de-DE" dirty="0" smtClean="0"/>
+              <a:rPr lang="de-DE" dirty="0"/>
               <a:t>Nun Test, ob die </a:t>
             </a:r>
             <a:r>
-              <a:rPr lang="de-DE" dirty="0" err="1" smtClean="0"/>
+              <a:rPr lang="de-DE" dirty="0" err="1"/>
               <a:t>Accuracy</a:t>
             </a:r>
             <a:r>
-              <a:rPr lang="de-DE" dirty="0" smtClean="0"/>
+              <a:rPr lang="de-DE" dirty="0"/>
               <a:t> und die Generalisierung der Klassifikation besser wird, wenn 1000 Bilder pro Klasse vorhanden sind: Neuer Datensatz 640 Bilder des </a:t>
             </a:r>
             <a:r>
-              <a:rPr lang="de-DE" dirty="0" err="1" smtClean="0"/>
+              <a:rPr lang="de-DE" dirty="0" err="1"/>
               <a:t>Kaggle</a:t>
             </a:r>
             <a:r>
-              <a:rPr lang="de-DE" dirty="0" smtClean="0"/>
+              <a:rPr lang="de-DE" dirty="0"/>
               <a:t> Datensatz + ca. 500 Bilder aus </a:t>
             </a:r>
             <a:r>
-              <a:rPr lang="de-DE" smtClean="0"/>
+              <a:rPr lang="de-DE"/>
               <a:t>mediapipe</a:t>
             </a:r>
-            <a:endParaRPr lang="de-DE"/>
           </a:p>
         </p:txBody>
       </p:sp>
@@ -7673,6 +7671,98 @@
       </p:grpSpPr>
       <p:sp>
         <p:nvSpPr>
+          <p:cNvPr id="2" name="Titel 1">
+            <a:extLst>
+              <a:ext uri="{FF2B5EF4-FFF2-40B4-BE49-F238E27FC236}">
+                <a16:creationId xmlns:a16="http://schemas.microsoft.com/office/drawing/2014/main" id="{24100E6A-6E44-BBDC-433C-CD2A952BB96F}"/>
+              </a:ext>
+            </a:extLst>
+          </p:cNvPr>
+          <p:cNvSpPr>
+            <a:spLocks noGrp="1"/>
+          </p:cNvSpPr>
+          <p:nvPr>
+            <p:ph type="title"/>
+          </p:nvPr>
+        </p:nvSpPr>
+        <p:spPr/>
+        <p:txBody>
+          <a:bodyPr/>
+          <a:lstStyle/>
+          <a:p>
+            <a:r>
+              <a:rPr lang="en-US" dirty="0" err="1"/>
+              <a:t>ViT</a:t>
+            </a:r>
+            <a:r>
+              <a:rPr lang="en-US" dirty="0"/>
+              <a:t> dataset 2 model 8</a:t>
+            </a:r>
+          </a:p>
+        </p:txBody>
+      </p:sp>
+      <p:pic>
+        <p:nvPicPr>
+          <p:cNvPr id="4" name="Grafik 3">
+            <a:extLst>
+              <a:ext uri="{FF2B5EF4-FFF2-40B4-BE49-F238E27FC236}">
+                <a16:creationId xmlns:a16="http://schemas.microsoft.com/office/drawing/2014/main" id="{B3A3B0DE-0170-F9A3-C232-7619CAD5DC13}"/>
+              </a:ext>
+            </a:extLst>
+          </p:cNvPr>
+          <p:cNvPicPr>
+            <a:picLocks noChangeAspect="1"/>
+          </p:cNvPicPr>
+          <p:nvPr/>
+        </p:nvPicPr>
+        <p:blipFill>
+          <a:blip r:embed="rId2"/>
+          <a:stretch>
+            <a:fillRect/>
+          </a:stretch>
+        </p:blipFill>
+        <p:spPr>
+          <a:xfrm>
+            <a:off x="299023" y="1447212"/>
+            <a:ext cx="11054777" cy="5311475"/>
+          </a:xfrm>
+          <a:prstGeom prst="rect">
+            <a:avLst/>
+          </a:prstGeom>
+        </p:spPr>
+      </p:pic>
+    </p:spTree>
+    <p:extLst>
+      <p:ext uri="{BB962C8B-B14F-4D97-AF65-F5344CB8AC3E}">
+        <p14:creationId xmlns:p14="http://schemas.microsoft.com/office/powerpoint/2010/main" val="146272807"/>
+      </p:ext>
+    </p:extLst>
+  </p:cSld>
+  <p:clrMapOvr>
+    <a:masterClrMapping/>
+  </p:clrMapOvr>
+</p:sld>
+</file>
+
+<file path=ppt/slides/slide36.xml><?xml version="1.0" encoding="utf-8"?>
+<p:sld xmlns:a="http://schemas.openxmlformats.org/drawingml/2006/main" xmlns:r="http://schemas.openxmlformats.org/officeDocument/2006/relationships" xmlns:p="http://schemas.openxmlformats.org/presentationml/2006/main">
+  <p:cSld>
+    <p:spTree>
+      <p:nvGrpSpPr>
+        <p:cNvPr id="1" name=""/>
+        <p:cNvGrpSpPr/>
+        <p:nvPr/>
+      </p:nvGrpSpPr>
+      <p:grpSpPr>
+        <a:xfrm>
+          <a:off x="0" y="0"/>
+          <a:ext cx="0" cy="0"/>
+          <a:chOff x="0" y="0"/>
+          <a:chExt cx="0" cy="0"/>
+        </a:xfrm>
+      </p:grpSpPr>
+      <p:sp>
+        <p:nvSpPr>
           <p:cNvPr id="2" name="Titel 1"/>
           <p:cNvSpPr>
             <a:spLocks noGrp="1"/>
@@ -7737,10 +7827,9 @@
           <a:lstStyle/>
           <a:p>
             <a:r>
-              <a:rPr lang="de-DE" dirty="0" smtClean="0"/>
+              <a:rPr lang="de-DE" dirty="0"/>
               <a:t>0             1           2           3           4           5           6            7          8</a:t>
             </a:r>
-            <a:endParaRPr lang="de-DE" dirty="0"/>
           </a:p>
         </p:txBody>
       </p:sp>
@@ -7768,13 +7857,8 @@
           <a:p>
             <a:r>
               <a:rPr lang="de-DE" dirty="0"/>
-              <a:t>9</a:t>
-            </a:r>
-            <a:r>
-              <a:rPr lang="de-DE" dirty="0" smtClean="0"/>
-              <a:t>             10           11         12        13         14        15         16          17</a:t>
-            </a:r>
-            <a:endParaRPr lang="de-DE" dirty="0"/>
+              <a:t>9             10           11         12        13         14        15         16          17</a:t>
+            </a:r>
           </a:p>
         </p:txBody>
       </p:sp>
@@ -7801,10 +7885,9 @@
           <a:lstStyle/>
           <a:p>
             <a:r>
-              <a:rPr lang="de-DE" dirty="0" smtClean="0"/>
+              <a:rPr lang="de-DE" dirty="0"/>
               <a:t>18           19           20         21        22         23        24        25</a:t>
             </a:r>
-            <a:endParaRPr lang="de-DE" dirty="0"/>
           </a:p>
         </p:txBody>
       </p:sp>
@@ -7843,7 +7926,7 @@
           <p:cNvPr id="2" name="Titel 1">
             <a:extLst>
               <a:ext uri="{FF2B5EF4-FFF2-40B4-BE49-F238E27FC236}">
-                <a16:creationId xmlns="" xmlns:a16="http://schemas.microsoft.com/office/drawing/2014/main" id="{9EE6259C-8E17-43C1-815C-EC58FCDFCE07}"/>
+                <a16:creationId xmlns:a16="http://schemas.microsoft.com/office/drawing/2014/main" id="{9EE6259C-8E17-43C1-815C-EC58FCDFCE07}"/>
               </a:ext>
             </a:extLst>
           </p:cNvPr>
@@ -7879,7 +7962,7 @@
           <p:cNvPr id="3" name="Grafik 2">
             <a:extLst>
               <a:ext uri="{FF2B5EF4-FFF2-40B4-BE49-F238E27FC236}">
-                <a16:creationId xmlns="" xmlns:a16="http://schemas.microsoft.com/office/drawing/2014/main" id="{5F9C2164-257F-4FBE-811F-AF875CACCA96}"/>
+                <a16:creationId xmlns:a16="http://schemas.microsoft.com/office/drawing/2014/main" id="{5F9C2164-257F-4FBE-811F-AF875CACCA96}"/>
               </a:ext>
             </a:extLst>
           </p:cNvPr>
@@ -7939,7 +8022,7 @@
           <p:cNvPr id="4" name="Textfeld 3">
             <a:extLst>
               <a:ext uri="{FF2B5EF4-FFF2-40B4-BE49-F238E27FC236}">
-                <a16:creationId xmlns="" xmlns:a16="http://schemas.microsoft.com/office/drawing/2014/main" id="{B6EA9917-7A82-410D-9CE7-B05AB59C6930}"/>
+                <a16:creationId xmlns:a16="http://schemas.microsoft.com/office/drawing/2014/main" id="{B6EA9917-7A82-410D-9CE7-B05AB59C6930}"/>
               </a:ext>
             </a:extLst>
           </p:cNvPr>
@@ -8031,7 +8114,7 @@
           <p:cNvPr id="5" name="Titel 1">
             <a:extLst>
               <a:ext uri="{FF2B5EF4-FFF2-40B4-BE49-F238E27FC236}">
-                <a16:creationId xmlns="" xmlns:a16="http://schemas.microsoft.com/office/drawing/2014/main" id="{B714DE99-8892-4254-AD52-8AF8324C50CA}"/>
+                <a16:creationId xmlns:a16="http://schemas.microsoft.com/office/drawing/2014/main" id="{B714DE99-8892-4254-AD52-8AF8324C50CA}"/>
               </a:ext>
             </a:extLst>
           </p:cNvPr>
@@ -8115,7 +8198,7 @@
           <p:cNvPr id="2" name="Titel 1">
             <a:extLst>
               <a:ext uri="{FF2B5EF4-FFF2-40B4-BE49-F238E27FC236}">
-                <a16:creationId xmlns="" xmlns:a16="http://schemas.microsoft.com/office/drawing/2014/main" id="{9EE6259C-8E17-43C1-815C-EC58FCDFCE07}"/>
+                <a16:creationId xmlns:a16="http://schemas.microsoft.com/office/drawing/2014/main" id="{9EE6259C-8E17-43C1-815C-EC58FCDFCE07}"/>
               </a:ext>
             </a:extLst>
           </p:cNvPr>
@@ -8148,7 +8231,7 @@
           <p:cNvPr id="7" name="Grafik 6">
             <a:extLst>
               <a:ext uri="{FF2B5EF4-FFF2-40B4-BE49-F238E27FC236}">
-                <a16:creationId xmlns="" xmlns:a16="http://schemas.microsoft.com/office/drawing/2014/main" id="{CF5D92CE-ABCF-491C-AD20-65205CAC2BC8}"/>
+                <a16:creationId xmlns:a16="http://schemas.microsoft.com/office/drawing/2014/main" id="{CF5D92CE-ABCF-491C-AD20-65205CAC2BC8}"/>
               </a:ext>
             </a:extLst>
           </p:cNvPr>
@@ -8214,7 +8297,7 @@
           <p:cNvPr id="2" name="Titel 1">
             <a:extLst>
               <a:ext uri="{FF2B5EF4-FFF2-40B4-BE49-F238E27FC236}">
-                <a16:creationId xmlns="" xmlns:a16="http://schemas.microsoft.com/office/drawing/2014/main" id="{9EE6259C-8E17-43C1-815C-EC58FCDFCE07}"/>
+                <a16:creationId xmlns:a16="http://schemas.microsoft.com/office/drawing/2014/main" id="{9EE6259C-8E17-43C1-815C-EC58FCDFCE07}"/>
               </a:ext>
             </a:extLst>
           </p:cNvPr>
@@ -8250,7 +8333,7 @@
           <p:cNvPr id="18" name="Grafik 17">
             <a:extLst>
               <a:ext uri="{FF2B5EF4-FFF2-40B4-BE49-F238E27FC236}">
-                <a16:creationId xmlns="" xmlns:a16="http://schemas.microsoft.com/office/drawing/2014/main" id="{50E7E37D-C9D6-497C-9462-1847C520EF17}"/>
+                <a16:creationId xmlns:a16="http://schemas.microsoft.com/office/drawing/2014/main" id="{50E7E37D-C9D6-497C-9462-1847C520EF17}"/>
               </a:ext>
             </a:extLst>
           </p:cNvPr>
@@ -8286,7 +8369,7 @@
           <p:cNvPr id="20" name="Grafik 19">
             <a:extLst>
               <a:ext uri="{FF2B5EF4-FFF2-40B4-BE49-F238E27FC236}">
-                <a16:creationId xmlns="" xmlns:a16="http://schemas.microsoft.com/office/drawing/2014/main" id="{B65397EF-5233-4329-A2BC-B9FD0E3D4552}"/>
+                <a16:creationId xmlns:a16="http://schemas.microsoft.com/office/drawing/2014/main" id="{B65397EF-5233-4329-A2BC-B9FD0E3D4552}"/>
               </a:ext>
             </a:extLst>
           </p:cNvPr>
@@ -8322,7 +8405,7 @@
           <p:cNvPr id="21" name="Grafik 20">
             <a:extLst>
               <a:ext uri="{FF2B5EF4-FFF2-40B4-BE49-F238E27FC236}">
-                <a16:creationId xmlns="" xmlns:a16="http://schemas.microsoft.com/office/drawing/2014/main" id="{A1DC1406-976B-4DCD-BED7-7DEC6E9D8CBB}"/>
+                <a16:creationId xmlns:a16="http://schemas.microsoft.com/office/drawing/2014/main" id="{A1DC1406-976B-4DCD-BED7-7DEC6E9D8CBB}"/>
               </a:ext>
             </a:extLst>
           </p:cNvPr>
@@ -8352,7 +8435,7 @@
           <p:cNvPr id="23" name="Grafik 22">
             <a:extLst>
               <a:ext uri="{FF2B5EF4-FFF2-40B4-BE49-F238E27FC236}">
-                <a16:creationId xmlns="" xmlns:a16="http://schemas.microsoft.com/office/drawing/2014/main" id="{8E0954D3-4692-42A3-AEF6-5F5F1DD717DF}"/>
+                <a16:creationId xmlns:a16="http://schemas.microsoft.com/office/drawing/2014/main" id="{8E0954D3-4692-42A3-AEF6-5F5F1DD717DF}"/>
               </a:ext>
             </a:extLst>
           </p:cNvPr>
@@ -8388,7 +8471,7 @@
           <p:cNvPr id="24" name="Grafik 23">
             <a:extLst>
               <a:ext uri="{FF2B5EF4-FFF2-40B4-BE49-F238E27FC236}">
-                <a16:creationId xmlns="" xmlns:a16="http://schemas.microsoft.com/office/drawing/2014/main" id="{B3C25451-2B01-4511-B3D3-446047570DE5}"/>
+                <a16:creationId xmlns:a16="http://schemas.microsoft.com/office/drawing/2014/main" id="{B3C25451-2B01-4511-B3D3-446047570DE5}"/>
               </a:ext>
             </a:extLst>
           </p:cNvPr>
@@ -8418,7 +8501,7 @@
           <p:cNvPr id="26" name="Grafik 25">
             <a:extLst>
               <a:ext uri="{FF2B5EF4-FFF2-40B4-BE49-F238E27FC236}">
-                <a16:creationId xmlns="" xmlns:a16="http://schemas.microsoft.com/office/drawing/2014/main" id="{1367260E-8C66-4449-B88B-A196FD0908A7}"/>
+                <a16:creationId xmlns:a16="http://schemas.microsoft.com/office/drawing/2014/main" id="{1367260E-8C66-4449-B88B-A196FD0908A7}"/>
               </a:ext>
             </a:extLst>
           </p:cNvPr>
@@ -8454,7 +8537,7 @@
           <p:cNvPr id="28" name="Grafik 27">
             <a:extLst>
               <a:ext uri="{FF2B5EF4-FFF2-40B4-BE49-F238E27FC236}">
-                <a16:creationId xmlns="" xmlns:a16="http://schemas.microsoft.com/office/drawing/2014/main" id="{3385D22C-EE8A-4485-AE09-C19130CBE8C3}"/>
+                <a16:creationId xmlns:a16="http://schemas.microsoft.com/office/drawing/2014/main" id="{3385D22C-EE8A-4485-AE09-C19130CBE8C3}"/>
               </a:ext>
             </a:extLst>
           </p:cNvPr>
@@ -8490,7 +8573,7 @@
           <p:cNvPr id="29" name="Grafik 28">
             <a:extLst>
               <a:ext uri="{FF2B5EF4-FFF2-40B4-BE49-F238E27FC236}">
-                <a16:creationId xmlns="" xmlns:a16="http://schemas.microsoft.com/office/drawing/2014/main" id="{467B77FF-95C2-44EA-AC51-9E575824E2C5}"/>
+                <a16:creationId xmlns:a16="http://schemas.microsoft.com/office/drawing/2014/main" id="{467B77FF-95C2-44EA-AC51-9E575824E2C5}"/>
               </a:ext>
             </a:extLst>
           </p:cNvPr>
@@ -8550,7 +8633,7 @@
           <p:cNvPr id="2" name="Titel 1">
             <a:extLst>
               <a:ext uri="{FF2B5EF4-FFF2-40B4-BE49-F238E27FC236}">
-                <a16:creationId xmlns="" xmlns:a16="http://schemas.microsoft.com/office/drawing/2014/main" id="{1F20CAF2-C127-4F0A-B316-19CC56055294}"/>
+                <a16:creationId xmlns:a16="http://schemas.microsoft.com/office/drawing/2014/main" id="{1F20CAF2-C127-4F0A-B316-19CC56055294}"/>
               </a:ext>
             </a:extLst>
           </p:cNvPr>
@@ -8578,7 +8661,7 @@
           <p:cNvPr id="5" name="Inhaltsplatzhalter 2">
             <a:extLst>
               <a:ext uri="{FF2B5EF4-FFF2-40B4-BE49-F238E27FC236}">
-                <a16:creationId xmlns="" xmlns:a16="http://schemas.microsoft.com/office/drawing/2014/main" id="{64590773-EBBD-4338-B137-C3DAAB80D082}"/>
+                <a16:creationId xmlns:a16="http://schemas.microsoft.com/office/drawing/2014/main" id="{64590773-EBBD-4338-B137-C3DAAB80D082}"/>
               </a:ext>
             </a:extLst>
           </p:cNvPr>
@@ -8806,7 +8889,7 @@
           <p:cNvPr id="2" name="Titel 1">
             <a:extLst>
               <a:ext uri="{FF2B5EF4-FFF2-40B4-BE49-F238E27FC236}">
-                <a16:creationId xmlns="" xmlns:a16="http://schemas.microsoft.com/office/drawing/2014/main" id="{9EE6259C-8E17-43C1-815C-EC58FCDFCE07}"/>
+                <a16:creationId xmlns:a16="http://schemas.microsoft.com/office/drawing/2014/main" id="{9EE6259C-8E17-43C1-815C-EC58FCDFCE07}"/>
               </a:ext>
             </a:extLst>
           </p:cNvPr>
@@ -8842,7 +8925,7 @@
           <p:cNvPr id="6" name="Grafik 5">
             <a:extLst>
               <a:ext uri="{FF2B5EF4-FFF2-40B4-BE49-F238E27FC236}">
-                <a16:creationId xmlns="" xmlns:a16="http://schemas.microsoft.com/office/drawing/2014/main" id="{14932DAF-0E81-4E95-8560-F9C199BFDDCF}"/>
+                <a16:creationId xmlns:a16="http://schemas.microsoft.com/office/drawing/2014/main" id="{14932DAF-0E81-4E95-8560-F9C199BFDDCF}"/>
               </a:ext>
             </a:extLst>
           </p:cNvPr>

</xml_diff>